<commit_message>
Atualizando Slide da aula 5
</commit_message>
<xml_diff>
--- a/Euripedes Simões de Paula/Banco de Dados/Aula 5/Projeto de banco de dados.pptx
+++ b/Euripedes Simões de Paula/Banco de Dados/Aula 5/Projeto de banco de dados.pptx
@@ -23,6 +23,9 @@
     <p:sldId id="271" r:id="rId17"/>
     <p:sldId id="272" r:id="rId18"/>
     <p:sldId id="273" r:id="rId19"/>
+    <p:sldId id="274" r:id="rId20"/>
+    <p:sldId id="275" r:id="rId21"/>
+    <p:sldId id="276" r:id="rId22"/>
   </p:sldIdLst>
   <p:sldSz cx="12192000" cy="6858000"/>
   <p:notesSz cx="6858000" cy="9144000"/>
@@ -121,6 +124,11 @@
       </a:defRPr>
     </a:lvl9pPr>
   </p:defaultTextStyle>
+  <p:extLst>
+    <p:ext uri="{EFAFB233-063F-42B5-8137-9DF3F51BA10A}">
+      <p15:sldGuideLst xmlns:p15="http://schemas.microsoft.com/office/powerpoint/2012/main"/>
+    </p:ext>
+  </p:extLst>
 </p:presentation>
 </file>
 
@@ -350,7 +358,7 @@
           <a:p>
             <a:fld id="{B8B9BE19-35B1-49B2-9769-AE2A591CF592}" type="datetimeFigureOut">
               <a:rPr lang="pt-BR" smtClean="0"/>
-              <a:t>26/03/2024</a:t>
+              <a:t>28/03/2024</a:t>
             </a:fld>
             <a:endParaRPr lang="pt-BR"/>
           </a:p>
@@ -558,7 +566,7 @@
           <a:p>
             <a:fld id="{B8B9BE19-35B1-49B2-9769-AE2A591CF592}" type="datetimeFigureOut">
               <a:rPr lang="pt-BR" smtClean="0"/>
-              <a:t>26/03/2024</a:t>
+              <a:t>28/03/2024</a:t>
             </a:fld>
             <a:endParaRPr lang="pt-BR"/>
           </a:p>
@@ -814,7 +822,7 @@
           <a:p>
             <a:fld id="{B8B9BE19-35B1-49B2-9769-AE2A591CF592}" type="datetimeFigureOut">
               <a:rPr lang="pt-BR" smtClean="0"/>
-              <a:t>26/03/2024</a:t>
+              <a:t>28/03/2024</a:t>
             </a:fld>
             <a:endParaRPr lang="pt-BR"/>
           </a:p>
@@ -988,7 +996,7 @@
           <a:p>
             <a:fld id="{B8B9BE19-35B1-49B2-9769-AE2A591CF592}" type="datetimeFigureOut">
               <a:rPr lang="pt-BR" smtClean="0"/>
-              <a:t>26/03/2024</a:t>
+              <a:t>28/03/2024</a:t>
             </a:fld>
             <a:endParaRPr lang="pt-BR"/>
           </a:p>
@@ -1331,7 +1339,7 @@
           <a:p>
             <a:fld id="{B8B9BE19-35B1-49B2-9769-AE2A591CF592}" type="datetimeFigureOut">
               <a:rPr lang="pt-BR" smtClean="0"/>
-              <a:t>26/03/2024</a:t>
+              <a:t>28/03/2024</a:t>
             </a:fld>
             <a:endParaRPr lang="pt-BR"/>
           </a:p>
@@ -1606,7 +1614,7 @@
           <a:p>
             <a:fld id="{B8B9BE19-35B1-49B2-9769-AE2A591CF592}" type="datetimeFigureOut">
               <a:rPr lang="pt-BR" smtClean="0"/>
-              <a:t>26/03/2024</a:t>
+              <a:t>28/03/2024</a:t>
             </a:fld>
             <a:endParaRPr lang="pt-BR"/>
           </a:p>
@@ -1985,7 +1993,7 @@
           <a:p>
             <a:fld id="{B8B9BE19-35B1-49B2-9769-AE2A591CF592}" type="datetimeFigureOut">
               <a:rPr lang="pt-BR" smtClean="0"/>
-              <a:t>26/03/2024</a:t>
+              <a:t>28/03/2024</a:t>
             </a:fld>
             <a:endParaRPr lang="pt-BR"/>
           </a:p>
@@ -2103,7 +2111,7 @@
           <a:p>
             <a:fld id="{B8B9BE19-35B1-49B2-9769-AE2A591CF592}" type="datetimeFigureOut">
               <a:rPr lang="pt-BR" smtClean="0"/>
-              <a:t>26/03/2024</a:t>
+              <a:t>28/03/2024</a:t>
             </a:fld>
             <a:endParaRPr lang="pt-BR"/>
           </a:p>
@@ -2274,7 +2282,7 @@
           <a:p>
             <a:fld id="{B8B9BE19-35B1-49B2-9769-AE2A591CF592}" type="datetimeFigureOut">
               <a:rPr lang="pt-BR" smtClean="0"/>
-              <a:t>26/03/2024</a:t>
+              <a:t>28/03/2024</a:t>
             </a:fld>
             <a:endParaRPr lang="pt-BR"/>
           </a:p>
@@ -2628,7 +2636,7 @@
           <a:p>
             <a:fld id="{B8B9BE19-35B1-49B2-9769-AE2A591CF592}" type="datetimeFigureOut">
               <a:rPr lang="pt-BR" smtClean="0"/>
-              <a:t>26/03/2024</a:t>
+              <a:t>28/03/2024</a:t>
             </a:fld>
             <a:endParaRPr lang="pt-BR"/>
           </a:p>
@@ -3010,7 +3018,7 @@
           <a:p>
             <a:fld id="{B8B9BE19-35B1-49B2-9769-AE2A591CF592}" type="datetimeFigureOut">
               <a:rPr lang="pt-BR" smtClean="0"/>
-              <a:t>26/03/2024</a:t>
+              <a:t>28/03/2024</a:t>
             </a:fld>
             <a:endParaRPr lang="pt-BR"/>
           </a:p>
@@ -3297,7 +3305,7 @@
           <a:p>
             <a:fld id="{B8B9BE19-35B1-49B2-9769-AE2A591CF592}" type="datetimeFigureOut">
               <a:rPr lang="pt-BR" smtClean="0"/>
-              <a:t>26/03/2024</a:t>
+              <a:t>28/03/2024</a:t>
             </a:fld>
             <a:endParaRPr lang="pt-BR"/>
           </a:p>
@@ -5730,7 +5738,7 @@
         <p:spPr>
           <a:xfrm>
             <a:off x="1097280" y="1923529"/>
-            <a:ext cx="10058400" cy="4414926"/>
+            <a:ext cx="10058400" cy="4379994"/>
           </a:xfrm>
         </p:spPr>
         <p:txBody>
@@ -5739,16 +5747,36 @@
           </a:bodyPr>
           <a:lstStyle/>
           <a:p>
-            <a:r>
-              <a:rPr lang="pt-BR" sz="2400" dirty="0"/>
-              <a:t>Cada entidade tem uma força, vamos conhece-la.</a:t>
-            </a:r>
-          </a:p>
-          <a:p>
             <a:pPr marL="0" indent="0">
               <a:buNone/>
             </a:pPr>
-            <a:endParaRPr lang="pt-BR" sz="2400" b="1" dirty="0"/>
+            <a:r>
+              <a:rPr lang="pt-BR" sz="2400" dirty="0"/>
+              <a:t>Podemos definir os atributos como informações ou descrições das entidades, e estes são as colunas da tabela. </a:t>
+            </a:r>
+          </a:p>
+          <a:p>
+            <a:pPr marL="0" indent="0">
+              <a:buNone/>
+            </a:pPr>
+            <a:r>
+              <a:rPr lang="pt-BR" sz="2400" dirty="0"/>
+              <a:t>No Diagrama Entidade-Relacionamento usamos os atributos:</a:t>
+            </a:r>
+          </a:p>
+          <a:p>
+            <a:pPr>
+              <a:buFont typeface="Wingdings" panose="05000000000000000000" pitchFamily="2" charset="2"/>
+              <a:buChar char="Ø"/>
+            </a:pPr>
+            <a:r>
+              <a:rPr lang="pt-BR" sz="2400" b="1" dirty="0"/>
+              <a:t> Atributos simples</a:t>
+            </a:r>
+            <a:r>
+              <a:rPr lang="pt-BR" sz="2400" dirty="0"/>
+              <a:t> – para aqueles que contêm apenas um valor por elemento da entidade.</a:t>
+            </a:r>
           </a:p>
           <a:p>
             <a:pPr marL="0" indent="0">
@@ -5764,10 +5792,910 @@
           </a:p>
         </p:txBody>
       </p:sp>
+      <p:grpSp>
+        <p:nvGrpSpPr>
+          <p:cNvPr id="4" name="Group 18995">
+            <a:extLst>
+              <a:ext uri="{FF2B5EF4-FFF2-40B4-BE49-F238E27FC236}">
+                <a16:creationId xmlns:a16="http://schemas.microsoft.com/office/drawing/2014/main" id="{77298285-4009-F48A-62E0-F67DE59087F2}"/>
+              </a:ext>
+            </a:extLst>
+          </p:cNvPr>
+          <p:cNvGrpSpPr/>
+          <p:nvPr/>
+        </p:nvGrpSpPr>
+        <p:grpSpPr>
+          <a:xfrm>
+            <a:off x="7879403" y="2654182"/>
+            <a:ext cx="5935825" cy="2918687"/>
+            <a:chOff x="-2112842" y="672915"/>
+            <a:chExt cx="4106687" cy="2121460"/>
+          </a:xfrm>
+        </p:grpSpPr>
+        <p:sp>
+          <p:nvSpPr>
+            <p:cNvPr id="8" name="Shape 366">
+              <a:extLst>
+                <a:ext uri="{FF2B5EF4-FFF2-40B4-BE49-F238E27FC236}">
+                  <a16:creationId xmlns:a16="http://schemas.microsoft.com/office/drawing/2014/main" id="{ED5C0FDF-7F32-337A-3051-CB6EE7C1ABAB}"/>
+                </a:ext>
+              </a:extLst>
+            </p:cNvPr>
+            <p:cNvSpPr/>
+            <p:nvPr/>
+          </p:nvSpPr>
+          <p:spPr>
+            <a:xfrm>
+              <a:off x="-2112842" y="1838493"/>
+              <a:ext cx="1695976" cy="955879"/>
+            </a:xfrm>
+            <a:custGeom>
+              <a:avLst/>
+              <a:gdLst/>
+              <a:ahLst/>
+              <a:cxnLst/>
+              <a:rect l="0" t="0" r="0" b="0"/>
+              <a:pathLst>
+                <a:path w="1190943" h="474726">
+                  <a:moveTo>
+                    <a:pt x="595465" y="0"/>
+                  </a:moveTo>
+                  <a:cubicBezTo>
+                    <a:pt x="924344" y="0"/>
+                    <a:pt x="1190943" y="106274"/>
+                    <a:pt x="1190943" y="237363"/>
+                  </a:cubicBezTo>
+                  <a:cubicBezTo>
+                    <a:pt x="1190943" y="368453"/>
+                    <a:pt x="924344" y="474726"/>
+                    <a:pt x="595465" y="474726"/>
+                  </a:cubicBezTo>
+                  <a:cubicBezTo>
+                    <a:pt x="266598" y="474726"/>
+                    <a:pt x="0" y="368453"/>
+                    <a:pt x="0" y="237363"/>
+                  </a:cubicBezTo>
+                  <a:cubicBezTo>
+                    <a:pt x="0" y="106274"/>
+                    <a:pt x="266598" y="0"/>
+                    <a:pt x="595465" y="0"/>
+                  </a:cubicBezTo>
+                  <a:close/>
+                </a:path>
+              </a:pathLst>
+            </a:custGeom>
+            <a:ln w="0" cap="flat">
+              <a:miter lim="127000"/>
+            </a:ln>
+          </p:spPr>
+          <p:style>
+            <a:lnRef idx="0">
+              <a:srgbClr val="000000">
+                <a:alpha val="0"/>
+              </a:srgbClr>
+            </a:lnRef>
+            <a:fillRef idx="1">
+              <a:srgbClr val="E5E5E4"/>
+            </a:fillRef>
+            <a:effectRef idx="0">
+              <a:scrgbClr r="0" g="0" b="0"/>
+            </a:effectRef>
+            <a:fontRef idx="none"/>
+          </p:style>
+          <p:txBody>
+            <a:bodyPr/>
+            <a:lstStyle/>
+            <a:p>
+              <a:endParaRPr lang="pt-BR"/>
+            </a:p>
+          </p:txBody>
+        </p:sp>
+        <p:sp>
+          <p:nvSpPr>
+            <p:cNvPr id="9" name="Shape 367">
+              <a:extLst>
+                <a:ext uri="{FF2B5EF4-FFF2-40B4-BE49-F238E27FC236}">
+                  <a16:creationId xmlns:a16="http://schemas.microsoft.com/office/drawing/2014/main" id="{6795331C-1553-F7E2-0C4B-29A18E6AF1F4}"/>
+                </a:ext>
+              </a:extLst>
+            </p:cNvPr>
+            <p:cNvSpPr/>
+            <p:nvPr/>
+          </p:nvSpPr>
+          <p:spPr>
+            <a:xfrm>
+              <a:off x="-2112842" y="1838494"/>
+              <a:ext cx="1695975" cy="955879"/>
+            </a:xfrm>
+            <a:custGeom>
+              <a:avLst/>
+              <a:gdLst/>
+              <a:ahLst/>
+              <a:cxnLst/>
+              <a:rect l="0" t="0" r="0" b="0"/>
+              <a:pathLst>
+                <a:path w="1190943" h="474726">
+                  <a:moveTo>
+                    <a:pt x="1190943" y="237363"/>
+                  </a:moveTo>
+                  <a:cubicBezTo>
+                    <a:pt x="1190943" y="368453"/>
+                    <a:pt x="924344" y="474726"/>
+                    <a:pt x="595465" y="474726"/>
+                  </a:cubicBezTo>
+                  <a:cubicBezTo>
+                    <a:pt x="266598" y="474726"/>
+                    <a:pt x="0" y="368453"/>
+                    <a:pt x="0" y="237363"/>
+                  </a:cubicBezTo>
+                  <a:cubicBezTo>
+                    <a:pt x="0" y="106274"/>
+                    <a:pt x="266598" y="0"/>
+                    <a:pt x="595465" y="0"/>
+                  </a:cubicBezTo>
+                  <a:cubicBezTo>
+                    <a:pt x="924344" y="0"/>
+                    <a:pt x="1190943" y="106274"/>
+                    <a:pt x="1190943" y="237363"/>
+                  </a:cubicBezTo>
+                  <a:close/>
+                </a:path>
+              </a:pathLst>
+            </a:custGeom>
+            <a:ln w="8103" cap="flat">
+              <a:miter lim="127000"/>
+            </a:ln>
+          </p:spPr>
+          <p:style>
+            <a:lnRef idx="1">
+              <a:srgbClr val="2F2115"/>
+            </a:lnRef>
+            <a:fillRef idx="0">
+              <a:srgbClr val="000000">
+                <a:alpha val="0"/>
+              </a:srgbClr>
+            </a:fillRef>
+            <a:effectRef idx="0">
+              <a:scrgbClr r="0" g="0" b="0"/>
+            </a:effectRef>
+            <a:fontRef idx="none"/>
+          </p:style>
+          <p:txBody>
+            <a:bodyPr/>
+            <a:lstStyle/>
+            <a:p>
+              <a:endParaRPr lang="pt-BR"/>
+            </a:p>
+          </p:txBody>
+        </p:sp>
+        <p:sp>
+          <p:nvSpPr>
+            <p:cNvPr id="27" name="Rectangle 18942">
+              <a:extLst>
+                <a:ext uri="{FF2B5EF4-FFF2-40B4-BE49-F238E27FC236}">
+                  <a16:creationId xmlns:a16="http://schemas.microsoft.com/office/drawing/2014/main" id="{1F32C1DA-D02E-F91E-B6B5-EA966047547C}"/>
+                </a:ext>
+              </a:extLst>
+            </p:cNvPr>
+            <p:cNvSpPr/>
+            <p:nvPr/>
+          </p:nvSpPr>
+          <p:spPr>
+            <a:xfrm>
+              <a:off x="1954823" y="672915"/>
+              <a:ext cx="39022" cy="146200"/>
+            </a:xfrm>
+            <a:prstGeom prst="rect">
+              <a:avLst/>
+            </a:prstGeom>
+            <a:ln>
+              <a:noFill/>
+            </a:ln>
+          </p:spPr>
+          <p:txBody>
+            <a:bodyPr vert="horz" lIns="0" tIns="0" rIns="0" bIns="0" rtlCol="0">
+              <a:noAutofit/>
+            </a:bodyPr>
+            <a:lstStyle/>
+            <a:p>
+              <a:pPr marR="127000" indent="163830" algn="l">
+                <a:lnSpc>
+                  <a:spcPct val="107000"/>
+                </a:lnSpc>
+                <a:spcAft>
+                  <a:spcPts val="800"/>
+                </a:spcAft>
+              </a:pPr>
+              <a:r>
+                <a:rPr lang="pt-BR" sz="700" kern="100">
+                  <a:solidFill>
+                    <a:srgbClr val="2F2115"/>
+                  </a:solidFill>
+                  <a:effectLst/>
+                  <a:latin typeface="Calibri" panose="020F0502020204030204" pitchFamily="34" charset="0"/>
+                  <a:ea typeface="Calibri" panose="020F0502020204030204" pitchFamily="34" charset="0"/>
+                </a:rPr>
+                <a:t>(</a:t>
+              </a:r>
+              <a:endParaRPr lang="pt-BR" sz="1000" kern="100">
+                <a:solidFill>
+                  <a:srgbClr val="2F2115"/>
+                </a:solidFill>
+                <a:effectLst/>
+                <a:latin typeface="Times New Roman" panose="02020603050405020304" pitchFamily="18" charset="0"/>
+                <a:ea typeface="Times New Roman" panose="02020603050405020304" pitchFamily="18" charset="0"/>
+              </a:endParaRPr>
+            </a:p>
+          </p:txBody>
+        </p:sp>
+        <p:sp>
+          <p:nvSpPr>
+            <p:cNvPr id="29" name="Rectangle 18944">
+              <a:extLst>
+                <a:ext uri="{FF2B5EF4-FFF2-40B4-BE49-F238E27FC236}">
+                  <a16:creationId xmlns:a16="http://schemas.microsoft.com/office/drawing/2014/main" id="{9736514F-0814-604B-63DE-C310A7E9914B}"/>
+                </a:ext>
+              </a:extLst>
+            </p:cNvPr>
+            <p:cNvSpPr/>
+            <p:nvPr/>
+          </p:nvSpPr>
+          <p:spPr>
+            <a:xfrm>
+              <a:off x="981453" y="2648175"/>
+              <a:ext cx="39022" cy="146200"/>
+            </a:xfrm>
+            <a:prstGeom prst="rect">
+              <a:avLst/>
+            </a:prstGeom>
+            <a:ln>
+              <a:noFill/>
+            </a:ln>
+          </p:spPr>
+          <p:txBody>
+            <a:bodyPr vert="horz" lIns="0" tIns="0" rIns="0" bIns="0" rtlCol="0">
+              <a:noAutofit/>
+            </a:bodyPr>
+            <a:lstStyle/>
+            <a:p>
+              <a:pPr marR="127000" indent="163830" algn="l">
+                <a:lnSpc>
+                  <a:spcPct val="107000"/>
+                </a:lnSpc>
+                <a:spcAft>
+                  <a:spcPts val="800"/>
+                </a:spcAft>
+              </a:pPr>
+              <a:r>
+                <a:rPr lang="pt-BR" sz="700" kern="100">
+                  <a:solidFill>
+                    <a:srgbClr val="2F2115"/>
+                  </a:solidFill>
+                  <a:effectLst/>
+                  <a:latin typeface="Calibri" panose="020F0502020204030204" pitchFamily="34" charset="0"/>
+                  <a:ea typeface="Calibri" panose="020F0502020204030204" pitchFamily="34" charset="0"/>
+                </a:rPr>
+                <a:t>(</a:t>
+              </a:r>
+              <a:endParaRPr lang="pt-BR" sz="1000" kern="100">
+                <a:solidFill>
+                  <a:srgbClr val="2F2115"/>
+                </a:solidFill>
+                <a:effectLst/>
+                <a:latin typeface="Times New Roman" panose="02020603050405020304" pitchFamily="18" charset="0"/>
+                <a:ea typeface="Times New Roman" panose="02020603050405020304" pitchFamily="18" charset="0"/>
+              </a:endParaRPr>
+            </a:p>
+          </p:txBody>
+        </p:sp>
+        <p:sp>
+          <p:nvSpPr>
+            <p:cNvPr id="37" name="Rectangle 392">
+              <a:extLst>
+                <a:ext uri="{FF2B5EF4-FFF2-40B4-BE49-F238E27FC236}">
+                  <a16:creationId xmlns:a16="http://schemas.microsoft.com/office/drawing/2014/main" id="{25FEED57-EC4E-6062-F0A0-1DD5630B25AC}"/>
+                </a:ext>
+              </a:extLst>
+            </p:cNvPr>
+            <p:cNvSpPr/>
+            <p:nvPr/>
+          </p:nvSpPr>
+          <p:spPr>
+            <a:xfrm>
+              <a:off x="-1629397" y="2163661"/>
+              <a:ext cx="729085" cy="305545"/>
+            </a:xfrm>
+            <a:prstGeom prst="rect">
+              <a:avLst/>
+            </a:prstGeom>
+            <a:ln>
+              <a:noFill/>
+            </a:ln>
+          </p:spPr>
+          <p:txBody>
+            <a:bodyPr vert="horz" lIns="0" tIns="0" rIns="0" bIns="0" rtlCol="0">
+              <a:noAutofit/>
+            </a:bodyPr>
+            <a:lstStyle/>
+            <a:p>
+              <a:pPr marR="127000" indent="163830" algn="l">
+                <a:lnSpc>
+                  <a:spcPct val="107000"/>
+                </a:lnSpc>
+                <a:spcAft>
+                  <a:spcPts val="800"/>
+                </a:spcAft>
+              </a:pPr>
+              <a:r>
+                <a:rPr lang="pt-BR" sz="2400" kern="100" dirty="0">
+                  <a:solidFill>
+                    <a:srgbClr val="2F2115"/>
+                  </a:solidFill>
+                  <a:effectLst/>
+                  <a:latin typeface="Calibri" panose="020F0502020204030204" pitchFamily="34" charset="0"/>
+                  <a:ea typeface="Calibri" panose="020F0502020204030204" pitchFamily="34" charset="0"/>
+                </a:rPr>
+                <a:t>Nome</a:t>
+              </a:r>
+              <a:endParaRPr lang="pt-BR" sz="2400" kern="100" dirty="0">
+                <a:solidFill>
+                  <a:srgbClr val="2F2115"/>
+                </a:solidFill>
+                <a:effectLst/>
+                <a:latin typeface="Times New Roman" panose="02020603050405020304" pitchFamily="18" charset="0"/>
+                <a:ea typeface="Times New Roman" panose="02020603050405020304" pitchFamily="18" charset="0"/>
+              </a:endParaRPr>
+            </a:p>
+          </p:txBody>
+        </p:sp>
+        <p:sp>
+          <p:nvSpPr>
+            <p:cNvPr id="48" name="Rectangle 18939">
+              <a:extLst>
+                <a:ext uri="{FF2B5EF4-FFF2-40B4-BE49-F238E27FC236}">
+                  <a16:creationId xmlns:a16="http://schemas.microsoft.com/office/drawing/2014/main" id="{C0301843-BFB2-D552-0638-33D13DA33BC2}"/>
+                </a:ext>
+              </a:extLst>
+            </p:cNvPr>
+            <p:cNvSpPr/>
+            <p:nvPr/>
+          </p:nvSpPr>
+          <p:spPr>
+            <a:xfrm>
+              <a:off x="357177" y="682129"/>
+              <a:ext cx="39022" cy="146200"/>
+            </a:xfrm>
+            <a:prstGeom prst="rect">
+              <a:avLst/>
+            </a:prstGeom>
+            <a:ln>
+              <a:noFill/>
+            </a:ln>
+          </p:spPr>
+          <p:txBody>
+            <a:bodyPr vert="horz" lIns="0" tIns="0" rIns="0" bIns="0" rtlCol="0">
+              <a:noAutofit/>
+            </a:bodyPr>
+            <a:lstStyle/>
+            <a:p>
+              <a:pPr marR="127000" indent="163830" algn="l">
+                <a:lnSpc>
+                  <a:spcPct val="107000"/>
+                </a:lnSpc>
+                <a:spcAft>
+                  <a:spcPts val="800"/>
+                </a:spcAft>
+              </a:pPr>
+              <a:r>
+                <a:rPr lang="pt-BR" sz="700" kern="100">
+                  <a:solidFill>
+                    <a:srgbClr val="2F2115"/>
+                  </a:solidFill>
+                  <a:effectLst/>
+                  <a:latin typeface="Calibri" panose="020F0502020204030204" pitchFamily="34" charset="0"/>
+                  <a:ea typeface="Calibri" panose="020F0502020204030204" pitchFamily="34" charset="0"/>
+                </a:rPr>
+                <a:t>(</a:t>
+              </a:r>
+              <a:endParaRPr lang="pt-BR" sz="1000" kern="100">
+                <a:solidFill>
+                  <a:srgbClr val="2F2115"/>
+                </a:solidFill>
+                <a:effectLst/>
+                <a:latin typeface="Times New Roman" panose="02020603050405020304" pitchFamily="18" charset="0"/>
+                <a:ea typeface="Times New Roman" panose="02020603050405020304" pitchFamily="18" charset="0"/>
+              </a:endParaRPr>
+            </a:p>
+          </p:txBody>
+        </p:sp>
+      </p:grpSp>
+      <p:sp>
+        <p:nvSpPr>
+          <p:cNvPr id="50" name="CaixaDeTexto 49">
+            <a:extLst>
+              <a:ext uri="{FF2B5EF4-FFF2-40B4-BE49-F238E27FC236}">
+                <a16:creationId xmlns:a16="http://schemas.microsoft.com/office/drawing/2014/main" id="{BFA1C8EA-3B28-13DA-9E34-0B41447DC354}"/>
+              </a:ext>
+            </a:extLst>
+          </p:cNvPr>
+          <p:cNvSpPr txBox="1"/>
+          <p:nvPr/>
+        </p:nvSpPr>
+        <p:spPr>
+          <a:xfrm>
+            <a:off x="1036321" y="4315155"/>
+            <a:ext cx="6103782" cy="1200329"/>
+          </a:xfrm>
+          <a:prstGeom prst="rect">
+            <a:avLst/>
+          </a:prstGeom>
+          <a:noFill/>
+        </p:spPr>
+        <p:txBody>
+          <a:bodyPr wrap="square" rtlCol="0">
+            <a:spAutoFit/>
+          </a:bodyPr>
+          <a:lstStyle/>
+          <a:p>
+            <a:r>
+              <a:rPr lang="pt-BR" sz="2400" dirty="0">
+                <a:solidFill>
+                  <a:schemeClr val="tx1">
+                    <a:lumMod val="75000"/>
+                    <a:lumOff val="25000"/>
+                  </a:schemeClr>
+                </a:solidFill>
+              </a:rPr>
+              <a:t>Nesta imagem conseguimos ver no modelo DER como é definido um atributo simples.</a:t>
+            </a:r>
+          </a:p>
+          <a:p>
+            <a:endParaRPr lang="pt-BR" sz="2400" dirty="0">
+              <a:solidFill>
+                <a:schemeClr val="tx1">
+                  <a:lumMod val="75000"/>
+                  <a:lumOff val="25000"/>
+                </a:schemeClr>
+              </a:solidFill>
+            </a:endParaRPr>
+          </a:p>
+        </p:txBody>
+      </p:sp>
     </p:spTree>
     <p:extLst>
       <p:ext uri="{BB962C8B-B14F-4D97-AF65-F5344CB8AC3E}">
         <p14:creationId xmlns:p14="http://schemas.microsoft.com/office/powerpoint/2010/main" val="1499120933"/>
+      </p:ext>
+    </p:extLst>
+  </p:cSld>
+  <p:clrMapOvr>
+    <a:masterClrMapping/>
+  </p:clrMapOvr>
+</p:sld>
+</file>
+
+<file path=ppt/slides/slide19.xml><?xml version="1.0" encoding="utf-8"?>
+<p:sld xmlns:a="http://schemas.openxmlformats.org/drawingml/2006/main" xmlns:r="http://schemas.openxmlformats.org/officeDocument/2006/relationships" xmlns:p="http://schemas.openxmlformats.org/presentationml/2006/main">
+  <p:cSld>
+    <p:spTree>
+      <p:nvGrpSpPr>
+        <p:cNvPr id="1" name=""/>
+        <p:cNvGrpSpPr/>
+        <p:nvPr/>
+      </p:nvGrpSpPr>
+      <p:grpSpPr>
+        <a:xfrm>
+          <a:off x="0" y="0"/>
+          <a:ext cx="0" cy="0"/>
+          <a:chOff x="0" y="0"/>
+          <a:chExt cx="0" cy="0"/>
+        </a:xfrm>
+      </p:grpSpPr>
+      <p:sp>
+        <p:nvSpPr>
+          <p:cNvPr id="2" name="Título 1">
+            <a:extLst>
+              <a:ext uri="{FF2B5EF4-FFF2-40B4-BE49-F238E27FC236}">
+                <a16:creationId xmlns:a16="http://schemas.microsoft.com/office/drawing/2014/main" id="{CC7C5B47-35D0-CBC5-39AF-B5F44B677392}"/>
+              </a:ext>
+            </a:extLst>
+          </p:cNvPr>
+          <p:cNvSpPr>
+            <a:spLocks noGrp="1"/>
+          </p:cNvSpPr>
+          <p:nvPr>
+            <p:ph type="title"/>
+          </p:nvPr>
+        </p:nvSpPr>
+        <p:spPr/>
+        <p:txBody>
+          <a:bodyPr>
+            <a:normAutofit/>
+          </a:bodyPr>
+          <a:lstStyle/>
+          <a:p>
+            <a:r>
+              <a:rPr lang="pt-BR" sz="4400" b="1" dirty="0"/>
+              <a:t>MODELO ENTIDADE-RELACIONAMENTO</a:t>
+            </a:r>
+            <a:br>
+              <a:rPr lang="pt-BR" sz="4400" b="1" dirty="0"/>
+            </a:br>
+            <a:r>
+              <a:rPr lang="pt-BR" sz="2700" dirty="0"/>
+              <a:t>ATRIBUTOS</a:t>
+            </a:r>
+          </a:p>
+        </p:txBody>
+      </p:sp>
+      <p:sp>
+        <p:nvSpPr>
+          <p:cNvPr id="3" name="Espaço Reservado para Conteúdo 2">
+            <a:extLst>
+              <a:ext uri="{FF2B5EF4-FFF2-40B4-BE49-F238E27FC236}">
+                <a16:creationId xmlns:a16="http://schemas.microsoft.com/office/drawing/2014/main" id="{59758A1E-514F-AFAC-13D2-56BDC5AADB96}"/>
+              </a:ext>
+            </a:extLst>
+          </p:cNvPr>
+          <p:cNvSpPr>
+            <a:spLocks noGrp="1"/>
+          </p:cNvSpPr>
+          <p:nvPr>
+            <p:ph idx="1"/>
+          </p:nvPr>
+        </p:nvSpPr>
+        <p:spPr>
+          <a:xfrm>
+            <a:off x="1097280" y="1923528"/>
+            <a:ext cx="10058400" cy="2142633"/>
+          </a:xfrm>
+        </p:spPr>
+        <p:txBody>
+          <a:bodyPr>
+            <a:normAutofit/>
+          </a:bodyPr>
+          <a:lstStyle/>
+          <a:p>
+            <a:pPr marL="0" indent="0">
+              <a:buNone/>
+            </a:pPr>
+            <a:r>
+              <a:rPr lang="pt-BR" sz="2400" dirty="0"/>
+              <a:t>Os </a:t>
+            </a:r>
+            <a:r>
+              <a:rPr lang="pt-BR" sz="2400" b="1" dirty="0"/>
+              <a:t>atributos multivalorados</a:t>
+            </a:r>
+            <a:r>
+              <a:rPr lang="pt-BR" sz="2400" dirty="0"/>
+              <a:t> suportam vários registros.</a:t>
+            </a:r>
+          </a:p>
+          <a:p>
+            <a:pPr marL="0" indent="0">
+              <a:buNone/>
+            </a:pPr>
+            <a:r>
+              <a:rPr lang="pt-BR" sz="2400" dirty="0"/>
+              <a:t>Por exemplo: Usando quando uma pessoa tem mais de 1 telefone.</a:t>
+            </a:r>
+          </a:p>
+          <a:p>
+            <a:pPr marL="0" indent="0">
+              <a:buNone/>
+            </a:pPr>
+            <a:r>
+              <a:rPr lang="pt-BR" sz="2400" dirty="0"/>
+              <a:t>Podemos ver na imagem abaixo como é registrado no DER os atributos multivalorados:</a:t>
+            </a:r>
+          </a:p>
+          <a:p>
+            <a:pPr marL="0" indent="0">
+              <a:buNone/>
+            </a:pPr>
+            <a:endParaRPr lang="pt-BR" sz="2400" dirty="0"/>
+          </a:p>
+        </p:txBody>
+      </p:sp>
+      <p:sp>
+        <p:nvSpPr>
+          <p:cNvPr id="5" name="Shape 368">
+            <a:extLst>
+              <a:ext uri="{FF2B5EF4-FFF2-40B4-BE49-F238E27FC236}">
+                <a16:creationId xmlns:a16="http://schemas.microsoft.com/office/drawing/2014/main" id="{2EC22FB8-4BFE-538A-09CF-1313F97C6A42}"/>
+              </a:ext>
+            </a:extLst>
+          </p:cNvPr>
+          <p:cNvSpPr/>
+          <p:nvPr/>
+        </p:nvSpPr>
+        <p:spPr>
+          <a:xfrm>
+            <a:off x="4130672" y="4165502"/>
+            <a:ext cx="3991615" cy="1556691"/>
+          </a:xfrm>
+          <a:custGeom>
+            <a:avLst/>
+            <a:gdLst/>
+            <a:ahLst/>
+            <a:cxnLst/>
+            <a:rect l="0" t="0" r="0" b="0"/>
+            <a:pathLst>
+              <a:path w="1190942" h="493573">
+                <a:moveTo>
+                  <a:pt x="595478" y="0"/>
+                </a:moveTo>
+                <a:cubicBezTo>
+                  <a:pt x="924344" y="0"/>
+                  <a:pt x="1190942" y="110490"/>
+                  <a:pt x="1190942" y="246786"/>
+                </a:cubicBezTo>
+                <a:cubicBezTo>
+                  <a:pt x="1190942" y="383083"/>
+                  <a:pt x="924344" y="493573"/>
+                  <a:pt x="595478" y="493573"/>
+                </a:cubicBezTo>
+                <a:cubicBezTo>
+                  <a:pt x="266598" y="493573"/>
+                  <a:pt x="0" y="383083"/>
+                  <a:pt x="0" y="246786"/>
+                </a:cubicBezTo>
+                <a:cubicBezTo>
+                  <a:pt x="0" y="110490"/>
+                  <a:pt x="266598" y="0"/>
+                  <a:pt x="595478" y="0"/>
+                </a:cubicBezTo>
+                <a:close/>
+              </a:path>
+            </a:pathLst>
+          </a:custGeom>
+          <a:ln w="0" cap="flat">
+            <a:miter lim="127000"/>
+          </a:ln>
+        </p:spPr>
+        <p:style>
+          <a:lnRef idx="0">
+            <a:srgbClr val="000000">
+              <a:alpha val="0"/>
+            </a:srgbClr>
+          </a:lnRef>
+          <a:fillRef idx="1">
+            <a:srgbClr val="E5E5E4"/>
+          </a:fillRef>
+          <a:effectRef idx="0">
+            <a:scrgbClr r="0" g="0" b="0"/>
+          </a:effectRef>
+          <a:fontRef idx="none"/>
+        </p:style>
+        <p:txBody>
+          <a:bodyPr/>
+          <a:lstStyle/>
+          <a:p>
+            <a:endParaRPr lang="pt-BR"/>
+          </a:p>
+        </p:txBody>
+      </p:sp>
+      <p:sp>
+        <p:nvSpPr>
+          <p:cNvPr id="6" name="Shape 369">
+            <a:extLst>
+              <a:ext uri="{FF2B5EF4-FFF2-40B4-BE49-F238E27FC236}">
+                <a16:creationId xmlns:a16="http://schemas.microsoft.com/office/drawing/2014/main" id="{D14C6C56-7C13-8AB8-2DEF-077AA0746C60}"/>
+              </a:ext>
+            </a:extLst>
+          </p:cNvPr>
+          <p:cNvSpPr/>
+          <p:nvPr/>
+        </p:nvSpPr>
+        <p:spPr>
+          <a:xfrm>
+            <a:off x="4100192" y="4165502"/>
+            <a:ext cx="3991615" cy="1556691"/>
+          </a:xfrm>
+          <a:custGeom>
+            <a:avLst/>
+            <a:gdLst/>
+            <a:ahLst/>
+            <a:cxnLst/>
+            <a:rect l="0" t="0" r="0" b="0"/>
+            <a:pathLst>
+              <a:path w="1190942" h="493573">
+                <a:moveTo>
+                  <a:pt x="1190942" y="246786"/>
+                </a:moveTo>
+                <a:cubicBezTo>
+                  <a:pt x="1190942" y="383083"/>
+                  <a:pt x="924344" y="493573"/>
+                  <a:pt x="595478" y="493573"/>
+                </a:cubicBezTo>
+                <a:cubicBezTo>
+                  <a:pt x="266598" y="493573"/>
+                  <a:pt x="0" y="383083"/>
+                  <a:pt x="0" y="246786"/>
+                </a:cubicBezTo>
+                <a:cubicBezTo>
+                  <a:pt x="0" y="110490"/>
+                  <a:pt x="266598" y="0"/>
+                  <a:pt x="595478" y="0"/>
+                </a:cubicBezTo>
+                <a:cubicBezTo>
+                  <a:pt x="924344" y="0"/>
+                  <a:pt x="1190942" y="110490"/>
+                  <a:pt x="1190942" y="246786"/>
+                </a:cubicBezTo>
+                <a:close/>
+              </a:path>
+            </a:pathLst>
+          </a:custGeom>
+          <a:ln w="8103" cap="flat">
+            <a:miter lim="127000"/>
+          </a:ln>
+        </p:spPr>
+        <p:style>
+          <a:lnRef idx="1">
+            <a:srgbClr val="2F2115"/>
+          </a:lnRef>
+          <a:fillRef idx="0">
+            <a:srgbClr val="000000">
+              <a:alpha val="0"/>
+            </a:srgbClr>
+          </a:fillRef>
+          <a:effectRef idx="0">
+            <a:scrgbClr r="0" g="0" b="0"/>
+          </a:effectRef>
+          <a:fontRef idx="none"/>
+        </p:style>
+        <p:txBody>
+          <a:bodyPr/>
+          <a:lstStyle/>
+          <a:p>
+            <a:endParaRPr lang="pt-BR"/>
+          </a:p>
+        </p:txBody>
+      </p:sp>
+      <p:sp>
+        <p:nvSpPr>
+          <p:cNvPr id="7" name="Shape 393">
+            <a:extLst>
+              <a:ext uri="{FF2B5EF4-FFF2-40B4-BE49-F238E27FC236}">
+                <a16:creationId xmlns:a16="http://schemas.microsoft.com/office/drawing/2014/main" id="{2A77B22A-04ED-EFA6-DD78-4E3C08431685}"/>
+              </a:ext>
+            </a:extLst>
+          </p:cNvPr>
+          <p:cNvSpPr/>
+          <p:nvPr/>
+        </p:nvSpPr>
+        <p:spPr>
+          <a:xfrm>
+            <a:off x="4458904" y="4249647"/>
+            <a:ext cx="3274189" cy="1388400"/>
+          </a:xfrm>
+          <a:custGeom>
+            <a:avLst/>
+            <a:gdLst/>
+            <a:ahLst/>
+            <a:cxnLst/>
+            <a:rect l="0" t="0" r="0" b="0"/>
+            <a:pathLst>
+              <a:path w="977265" h="440207">
+                <a:moveTo>
+                  <a:pt x="488632" y="0"/>
+                </a:moveTo>
+                <a:cubicBezTo>
+                  <a:pt x="758495" y="0"/>
+                  <a:pt x="977265" y="98539"/>
+                  <a:pt x="977265" y="220104"/>
+                </a:cubicBezTo>
+                <a:cubicBezTo>
+                  <a:pt x="977265" y="341668"/>
+                  <a:pt x="758495" y="440207"/>
+                  <a:pt x="488632" y="440207"/>
+                </a:cubicBezTo>
+                <a:cubicBezTo>
+                  <a:pt x="218770" y="440207"/>
+                  <a:pt x="0" y="341668"/>
+                  <a:pt x="0" y="220104"/>
+                </a:cubicBezTo>
+                <a:cubicBezTo>
+                  <a:pt x="0" y="98539"/>
+                  <a:pt x="218770" y="0"/>
+                  <a:pt x="488632" y="0"/>
+                </a:cubicBezTo>
+                <a:close/>
+              </a:path>
+            </a:pathLst>
+          </a:custGeom>
+          <a:ln w="0" cap="flat">
+            <a:miter lim="127000"/>
+          </a:ln>
+        </p:spPr>
+        <p:style>
+          <a:lnRef idx="0">
+            <a:srgbClr val="000000">
+              <a:alpha val="0"/>
+            </a:srgbClr>
+          </a:lnRef>
+          <a:fillRef idx="1">
+            <a:srgbClr val="FEFEFE"/>
+          </a:fillRef>
+          <a:effectRef idx="0">
+            <a:scrgbClr r="0" g="0" b="0"/>
+          </a:effectRef>
+          <a:fontRef idx="none"/>
+        </p:style>
+        <p:txBody>
+          <a:bodyPr/>
+          <a:lstStyle/>
+          <a:p>
+            <a:endParaRPr lang="pt-BR"/>
+          </a:p>
+        </p:txBody>
+      </p:sp>
+      <p:sp>
+        <p:nvSpPr>
+          <p:cNvPr id="10" name="Rectangle 395">
+            <a:extLst>
+              <a:ext uri="{FF2B5EF4-FFF2-40B4-BE49-F238E27FC236}">
+                <a16:creationId xmlns:a16="http://schemas.microsoft.com/office/drawing/2014/main" id="{4DAFEBD5-C01A-137A-4FBD-B02B254663FC}"/>
+              </a:ext>
+            </a:extLst>
+          </p:cNvPr>
+          <p:cNvSpPr/>
+          <p:nvPr/>
+        </p:nvSpPr>
+        <p:spPr>
+          <a:xfrm>
+            <a:off x="5565912" y="4754124"/>
+            <a:ext cx="1121134" cy="379446"/>
+          </a:xfrm>
+          <a:prstGeom prst="rect">
+            <a:avLst/>
+          </a:prstGeom>
+          <a:ln>
+            <a:noFill/>
+          </a:ln>
+        </p:spPr>
+        <p:txBody>
+          <a:bodyPr vert="horz" lIns="0" tIns="0" rIns="0" bIns="0" rtlCol="0">
+            <a:noAutofit/>
+          </a:bodyPr>
+          <a:lstStyle/>
+          <a:p>
+            <a:pPr marR="127000" indent="163830" algn="l">
+              <a:lnSpc>
+                <a:spcPct val="107000"/>
+              </a:lnSpc>
+              <a:spcAft>
+                <a:spcPts val="800"/>
+              </a:spcAft>
+            </a:pPr>
+            <a:r>
+              <a:rPr lang="pt-BR" sz="2400" kern="100">
+                <a:solidFill>
+                  <a:srgbClr val="2F2115"/>
+                </a:solidFill>
+                <a:effectLst/>
+                <a:latin typeface="Calibri" panose="020F0502020204030204" pitchFamily="34" charset="0"/>
+                <a:ea typeface="Calibri" panose="020F0502020204030204" pitchFamily="34" charset="0"/>
+              </a:rPr>
+              <a:t>Nome</a:t>
+            </a:r>
+            <a:endParaRPr lang="pt-BR" sz="2400" kern="100">
+              <a:solidFill>
+                <a:srgbClr val="2F2115"/>
+              </a:solidFill>
+              <a:effectLst/>
+              <a:latin typeface="Times New Roman" panose="02020603050405020304" pitchFamily="18" charset="0"/>
+              <a:ea typeface="Times New Roman" panose="02020603050405020304" pitchFamily="18" charset="0"/>
+            </a:endParaRPr>
+          </a:p>
+        </p:txBody>
+      </p:sp>
+    </p:spTree>
+    <p:extLst>
+      <p:ext uri="{BB962C8B-B14F-4D97-AF65-F5344CB8AC3E}">
+        <p14:creationId xmlns:p14="http://schemas.microsoft.com/office/powerpoint/2010/main" val="2505707923"/>
       </p:ext>
     </p:extLst>
   </p:cSld>
@@ -5932,6 +6860,1839 @@
     <p:extLst>
       <p:ext uri="{BB962C8B-B14F-4D97-AF65-F5344CB8AC3E}">
         <p14:creationId xmlns:p14="http://schemas.microsoft.com/office/powerpoint/2010/main" val="983704062"/>
+      </p:ext>
+    </p:extLst>
+  </p:cSld>
+  <p:clrMapOvr>
+    <a:masterClrMapping/>
+  </p:clrMapOvr>
+</p:sld>
+</file>
+
+<file path=ppt/slides/slide20.xml><?xml version="1.0" encoding="utf-8"?>
+<p:sld xmlns:a="http://schemas.openxmlformats.org/drawingml/2006/main" xmlns:r="http://schemas.openxmlformats.org/officeDocument/2006/relationships" xmlns:p="http://schemas.openxmlformats.org/presentationml/2006/main">
+  <p:cSld>
+    <p:spTree>
+      <p:nvGrpSpPr>
+        <p:cNvPr id="1" name=""/>
+        <p:cNvGrpSpPr/>
+        <p:nvPr/>
+      </p:nvGrpSpPr>
+      <p:grpSpPr>
+        <a:xfrm>
+          <a:off x="0" y="0"/>
+          <a:ext cx="0" cy="0"/>
+          <a:chOff x="0" y="0"/>
+          <a:chExt cx="0" cy="0"/>
+        </a:xfrm>
+      </p:grpSpPr>
+      <p:sp>
+        <p:nvSpPr>
+          <p:cNvPr id="2" name="Título 1">
+            <a:extLst>
+              <a:ext uri="{FF2B5EF4-FFF2-40B4-BE49-F238E27FC236}">
+                <a16:creationId xmlns:a16="http://schemas.microsoft.com/office/drawing/2014/main" id="{CC7C5B47-35D0-CBC5-39AF-B5F44B677392}"/>
+              </a:ext>
+            </a:extLst>
+          </p:cNvPr>
+          <p:cNvSpPr>
+            <a:spLocks noGrp="1"/>
+          </p:cNvSpPr>
+          <p:nvPr>
+            <p:ph type="title"/>
+          </p:nvPr>
+        </p:nvSpPr>
+        <p:spPr/>
+        <p:txBody>
+          <a:bodyPr>
+            <a:normAutofit/>
+          </a:bodyPr>
+          <a:lstStyle/>
+          <a:p>
+            <a:r>
+              <a:rPr lang="pt-BR" sz="4400" b="1" dirty="0"/>
+              <a:t>MODELO ENTIDADE-RELACIONAMENTO</a:t>
+            </a:r>
+            <a:br>
+              <a:rPr lang="pt-BR" sz="4400" b="1" dirty="0"/>
+            </a:br>
+            <a:r>
+              <a:rPr lang="pt-BR" sz="2700" dirty="0"/>
+              <a:t>ATRIBUTOS</a:t>
+            </a:r>
+          </a:p>
+        </p:txBody>
+      </p:sp>
+      <p:sp>
+        <p:nvSpPr>
+          <p:cNvPr id="3" name="Espaço Reservado para Conteúdo 2">
+            <a:extLst>
+              <a:ext uri="{FF2B5EF4-FFF2-40B4-BE49-F238E27FC236}">
+                <a16:creationId xmlns:a16="http://schemas.microsoft.com/office/drawing/2014/main" id="{59758A1E-514F-AFAC-13D2-56BDC5AADB96}"/>
+              </a:ext>
+            </a:extLst>
+          </p:cNvPr>
+          <p:cNvSpPr>
+            <a:spLocks noGrp="1"/>
+          </p:cNvSpPr>
+          <p:nvPr>
+            <p:ph idx="1"/>
+          </p:nvPr>
+        </p:nvSpPr>
+        <p:spPr>
+          <a:xfrm>
+            <a:off x="1097280" y="1923528"/>
+            <a:ext cx="3727639" cy="4341085"/>
+          </a:xfrm>
+        </p:spPr>
+        <p:txBody>
+          <a:bodyPr>
+            <a:normAutofit/>
+          </a:bodyPr>
+          <a:lstStyle/>
+          <a:p>
+            <a:pPr marL="0" indent="0">
+              <a:buNone/>
+            </a:pPr>
+            <a:r>
+              <a:rPr lang="pt-BR" sz="2400" dirty="0"/>
+              <a:t>Os </a:t>
+            </a:r>
+            <a:r>
+              <a:rPr lang="pt-BR" sz="2400" b="1" dirty="0"/>
+              <a:t>atributos compostos</a:t>
+            </a:r>
+            <a:r>
+              <a:rPr lang="pt-BR" sz="2400" dirty="0"/>
+              <a:t> permitem indicar um atributo que podem ser divididos em outros.</a:t>
+            </a:r>
+          </a:p>
+          <a:p>
+            <a:pPr marL="0" indent="0">
+              <a:buNone/>
+            </a:pPr>
+            <a:r>
+              <a:rPr lang="pt-BR" sz="2400" dirty="0"/>
+              <a:t>Conseguimos ver na imagem que um atributo pode ser dividido em várias partes.</a:t>
+            </a:r>
+          </a:p>
+          <a:p>
+            <a:pPr marL="0" indent="0">
+              <a:buNone/>
+            </a:pPr>
+            <a:endParaRPr lang="pt-BR" sz="2400" dirty="0"/>
+          </a:p>
+        </p:txBody>
+      </p:sp>
+      <p:sp>
+        <p:nvSpPr>
+          <p:cNvPr id="17" name="Shape 370">
+            <a:extLst>
+              <a:ext uri="{FF2B5EF4-FFF2-40B4-BE49-F238E27FC236}">
+                <a16:creationId xmlns:a16="http://schemas.microsoft.com/office/drawing/2014/main" id="{612E5618-9ECA-4E90-6F43-AE0E6113398F}"/>
+              </a:ext>
+            </a:extLst>
+          </p:cNvPr>
+          <p:cNvSpPr/>
+          <p:nvPr/>
+        </p:nvSpPr>
+        <p:spPr>
+          <a:xfrm>
+            <a:off x="6910702" y="3522084"/>
+            <a:ext cx="2024954" cy="1190328"/>
+          </a:xfrm>
+          <a:custGeom>
+            <a:avLst/>
+            <a:gdLst/>
+            <a:ahLst/>
+            <a:cxnLst/>
+            <a:rect l="0" t="0" r="0" b="0"/>
+            <a:pathLst>
+              <a:path w="794537" h="367361">
+                <a:moveTo>
+                  <a:pt x="397269" y="0"/>
+                </a:moveTo>
+                <a:cubicBezTo>
+                  <a:pt x="616674" y="0"/>
+                  <a:pt x="794537" y="82233"/>
+                  <a:pt x="794537" y="183680"/>
+                </a:cubicBezTo>
+                <a:cubicBezTo>
+                  <a:pt x="794537" y="285128"/>
+                  <a:pt x="616674" y="367361"/>
+                  <a:pt x="397269" y="367361"/>
+                </a:cubicBezTo>
+                <a:cubicBezTo>
+                  <a:pt x="177863" y="367361"/>
+                  <a:pt x="0" y="285128"/>
+                  <a:pt x="0" y="183680"/>
+                </a:cubicBezTo>
+                <a:cubicBezTo>
+                  <a:pt x="0" y="82233"/>
+                  <a:pt x="177863" y="0"/>
+                  <a:pt x="397269" y="0"/>
+                </a:cubicBezTo>
+                <a:close/>
+              </a:path>
+            </a:pathLst>
+          </a:custGeom>
+          <a:ln w="0" cap="flat">
+            <a:miter lim="127000"/>
+          </a:ln>
+        </p:spPr>
+        <p:style>
+          <a:lnRef idx="0">
+            <a:srgbClr val="000000">
+              <a:alpha val="0"/>
+            </a:srgbClr>
+          </a:lnRef>
+          <a:fillRef idx="1">
+            <a:srgbClr val="E5E5E4"/>
+          </a:fillRef>
+          <a:effectRef idx="0">
+            <a:scrgbClr r="0" g="0" b="0"/>
+          </a:effectRef>
+          <a:fontRef idx="none"/>
+        </p:style>
+        <p:txBody>
+          <a:bodyPr/>
+          <a:lstStyle/>
+          <a:p>
+            <a:endParaRPr lang="pt-BR"/>
+          </a:p>
+        </p:txBody>
+      </p:sp>
+      <p:sp>
+        <p:nvSpPr>
+          <p:cNvPr id="18" name="Shape 371">
+            <a:extLst>
+              <a:ext uri="{FF2B5EF4-FFF2-40B4-BE49-F238E27FC236}">
+                <a16:creationId xmlns:a16="http://schemas.microsoft.com/office/drawing/2014/main" id="{73E20734-8F66-3CAE-5701-285AEFFEAFCE}"/>
+              </a:ext>
+            </a:extLst>
+          </p:cNvPr>
+          <p:cNvSpPr/>
+          <p:nvPr/>
+        </p:nvSpPr>
+        <p:spPr>
+          <a:xfrm>
+            <a:off x="6910702" y="3498906"/>
+            <a:ext cx="2024954" cy="1190328"/>
+          </a:xfrm>
+          <a:custGeom>
+            <a:avLst/>
+            <a:gdLst/>
+            <a:ahLst/>
+            <a:cxnLst/>
+            <a:rect l="0" t="0" r="0" b="0"/>
+            <a:pathLst>
+              <a:path w="794537" h="367361">
+                <a:moveTo>
+                  <a:pt x="794537" y="183680"/>
+                </a:moveTo>
+                <a:cubicBezTo>
+                  <a:pt x="794537" y="285128"/>
+                  <a:pt x="616674" y="367361"/>
+                  <a:pt x="397269" y="367361"/>
+                </a:cubicBezTo>
+                <a:cubicBezTo>
+                  <a:pt x="177863" y="367361"/>
+                  <a:pt x="0" y="285128"/>
+                  <a:pt x="0" y="183680"/>
+                </a:cubicBezTo>
+                <a:cubicBezTo>
+                  <a:pt x="0" y="82233"/>
+                  <a:pt x="177863" y="0"/>
+                  <a:pt x="397269" y="0"/>
+                </a:cubicBezTo>
+                <a:cubicBezTo>
+                  <a:pt x="616674" y="0"/>
+                  <a:pt x="794537" y="82233"/>
+                  <a:pt x="794537" y="183680"/>
+                </a:cubicBezTo>
+                <a:close/>
+              </a:path>
+            </a:pathLst>
+          </a:custGeom>
+          <a:ln w="8103" cap="flat">
+            <a:miter lim="127000"/>
+          </a:ln>
+        </p:spPr>
+        <p:style>
+          <a:lnRef idx="1">
+            <a:srgbClr val="2F2115"/>
+          </a:lnRef>
+          <a:fillRef idx="0">
+            <a:srgbClr val="000000">
+              <a:alpha val="0"/>
+            </a:srgbClr>
+          </a:fillRef>
+          <a:effectRef idx="0">
+            <a:scrgbClr r="0" g="0" b="0"/>
+          </a:effectRef>
+          <a:fontRef idx="none"/>
+        </p:style>
+        <p:txBody>
+          <a:bodyPr/>
+          <a:lstStyle/>
+          <a:p>
+            <a:endParaRPr lang="pt-BR"/>
+          </a:p>
+        </p:txBody>
+      </p:sp>
+      <p:sp>
+        <p:nvSpPr>
+          <p:cNvPr id="22" name="Shape 370">
+            <a:extLst>
+              <a:ext uri="{FF2B5EF4-FFF2-40B4-BE49-F238E27FC236}">
+                <a16:creationId xmlns:a16="http://schemas.microsoft.com/office/drawing/2014/main" id="{6267A0B7-5E35-C831-DF7B-A0581E71A1C3}"/>
+              </a:ext>
+            </a:extLst>
+          </p:cNvPr>
+          <p:cNvSpPr/>
+          <p:nvPr/>
+        </p:nvSpPr>
+        <p:spPr>
+          <a:xfrm>
+            <a:off x="9069766" y="1923528"/>
+            <a:ext cx="2024954" cy="1190328"/>
+          </a:xfrm>
+          <a:custGeom>
+            <a:avLst/>
+            <a:gdLst/>
+            <a:ahLst/>
+            <a:cxnLst/>
+            <a:rect l="0" t="0" r="0" b="0"/>
+            <a:pathLst>
+              <a:path w="794537" h="367361">
+                <a:moveTo>
+                  <a:pt x="397269" y="0"/>
+                </a:moveTo>
+                <a:cubicBezTo>
+                  <a:pt x="616674" y="0"/>
+                  <a:pt x="794537" y="82233"/>
+                  <a:pt x="794537" y="183680"/>
+                </a:cubicBezTo>
+                <a:cubicBezTo>
+                  <a:pt x="794537" y="285128"/>
+                  <a:pt x="616674" y="367361"/>
+                  <a:pt x="397269" y="367361"/>
+                </a:cubicBezTo>
+                <a:cubicBezTo>
+                  <a:pt x="177863" y="367361"/>
+                  <a:pt x="0" y="285128"/>
+                  <a:pt x="0" y="183680"/>
+                </a:cubicBezTo>
+                <a:cubicBezTo>
+                  <a:pt x="0" y="82233"/>
+                  <a:pt x="177863" y="0"/>
+                  <a:pt x="397269" y="0"/>
+                </a:cubicBezTo>
+                <a:close/>
+              </a:path>
+            </a:pathLst>
+          </a:custGeom>
+          <a:ln w="0" cap="flat">
+            <a:miter lim="127000"/>
+          </a:ln>
+        </p:spPr>
+        <p:style>
+          <a:lnRef idx="0">
+            <a:srgbClr val="000000">
+              <a:alpha val="0"/>
+            </a:srgbClr>
+          </a:lnRef>
+          <a:fillRef idx="1">
+            <a:srgbClr val="E5E5E4"/>
+          </a:fillRef>
+          <a:effectRef idx="0">
+            <a:scrgbClr r="0" g="0" b="0"/>
+          </a:effectRef>
+          <a:fontRef idx="none"/>
+        </p:style>
+        <p:txBody>
+          <a:bodyPr/>
+          <a:lstStyle/>
+          <a:p>
+            <a:endParaRPr lang="pt-BR"/>
+          </a:p>
+        </p:txBody>
+      </p:sp>
+      <p:sp>
+        <p:nvSpPr>
+          <p:cNvPr id="23" name="Shape 370">
+            <a:extLst>
+              <a:ext uri="{FF2B5EF4-FFF2-40B4-BE49-F238E27FC236}">
+                <a16:creationId xmlns:a16="http://schemas.microsoft.com/office/drawing/2014/main" id="{7B3BFE68-A05F-C446-DA4F-184EB119FAB6}"/>
+              </a:ext>
+            </a:extLst>
+          </p:cNvPr>
+          <p:cNvSpPr/>
+          <p:nvPr/>
+        </p:nvSpPr>
+        <p:spPr>
+          <a:xfrm>
+            <a:off x="8961758" y="5074284"/>
+            <a:ext cx="2024954" cy="1190328"/>
+          </a:xfrm>
+          <a:custGeom>
+            <a:avLst/>
+            <a:gdLst/>
+            <a:ahLst/>
+            <a:cxnLst/>
+            <a:rect l="0" t="0" r="0" b="0"/>
+            <a:pathLst>
+              <a:path w="794537" h="367361">
+                <a:moveTo>
+                  <a:pt x="397269" y="0"/>
+                </a:moveTo>
+                <a:cubicBezTo>
+                  <a:pt x="616674" y="0"/>
+                  <a:pt x="794537" y="82233"/>
+                  <a:pt x="794537" y="183680"/>
+                </a:cubicBezTo>
+                <a:cubicBezTo>
+                  <a:pt x="794537" y="285128"/>
+                  <a:pt x="616674" y="367361"/>
+                  <a:pt x="397269" y="367361"/>
+                </a:cubicBezTo>
+                <a:cubicBezTo>
+                  <a:pt x="177863" y="367361"/>
+                  <a:pt x="0" y="285128"/>
+                  <a:pt x="0" y="183680"/>
+                </a:cubicBezTo>
+                <a:cubicBezTo>
+                  <a:pt x="0" y="82233"/>
+                  <a:pt x="177863" y="0"/>
+                  <a:pt x="397269" y="0"/>
+                </a:cubicBezTo>
+                <a:close/>
+              </a:path>
+            </a:pathLst>
+          </a:custGeom>
+          <a:ln w="0" cap="flat">
+            <a:miter lim="127000"/>
+          </a:ln>
+        </p:spPr>
+        <p:style>
+          <a:lnRef idx="0">
+            <a:srgbClr val="000000">
+              <a:alpha val="0"/>
+            </a:srgbClr>
+          </a:lnRef>
+          <a:fillRef idx="1">
+            <a:srgbClr val="E5E5E4"/>
+          </a:fillRef>
+          <a:effectRef idx="0">
+            <a:scrgbClr r="0" g="0" b="0"/>
+          </a:effectRef>
+          <a:fontRef idx="none"/>
+        </p:style>
+        <p:txBody>
+          <a:bodyPr/>
+          <a:lstStyle/>
+          <a:p>
+            <a:endParaRPr lang="pt-BR"/>
+          </a:p>
+        </p:txBody>
+      </p:sp>
+      <p:sp>
+        <p:nvSpPr>
+          <p:cNvPr id="24" name="Shape 370">
+            <a:extLst>
+              <a:ext uri="{FF2B5EF4-FFF2-40B4-BE49-F238E27FC236}">
+                <a16:creationId xmlns:a16="http://schemas.microsoft.com/office/drawing/2014/main" id="{ACF92D96-2828-1FC4-BAA0-6ECA7BF5EFAA}"/>
+              </a:ext>
+            </a:extLst>
+          </p:cNvPr>
+          <p:cNvSpPr/>
+          <p:nvPr/>
+        </p:nvSpPr>
+        <p:spPr>
+          <a:xfrm>
+            <a:off x="4885748" y="5120640"/>
+            <a:ext cx="2024954" cy="1190328"/>
+          </a:xfrm>
+          <a:custGeom>
+            <a:avLst/>
+            <a:gdLst/>
+            <a:ahLst/>
+            <a:cxnLst/>
+            <a:rect l="0" t="0" r="0" b="0"/>
+            <a:pathLst>
+              <a:path w="794537" h="367361">
+                <a:moveTo>
+                  <a:pt x="397269" y="0"/>
+                </a:moveTo>
+                <a:cubicBezTo>
+                  <a:pt x="616674" y="0"/>
+                  <a:pt x="794537" y="82233"/>
+                  <a:pt x="794537" y="183680"/>
+                </a:cubicBezTo>
+                <a:cubicBezTo>
+                  <a:pt x="794537" y="285128"/>
+                  <a:pt x="616674" y="367361"/>
+                  <a:pt x="397269" y="367361"/>
+                </a:cubicBezTo>
+                <a:cubicBezTo>
+                  <a:pt x="177863" y="367361"/>
+                  <a:pt x="0" y="285128"/>
+                  <a:pt x="0" y="183680"/>
+                </a:cubicBezTo>
+                <a:cubicBezTo>
+                  <a:pt x="0" y="82233"/>
+                  <a:pt x="177863" y="0"/>
+                  <a:pt x="397269" y="0"/>
+                </a:cubicBezTo>
+                <a:close/>
+              </a:path>
+            </a:pathLst>
+          </a:custGeom>
+          <a:ln w="0" cap="flat">
+            <a:miter lim="127000"/>
+          </a:ln>
+        </p:spPr>
+        <p:style>
+          <a:lnRef idx="0">
+            <a:srgbClr val="000000">
+              <a:alpha val="0"/>
+            </a:srgbClr>
+          </a:lnRef>
+          <a:fillRef idx="1">
+            <a:srgbClr val="E5E5E4"/>
+          </a:fillRef>
+          <a:effectRef idx="0">
+            <a:scrgbClr r="0" g="0" b="0"/>
+          </a:effectRef>
+          <a:fontRef idx="none"/>
+        </p:style>
+        <p:txBody>
+          <a:bodyPr/>
+          <a:lstStyle/>
+          <a:p>
+            <a:endParaRPr lang="pt-BR"/>
+          </a:p>
+        </p:txBody>
+      </p:sp>
+      <p:sp>
+        <p:nvSpPr>
+          <p:cNvPr id="25" name="Shape 370">
+            <a:extLst>
+              <a:ext uri="{FF2B5EF4-FFF2-40B4-BE49-F238E27FC236}">
+                <a16:creationId xmlns:a16="http://schemas.microsoft.com/office/drawing/2014/main" id="{0C4B0A34-D4C9-7186-FA5F-A195DAF63756}"/>
+              </a:ext>
+            </a:extLst>
+          </p:cNvPr>
+          <p:cNvSpPr/>
+          <p:nvPr/>
+        </p:nvSpPr>
+        <p:spPr>
+          <a:xfrm>
+            <a:off x="4885748" y="1923528"/>
+            <a:ext cx="2024954" cy="1190328"/>
+          </a:xfrm>
+          <a:custGeom>
+            <a:avLst/>
+            <a:gdLst/>
+            <a:ahLst/>
+            <a:cxnLst/>
+            <a:rect l="0" t="0" r="0" b="0"/>
+            <a:pathLst>
+              <a:path w="794537" h="367361">
+                <a:moveTo>
+                  <a:pt x="397269" y="0"/>
+                </a:moveTo>
+                <a:cubicBezTo>
+                  <a:pt x="616674" y="0"/>
+                  <a:pt x="794537" y="82233"/>
+                  <a:pt x="794537" y="183680"/>
+                </a:cubicBezTo>
+                <a:cubicBezTo>
+                  <a:pt x="794537" y="285128"/>
+                  <a:pt x="616674" y="367361"/>
+                  <a:pt x="397269" y="367361"/>
+                </a:cubicBezTo>
+                <a:cubicBezTo>
+                  <a:pt x="177863" y="367361"/>
+                  <a:pt x="0" y="285128"/>
+                  <a:pt x="0" y="183680"/>
+                </a:cubicBezTo>
+                <a:cubicBezTo>
+                  <a:pt x="0" y="82233"/>
+                  <a:pt x="177863" y="0"/>
+                  <a:pt x="397269" y="0"/>
+                </a:cubicBezTo>
+                <a:close/>
+              </a:path>
+            </a:pathLst>
+          </a:custGeom>
+          <a:ln w="0" cap="flat">
+            <a:miter lim="127000"/>
+          </a:ln>
+        </p:spPr>
+        <p:style>
+          <a:lnRef idx="0">
+            <a:srgbClr val="000000">
+              <a:alpha val="0"/>
+            </a:srgbClr>
+          </a:lnRef>
+          <a:fillRef idx="1">
+            <a:srgbClr val="E5E5E4"/>
+          </a:fillRef>
+          <a:effectRef idx="0">
+            <a:scrgbClr r="0" g="0" b="0"/>
+          </a:effectRef>
+          <a:fontRef idx="none"/>
+        </p:style>
+        <p:txBody>
+          <a:bodyPr/>
+          <a:lstStyle/>
+          <a:p>
+            <a:endParaRPr lang="pt-BR"/>
+          </a:p>
+        </p:txBody>
+      </p:sp>
+      <p:sp>
+        <p:nvSpPr>
+          <p:cNvPr id="26" name="Shape 371">
+            <a:extLst>
+              <a:ext uri="{FF2B5EF4-FFF2-40B4-BE49-F238E27FC236}">
+                <a16:creationId xmlns:a16="http://schemas.microsoft.com/office/drawing/2014/main" id="{8A9F829F-3FED-5377-6C4C-317D35719D6E}"/>
+              </a:ext>
+            </a:extLst>
+          </p:cNvPr>
+          <p:cNvSpPr/>
+          <p:nvPr/>
+        </p:nvSpPr>
+        <p:spPr>
+          <a:xfrm>
+            <a:off x="9069766" y="1923528"/>
+            <a:ext cx="2024954" cy="1190328"/>
+          </a:xfrm>
+          <a:custGeom>
+            <a:avLst/>
+            <a:gdLst/>
+            <a:ahLst/>
+            <a:cxnLst/>
+            <a:rect l="0" t="0" r="0" b="0"/>
+            <a:pathLst>
+              <a:path w="794537" h="367361">
+                <a:moveTo>
+                  <a:pt x="794537" y="183680"/>
+                </a:moveTo>
+                <a:cubicBezTo>
+                  <a:pt x="794537" y="285128"/>
+                  <a:pt x="616674" y="367361"/>
+                  <a:pt x="397269" y="367361"/>
+                </a:cubicBezTo>
+                <a:cubicBezTo>
+                  <a:pt x="177863" y="367361"/>
+                  <a:pt x="0" y="285128"/>
+                  <a:pt x="0" y="183680"/>
+                </a:cubicBezTo>
+                <a:cubicBezTo>
+                  <a:pt x="0" y="82233"/>
+                  <a:pt x="177863" y="0"/>
+                  <a:pt x="397269" y="0"/>
+                </a:cubicBezTo>
+                <a:cubicBezTo>
+                  <a:pt x="616674" y="0"/>
+                  <a:pt x="794537" y="82233"/>
+                  <a:pt x="794537" y="183680"/>
+                </a:cubicBezTo>
+                <a:close/>
+              </a:path>
+            </a:pathLst>
+          </a:custGeom>
+          <a:ln w="8103" cap="flat">
+            <a:miter lim="127000"/>
+          </a:ln>
+        </p:spPr>
+        <p:style>
+          <a:lnRef idx="1">
+            <a:srgbClr val="2F2115"/>
+          </a:lnRef>
+          <a:fillRef idx="0">
+            <a:srgbClr val="000000">
+              <a:alpha val="0"/>
+            </a:srgbClr>
+          </a:fillRef>
+          <a:effectRef idx="0">
+            <a:scrgbClr r="0" g="0" b="0"/>
+          </a:effectRef>
+          <a:fontRef idx="none"/>
+        </p:style>
+        <p:txBody>
+          <a:bodyPr/>
+          <a:lstStyle/>
+          <a:p>
+            <a:endParaRPr lang="pt-BR"/>
+          </a:p>
+        </p:txBody>
+      </p:sp>
+      <p:sp>
+        <p:nvSpPr>
+          <p:cNvPr id="27" name="Shape 371">
+            <a:extLst>
+              <a:ext uri="{FF2B5EF4-FFF2-40B4-BE49-F238E27FC236}">
+                <a16:creationId xmlns:a16="http://schemas.microsoft.com/office/drawing/2014/main" id="{C8E02792-29C5-01DF-8FD3-500F0D52973A}"/>
+              </a:ext>
+            </a:extLst>
+          </p:cNvPr>
+          <p:cNvSpPr/>
+          <p:nvPr/>
+        </p:nvSpPr>
+        <p:spPr>
+          <a:xfrm>
+            <a:off x="4855333" y="1945819"/>
+            <a:ext cx="2024954" cy="1190328"/>
+          </a:xfrm>
+          <a:custGeom>
+            <a:avLst/>
+            <a:gdLst/>
+            <a:ahLst/>
+            <a:cxnLst/>
+            <a:rect l="0" t="0" r="0" b="0"/>
+            <a:pathLst>
+              <a:path w="794537" h="367361">
+                <a:moveTo>
+                  <a:pt x="794537" y="183680"/>
+                </a:moveTo>
+                <a:cubicBezTo>
+                  <a:pt x="794537" y="285128"/>
+                  <a:pt x="616674" y="367361"/>
+                  <a:pt x="397269" y="367361"/>
+                </a:cubicBezTo>
+                <a:cubicBezTo>
+                  <a:pt x="177863" y="367361"/>
+                  <a:pt x="0" y="285128"/>
+                  <a:pt x="0" y="183680"/>
+                </a:cubicBezTo>
+                <a:cubicBezTo>
+                  <a:pt x="0" y="82233"/>
+                  <a:pt x="177863" y="0"/>
+                  <a:pt x="397269" y="0"/>
+                </a:cubicBezTo>
+                <a:cubicBezTo>
+                  <a:pt x="616674" y="0"/>
+                  <a:pt x="794537" y="82233"/>
+                  <a:pt x="794537" y="183680"/>
+                </a:cubicBezTo>
+                <a:close/>
+              </a:path>
+            </a:pathLst>
+          </a:custGeom>
+          <a:ln w="8103" cap="flat">
+            <a:miter lim="127000"/>
+          </a:ln>
+        </p:spPr>
+        <p:style>
+          <a:lnRef idx="1">
+            <a:srgbClr val="2F2115"/>
+          </a:lnRef>
+          <a:fillRef idx="0">
+            <a:srgbClr val="000000">
+              <a:alpha val="0"/>
+            </a:srgbClr>
+          </a:fillRef>
+          <a:effectRef idx="0">
+            <a:scrgbClr r="0" g="0" b="0"/>
+          </a:effectRef>
+          <a:fontRef idx="none"/>
+        </p:style>
+        <p:txBody>
+          <a:bodyPr/>
+          <a:lstStyle/>
+          <a:p>
+            <a:endParaRPr lang="pt-BR"/>
+          </a:p>
+        </p:txBody>
+      </p:sp>
+      <p:sp>
+        <p:nvSpPr>
+          <p:cNvPr id="28" name="Shape 371">
+            <a:extLst>
+              <a:ext uri="{FF2B5EF4-FFF2-40B4-BE49-F238E27FC236}">
+                <a16:creationId xmlns:a16="http://schemas.microsoft.com/office/drawing/2014/main" id="{2A5CE42A-D323-8467-DE73-97BC6464B947}"/>
+              </a:ext>
+            </a:extLst>
+          </p:cNvPr>
+          <p:cNvSpPr/>
+          <p:nvPr/>
+        </p:nvSpPr>
+        <p:spPr>
+          <a:xfrm>
+            <a:off x="8987860" y="5074284"/>
+            <a:ext cx="2024954" cy="1190328"/>
+          </a:xfrm>
+          <a:custGeom>
+            <a:avLst/>
+            <a:gdLst/>
+            <a:ahLst/>
+            <a:cxnLst/>
+            <a:rect l="0" t="0" r="0" b="0"/>
+            <a:pathLst>
+              <a:path w="794537" h="367361">
+                <a:moveTo>
+                  <a:pt x="794537" y="183680"/>
+                </a:moveTo>
+                <a:cubicBezTo>
+                  <a:pt x="794537" y="285128"/>
+                  <a:pt x="616674" y="367361"/>
+                  <a:pt x="397269" y="367361"/>
+                </a:cubicBezTo>
+                <a:cubicBezTo>
+                  <a:pt x="177863" y="367361"/>
+                  <a:pt x="0" y="285128"/>
+                  <a:pt x="0" y="183680"/>
+                </a:cubicBezTo>
+                <a:cubicBezTo>
+                  <a:pt x="0" y="82233"/>
+                  <a:pt x="177863" y="0"/>
+                  <a:pt x="397269" y="0"/>
+                </a:cubicBezTo>
+                <a:cubicBezTo>
+                  <a:pt x="616674" y="0"/>
+                  <a:pt x="794537" y="82233"/>
+                  <a:pt x="794537" y="183680"/>
+                </a:cubicBezTo>
+                <a:close/>
+              </a:path>
+            </a:pathLst>
+          </a:custGeom>
+          <a:ln w="8103" cap="flat">
+            <a:miter lim="127000"/>
+          </a:ln>
+        </p:spPr>
+        <p:style>
+          <a:lnRef idx="1">
+            <a:srgbClr val="2F2115"/>
+          </a:lnRef>
+          <a:fillRef idx="0">
+            <a:srgbClr val="000000">
+              <a:alpha val="0"/>
+            </a:srgbClr>
+          </a:fillRef>
+          <a:effectRef idx="0">
+            <a:scrgbClr r="0" g="0" b="0"/>
+          </a:effectRef>
+          <a:fontRef idx="none"/>
+        </p:style>
+        <p:txBody>
+          <a:bodyPr/>
+          <a:lstStyle/>
+          <a:p>
+            <a:endParaRPr lang="pt-BR"/>
+          </a:p>
+        </p:txBody>
+      </p:sp>
+      <p:sp>
+        <p:nvSpPr>
+          <p:cNvPr id="29" name="Shape 371">
+            <a:extLst>
+              <a:ext uri="{FF2B5EF4-FFF2-40B4-BE49-F238E27FC236}">
+                <a16:creationId xmlns:a16="http://schemas.microsoft.com/office/drawing/2014/main" id="{C35A7FC2-19B3-92AC-EA44-065ED683A4BA}"/>
+              </a:ext>
+            </a:extLst>
+          </p:cNvPr>
+          <p:cNvSpPr/>
+          <p:nvPr/>
+        </p:nvSpPr>
+        <p:spPr>
+          <a:xfrm>
+            <a:off x="4885748" y="5074284"/>
+            <a:ext cx="2024954" cy="1190328"/>
+          </a:xfrm>
+          <a:custGeom>
+            <a:avLst/>
+            <a:gdLst/>
+            <a:ahLst/>
+            <a:cxnLst/>
+            <a:rect l="0" t="0" r="0" b="0"/>
+            <a:pathLst>
+              <a:path w="794537" h="367361">
+                <a:moveTo>
+                  <a:pt x="794537" y="183680"/>
+                </a:moveTo>
+                <a:cubicBezTo>
+                  <a:pt x="794537" y="285128"/>
+                  <a:pt x="616674" y="367361"/>
+                  <a:pt x="397269" y="367361"/>
+                </a:cubicBezTo>
+                <a:cubicBezTo>
+                  <a:pt x="177863" y="367361"/>
+                  <a:pt x="0" y="285128"/>
+                  <a:pt x="0" y="183680"/>
+                </a:cubicBezTo>
+                <a:cubicBezTo>
+                  <a:pt x="0" y="82233"/>
+                  <a:pt x="177863" y="0"/>
+                  <a:pt x="397269" y="0"/>
+                </a:cubicBezTo>
+                <a:cubicBezTo>
+                  <a:pt x="616674" y="0"/>
+                  <a:pt x="794537" y="82233"/>
+                  <a:pt x="794537" y="183680"/>
+                </a:cubicBezTo>
+                <a:close/>
+              </a:path>
+            </a:pathLst>
+          </a:custGeom>
+          <a:ln w="8103" cap="flat">
+            <a:miter lim="127000"/>
+          </a:ln>
+        </p:spPr>
+        <p:style>
+          <a:lnRef idx="1">
+            <a:srgbClr val="2F2115"/>
+          </a:lnRef>
+          <a:fillRef idx="0">
+            <a:srgbClr val="000000">
+              <a:alpha val="0"/>
+            </a:srgbClr>
+          </a:fillRef>
+          <a:effectRef idx="0">
+            <a:scrgbClr r="0" g="0" b="0"/>
+          </a:effectRef>
+          <a:fontRef idx="none"/>
+        </p:style>
+        <p:txBody>
+          <a:bodyPr/>
+          <a:lstStyle/>
+          <a:p>
+            <a:endParaRPr lang="pt-BR"/>
+          </a:p>
+        </p:txBody>
+      </p:sp>
+      <p:sp>
+        <p:nvSpPr>
+          <p:cNvPr id="30" name="Shape 399">
+            <a:extLst>
+              <a:ext uri="{FF2B5EF4-FFF2-40B4-BE49-F238E27FC236}">
+                <a16:creationId xmlns:a16="http://schemas.microsoft.com/office/drawing/2014/main" id="{A1940444-3679-F2C6-31B1-D9397F4ABA05}"/>
+              </a:ext>
+            </a:extLst>
+          </p:cNvPr>
+          <p:cNvSpPr/>
+          <p:nvPr/>
+        </p:nvSpPr>
+        <p:spPr>
+          <a:xfrm>
+            <a:off x="8756549" y="3113856"/>
+            <a:ext cx="1107298" cy="616666"/>
+          </a:xfrm>
+          <a:custGeom>
+            <a:avLst/>
+            <a:gdLst/>
+            <a:ahLst/>
+            <a:cxnLst/>
+            <a:rect l="0" t="0" r="0" b="0"/>
+            <a:pathLst>
+              <a:path w="793966" h="487058">
+                <a:moveTo>
+                  <a:pt x="0" y="487058"/>
+                </a:moveTo>
+                <a:lnTo>
+                  <a:pt x="793966" y="0"/>
+                </a:lnTo>
+              </a:path>
+            </a:pathLst>
+          </a:custGeom>
+          <a:ln w="8103" cap="flat">
+            <a:miter lim="127000"/>
+          </a:ln>
+        </p:spPr>
+        <p:style>
+          <a:lnRef idx="1">
+            <a:srgbClr val="2F2115"/>
+          </a:lnRef>
+          <a:fillRef idx="0">
+            <a:srgbClr val="000000">
+              <a:alpha val="0"/>
+            </a:srgbClr>
+          </a:fillRef>
+          <a:effectRef idx="0">
+            <a:scrgbClr r="0" g="0" b="0"/>
+          </a:effectRef>
+          <a:fontRef idx="none"/>
+        </p:style>
+        <p:txBody>
+          <a:bodyPr/>
+          <a:lstStyle/>
+          <a:p>
+            <a:endParaRPr lang="pt-BR"/>
+          </a:p>
+        </p:txBody>
+      </p:sp>
+      <p:sp>
+        <p:nvSpPr>
+          <p:cNvPr id="31" name="Shape 399">
+            <a:extLst>
+              <a:ext uri="{FF2B5EF4-FFF2-40B4-BE49-F238E27FC236}">
+                <a16:creationId xmlns:a16="http://schemas.microsoft.com/office/drawing/2014/main" id="{E85557FA-5494-AF76-B489-0E75CB2BDF13}"/>
+              </a:ext>
+            </a:extLst>
+          </p:cNvPr>
+          <p:cNvSpPr/>
+          <p:nvPr/>
+        </p:nvSpPr>
+        <p:spPr>
+          <a:xfrm rot="20090525">
+            <a:off x="6737323" y="4885745"/>
+            <a:ext cx="1107298" cy="616666"/>
+          </a:xfrm>
+          <a:custGeom>
+            <a:avLst/>
+            <a:gdLst/>
+            <a:ahLst/>
+            <a:cxnLst/>
+            <a:rect l="0" t="0" r="0" b="0"/>
+            <a:pathLst>
+              <a:path w="793966" h="487058">
+                <a:moveTo>
+                  <a:pt x="0" y="487058"/>
+                </a:moveTo>
+                <a:lnTo>
+                  <a:pt x="793966" y="0"/>
+                </a:lnTo>
+              </a:path>
+            </a:pathLst>
+          </a:custGeom>
+          <a:ln w="8103" cap="flat">
+            <a:miter lim="127000"/>
+          </a:ln>
+        </p:spPr>
+        <p:style>
+          <a:lnRef idx="1">
+            <a:srgbClr val="2F2115"/>
+          </a:lnRef>
+          <a:fillRef idx="0">
+            <a:srgbClr val="000000">
+              <a:alpha val="0"/>
+            </a:srgbClr>
+          </a:fillRef>
+          <a:effectRef idx="0">
+            <a:scrgbClr r="0" g="0" b="0"/>
+          </a:effectRef>
+          <a:fontRef idx="none"/>
+        </p:style>
+        <p:txBody>
+          <a:bodyPr/>
+          <a:lstStyle/>
+          <a:p>
+            <a:endParaRPr lang="pt-BR"/>
+          </a:p>
+        </p:txBody>
+      </p:sp>
+      <p:sp>
+        <p:nvSpPr>
+          <p:cNvPr id="32" name="Shape 399">
+            <a:extLst>
+              <a:ext uri="{FF2B5EF4-FFF2-40B4-BE49-F238E27FC236}">
+                <a16:creationId xmlns:a16="http://schemas.microsoft.com/office/drawing/2014/main" id="{B0CE30DA-C9D7-937E-9F93-A839D5406C38}"/>
+              </a:ext>
+            </a:extLst>
+          </p:cNvPr>
+          <p:cNvSpPr/>
+          <p:nvPr/>
+        </p:nvSpPr>
+        <p:spPr>
+          <a:xfrm rot="4908826">
+            <a:off x="8058810" y="4862926"/>
+            <a:ext cx="1107298" cy="616666"/>
+          </a:xfrm>
+          <a:custGeom>
+            <a:avLst/>
+            <a:gdLst/>
+            <a:ahLst/>
+            <a:cxnLst/>
+            <a:rect l="0" t="0" r="0" b="0"/>
+            <a:pathLst>
+              <a:path w="793966" h="487058">
+                <a:moveTo>
+                  <a:pt x="0" y="487058"/>
+                </a:moveTo>
+                <a:lnTo>
+                  <a:pt x="793966" y="0"/>
+                </a:lnTo>
+              </a:path>
+            </a:pathLst>
+          </a:custGeom>
+          <a:ln w="8103" cap="flat">
+            <a:miter lim="127000"/>
+          </a:ln>
+        </p:spPr>
+        <p:style>
+          <a:lnRef idx="1">
+            <a:srgbClr val="2F2115"/>
+          </a:lnRef>
+          <a:fillRef idx="0">
+            <a:srgbClr val="000000">
+              <a:alpha val="0"/>
+            </a:srgbClr>
+          </a:fillRef>
+          <a:effectRef idx="0">
+            <a:scrgbClr r="0" g="0" b="0"/>
+          </a:effectRef>
+          <a:fontRef idx="none"/>
+        </p:style>
+        <p:txBody>
+          <a:bodyPr/>
+          <a:lstStyle/>
+          <a:p>
+            <a:endParaRPr lang="pt-BR"/>
+          </a:p>
+        </p:txBody>
+      </p:sp>
+      <p:sp>
+        <p:nvSpPr>
+          <p:cNvPr id="33" name="Shape 399">
+            <a:extLst>
+              <a:ext uri="{FF2B5EF4-FFF2-40B4-BE49-F238E27FC236}">
+                <a16:creationId xmlns:a16="http://schemas.microsoft.com/office/drawing/2014/main" id="{73C731E9-F9D2-A985-2B21-425C8014EA2F}"/>
+              </a:ext>
+            </a:extLst>
+          </p:cNvPr>
+          <p:cNvSpPr/>
+          <p:nvPr/>
+        </p:nvSpPr>
+        <p:spPr>
+          <a:xfrm flipH="1">
+            <a:off x="5952963" y="3129035"/>
+            <a:ext cx="1107298" cy="616666"/>
+          </a:xfrm>
+          <a:custGeom>
+            <a:avLst/>
+            <a:gdLst/>
+            <a:ahLst/>
+            <a:cxnLst/>
+            <a:rect l="0" t="0" r="0" b="0"/>
+            <a:pathLst>
+              <a:path w="793966" h="487058">
+                <a:moveTo>
+                  <a:pt x="0" y="487058"/>
+                </a:moveTo>
+                <a:lnTo>
+                  <a:pt x="793966" y="0"/>
+                </a:lnTo>
+              </a:path>
+            </a:pathLst>
+          </a:custGeom>
+          <a:ln w="8103" cap="flat">
+            <a:miter lim="127000"/>
+          </a:ln>
+        </p:spPr>
+        <p:style>
+          <a:lnRef idx="1">
+            <a:srgbClr val="2F2115"/>
+          </a:lnRef>
+          <a:fillRef idx="0">
+            <a:srgbClr val="000000">
+              <a:alpha val="0"/>
+            </a:srgbClr>
+          </a:fillRef>
+          <a:effectRef idx="0">
+            <a:scrgbClr r="0" g="0" b="0"/>
+          </a:effectRef>
+          <a:fontRef idx="none"/>
+        </p:style>
+        <p:txBody>
+          <a:bodyPr/>
+          <a:lstStyle/>
+          <a:p>
+            <a:endParaRPr lang="pt-BR"/>
+          </a:p>
+        </p:txBody>
+      </p:sp>
+      <p:sp>
+        <p:nvSpPr>
+          <p:cNvPr id="34" name="Rectangle 372">
+            <a:extLst>
+              <a:ext uri="{FF2B5EF4-FFF2-40B4-BE49-F238E27FC236}">
+                <a16:creationId xmlns:a16="http://schemas.microsoft.com/office/drawing/2014/main" id="{4553B4CA-E4B8-9654-D711-1FC2DE71C50A}"/>
+              </a:ext>
+            </a:extLst>
+          </p:cNvPr>
+          <p:cNvSpPr/>
+          <p:nvPr/>
+        </p:nvSpPr>
+        <p:spPr>
+          <a:xfrm>
+            <a:off x="7175925" y="3953609"/>
+            <a:ext cx="1580624" cy="364148"/>
+          </a:xfrm>
+          <a:prstGeom prst="rect">
+            <a:avLst/>
+          </a:prstGeom>
+          <a:ln>
+            <a:noFill/>
+          </a:ln>
+        </p:spPr>
+        <p:txBody>
+          <a:bodyPr vert="horz" lIns="0" tIns="0" rIns="0" bIns="0" rtlCol="0">
+            <a:noAutofit/>
+          </a:bodyPr>
+          <a:lstStyle/>
+          <a:p>
+            <a:pPr marR="127000" indent="163830" algn="l">
+              <a:lnSpc>
+                <a:spcPct val="107000"/>
+              </a:lnSpc>
+              <a:spcAft>
+                <a:spcPts val="800"/>
+              </a:spcAft>
+            </a:pPr>
+            <a:r>
+              <a:rPr lang="pt-BR" sz="2400" kern="100" dirty="0">
+                <a:solidFill>
+                  <a:srgbClr val="2F2115"/>
+                </a:solidFill>
+                <a:effectLst/>
+                <a:latin typeface="Calibri" panose="020F0502020204030204" pitchFamily="34" charset="0"/>
+                <a:ea typeface="Calibri" panose="020F0502020204030204" pitchFamily="34" charset="0"/>
+              </a:rPr>
+              <a:t>Endereço</a:t>
+            </a:r>
+            <a:endParaRPr lang="pt-BR" sz="2400" kern="100" dirty="0">
+              <a:solidFill>
+                <a:srgbClr val="2F2115"/>
+              </a:solidFill>
+              <a:effectLst/>
+              <a:latin typeface="Times New Roman" panose="02020603050405020304" pitchFamily="18" charset="0"/>
+              <a:ea typeface="Times New Roman" panose="02020603050405020304" pitchFamily="18" charset="0"/>
+            </a:endParaRPr>
+          </a:p>
+        </p:txBody>
+      </p:sp>
+      <p:sp>
+        <p:nvSpPr>
+          <p:cNvPr id="35" name="Rectangle 372">
+            <a:extLst>
+              <a:ext uri="{FF2B5EF4-FFF2-40B4-BE49-F238E27FC236}">
+                <a16:creationId xmlns:a16="http://schemas.microsoft.com/office/drawing/2014/main" id="{E7B2A1FD-7B54-A8F5-1C8A-02748304F4A6}"/>
+              </a:ext>
+            </a:extLst>
+          </p:cNvPr>
+          <p:cNvSpPr/>
+          <p:nvPr/>
+        </p:nvSpPr>
+        <p:spPr>
+          <a:xfrm>
+            <a:off x="5458451" y="2337692"/>
+            <a:ext cx="814827" cy="406582"/>
+          </a:xfrm>
+          <a:prstGeom prst="rect">
+            <a:avLst/>
+          </a:prstGeom>
+          <a:ln>
+            <a:noFill/>
+          </a:ln>
+        </p:spPr>
+        <p:txBody>
+          <a:bodyPr vert="horz" lIns="0" tIns="0" rIns="0" bIns="0" rtlCol="0">
+            <a:noAutofit/>
+          </a:bodyPr>
+          <a:lstStyle/>
+          <a:p>
+            <a:pPr marR="127000" indent="163830" algn="l">
+              <a:lnSpc>
+                <a:spcPct val="107000"/>
+              </a:lnSpc>
+              <a:spcAft>
+                <a:spcPts val="800"/>
+              </a:spcAft>
+            </a:pPr>
+            <a:r>
+              <a:rPr lang="pt-BR" sz="2400" kern="100" dirty="0">
+                <a:solidFill>
+                  <a:srgbClr val="2F2115"/>
+                </a:solidFill>
+                <a:effectLst/>
+                <a:latin typeface="Calibri" panose="020F0502020204030204" pitchFamily="34" charset="0"/>
+                <a:ea typeface="Calibri" panose="020F0502020204030204" pitchFamily="34" charset="0"/>
+              </a:rPr>
+              <a:t>Rua</a:t>
+            </a:r>
+            <a:endParaRPr lang="pt-BR" sz="2400" kern="100" dirty="0">
+              <a:solidFill>
+                <a:srgbClr val="2F2115"/>
+              </a:solidFill>
+              <a:effectLst/>
+              <a:latin typeface="Times New Roman" panose="02020603050405020304" pitchFamily="18" charset="0"/>
+              <a:ea typeface="Times New Roman" panose="02020603050405020304" pitchFamily="18" charset="0"/>
+            </a:endParaRPr>
+          </a:p>
+        </p:txBody>
+      </p:sp>
+      <p:sp>
+        <p:nvSpPr>
+          <p:cNvPr id="36" name="Rectangle 372">
+            <a:extLst>
+              <a:ext uri="{FF2B5EF4-FFF2-40B4-BE49-F238E27FC236}">
+                <a16:creationId xmlns:a16="http://schemas.microsoft.com/office/drawing/2014/main" id="{EABA041A-D045-0F2D-03E5-87709C2D32E3}"/>
+              </a:ext>
+            </a:extLst>
+          </p:cNvPr>
+          <p:cNvSpPr/>
+          <p:nvPr/>
+        </p:nvSpPr>
+        <p:spPr>
+          <a:xfrm>
+            <a:off x="9496530" y="2337692"/>
+            <a:ext cx="1171426" cy="462871"/>
+          </a:xfrm>
+          <a:prstGeom prst="rect">
+            <a:avLst/>
+          </a:prstGeom>
+          <a:ln>
+            <a:noFill/>
+          </a:ln>
+        </p:spPr>
+        <p:txBody>
+          <a:bodyPr vert="horz" lIns="0" tIns="0" rIns="0" bIns="0" rtlCol="0">
+            <a:noAutofit/>
+          </a:bodyPr>
+          <a:lstStyle/>
+          <a:p>
+            <a:pPr marR="127000" indent="163830" algn="l">
+              <a:lnSpc>
+                <a:spcPct val="107000"/>
+              </a:lnSpc>
+              <a:spcAft>
+                <a:spcPts val="800"/>
+              </a:spcAft>
+            </a:pPr>
+            <a:r>
+              <a:rPr lang="pt-BR" sz="2400" kern="100" dirty="0">
+                <a:solidFill>
+                  <a:srgbClr val="2F2115"/>
+                </a:solidFill>
+                <a:effectLst/>
+                <a:latin typeface="Calibri" panose="020F0502020204030204" pitchFamily="34" charset="0"/>
+                <a:ea typeface="Calibri" panose="020F0502020204030204" pitchFamily="34" charset="0"/>
+              </a:rPr>
+              <a:t>Cidade</a:t>
+            </a:r>
+            <a:endParaRPr lang="pt-BR" sz="2400" kern="100" dirty="0">
+              <a:solidFill>
+                <a:srgbClr val="2F2115"/>
+              </a:solidFill>
+              <a:effectLst/>
+              <a:latin typeface="Times New Roman" panose="02020603050405020304" pitchFamily="18" charset="0"/>
+              <a:ea typeface="Times New Roman" panose="02020603050405020304" pitchFamily="18" charset="0"/>
+            </a:endParaRPr>
+          </a:p>
+        </p:txBody>
+      </p:sp>
+      <p:sp>
+        <p:nvSpPr>
+          <p:cNvPr id="37" name="Rectangle 372">
+            <a:extLst>
+              <a:ext uri="{FF2B5EF4-FFF2-40B4-BE49-F238E27FC236}">
+                <a16:creationId xmlns:a16="http://schemas.microsoft.com/office/drawing/2014/main" id="{957B6D9D-9097-BDAE-74F5-E51DD666EFDF}"/>
+              </a:ext>
+            </a:extLst>
+          </p:cNvPr>
+          <p:cNvSpPr/>
+          <p:nvPr/>
+        </p:nvSpPr>
+        <p:spPr>
+          <a:xfrm>
+            <a:off x="5326263" y="5549649"/>
+            <a:ext cx="1143923" cy="427044"/>
+          </a:xfrm>
+          <a:prstGeom prst="rect">
+            <a:avLst/>
+          </a:prstGeom>
+          <a:ln>
+            <a:noFill/>
+          </a:ln>
+        </p:spPr>
+        <p:txBody>
+          <a:bodyPr vert="horz" lIns="0" tIns="0" rIns="0" bIns="0" rtlCol="0">
+            <a:noAutofit/>
+          </a:bodyPr>
+          <a:lstStyle/>
+          <a:p>
+            <a:pPr marR="127000" indent="163830" algn="l">
+              <a:lnSpc>
+                <a:spcPct val="107000"/>
+              </a:lnSpc>
+              <a:spcAft>
+                <a:spcPts val="800"/>
+              </a:spcAft>
+            </a:pPr>
+            <a:r>
+              <a:rPr lang="pt-BR" sz="2400" kern="100" dirty="0">
+                <a:solidFill>
+                  <a:srgbClr val="2F2115"/>
+                </a:solidFill>
+                <a:effectLst/>
+                <a:latin typeface="Calibri" panose="020F0502020204030204" pitchFamily="34" charset="0"/>
+                <a:ea typeface="Calibri" panose="020F0502020204030204" pitchFamily="34" charset="0"/>
+              </a:rPr>
+              <a:t>Estado</a:t>
+            </a:r>
+            <a:endParaRPr lang="pt-BR" sz="2400" kern="100" dirty="0">
+              <a:solidFill>
+                <a:srgbClr val="2F2115"/>
+              </a:solidFill>
+              <a:effectLst/>
+              <a:latin typeface="Times New Roman" panose="02020603050405020304" pitchFamily="18" charset="0"/>
+              <a:ea typeface="Times New Roman" panose="02020603050405020304" pitchFamily="18" charset="0"/>
+            </a:endParaRPr>
+          </a:p>
+        </p:txBody>
+      </p:sp>
+      <p:sp>
+        <p:nvSpPr>
+          <p:cNvPr id="38" name="Rectangle 372">
+            <a:extLst>
+              <a:ext uri="{FF2B5EF4-FFF2-40B4-BE49-F238E27FC236}">
+                <a16:creationId xmlns:a16="http://schemas.microsoft.com/office/drawing/2014/main" id="{915DF8CD-B2B8-961E-EE1B-45194E30DEA1}"/>
+              </a:ext>
+            </a:extLst>
+          </p:cNvPr>
+          <p:cNvSpPr/>
+          <p:nvPr/>
+        </p:nvSpPr>
+        <p:spPr>
+          <a:xfrm>
+            <a:off x="9590209" y="5465830"/>
+            <a:ext cx="768052" cy="450240"/>
+          </a:xfrm>
+          <a:prstGeom prst="rect">
+            <a:avLst/>
+          </a:prstGeom>
+          <a:ln>
+            <a:noFill/>
+          </a:ln>
+        </p:spPr>
+        <p:txBody>
+          <a:bodyPr vert="horz" lIns="0" tIns="0" rIns="0" bIns="0" rtlCol="0">
+            <a:noAutofit/>
+          </a:bodyPr>
+          <a:lstStyle/>
+          <a:p>
+            <a:pPr marR="127000" indent="163830" algn="l">
+              <a:lnSpc>
+                <a:spcPct val="107000"/>
+              </a:lnSpc>
+              <a:spcAft>
+                <a:spcPts val="800"/>
+              </a:spcAft>
+            </a:pPr>
+            <a:r>
+              <a:rPr lang="pt-BR" sz="2400" kern="100" dirty="0">
+                <a:solidFill>
+                  <a:srgbClr val="2F2115"/>
+                </a:solidFill>
+                <a:effectLst/>
+                <a:latin typeface="Calibri" panose="020F0502020204030204" pitchFamily="34" charset="0"/>
+                <a:ea typeface="Calibri" panose="020F0502020204030204" pitchFamily="34" charset="0"/>
+              </a:rPr>
+              <a:t>CEP</a:t>
+            </a:r>
+            <a:endParaRPr lang="pt-BR" sz="2400" kern="100" dirty="0">
+              <a:solidFill>
+                <a:srgbClr val="2F2115"/>
+              </a:solidFill>
+              <a:effectLst/>
+              <a:latin typeface="Times New Roman" panose="02020603050405020304" pitchFamily="18" charset="0"/>
+              <a:ea typeface="Times New Roman" panose="02020603050405020304" pitchFamily="18" charset="0"/>
+            </a:endParaRPr>
+          </a:p>
+        </p:txBody>
+      </p:sp>
+    </p:spTree>
+    <p:extLst>
+      <p:ext uri="{BB962C8B-B14F-4D97-AF65-F5344CB8AC3E}">
+        <p14:creationId xmlns:p14="http://schemas.microsoft.com/office/powerpoint/2010/main" val="3213824896"/>
+      </p:ext>
+    </p:extLst>
+  </p:cSld>
+  <p:clrMapOvr>
+    <a:masterClrMapping/>
+  </p:clrMapOvr>
+</p:sld>
+</file>
+
+<file path=ppt/slides/slide21.xml><?xml version="1.0" encoding="utf-8"?>
+<p:sld xmlns:a="http://schemas.openxmlformats.org/drawingml/2006/main" xmlns:r="http://schemas.openxmlformats.org/officeDocument/2006/relationships" xmlns:p="http://schemas.openxmlformats.org/presentationml/2006/main">
+  <p:cSld>
+    <p:spTree>
+      <p:nvGrpSpPr>
+        <p:cNvPr id="1" name=""/>
+        <p:cNvGrpSpPr/>
+        <p:nvPr/>
+      </p:nvGrpSpPr>
+      <p:grpSpPr>
+        <a:xfrm>
+          <a:off x="0" y="0"/>
+          <a:ext cx="0" cy="0"/>
+          <a:chOff x="0" y="0"/>
+          <a:chExt cx="0" cy="0"/>
+        </a:xfrm>
+      </p:grpSpPr>
+      <p:sp>
+        <p:nvSpPr>
+          <p:cNvPr id="2" name="Título 1">
+            <a:extLst>
+              <a:ext uri="{FF2B5EF4-FFF2-40B4-BE49-F238E27FC236}">
+                <a16:creationId xmlns:a16="http://schemas.microsoft.com/office/drawing/2014/main" id="{CC7C5B47-35D0-CBC5-39AF-B5F44B677392}"/>
+              </a:ext>
+            </a:extLst>
+          </p:cNvPr>
+          <p:cNvSpPr>
+            <a:spLocks noGrp="1"/>
+          </p:cNvSpPr>
+          <p:nvPr>
+            <p:ph type="title"/>
+          </p:nvPr>
+        </p:nvSpPr>
+        <p:spPr/>
+        <p:txBody>
+          <a:bodyPr>
+            <a:normAutofit/>
+          </a:bodyPr>
+          <a:lstStyle/>
+          <a:p>
+            <a:r>
+              <a:rPr lang="pt-BR" sz="4400" b="1" dirty="0"/>
+              <a:t>MODELO ENTIDADE-RELACIONAMENTO</a:t>
+            </a:r>
+            <a:br>
+              <a:rPr lang="pt-BR" sz="4400" b="1" dirty="0"/>
+            </a:br>
+            <a:r>
+              <a:rPr lang="pt-BR" sz="2700" dirty="0"/>
+              <a:t>ATRIBUTOS</a:t>
+            </a:r>
+          </a:p>
+        </p:txBody>
+      </p:sp>
+      <p:sp>
+        <p:nvSpPr>
+          <p:cNvPr id="3" name="Espaço Reservado para Conteúdo 2">
+            <a:extLst>
+              <a:ext uri="{FF2B5EF4-FFF2-40B4-BE49-F238E27FC236}">
+                <a16:creationId xmlns:a16="http://schemas.microsoft.com/office/drawing/2014/main" id="{59758A1E-514F-AFAC-13D2-56BDC5AADB96}"/>
+              </a:ext>
+            </a:extLst>
+          </p:cNvPr>
+          <p:cNvSpPr>
+            <a:spLocks noGrp="1"/>
+          </p:cNvSpPr>
+          <p:nvPr>
+            <p:ph idx="1"/>
+          </p:nvPr>
+        </p:nvSpPr>
+        <p:spPr>
+          <a:xfrm>
+            <a:off x="1097280" y="1923528"/>
+            <a:ext cx="10058400" cy="4341085"/>
+          </a:xfrm>
+        </p:spPr>
+        <p:txBody>
+          <a:bodyPr>
+            <a:normAutofit/>
+          </a:bodyPr>
+          <a:lstStyle/>
+          <a:p>
+            <a:pPr marL="0" indent="0">
+              <a:buNone/>
+            </a:pPr>
+            <a:r>
+              <a:rPr lang="pt-BR" sz="2400" dirty="0"/>
+              <a:t>Os </a:t>
+            </a:r>
+            <a:r>
+              <a:rPr lang="pt-BR" sz="2400" b="1" dirty="0"/>
+              <a:t>atributos-chave</a:t>
+            </a:r>
+            <a:r>
+              <a:rPr lang="pt-BR" sz="2400" dirty="0"/>
+              <a:t> informa qual é o atributo de identificação na entidade:</a:t>
+            </a:r>
+          </a:p>
+          <a:p>
+            <a:pPr>
+              <a:buFont typeface="Wingdings" panose="05000000000000000000" pitchFamily="2" charset="2"/>
+              <a:buChar char="Ø"/>
+            </a:pPr>
+            <a:r>
+              <a:rPr lang="pt-BR" sz="2400" dirty="0"/>
+              <a:t> Esta identificação é única;</a:t>
+            </a:r>
+          </a:p>
+          <a:p>
+            <a:pPr>
+              <a:buFont typeface="Wingdings" panose="05000000000000000000" pitchFamily="2" charset="2"/>
+              <a:buChar char="Ø"/>
+            </a:pPr>
+            <a:r>
+              <a:rPr lang="pt-BR" sz="2400" dirty="0"/>
+              <a:t> Esta identificação não pode ser nula.</a:t>
+            </a:r>
+          </a:p>
+          <a:p>
+            <a:pPr marL="0" indent="0">
+              <a:buNone/>
+            </a:pPr>
+            <a:r>
+              <a:rPr lang="pt-BR" sz="2400" dirty="0"/>
+              <a:t>Na figura observamos que o DER sugere este atributo com o seguinte desenho:</a:t>
+            </a:r>
+          </a:p>
+          <a:p>
+            <a:pPr marL="0" indent="0">
+              <a:buNone/>
+            </a:pPr>
+            <a:endParaRPr lang="pt-BR" sz="2400" dirty="0"/>
+          </a:p>
+          <a:p>
+            <a:pPr marL="0" indent="0">
+              <a:buNone/>
+            </a:pPr>
+            <a:endParaRPr lang="pt-BR" sz="2400" dirty="0"/>
+          </a:p>
+          <a:p>
+            <a:pPr marL="0" indent="0">
+              <a:buNone/>
+            </a:pPr>
+            <a:endParaRPr lang="pt-BR" sz="2400" dirty="0"/>
+          </a:p>
+          <a:p>
+            <a:pPr marL="0" indent="0">
+              <a:buNone/>
+            </a:pPr>
+            <a:r>
+              <a:rPr lang="pt-BR" sz="2400" dirty="0"/>
+              <a:t>OBS: As bordas são diferentes, se destacando dos outros atributos.</a:t>
+            </a:r>
+          </a:p>
+        </p:txBody>
+      </p:sp>
+      <p:sp>
+        <p:nvSpPr>
+          <p:cNvPr id="6" name="Shape 389">
+            <a:extLst>
+              <a:ext uri="{FF2B5EF4-FFF2-40B4-BE49-F238E27FC236}">
+                <a16:creationId xmlns:a16="http://schemas.microsoft.com/office/drawing/2014/main" id="{072B6DF5-6A1C-C9F4-D106-2251492D408A}"/>
+              </a:ext>
+            </a:extLst>
+          </p:cNvPr>
+          <p:cNvSpPr/>
+          <p:nvPr/>
+        </p:nvSpPr>
+        <p:spPr>
+          <a:xfrm>
+            <a:off x="4942557" y="4391331"/>
+            <a:ext cx="2367846" cy="875372"/>
+          </a:xfrm>
+          <a:custGeom>
+            <a:avLst/>
+            <a:gdLst/>
+            <a:ahLst/>
+            <a:cxnLst/>
+            <a:rect l="0" t="0" r="0" b="0"/>
+            <a:pathLst>
+              <a:path w="947179" h="369913">
+                <a:moveTo>
+                  <a:pt x="473583" y="0"/>
+                </a:moveTo>
+                <a:cubicBezTo>
+                  <a:pt x="735140" y="0"/>
+                  <a:pt x="947179" y="82817"/>
+                  <a:pt x="947179" y="184963"/>
+                </a:cubicBezTo>
+                <a:cubicBezTo>
+                  <a:pt x="947179" y="287122"/>
+                  <a:pt x="735140" y="369913"/>
+                  <a:pt x="473583" y="369913"/>
+                </a:cubicBezTo>
+                <a:cubicBezTo>
+                  <a:pt x="212026" y="369913"/>
+                  <a:pt x="0" y="287122"/>
+                  <a:pt x="0" y="184963"/>
+                </a:cubicBezTo>
+                <a:cubicBezTo>
+                  <a:pt x="0" y="82817"/>
+                  <a:pt x="212026" y="0"/>
+                  <a:pt x="473583" y="0"/>
+                </a:cubicBezTo>
+                <a:close/>
+              </a:path>
+            </a:pathLst>
+          </a:custGeom>
+          <a:ln w="0" cap="flat">
+            <a:miter lim="127000"/>
+          </a:ln>
+        </p:spPr>
+        <p:style>
+          <a:lnRef idx="0">
+            <a:srgbClr val="000000">
+              <a:alpha val="0"/>
+            </a:srgbClr>
+          </a:lnRef>
+          <a:fillRef idx="1">
+            <a:srgbClr val="E5E5E4"/>
+          </a:fillRef>
+          <a:effectRef idx="0">
+            <a:scrgbClr r="0" g="0" b="0"/>
+          </a:effectRef>
+          <a:fontRef idx="none"/>
+        </p:style>
+        <p:txBody>
+          <a:bodyPr/>
+          <a:lstStyle/>
+          <a:p>
+            <a:endParaRPr lang="pt-BR"/>
+          </a:p>
+        </p:txBody>
+      </p:sp>
+      <p:sp>
+        <p:nvSpPr>
+          <p:cNvPr id="7" name="Rectangle 397">
+            <a:extLst>
+              <a:ext uri="{FF2B5EF4-FFF2-40B4-BE49-F238E27FC236}">
+                <a16:creationId xmlns:a16="http://schemas.microsoft.com/office/drawing/2014/main" id="{187D8DC2-E659-A136-B2AD-C5A6B74897B6}"/>
+              </a:ext>
+            </a:extLst>
+          </p:cNvPr>
+          <p:cNvSpPr/>
+          <p:nvPr/>
+        </p:nvSpPr>
+        <p:spPr>
+          <a:xfrm>
+            <a:off x="5387178" y="4634358"/>
+            <a:ext cx="1478604" cy="389318"/>
+          </a:xfrm>
+          <a:prstGeom prst="rect">
+            <a:avLst/>
+          </a:prstGeom>
+          <a:ln>
+            <a:noFill/>
+          </a:ln>
+        </p:spPr>
+        <p:txBody>
+          <a:bodyPr vert="horz" lIns="0" tIns="0" rIns="0" bIns="0" rtlCol="0">
+            <a:noAutofit/>
+          </a:bodyPr>
+          <a:lstStyle/>
+          <a:p>
+            <a:pPr marR="127000" indent="163830" algn="l">
+              <a:lnSpc>
+                <a:spcPct val="107000"/>
+              </a:lnSpc>
+              <a:spcAft>
+                <a:spcPts val="800"/>
+              </a:spcAft>
+            </a:pPr>
+            <a:r>
+              <a:rPr lang="pt-BR" sz="2400" kern="100" dirty="0">
+                <a:solidFill>
+                  <a:srgbClr val="2F2115"/>
+                </a:solidFill>
+                <a:effectLst/>
+                <a:latin typeface="Calibri" panose="020F0502020204030204" pitchFamily="34" charset="0"/>
+                <a:ea typeface="Calibri" panose="020F0502020204030204" pitchFamily="34" charset="0"/>
+              </a:rPr>
+              <a:t>Matrícula</a:t>
+            </a:r>
+            <a:endParaRPr lang="pt-BR" sz="2400" kern="100" dirty="0">
+              <a:solidFill>
+                <a:srgbClr val="2F2115"/>
+              </a:solidFill>
+              <a:effectLst/>
+              <a:latin typeface="Times New Roman" panose="02020603050405020304" pitchFamily="18" charset="0"/>
+              <a:ea typeface="Times New Roman" panose="02020603050405020304" pitchFamily="18" charset="0"/>
+            </a:endParaRPr>
+          </a:p>
+        </p:txBody>
+      </p:sp>
+      <p:sp>
+        <p:nvSpPr>
+          <p:cNvPr id="10" name="Shape 390">
+            <a:extLst>
+              <a:ext uri="{FF2B5EF4-FFF2-40B4-BE49-F238E27FC236}">
+                <a16:creationId xmlns:a16="http://schemas.microsoft.com/office/drawing/2014/main" id="{6A70959C-F811-4AD8-470B-D43B6281A889}"/>
+              </a:ext>
+            </a:extLst>
+          </p:cNvPr>
+          <p:cNvSpPr/>
+          <p:nvPr/>
+        </p:nvSpPr>
+        <p:spPr>
+          <a:xfrm>
+            <a:off x="4942557" y="4391331"/>
+            <a:ext cx="2367847" cy="875372"/>
+          </a:xfrm>
+          <a:custGeom>
+            <a:avLst/>
+            <a:gdLst/>
+            <a:ahLst/>
+            <a:cxnLst/>
+            <a:rect l="0" t="0" r="0" b="0"/>
+            <a:pathLst>
+              <a:path w="947179" h="369913">
+                <a:moveTo>
+                  <a:pt x="947179" y="184963"/>
+                </a:moveTo>
+                <a:cubicBezTo>
+                  <a:pt x="947179" y="287122"/>
+                  <a:pt x="735140" y="369913"/>
+                  <a:pt x="473583" y="369913"/>
+                </a:cubicBezTo>
+                <a:cubicBezTo>
+                  <a:pt x="212026" y="369913"/>
+                  <a:pt x="0" y="287122"/>
+                  <a:pt x="0" y="184963"/>
+                </a:cubicBezTo>
+                <a:cubicBezTo>
+                  <a:pt x="0" y="82817"/>
+                  <a:pt x="212026" y="0"/>
+                  <a:pt x="473583" y="0"/>
+                </a:cubicBezTo>
+                <a:cubicBezTo>
+                  <a:pt x="735140" y="0"/>
+                  <a:pt x="947179" y="82817"/>
+                  <a:pt x="947179" y="184963"/>
+                </a:cubicBezTo>
+                <a:close/>
+              </a:path>
+            </a:pathLst>
+          </a:custGeom>
+          <a:ln w="38100" cap="flat">
+            <a:miter lim="127000"/>
+          </a:ln>
+        </p:spPr>
+        <p:style>
+          <a:lnRef idx="1">
+            <a:srgbClr val="2F2115"/>
+          </a:lnRef>
+          <a:fillRef idx="0">
+            <a:srgbClr val="000000">
+              <a:alpha val="0"/>
+            </a:srgbClr>
+          </a:fillRef>
+          <a:effectRef idx="0">
+            <a:scrgbClr r="0" g="0" b="0"/>
+          </a:effectRef>
+          <a:fontRef idx="none"/>
+        </p:style>
+        <p:txBody>
+          <a:bodyPr/>
+          <a:lstStyle/>
+          <a:p>
+            <a:endParaRPr lang="pt-BR"/>
+          </a:p>
+        </p:txBody>
+      </p:sp>
+    </p:spTree>
+    <p:extLst>
+      <p:ext uri="{BB962C8B-B14F-4D97-AF65-F5344CB8AC3E}">
+        <p14:creationId xmlns:p14="http://schemas.microsoft.com/office/powerpoint/2010/main" val="782838912"/>
       </p:ext>
     </p:extLst>
   </p:cSld>

</xml_diff>

<commit_message>
Realizando uma nova alteração na aula 5
</commit_message>
<xml_diff>
--- a/Euripedes Simões de Paula/Banco de Dados/Aula 5/Projeto de banco de dados.pptx
+++ b/Euripedes Simões de Paula/Banco de Dados/Aula 5/Projeto de banco de dados.pptx
@@ -52,6 +52,10 @@
     <p:sldId id="303" r:id="rId46"/>
     <p:sldId id="304" r:id="rId47"/>
     <p:sldId id="305" r:id="rId48"/>
+    <p:sldId id="306" r:id="rId49"/>
+    <p:sldId id="307" r:id="rId50"/>
+    <p:sldId id="308" r:id="rId51"/>
+    <p:sldId id="309" r:id="rId52"/>
   </p:sldIdLst>
   <p:sldSz cx="12192000" cy="6858000"/>
   <p:notesSz cx="6858000" cy="9144000"/>
@@ -384,7 +388,7 @@
           <a:p>
             <a:fld id="{B8B9BE19-35B1-49B2-9769-AE2A591CF592}" type="datetimeFigureOut">
               <a:rPr lang="pt-BR" smtClean="0"/>
-              <a:t>30/03/2024</a:t>
+              <a:t>31/03/2024</a:t>
             </a:fld>
             <a:endParaRPr lang="pt-BR"/>
           </a:p>
@@ -592,7 +596,7 @@
           <a:p>
             <a:fld id="{B8B9BE19-35B1-49B2-9769-AE2A591CF592}" type="datetimeFigureOut">
               <a:rPr lang="pt-BR" smtClean="0"/>
-              <a:t>30/03/2024</a:t>
+              <a:t>31/03/2024</a:t>
             </a:fld>
             <a:endParaRPr lang="pt-BR"/>
           </a:p>
@@ -848,7 +852,7 @@
           <a:p>
             <a:fld id="{B8B9BE19-35B1-49B2-9769-AE2A591CF592}" type="datetimeFigureOut">
               <a:rPr lang="pt-BR" smtClean="0"/>
-              <a:t>30/03/2024</a:t>
+              <a:t>31/03/2024</a:t>
             </a:fld>
             <a:endParaRPr lang="pt-BR"/>
           </a:p>
@@ -1022,7 +1026,7 @@
           <a:p>
             <a:fld id="{B8B9BE19-35B1-49B2-9769-AE2A591CF592}" type="datetimeFigureOut">
               <a:rPr lang="pt-BR" smtClean="0"/>
-              <a:t>30/03/2024</a:t>
+              <a:t>31/03/2024</a:t>
             </a:fld>
             <a:endParaRPr lang="pt-BR"/>
           </a:p>
@@ -1365,7 +1369,7 @@
           <a:p>
             <a:fld id="{B8B9BE19-35B1-49B2-9769-AE2A591CF592}" type="datetimeFigureOut">
               <a:rPr lang="pt-BR" smtClean="0"/>
-              <a:t>30/03/2024</a:t>
+              <a:t>31/03/2024</a:t>
             </a:fld>
             <a:endParaRPr lang="pt-BR"/>
           </a:p>
@@ -1640,7 +1644,7 @@
           <a:p>
             <a:fld id="{B8B9BE19-35B1-49B2-9769-AE2A591CF592}" type="datetimeFigureOut">
               <a:rPr lang="pt-BR" smtClean="0"/>
-              <a:t>30/03/2024</a:t>
+              <a:t>31/03/2024</a:t>
             </a:fld>
             <a:endParaRPr lang="pt-BR"/>
           </a:p>
@@ -2019,7 +2023,7 @@
           <a:p>
             <a:fld id="{B8B9BE19-35B1-49B2-9769-AE2A591CF592}" type="datetimeFigureOut">
               <a:rPr lang="pt-BR" smtClean="0"/>
-              <a:t>30/03/2024</a:t>
+              <a:t>31/03/2024</a:t>
             </a:fld>
             <a:endParaRPr lang="pt-BR"/>
           </a:p>
@@ -2137,7 +2141,7 @@
           <a:p>
             <a:fld id="{B8B9BE19-35B1-49B2-9769-AE2A591CF592}" type="datetimeFigureOut">
               <a:rPr lang="pt-BR" smtClean="0"/>
-              <a:t>30/03/2024</a:t>
+              <a:t>31/03/2024</a:t>
             </a:fld>
             <a:endParaRPr lang="pt-BR"/>
           </a:p>
@@ -2308,7 +2312,7 @@
           <a:p>
             <a:fld id="{B8B9BE19-35B1-49B2-9769-AE2A591CF592}" type="datetimeFigureOut">
               <a:rPr lang="pt-BR" smtClean="0"/>
-              <a:t>30/03/2024</a:t>
+              <a:t>31/03/2024</a:t>
             </a:fld>
             <a:endParaRPr lang="pt-BR"/>
           </a:p>
@@ -2662,7 +2666,7 @@
           <a:p>
             <a:fld id="{B8B9BE19-35B1-49B2-9769-AE2A591CF592}" type="datetimeFigureOut">
               <a:rPr lang="pt-BR" smtClean="0"/>
-              <a:t>30/03/2024</a:t>
+              <a:t>31/03/2024</a:t>
             </a:fld>
             <a:endParaRPr lang="pt-BR"/>
           </a:p>
@@ -3044,7 +3048,7 @@
           <a:p>
             <a:fld id="{B8B9BE19-35B1-49B2-9769-AE2A591CF592}" type="datetimeFigureOut">
               <a:rPr lang="pt-BR" smtClean="0"/>
-              <a:t>30/03/2024</a:t>
+              <a:t>31/03/2024</a:t>
             </a:fld>
             <a:endParaRPr lang="pt-BR"/>
           </a:p>
@@ -3331,7 +3335,7 @@
           <a:p>
             <a:fld id="{B8B9BE19-35B1-49B2-9769-AE2A591CF592}" type="datetimeFigureOut">
               <a:rPr lang="pt-BR" smtClean="0"/>
-              <a:t>30/03/2024</a:t>
+              <a:t>31/03/2024</a:t>
             </a:fld>
             <a:endParaRPr lang="pt-BR"/>
           </a:p>
@@ -22431,6 +22435,1910 @@
     <p:extLst>
       <p:ext uri="{BB962C8B-B14F-4D97-AF65-F5344CB8AC3E}">
         <p14:creationId xmlns:p14="http://schemas.microsoft.com/office/powerpoint/2010/main" val="3996439270"/>
+      </p:ext>
+    </p:extLst>
+  </p:cSld>
+  <p:clrMapOvr>
+    <a:masterClrMapping/>
+  </p:clrMapOvr>
+</p:sld>
+</file>
+
+<file path=ppt/slides/slide48.xml><?xml version="1.0" encoding="utf-8"?>
+<p:sld xmlns:a="http://schemas.openxmlformats.org/drawingml/2006/main" xmlns:r="http://schemas.openxmlformats.org/officeDocument/2006/relationships" xmlns:p="http://schemas.openxmlformats.org/presentationml/2006/main">
+  <p:cSld>
+    <p:spTree>
+      <p:nvGrpSpPr>
+        <p:cNvPr id="1" name=""/>
+        <p:cNvGrpSpPr/>
+        <p:nvPr/>
+      </p:nvGrpSpPr>
+      <p:grpSpPr>
+        <a:xfrm>
+          <a:off x="0" y="0"/>
+          <a:ext cx="0" cy="0"/>
+          <a:chOff x="0" y="0"/>
+          <a:chExt cx="0" cy="0"/>
+        </a:xfrm>
+      </p:grpSpPr>
+      <p:sp>
+        <p:nvSpPr>
+          <p:cNvPr id="2" name="Título 1">
+            <a:extLst>
+              <a:ext uri="{FF2B5EF4-FFF2-40B4-BE49-F238E27FC236}">
+                <a16:creationId xmlns:a16="http://schemas.microsoft.com/office/drawing/2014/main" id="{CC7C5B47-35D0-CBC5-39AF-B5F44B677392}"/>
+              </a:ext>
+            </a:extLst>
+          </p:cNvPr>
+          <p:cNvSpPr>
+            <a:spLocks noGrp="1"/>
+          </p:cNvSpPr>
+          <p:nvPr>
+            <p:ph type="title"/>
+          </p:nvPr>
+        </p:nvSpPr>
+        <p:spPr/>
+        <p:txBody>
+          <a:bodyPr>
+            <a:normAutofit/>
+          </a:bodyPr>
+          <a:lstStyle/>
+          <a:p>
+            <a:r>
+              <a:rPr lang="pt-BR" sz="4400" b="1" dirty="0"/>
+              <a:t>MODELAGEM DE BANCO DE DADOS RELACIONAL</a:t>
+            </a:r>
+            <a:endParaRPr lang="pt-BR" sz="2700" dirty="0"/>
+          </a:p>
+        </p:txBody>
+      </p:sp>
+      <p:sp>
+        <p:nvSpPr>
+          <p:cNvPr id="3" name="Espaço Reservado para Conteúdo 2">
+            <a:extLst>
+              <a:ext uri="{FF2B5EF4-FFF2-40B4-BE49-F238E27FC236}">
+                <a16:creationId xmlns:a16="http://schemas.microsoft.com/office/drawing/2014/main" id="{59758A1E-514F-AFAC-13D2-56BDC5AADB96}"/>
+              </a:ext>
+            </a:extLst>
+          </p:cNvPr>
+          <p:cNvSpPr>
+            <a:spLocks noGrp="1"/>
+          </p:cNvSpPr>
+          <p:nvPr>
+            <p:ph idx="1"/>
+          </p:nvPr>
+        </p:nvSpPr>
+        <p:spPr>
+          <a:xfrm>
+            <a:off x="1097279" y="1923026"/>
+            <a:ext cx="10058399" cy="4384468"/>
+          </a:xfrm>
+          <a:ln>
+            <a:solidFill>
+              <a:schemeClr val="bg1"/>
+            </a:solidFill>
+          </a:ln>
+        </p:spPr>
+        <p:style>
+          <a:lnRef idx="2">
+            <a:schemeClr val="dk1"/>
+          </a:lnRef>
+          <a:fillRef idx="1">
+            <a:schemeClr val="lt1"/>
+          </a:fillRef>
+          <a:effectRef idx="0">
+            <a:schemeClr val="dk1"/>
+          </a:effectRef>
+          <a:fontRef idx="minor">
+            <a:schemeClr val="dk1"/>
+          </a:fontRef>
+        </p:style>
+        <p:txBody>
+          <a:bodyPr>
+            <a:normAutofit/>
+          </a:bodyPr>
+          <a:lstStyle/>
+          <a:p>
+            <a:pPr marL="0" indent="0">
+              <a:buNone/>
+            </a:pPr>
+            <a:r>
+              <a:rPr lang="pt-BR" sz="2400" dirty="0"/>
+              <a:t>Um banco de dados relacional é composto por tabelas.</a:t>
+            </a:r>
+          </a:p>
+          <a:p>
+            <a:pPr marL="0" indent="0">
+              <a:buNone/>
+            </a:pPr>
+            <a:r>
+              <a:rPr lang="pt-BR" sz="2400" dirty="0"/>
+              <a:t>O termo </a:t>
+            </a:r>
+            <a:r>
+              <a:rPr lang="pt-BR" sz="2400" b="1" dirty="0"/>
+              <a:t>tabela</a:t>
+            </a:r>
+            <a:r>
+              <a:rPr lang="pt-BR" sz="2400" dirty="0"/>
+              <a:t> é mais usado ao utilizar produtos comerciais; já o termo </a:t>
+            </a:r>
+            <a:r>
+              <a:rPr lang="pt-BR" sz="2400" b="1" dirty="0"/>
+              <a:t>relações</a:t>
+            </a:r>
+            <a:r>
+              <a:rPr lang="pt-BR" sz="2400" dirty="0"/>
+              <a:t> é adotado para a área acadêmica.</a:t>
+            </a:r>
+          </a:p>
+          <a:p>
+            <a:pPr marL="0" indent="0">
+              <a:buNone/>
+            </a:pPr>
+            <a:r>
+              <a:rPr lang="pt-BR" sz="2400" dirty="0"/>
+              <a:t>A tabela é um conjunto não ordenado de linhas e estão em uma série de </a:t>
+            </a:r>
+            <a:r>
+              <a:rPr lang="pt-BR" sz="2400" b="1" dirty="0"/>
+              <a:t>valores de atributos</a:t>
+            </a:r>
+            <a:r>
+              <a:rPr lang="pt-BR" sz="2400" dirty="0"/>
+              <a:t>.</a:t>
+            </a:r>
+          </a:p>
+          <a:p>
+            <a:pPr marL="0" indent="0">
+              <a:buNone/>
+            </a:pPr>
+            <a:r>
+              <a:rPr lang="pt-BR" sz="2400" dirty="0"/>
+              <a:t>Quando falamos de banco de dados relacional, devemos pensar em um composto de tabelas, chaves, domínios, valores e restrições de integridade.</a:t>
+            </a:r>
+          </a:p>
+          <a:p>
+            <a:pPr marL="0" indent="0">
+              <a:buNone/>
+            </a:pPr>
+            <a:r>
+              <a:rPr lang="pt-BR" sz="2400" dirty="0"/>
+              <a:t>As chaves devem ser a identificação de uma tabela, sendo as mais conhecidas chaves primárias, chave estrangeira e chave alternativa.</a:t>
+            </a:r>
+          </a:p>
+        </p:txBody>
+      </p:sp>
+    </p:spTree>
+    <p:extLst>
+      <p:ext uri="{BB962C8B-B14F-4D97-AF65-F5344CB8AC3E}">
+        <p14:creationId xmlns:p14="http://schemas.microsoft.com/office/powerpoint/2010/main" val="1716933532"/>
+      </p:ext>
+    </p:extLst>
+  </p:cSld>
+  <p:clrMapOvr>
+    <a:masterClrMapping/>
+  </p:clrMapOvr>
+</p:sld>
+</file>
+
+<file path=ppt/slides/slide49.xml><?xml version="1.0" encoding="utf-8"?>
+<p:sld xmlns:a="http://schemas.openxmlformats.org/drawingml/2006/main" xmlns:r="http://schemas.openxmlformats.org/officeDocument/2006/relationships" xmlns:p="http://schemas.openxmlformats.org/presentationml/2006/main">
+  <p:cSld>
+    <p:spTree>
+      <p:nvGrpSpPr>
+        <p:cNvPr id="1" name=""/>
+        <p:cNvGrpSpPr/>
+        <p:nvPr/>
+      </p:nvGrpSpPr>
+      <p:grpSpPr>
+        <a:xfrm>
+          <a:off x="0" y="0"/>
+          <a:ext cx="0" cy="0"/>
+          <a:chOff x="0" y="0"/>
+          <a:chExt cx="0" cy="0"/>
+        </a:xfrm>
+      </p:grpSpPr>
+      <p:sp>
+        <p:nvSpPr>
+          <p:cNvPr id="2" name="Título 1">
+            <a:extLst>
+              <a:ext uri="{FF2B5EF4-FFF2-40B4-BE49-F238E27FC236}">
+                <a16:creationId xmlns:a16="http://schemas.microsoft.com/office/drawing/2014/main" id="{CC7C5B47-35D0-CBC5-39AF-B5F44B677392}"/>
+              </a:ext>
+            </a:extLst>
+          </p:cNvPr>
+          <p:cNvSpPr>
+            <a:spLocks noGrp="1"/>
+          </p:cNvSpPr>
+          <p:nvPr>
+            <p:ph type="title"/>
+          </p:nvPr>
+        </p:nvSpPr>
+        <p:spPr/>
+        <p:txBody>
+          <a:bodyPr>
+            <a:normAutofit/>
+          </a:bodyPr>
+          <a:lstStyle/>
+          <a:p>
+            <a:r>
+              <a:rPr lang="pt-BR" sz="4400" b="1" dirty="0"/>
+              <a:t>MODELAGEM DE BANCO DE DADOS RELACIONAL</a:t>
+            </a:r>
+            <a:endParaRPr lang="pt-BR" sz="2700" dirty="0"/>
+          </a:p>
+        </p:txBody>
+      </p:sp>
+      <p:sp>
+        <p:nvSpPr>
+          <p:cNvPr id="3" name="Espaço Reservado para Conteúdo 2">
+            <a:extLst>
+              <a:ext uri="{FF2B5EF4-FFF2-40B4-BE49-F238E27FC236}">
+                <a16:creationId xmlns:a16="http://schemas.microsoft.com/office/drawing/2014/main" id="{59758A1E-514F-AFAC-13D2-56BDC5AADB96}"/>
+              </a:ext>
+            </a:extLst>
+          </p:cNvPr>
+          <p:cNvSpPr>
+            <a:spLocks noGrp="1"/>
+          </p:cNvSpPr>
+          <p:nvPr>
+            <p:ph idx="1"/>
+          </p:nvPr>
+        </p:nvSpPr>
+        <p:spPr>
+          <a:xfrm>
+            <a:off x="1097279" y="1923026"/>
+            <a:ext cx="10058399" cy="4384468"/>
+          </a:xfrm>
+          <a:ln>
+            <a:solidFill>
+              <a:schemeClr val="bg1"/>
+            </a:solidFill>
+          </a:ln>
+        </p:spPr>
+        <p:style>
+          <a:lnRef idx="2">
+            <a:schemeClr val="dk1"/>
+          </a:lnRef>
+          <a:fillRef idx="1">
+            <a:schemeClr val="lt1"/>
+          </a:fillRef>
+          <a:effectRef idx="0">
+            <a:schemeClr val="dk1"/>
+          </a:effectRef>
+          <a:fontRef idx="minor">
+            <a:schemeClr val="dk1"/>
+          </a:fontRef>
+        </p:style>
+        <p:txBody>
+          <a:bodyPr>
+            <a:normAutofit/>
+          </a:bodyPr>
+          <a:lstStyle/>
+          <a:p>
+            <a:pPr marL="0" indent="0">
+              <a:buNone/>
+            </a:pPr>
+            <a:r>
+              <a:rPr lang="pt-BR" sz="2400" dirty="0"/>
+              <a:t>Na imagem que vemos abaixo, temos uma chave primária na tabela no campo </a:t>
+            </a:r>
+            <a:r>
+              <a:rPr lang="pt-BR" sz="2400" i="1" dirty="0"/>
+              <a:t>ID_EMPREGADO</a:t>
+            </a:r>
+            <a:r>
+              <a:rPr lang="pt-BR" sz="2400" dirty="0"/>
+              <a:t> da tabela TB_EMPREGADO. </a:t>
+            </a:r>
+          </a:p>
+          <a:p>
+            <a:pPr marL="0" indent="0">
+              <a:buNone/>
+            </a:pPr>
+            <a:r>
+              <a:rPr lang="pt-BR" sz="2400" dirty="0"/>
+              <a:t>Essa chave é única, e não deve ter valores nulos ou repetidos.</a:t>
+            </a:r>
+          </a:p>
+        </p:txBody>
+      </p:sp>
+      <p:graphicFrame>
+        <p:nvGraphicFramePr>
+          <p:cNvPr id="4" name="Tabela 3">
+            <a:extLst>
+              <a:ext uri="{FF2B5EF4-FFF2-40B4-BE49-F238E27FC236}">
+                <a16:creationId xmlns:a16="http://schemas.microsoft.com/office/drawing/2014/main" id="{664028F6-E0CC-DC2C-BC41-809C3948573D}"/>
+              </a:ext>
+            </a:extLst>
+          </p:cNvPr>
+          <p:cNvGraphicFramePr>
+            <a:graphicFrameLocks noGrp="1"/>
+          </p:cNvGraphicFramePr>
+          <p:nvPr>
+            <p:extLst>
+              <p:ext uri="{D42A27DB-BD31-4B8C-83A1-F6EECF244321}">
+                <p14:modId xmlns:p14="http://schemas.microsoft.com/office/powerpoint/2010/main" val="2475099542"/>
+              </p:ext>
+            </p:extLst>
+          </p:nvPr>
+        </p:nvGraphicFramePr>
+        <p:xfrm>
+          <a:off x="1115208" y="3429000"/>
+          <a:ext cx="5841404" cy="1854200"/>
+        </p:xfrm>
+        <a:graphic>
+          <a:graphicData uri="http://schemas.openxmlformats.org/drawingml/2006/table">
+            <a:tbl>
+              <a:tblPr firstRow="1" bandRow="1">
+                <a:tableStyleId>{2D5ABB26-0587-4C30-8999-92F81FD0307C}</a:tableStyleId>
+              </a:tblPr>
+              <a:tblGrid>
+                <a:gridCol w="1735568">
+                  <a:extLst>
+                    <a:ext uri="{9D8B030D-6E8A-4147-A177-3AD203B41FA5}">
+                      <a16:colId xmlns:a16="http://schemas.microsoft.com/office/drawing/2014/main" val="639222513"/>
+                    </a:ext>
+                  </a:extLst>
+                </a:gridCol>
+                <a:gridCol w="968188">
+                  <a:extLst>
+                    <a:ext uri="{9D8B030D-6E8A-4147-A177-3AD203B41FA5}">
+                      <a16:colId xmlns:a16="http://schemas.microsoft.com/office/drawing/2014/main" val="885486051"/>
+                    </a:ext>
+                  </a:extLst>
+                </a:gridCol>
+                <a:gridCol w="1380565">
+                  <a:extLst>
+                    <a:ext uri="{9D8B030D-6E8A-4147-A177-3AD203B41FA5}">
+                      <a16:colId xmlns:a16="http://schemas.microsoft.com/office/drawing/2014/main" val="3563096703"/>
+                    </a:ext>
+                  </a:extLst>
+                </a:gridCol>
+                <a:gridCol w="1757083">
+                  <a:extLst>
+                    <a:ext uri="{9D8B030D-6E8A-4147-A177-3AD203B41FA5}">
+                      <a16:colId xmlns:a16="http://schemas.microsoft.com/office/drawing/2014/main" val="500366731"/>
+                    </a:ext>
+                  </a:extLst>
+                </a:gridCol>
+              </a:tblGrid>
+              <a:tr h="370840">
+                <a:tc>
+                  <a:txBody>
+                    <a:bodyPr/>
+                    <a:lstStyle/>
+                    <a:p>
+                      <a:pPr algn="ctr"/>
+                      <a:r>
+                        <a:rPr lang="pt-BR" dirty="0"/>
+                        <a:t>ID_EMPREGADO</a:t>
+                      </a:r>
+                    </a:p>
+                  </a:txBody>
+                  <a:tcPr>
+                    <a:lnL w="12700" cap="flat" cmpd="sng" algn="ctr">
+                      <a:solidFill>
+                        <a:schemeClr val="tx1"/>
+                      </a:solidFill>
+                      <a:prstDash val="solid"/>
+                      <a:round/>
+                      <a:headEnd type="none" w="med" len="med"/>
+                      <a:tailEnd type="none" w="med" len="med"/>
+                    </a:lnL>
+                    <a:lnR w="12700" cap="flat" cmpd="sng" algn="ctr">
+                      <a:solidFill>
+                        <a:schemeClr val="tx1"/>
+                      </a:solidFill>
+                      <a:prstDash val="solid"/>
+                      <a:round/>
+                      <a:headEnd type="none" w="med" len="med"/>
+                      <a:tailEnd type="none" w="med" len="med"/>
+                    </a:lnR>
+                    <a:lnT w="12700" cap="flat" cmpd="sng" algn="ctr">
+                      <a:solidFill>
+                        <a:schemeClr val="tx1"/>
+                      </a:solidFill>
+                      <a:prstDash val="solid"/>
+                      <a:round/>
+                      <a:headEnd type="none" w="med" len="med"/>
+                      <a:tailEnd type="none" w="med" len="med"/>
+                    </a:lnT>
+                    <a:lnB w="12700" cap="flat" cmpd="sng" algn="ctr">
+                      <a:solidFill>
+                        <a:schemeClr val="tx1"/>
+                      </a:solidFill>
+                      <a:prstDash val="solid"/>
+                      <a:round/>
+                      <a:headEnd type="none" w="med" len="med"/>
+                      <a:tailEnd type="none" w="med" len="med"/>
+                    </a:lnB>
+                  </a:tcPr>
+                </a:tc>
+                <a:tc>
+                  <a:txBody>
+                    <a:bodyPr/>
+                    <a:lstStyle/>
+                    <a:p>
+                      <a:r>
+                        <a:rPr lang="pt-BR" dirty="0"/>
+                        <a:t>NOME</a:t>
+                      </a:r>
+                    </a:p>
+                  </a:txBody>
+                  <a:tcPr>
+                    <a:lnL w="12700" cap="flat" cmpd="sng" algn="ctr">
+                      <a:solidFill>
+                        <a:schemeClr val="tx1"/>
+                      </a:solidFill>
+                      <a:prstDash val="solid"/>
+                      <a:round/>
+                      <a:headEnd type="none" w="med" len="med"/>
+                      <a:tailEnd type="none" w="med" len="med"/>
+                    </a:lnL>
+                    <a:lnR w="12700" cap="flat" cmpd="sng" algn="ctr">
+                      <a:solidFill>
+                        <a:schemeClr val="tx1"/>
+                      </a:solidFill>
+                      <a:prstDash val="solid"/>
+                      <a:round/>
+                      <a:headEnd type="none" w="med" len="med"/>
+                      <a:tailEnd type="none" w="med" len="med"/>
+                    </a:lnR>
+                    <a:lnT w="12700" cap="flat" cmpd="sng" algn="ctr">
+                      <a:solidFill>
+                        <a:schemeClr val="tx1"/>
+                      </a:solidFill>
+                      <a:prstDash val="solid"/>
+                      <a:round/>
+                      <a:headEnd type="none" w="med" len="med"/>
+                      <a:tailEnd type="none" w="med" len="med"/>
+                    </a:lnT>
+                    <a:lnB w="12700" cap="flat" cmpd="sng" algn="ctr">
+                      <a:solidFill>
+                        <a:schemeClr val="tx1"/>
+                      </a:solidFill>
+                      <a:prstDash val="solid"/>
+                      <a:round/>
+                      <a:headEnd type="none" w="med" len="med"/>
+                      <a:tailEnd type="none" w="med" len="med"/>
+                    </a:lnB>
+                  </a:tcPr>
+                </a:tc>
+                <a:tc>
+                  <a:txBody>
+                    <a:bodyPr/>
+                    <a:lstStyle/>
+                    <a:p>
+                      <a:pPr algn="ctr"/>
+                      <a:r>
+                        <a:rPr lang="pt-BR" dirty="0"/>
+                        <a:t>COD_DEPTO</a:t>
+                      </a:r>
+                    </a:p>
+                  </a:txBody>
+                  <a:tcPr>
+                    <a:lnL w="12700" cap="flat" cmpd="sng" algn="ctr">
+                      <a:solidFill>
+                        <a:schemeClr val="tx1"/>
+                      </a:solidFill>
+                      <a:prstDash val="solid"/>
+                      <a:round/>
+                      <a:headEnd type="none" w="med" len="med"/>
+                      <a:tailEnd type="none" w="med" len="med"/>
+                    </a:lnL>
+                    <a:lnR w="12700" cap="flat" cmpd="sng" algn="ctr">
+                      <a:solidFill>
+                        <a:schemeClr val="tx1"/>
+                      </a:solidFill>
+                      <a:prstDash val="solid"/>
+                      <a:round/>
+                      <a:headEnd type="none" w="med" len="med"/>
+                      <a:tailEnd type="none" w="med" len="med"/>
+                    </a:lnR>
+                    <a:lnT w="12700" cap="flat" cmpd="sng" algn="ctr">
+                      <a:solidFill>
+                        <a:schemeClr val="tx1"/>
+                      </a:solidFill>
+                      <a:prstDash val="solid"/>
+                      <a:round/>
+                      <a:headEnd type="none" w="med" len="med"/>
+                      <a:tailEnd type="none" w="med" len="med"/>
+                    </a:lnT>
+                    <a:lnB w="12700" cap="flat" cmpd="sng" algn="ctr">
+                      <a:solidFill>
+                        <a:schemeClr val="tx1"/>
+                      </a:solidFill>
+                      <a:prstDash val="solid"/>
+                      <a:round/>
+                      <a:headEnd type="none" w="med" len="med"/>
+                      <a:tailEnd type="none" w="med" len="med"/>
+                    </a:lnB>
+                  </a:tcPr>
+                </a:tc>
+                <a:tc>
+                  <a:txBody>
+                    <a:bodyPr/>
+                    <a:lstStyle/>
+                    <a:p>
+                      <a:r>
+                        <a:rPr lang="pt-BR" dirty="0"/>
+                        <a:t>CPF</a:t>
+                      </a:r>
+                    </a:p>
+                  </a:txBody>
+                  <a:tcPr>
+                    <a:lnL w="12700" cap="flat" cmpd="sng" algn="ctr">
+                      <a:solidFill>
+                        <a:schemeClr val="tx1"/>
+                      </a:solidFill>
+                      <a:prstDash val="solid"/>
+                      <a:round/>
+                      <a:headEnd type="none" w="med" len="med"/>
+                      <a:tailEnd type="none" w="med" len="med"/>
+                    </a:lnL>
+                    <a:lnR w="12700" cap="flat" cmpd="sng" algn="ctr">
+                      <a:solidFill>
+                        <a:schemeClr val="tx1"/>
+                      </a:solidFill>
+                      <a:prstDash val="solid"/>
+                      <a:round/>
+                      <a:headEnd type="none" w="med" len="med"/>
+                      <a:tailEnd type="none" w="med" len="med"/>
+                    </a:lnR>
+                    <a:lnT w="12700" cap="flat" cmpd="sng" algn="ctr">
+                      <a:solidFill>
+                        <a:schemeClr val="tx1"/>
+                      </a:solidFill>
+                      <a:prstDash val="solid"/>
+                      <a:round/>
+                      <a:headEnd type="none" w="med" len="med"/>
+                      <a:tailEnd type="none" w="med" len="med"/>
+                    </a:lnT>
+                    <a:lnB w="12700" cap="flat" cmpd="sng" algn="ctr">
+                      <a:solidFill>
+                        <a:schemeClr val="tx1"/>
+                      </a:solidFill>
+                      <a:prstDash val="solid"/>
+                      <a:round/>
+                      <a:headEnd type="none" w="med" len="med"/>
+                      <a:tailEnd type="none" w="med" len="med"/>
+                    </a:lnB>
+                  </a:tcPr>
+                </a:tc>
+                <a:extLst>
+                  <a:ext uri="{0D108BD9-81ED-4DB2-BD59-A6C34878D82A}">
+                    <a16:rowId xmlns:a16="http://schemas.microsoft.com/office/drawing/2014/main" val="3741624859"/>
+                  </a:ext>
+                </a:extLst>
+              </a:tr>
+              <a:tr h="370840">
+                <a:tc>
+                  <a:txBody>
+                    <a:bodyPr/>
+                    <a:lstStyle/>
+                    <a:p>
+                      <a:pPr algn="ctr"/>
+                      <a:r>
+                        <a:rPr lang="pt-BR" dirty="0"/>
+                        <a:t>1</a:t>
+                      </a:r>
+                    </a:p>
+                  </a:txBody>
+                  <a:tcPr>
+                    <a:lnL w="12700" cap="flat" cmpd="sng" algn="ctr">
+                      <a:solidFill>
+                        <a:schemeClr val="tx1"/>
+                      </a:solidFill>
+                      <a:prstDash val="solid"/>
+                      <a:round/>
+                      <a:headEnd type="none" w="med" len="med"/>
+                      <a:tailEnd type="none" w="med" len="med"/>
+                    </a:lnL>
+                    <a:lnR w="12700" cap="flat" cmpd="sng" algn="ctr">
+                      <a:solidFill>
+                        <a:schemeClr val="tx1"/>
+                      </a:solidFill>
+                      <a:prstDash val="solid"/>
+                      <a:round/>
+                      <a:headEnd type="none" w="med" len="med"/>
+                      <a:tailEnd type="none" w="med" len="med"/>
+                    </a:lnR>
+                    <a:lnT w="12700" cap="flat" cmpd="sng" algn="ctr">
+                      <a:solidFill>
+                        <a:schemeClr val="tx1"/>
+                      </a:solidFill>
+                      <a:prstDash val="solid"/>
+                      <a:round/>
+                      <a:headEnd type="none" w="med" len="med"/>
+                      <a:tailEnd type="none" w="med" len="med"/>
+                    </a:lnT>
+                    <a:lnB w="12700" cap="flat" cmpd="sng" algn="ctr">
+                      <a:solidFill>
+                        <a:schemeClr val="tx1"/>
+                      </a:solidFill>
+                      <a:prstDash val="solid"/>
+                      <a:round/>
+                      <a:headEnd type="none" w="med" len="med"/>
+                      <a:tailEnd type="none" w="med" len="med"/>
+                    </a:lnB>
+                  </a:tcPr>
+                </a:tc>
+                <a:tc>
+                  <a:txBody>
+                    <a:bodyPr/>
+                    <a:lstStyle/>
+                    <a:p>
+                      <a:r>
+                        <a:rPr lang="pt-BR" dirty="0"/>
+                        <a:t>YURI</a:t>
+                      </a:r>
+                    </a:p>
+                  </a:txBody>
+                  <a:tcPr>
+                    <a:lnL w="12700" cap="flat" cmpd="sng" algn="ctr">
+                      <a:solidFill>
+                        <a:schemeClr val="tx1"/>
+                      </a:solidFill>
+                      <a:prstDash val="solid"/>
+                      <a:round/>
+                      <a:headEnd type="none" w="med" len="med"/>
+                      <a:tailEnd type="none" w="med" len="med"/>
+                    </a:lnL>
+                    <a:lnR w="12700" cap="flat" cmpd="sng" algn="ctr">
+                      <a:solidFill>
+                        <a:schemeClr val="tx1"/>
+                      </a:solidFill>
+                      <a:prstDash val="solid"/>
+                      <a:round/>
+                      <a:headEnd type="none" w="med" len="med"/>
+                      <a:tailEnd type="none" w="med" len="med"/>
+                    </a:lnR>
+                    <a:lnT w="12700" cap="flat" cmpd="sng" algn="ctr">
+                      <a:solidFill>
+                        <a:schemeClr val="tx1"/>
+                      </a:solidFill>
+                      <a:prstDash val="solid"/>
+                      <a:round/>
+                      <a:headEnd type="none" w="med" len="med"/>
+                      <a:tailEnd type="none" w="med" len="med"/>
+                    </a:lnT>
+                    <a:lnB w="12700" cap="flat" cmpd="sng" algn="ctr">
+                      <a:solidFill>
+                        <a:schemeClr val="tx1"/>
+                      </a:solidFill>
+                      <a:prstDash val="solid"/>
+                      <a:round/>
+                      <a:headEnd type="none" w="med" len="med"/>
+                      <a:tailEnd type="none" w="med" len="med"/>
+                    </a:lnB>
+                  </a:tcPr>
+                </a:tc>
+                <a:tc>
+                  <a:txBody>
+                    <a:bodyPr/>
+                    <a:lstStyle/>
+                    <a:p>
+                      <a:pPr algn="ctr"/>
+                      <a:r>
+                        <a:rPr lang="pt-BR" dirty="0"/>
+                        <a:t>1</a:t>
+                      </a:r>
+                    </a:p>
+                  </a:txBody>
+                  <a:tcPr>
+                    <a:lnL w="12700" cap="flat" cmpd="sng" algn="ctr">
+                      <a:solidFill>
+                        <a:schemeClr val="tx1"/>
+                      </a:solidFill>
+                      <a:prstDash val="solid"/>
+                      <a:round/>
+                      <a:headEnd type="none" w="med" len="med"/>
+                      <a:tailEnd type="none" w="med" len="med"/>
+                    </a:lnL>
+                    <a:lnR w="12700" cap="flat" cmpd="sng" algn="ctr">
+                      <a:solidFill>
+                        <a:schemeClr val="tx1"/>
+                      </a:solidFill>
+                      <a:prstDash val="solid"/>
+                      <a:round/>
+                      <a:headEnd type="none" w="med" len="med"/>
+                      <a:tailEnd type="none" w="med" len="med"/>
+                    </a:lnR>
+                    <a:lnT w="12700" cap="flat" cmpd="sng" algn="ctr">
+                      <a:solidFill>
+                        <a:schemeClr val="tx1"/>
+                      </a:solidFill>
+                      <a:prstDash val="solid"/>
+                      <a:round/>
+                      <a:headEnd type="none" w="med" len="med"/>
+                      <a:tailEnd type="none" w="med" len="med"/>
+                    </a:lnT>
+                    <a:lnB w="12700" cap="flat" cmpd="sng" algn="ctr">
+                      <a:solidFill>
+                        <a:schemeClr val="tx1"/>
+                      </a:solidFill>
+                      <a:prstDash val="solid"/>
+                      <a:round/>
+                      <a:headEnd type="none" w="med" len="med"/>
+                      <a:tailEnd type="none" w="med" len="med"/>
+                    </a:lnB>
+                  </a:tcPr>
+                </a:tc>
+                <a:tc>
+                  <a:txBody>
+                    <a:bodyPr/>
+                    <a:lstStyle/>
+                    <a:p>
+                      <a:r>
+                        <a:rPr lang="pt-BR" dirty="0"/>
+                        <a:t>XXX.XXX.XXX-X1</a:t>
+                      </a:r>
+                    </a:p>
+                  </a:txBody>
+                  <a:tcPr>
+                    <a:lnL w="12700" cap="flat" cmpd="sng" algn="ctr">
+                      <a:solidFill>
+                        <a:schemeClr val="tx1"/>
+                      </a:solidFill>
+                      <a:prstDash val="solid"/>
+                      <a:round/>
+                      <a:headEnd type="none" w="med" len="med"/>
+                      <a:tailEnd type="none" w="med" len="med"/>
+                    </a:lnL>
+                    <a:lnR w="12700" cap="flat" cmpd="sng" algn="ctr">
+                      <a:solidFill>
+                        <a:schemeClr val="tx1"/>
+                      </a:solidFill>
+                      <a:prstDash val="solid"/>
+                      <a:round/>
+                      <a:headEnd type="none" w="med" len="med"/>
+                      <a:tailEnd type="none" w="med" len="med"/>
+                    </a:lnR>
+                    <a:lnT w="12700" cap="flat" cmpd="sng" algn="ctr">
+                      <a:solidFill>
+                        <a:schemeClr val="tx1"/>
+                      </a:solidFill>
+                      <a:prstDash val="solid"/>
+                      <a:round/>
+                      <a:headEnd type="none" w="med" len="med"/>
+                      <a:tailEnd type="none" w="med" len="med"/>
+                    </a:lnT>
+                    <a:lnB w="12700" cap="flat" cmpd="sng" algn="ctr">
+                      <a:solidFill>
+                        <a:schemeClr val="tx1"/>
+                      </a:solidFill>
+                      <a:prstDash val="solid"/>
+                      <a:round/>
+                      <a:headEnd type="none" w="med" len="med"/>
+                      <a:tailEnd type="none" w="med" len="med"/>
+                    </a:lnB>
+                  </a:tcPr>
+                </a:tc>
+                <a:extLst>
+                  <a:ext uri="{0D108BD9-81ED-4DB2-BD59-A6C34878D82A}">
+                    <a16:rowId xmlns:a16="http://schemas.microsoft.com/office/drawing/2014/main" val="4002527758"/>
+                  </a:ext>
+                </a:extLst>
+              </a:tr>
+              <a:tr h="370840">
+                <a:tc>
+                  <a:txBody>
+                    <a:bodyPr/>
+                    <a:lstStyle/>
+                    <a:p>
+                      <a:pPr algn="ctr"/>
+                      <a:r>
+                        <a:rPr lang="pt-BR" dirty="0"/>
+                        <a:t>2</a:t>
+                      </a:r>
+                    </a:p>
+                  </a:txBody>
+                  <a:tcPr>
+                    <a:lnL w="12700" cap="flat" cmpd="sng" algn="ctr">
+                      <a:solidFill>
+                        <a:schemeClr val="tx1"/>
+                      </a:solidFill>
+                      <a:prstDash val="solid"/>
+                      <a:round/>
+                      <a:headEnd type="none" w="med" len="med"/>
+                      <a:tailEnd type="none" w="med" len="med"/>
+                    </a:lnL>
+                    <a:lnR w="12700" cap="flat" cmpd="sng" algn="ctr">
+                      <a:solidFill>
+                        <a:schemeClr val="tx1"/>
+                      </a:solidFill>
+                      <a:prstDash val="solid"/>
+                      <a:round/>
+                      <a:headEnd type="none" w="med" len="med"/>
+                      <a:tailEnd type="none" w="med" len="med"/>
+                    </a:lnR>
+                    <a:lnT w="12700" cap="flat" cmpd="sng" algn="ctr">
+                      <a:solidFill>
+                        <a:schemeClr val="tx1"/>
+                      </a:solidFill>
+                      <a:prstDash val="solid"/>
+                      <a:round/>
+                      <a:headEnd type="none" w="med" len="med"/>
+                      <a:tailEnd type="none" w="med" len="med"/>
+                    </a:lnT>
+                    <a:lnB w="12700" cap="flat" cmpd="sng" algn="ctr">
+                      <a:solidFill>
+                        <a:schemeClr val="tx1"/>
+                      </a:solidFill>
+                      <a:prstDash val="solid"/>
+                      <a:round/>
+                      <a:headEnd type="none" w="med" len="med"/>
+                      <a:tailEnd type="none" w="med" len="med"/>
+                    </a:lnB>
+                  </a:tcPr>
+                </a:tc>
+                <a:tc>
+                  <a:txBody>
+                    <a:bodyPr/>
+                    <a:lstStyle/>
+                    <a:p>
+                      <a:r>
+                        <a:rPr lang="pt-BR" dirty="0"/>
+                        <a:t>TAUMI</a:t>
+                      </a:r>
+                    </a:p>
+                  </a:txBody>
+                  <a:tcPr>
+                    <a:lnL w="12700" cap="flat" cmpd="sng" algn="ctr">
+                      <a:solidFill>
+                        <a:schemeClr val="tx1"/>
+                      </a:solidFill>
+                      <a:prstDash val="solid"/>
+                      <a:round/>
+                      <a:headEnd type="none" w="med" len="med"/>
+                      <a:tailEnd type="none" w="med" len="med"/>
+                    </a:lnL>
+                    <a:lnR w="12700" cap="flat" cmpd="sng" algn="ctr">
+                      <a:solidFill>
+                        <a:schemeClr val="tx1"/>
+                      </a:solidFill>
+                      <a:prstDash val="solid"/>
+                      <a:round/>
+                      <a:headEnd type="none" w="med" len="med"/>
+                      <a:tailEnd type="none" w="med" len="med"/>
+                    </a:lnR>
+                    <a:lnT w="12700" cap="flat" cmpd="sng" algn="ctr">
+                      <a:solidFill>
+                        <a:schemeClr val="tx1"/>
+                      </a:solidFill>
+                      <a:prstDash val="solid"/>
+                      <a:round/>
+                      <a:headEnd type="none" w="med" len="med"/>
+                      <a:tailEnd type="none" w="med" len="med"/>
+                    </a:lnT>
+                    <a:lnB w="12700" cap="flat" cmpd="sng" algn="ctr">
+                      <a:solidFill>
+                        <a:schemeClr val="tx1"/>
+                      </a:solidFill>
+                      <a:prstDash val="solid"/>
+                      <a:round/>
+                      <a:headEnd type="none" w="med" len="med"/>
+                      <a:tailEnd type="none" w="med" len="med"/>
+                    </a:lnB>
+                  </a:tcPr>
+                </a:tc>
+                <a:tc>
+                  <a:txBody>
+                    <a:bodyPr/>
+                    <a:lstStyle/>
+                    <a:p>
+                      <a:pPr algn="ctr"/>
+                      <a:r>
+                        <a:rPr lang="pt-BR" dirty="0"/>
+                        <a:t>2</a:t>
+                      </a:r>
+                    </a:p>
+                  </a:txBody>
+                  <a:tcPr>
+                    <a:lnL w="12700" cap="flat" cmpd="sng" algn="ctr">
+                      <a:solidFill>
+                        <a:schemeClr val="tx1"/>
+                      </a:solidFill>
+                      <a:prstDash val="solid"/>
+                      <a:round/>
+                      <a:headEnd type="none" w="med" len="med"/>
+                      <a:tailEnd type="none" w="med" len="med"/>
+                    </a:lnL>
+                    <a:lnR w="12700" cap="flat" cmpd="sng" algn="ctr">
+                      <a:solidFill>
+                        <a:schemeClr val="tx1"/>
+                      </a:solidFill>
+                      <a:prstDash val="solid"/>
+                      <a:round/>
+                      <a:headEnd type="none" w="med" len="med"/>
+                      <a:tailEnd type="none" w="med" len="med"/>
+                    </a:lnR>
+                    <a:lnT w="12700" cap="flat" cmpd="sng" algn="ctr">
+                      <a:solidFill>
+                        <a:schemeClr val="tx1"/>
+                      </a:solidFill>
+                      <a:prstDash val="solid"/>
+                      <a:round/>
+                      <a:headEnd type="none" w="med" len="med"/>
+                      <a:tailEnd type="none" w="med" len="med"/>
+                    </a:lnT>
+                    <a:lnB w="12700" cap="flat" cmpd="sng" algn="ctr">
+                      <a:solidFill>
+                        <a:schemeClr val="tx1"/>
+                      </a:solidFill>
+                      <a:prstDash val="solid"/>
+                      <a:round/>
+                      <a:headEnd type="none" w="med" len="med"/>
+                      <a:tailEnd type="none" w="med" len="med"/>
+                    </a:lnB>
+                  </a:tcPr>
+                </a:tc>
+                <a:tc>
+                  <a:txBody>
+                    <a:bodyPr/>
+                    <a:lstStyle/>
+                    <a:p>
+                      <a:r>
+                        <a:rPr lang="pt-BR" dirty="0"/>
+                        <a:t>XXX.XXX.XXX-X2</a:t>
+                      </a:r>
+                    </a:p>
+                  </a:txBody>
+                  <a:tcPr>
+                    <a:lnL w="12700" cap="flat" cmpd="sng" algn="ctr">
+                      <a:solidFill>
+                        <a:schemeClr val="tx1"/>
+                      </a:solidFill>
+                      <a:prstDash val="solid"/>
+                      <a:round/>
+                      <a:headEnd type="none" w="med" len="med"/>
+                      <a:tailEnd type="none" w="med" len="med"/>
+                    </a:lnL>
+                    <a:lnR w="12700" cap="flat" cmpd="sng" algn="ctr">
+                      <a:solidFill>
+                        <a:schemeClr val="tx1"/>
+                      </a:solidFill>
+                      <a:prstDash val="solid"/>
+                      <a:round/>
+                      <a:headEnd type="none" w="med" len="med"/>
+                      <a:tailEnd type="none" w="med" len="med"/>
+                    </a:lnR>
+                    <a:lnT w="12700" cap="flat" cmpd="sng" algn="ctr">
+                      <a:solidFill>
+                        <a:schemeClr val="tx1"/>
+                      </a:solidFill>
+                      <a:prstDash val="solid"/>
+                      <a:round/>
+                      <a:headEnd type="none" w="med" len="med"/>
+                      <a:tailEnd type="none" w="med" len="med"/>
+                    </a:lnT>
+                    <a:lnB w="12700" cap="flat" cmpd="sng" algn="ctr">
+                      <a:solidFill>
+                        <a:schemeClr val="tx1"/>
+                      </a:solidFill>
+                      <a:prstDash val="solid"/>
+                      <a:round/>
+                      <a:headEnd type="none" w="med" len="med"/>
+                      <a:tailEnd type="none" w="med" len="med"/>
+                    </a:lnB>
+                  </a:tcPr>
+                </a:tc>
+                <a:extLst>
+                  <a:ext uri="{0D108BD9-81ED-4DB2-BD59-A6C34878D82A}">
+                    <a16:rowId xmlns:a16="http://schemas.microsoft.com/office/drawing/2014/main" val="2413718252"/>
+                  </a:ext>
+                </a:extLst>
+              </a:tr>
+              <a:tr h="370840">
+                <a:tc>
+                  <a:txBody>
+                    <a:bodyPr/>
+                    <a:lstStyle/>
+                    <a:p>
+                      <a:pPr algn="ctr"/>
+                      <a:r>
+                        <a:rPr lang="pt-BR" dirty="0"/>
+                        <a:t>2</a:t>
+                      </a:r>
+                    </a:p>
+                  </a:txBody>
+                  <a:tcPr>
+                    <a:lnL w="12700" cap="flat" cmpd="sng" algn="ctr">
+                      <a:solidFill>
+                        <a:schemeClr val="tx1"/>
+                      </a:solidFill>
+                      <a:prstDash val="solid"/>
+                      <a:round/>
+                      <a:headEnd type="none" w="med" len="med"/>
+                      <a:tailEnd type="none" w="med" len="med"/>
+                    </a:lnL>
+                    <a:lnR w="12700" cap="flat" cmpd="sng" algn="ctr">
+                      <a:solidFill>
+                        <a:schemeClr val="tx1"/>
+                      </a:solidFill>
+                      <a:prstDash val="solid"/>
+                      <a:round/>
+                      <a:headEnd type="none" w="med" len="med"/>
+                      <a:tailEnd type="none" w="med" len="med"/>
+                    </a:lnR>
+                    <a:lnT w="12700" cap="flat" cmpd="sng" algn="ctr">
+                      <a:solidFill>
+                        <a:schemeClr val="tx1"/>
+                      </a:solidFill>
+                      <a:prstDash val="solid"/>
+                      <a:round/>
+                      <a:headEnd type="none" w="med" len="med"/>
+                      <a:tailEnd type="none" w="med" len="med"/>
+                    </a:lnT>
+                    <a:lnB w="12700" cap="flat" cmpd="sng" algn="ctr">
+                      <a:solidFill>
+                        <a:schemeClr val="tx1"/>
+                      </a:solidFill>
+                      <a:prstDash val="solid"/>
+                      <a:round/>
+                      <a:headEnd type="none" w="med" len="med"/>
+                      <a:tailEnd type="none" w="med" len="med"/>
+                    </a:lnB>
+                  </a:tcPr>
+                </a:tc>
+                <a:tc>
+                  <a:txBody>
+                    <a:bodyPr/>
+                    <a:lstStyle/>
+                    <a:p>
+                      <a:r>
+                        <a:rPr lang="pt-BR" dirty="0"/>
+                        <a:t>DANIEL</a:t>
+                      </a:r>
+                    </a:p>
+                  </a:txBody>
+                  <a:tcPr>
+                    <a:lnL w="12700" cap="flat" cmpd="sng" algn="ctr">
+                      <a:solidFill>
+                        <a:schemeClr val="tx1"/>
+                      </a:solidFill>
+                      <a:prstDash val="solid"/>
+                      <a:round/>
+                      <a:headEnd type="none" w="med" len="med"/>
+                      <a:tailEnd type="none" w="med" len="med"/>
+                    </a:lnL>
+                    <a:lnR w="12700" cap="flat" cmpd="sng" algn="ctr">
+                      <a:solidFill>
+                        <a:schemeClr val="tx1"/>
+                      </a:solidFill>
+                      <a:prstDash val="solid"/>
+                      <a:round/>
+                      <a:headEnd type="none" w="med" len="med"/>
+                      <a:tailEnd type="none" w="med" len="med"/>
+                    </a:lnR>
+                    <a:lnT w="12700" cap="flat" cmpd="sng" algn="ctr">
+                      <a:solidFill>
+                        <a:schemeClr val="tx1"/>
+                      </a:solidFill>
+                      <a:prstDash val="solid"/>
+                      <a:round/>
+                      <a:headEnd type="none" w="med" len="med"/>
+                      <a:tailEnd type="none" w="med" len="med"/>
+                    </a:lnT>
+                    <a:lnB w="12700" cap="flat" cmpd="sng" algn="ctr">
+                      <a:solidFill>
+                        <a:schemeClr val="tx1"/>
+                      </a:solidFill>
+                      <a:prstDash val="solid"/>
+                      <a:round/>
+                      <a:headEnd type="none" w="med" len="med"/>
+                      <a:tailEnd type="none" w="med" len="med"/>
+                    </a:lnB>
+                  </a:tcPr>
+                </a:tc>
+                <a:tc>
+                  <a:txBody>
+                    <a:bodyPr/>
+                    <a:lstStyle/>
+                    <a:p>
+                      <a:pPr algn="ctr"/>
+                      <a:r>
+                        <a:rPr lang="pt-BR" dirty="0"/>
+                        <a:t>2</a:t>
+                      </a:r>
+                    </a:p>
+                  </a:txBody>
+                  <a:tcPr>
+                    <a:lnL w="12700" cap="flat" cmpd="sng" algn="ctr">
+                      <a:solidFill>
+                        <a:schemeClr val="tx1"/>
+                      </a:solidFill>
+                      <a:prstDash val="solid"/>
+                      <a:round/>
+                      <a:headEnd type="none" w="med" len="med"/>
+                      <a:tailEnd type="none" w="med" len="med"/>
+                    </a:lnL>
+                    <a:lnR w="12700" cap="flat" cmpd="sng" algn="ctr">
+                      <a:solidFill>
+                        <a:schemeClr val="tx1"/>
+                      </a:solidFill>
+                      <a:prstDash val="solid"/>
+                      <a:round/>
+                      <a:headEnd type="none" w="med" len="med"/>
+                      <a:tailEnd type="none" w="med" len="med"/>
+                    </a:lnR>
+                    <a:lnT w="12700" cap="flat" cmpd="sng" algn="ctr">
+                      <a:solidFill>
+                        <a:schemeClr val="tx1"/>
+                      </a:solidFill>
+                      <a:prstDash val="solid"/>
+                      <a:round/>
+                      <a:headEnd type="none" w="med" len="med"/>
+                      <a:tailEnd type="none" w="med" len="med"/>
+                    </a:lnT>
+                    <a:lnB w="12700" cap="flat" cmpd="sng" algn="ctr">
+                      <a:solidFill>
+                        <a:schemeClr val="tx1"/>
+                      </a:solidFill>
+                      <a:prstDash val="solid"/>
+                      <a:round/>
+                      <a:headEnd type="none" w="med" len="med"/>
+                      <a:tailEnd type="none" w="med" len="med"/>
+                    </a:lnB>
+                  </a:tcPr>
+                </a:tc>
+                <a:tc>
+                  <a:txBody>
+                    <a:bodyPr/>
+                    <a:lstStyle/>
+                    <a:p>
+                      <a:r>
+                        <a:rPr lang="pt-BR" dirty="0"/>
+                        <a:t>XXX.XXX.XXX-X3</a:t>
+                      </a:r>
+                    </a:p>
+                  </a:txBody>
+                  <a:tcPr>
+                    <a:lnL w="12700" cap="flat" cmpd="sng" algn="ctr">
+                      <a:solidFill>
+                        <a:schemeClr val="tx1"/>
+                      </a:solidFill>
+                      <a:prstDash val="solid"/>
+                      <a:round/>
+                      <a:headEnd type="none" w="med" len="med"/>
+                      <a:tailEnd type="none" w="med" len="med"/>
+                    </a:lnL>
+                    <a:lnR w="12700" cap="flat" cmpd="sng" algn="ctr">
+                      <a:solidFill>
+                        <a:schemeClr val="tx1"/>
+                      </a:solidFill>
+                      <a:prstDash val="solid"/>
+                      <a:round/>
+                      <a:headEnd type="none" w="med" len="med"/>
+                      <a:tailEnd type="none" w="med" len="med"/>
+                    </a:lnR>
+                    <a:lnT w="12700" cap="flat" cmpd="sng" algn="ctr">
+                      <a:solidFill>
+                        <a:schemeClr val="tx1"/>
+                      </a:solidFill>
+                      <a:prstDash val="solid"/>
+                      <a:round/>
+                      <a:headEnd type="none" w="med" len="med"/>
+                      <a:tailEnd type="none" w="med" len="med"/>
+                    </a:lnT>
+                    <a:lnB w="12700" cap="flat" cmpd="sng" algn="ctr">
+                      <a:solidFill>
+                        <a:schemeClr val="tx1"/>
+                      </a:solidFill>
+                      <a:prstDash val="solid"/>
+                      <a:round/>
+                      <a:headEnd type="none" w="med" len="med"/>
+                      <a:tailEnd type="none" w="med" len="med"/>
+                    </a:lnB>
+                  </a:tcPr>
+                </a:tc>
+                <a:extLst>
+                  <a:ext uri="{0D108BD9-81ED-4DB2-BD59-A6C34878D82A}">
+                    <a16:rowId xmlns:a16="http://schemas.microsoft.com/office/drawing/2014/main" val="4060221883"/>
+                  </a:ext>
+                </a:extLst>
+              </a:tr>
+              <a:tr h="370840">
+                <a:tc>
+                  <a:txBody>
+                    <a:bodyPr/>
+                    <a:lstStyle/>
+                    <a:p>
+                      <a:pPr algn="ctr"/>
+                      <a:r>
+                        <a:rPr lang="pt-BR" dirty="0"/>
+                        <a:t>4</a:t>
+                      </a:r>
+                    </a:p>
+                  </a:txBody>
+                  <a:tcPr>
+                    <a:lnL w="12700" cap="flat" cmpd="sng" algn="ctr">
+                      <a:solidFill>
+                        <a:schemeClr val="tx1"/>
+                      </a:solidFill>
+                      <a:prstDash val="solid"/>
+                      <a:round/>
+                      <a:headEnd type="none" w="med" len="med"/>
+                      <a:tailEnd type="none" w="med" len="med"/>
+                    </a:lnL>
+                    <a:lnR w="12700" cap="flat" cmpd="sng" algn="ctr">
+                      <a:solidFill>
+                        <a:schemeClr val="tx1"/>
+                      </a:solidFill>
+                      <a:prstDash val="solid"/>
+                      <a:round/>
+                      <a:headEnd type="none" w="med" len="med"/>
+                      <a:tailEnd type="none" w="med" len="med"/>
+                    </a:lnR>
+                    <a:lnT w="12700" cap="flat" cmpd="sng" algn="ctr">
+                      <a:solidFill>
+                        <a:schemeClr val="tx1"/>
+                      </a:solidFill>
+                      <a:prstDash val="solid"/>
+                      <a:round/>
+                      <a:headEnd type="none" w="med" len="med"/>
+                      <a:tailEnd type="none" w="med" len="med"/>
+                    </a:lnT>
+                    <a:lnB w="12700" cap="flat" cmpd="sng" algn="ctr">
+                      <a:solidFill>
+                        <a:schemeClr val="tx1"/>
+                      </a:solidFill>
+                      <a:prstDash val="solid"/>
+                      <a:round/>
+                      <a:headEnd type="none" w="med" len="med"/>
+                      <a:tailEnd type="none" w="med" len="med"/>
+                    </a:lnB>
+                  </a:tcPr>
+                </a:tc>
+                <a:tc>
+                  <a:txBody>
+                    <a:bodyPr/>
+                    <a:lstStyle/>
+                    <a:p>
+                      <a:r>
+                        <a:rPr lang="pt-BR" dirty="0"/>
+                        <a:t>GOIABA</a:t>
+                      </a:r>
+                    </a:p>
+                  </a:txBody>
+                  <a:tcPr>
+                    <a:lnL w="12700" cap="flat" cmpd="sng" algn="ctr">
+                      <a:solidFill>
+                        <a:schemeClr val="tx1"/>
+                      </a:solidFill>
+                      <a:prstDash val="solid"/>
+                      <a:round/>
+                      <a:headEnd type="none" w="med" len="med"/>
+                      <a:tailEnd type="none" w="med" len="med"/>
+                    </a:lnL>
+                    <a:lnR w="12700" cap="flat" cmpd="sng" algn="ctr">
+                      <a:solidFill>
+                        <a:schemeClr val="tx1"/>
+                      </a:solidFill>
+                      <a:prstDash val="solid"/>
+                      <a:round/>
+                      <a:headEnd type="none" w="med" len="med"/>
+                      <a:tailEnd type="none" w="med" len="med"/>
+                    </a:lnR>
+                    <a:lnT w="12700" cap="flat" cmpd="sng" algn="ctr">
+                      <a:solidFill>
+                        <a:schemeClr val="tx1"/>
+                      </a:solidFill>
+                      <a:prstDash val="solid"/>
+                      <a:round/>
+                      <a:headEnd type="none" w="med" len="med"/>
+                      <a:tailEnd type="none" w="med" len="med"/>
+                    </a:lnT>
+                    <a:lnB w="12700" cap="flat" cmpd="sng" algn="ctr">
+                      <a:solidFill>
+                        <a:schemeClr val="tx1"/>
+                      </a:solidFill>
+                      <a:prstDash val="solid"/>
+                      <a:round/>
+                      <a:headEnd type="none" w="med" len="med"/>
+                      <a:tailEnd type="none" w="med" len="med"/>
+                    </a:lnB>
+                  </a:tcPr>
+                </a:tc>
+                <a:tc>
+                  <a:txBody>
+                    <a:bodyPr/>
+                    <a:lstStyle/>
+                    <a:p>
+                      <a:pPr algn="ctr"/>
+                      <a:r>
+                        <a:rPr lang="pt-BR" dirty="0"/>
+                        <a:t>1</a:t>
+                      </a:r>
+                    </a:p>
+                  </a:txBody>
+                  <a:tcPr>
+                    <a:lnL w="12700" cap="flat" cmpd="sng" algn="ctr">
+                      <a:solidFill>
+                        <a:schemeClr val="tx1"/>
+                      </a:solidFill>
+                      <a:prstDash val="solid"/>
+                      <a:round/>
+                      <a:headEnd type="none" w="med" len="med"/>
+                      <a:tailEnd type="none" w="med" len="med"/>
+                    </a:lnL>
+                    <a:lnR w="12700" cap="flat" cmpd="sng" algn="ctr">
+                      <a:solidFill>
+                        <a:schemeClr val="tx1"/>
+                      </a:solidFill>
+                      <a:prstDash val="solid"/>
+                      <a:round/>
+                      <a:headEnd type="none" w="med" len="med"/>
+                      <a:tailEnd type="none" w="med" len="med"/>
+                    </a:lnR>
+                    <a:lnT w="12700" cap="flat" cmpd="sng" algn="ctr">
+                      <a:solidFill>
+                        <a:schemeClr val="tx1"/>
+                      </a:solidFill>
+                      <a:prstDash val="solid"/>
+                      <a:round/>
+                      <a:headEnd type="none" w="med" len="med"/>
+                      <a:tailEnd type="none" w="med" len="med"/>
+                    </a:lnT>
+                    <a:lnB w="12700" cap="flat" cmpd="sng" algn="ctr">
+                      <a:solidFill>
+                        <a:schemeClr val="tx1"/>
+                      </a:solidFill>
+                      <a:prstDash val="solid"/>
+                      <a:round/>
+                      <a:headEnd type="none" w="med" len="med"/>
+                      <a:tailEnd type="none" w="med" len="med"/>
+                    </a:lnB>
+                  </a:tcPr>
+                </a:tc>
+                <a:tc>
+                  <a:txBody>
+                    <a:bodyPr/>
+                    <a:lstStyle/>
+                    <a:p>
+                      <a:r>
+                        <a:rPr lang="pt-BR" dirty="0"/>
+                        <a:t>XXX.XXX.XXX-X4</a:t>
+                      </a:r>
+                    </a:p>
+                  </a:txBody>
+                  <a:tcPr>
+                    <a:lnL w="12700" cap="flat" cmpd="sng" algn="ctr">
+                      <a:solidFill>
+                        <a:schemeClr val="tx1"/>
+                      </a:solidFill>
+                      <a:prstDash val="solid"/>
+                      <a:round/>
+                      <a:headEnd type="none" w="med" len="med"/>
+                      <a:tailEnd type="none" w="med" len="med"/>
+                    </a:lnL>
+                    <a:lnR w="12700" cap="flat" cmpd="sng" algn="ctr">
+                      <a:solidFill>
+                        <a:schemeClr val="tx1"/>
+                      </a:solidFill>
+                      <a:prstDash val="solid"/>
+                      <a:round/>
+                      <a:headEnd type="none" w="med" len="med"/>
+                      <a:tailEnd type="none" w="med" len="med"/>
+                    </a:lnR>
+                    <a:lnT w="12700" cap="flat" cmpd="sng" algn="ctr">
+                      <a:solidFill>
+                        <a:schemeClr val="tx1"/>
+                      </a:solidFill>
+                      <a:prstDash val="solid"/>
+                      <a:round/>
+                      <a:headEnd type="none" w="med" len="med"/>
+                      <a:tailEnd type="none" w="med" len="med"/>
+                    </a:lnT>
+                    <a:lnB w="12700" cap="flat" cmpd="sng" algn="ctr">
+                      <a:solidFill>
+                        <a:schemeClr val="tx1"/>
+                      </a:solidFill>
+                      <a:prstDash val="solid"/>
+                      <a:round/>
+                      <a:headEnd type="none" w="med" len="med"/>
+                      <a:tailEnd type="none" w="med" len="med"/>
+                    </a:lnB>
+                  </a:tcPr>
+                </a:tc>
+                <a:extLst>
+                  <a:ext uri="{0D108BD9-81ED-4DB2-BD59-A6C34878D82A}">
+                    <a16:rowId xmlns:a16="http://schemas.microsoft.com/office/drawing/2014/main" val="545109077"/>
+                  </a:ext>
+                </a:extLst>
+              </a:tr>
+            </a:tbl>
+          </a:graphicData>
+        </a:graphic>
+      </p:graphicFrame>
+      <p:graphicFrame>
+        <p:nvGraphicFramePr>
+          <p:cNvPr id="5" name="Tabela 4">
+            <a:extLst>
+              <a:ext uri="{FF2B5EF4-FFF2-40B4-BE49-F238E27FC236}">
+                <a16:creationId xmlns:a16="http://schemas.microsoft.com/office/drawing/2014/main" id="{9A10063E-4E31-C12B-6EEB-7207321D3B99}"/>
+              </a:ext>
+            </a:extLst>
+          </p:cNvPr>
+          <p:cNvGraphicFramePr>
+            <a:graphicFrameLocks noGrp="1"/>
+          </p:cNvGraphicFramePr>
+          <p:nvPr>
+            <p:extLst>
+              <p:ext uri="{D42A27DB-BD31-4B8C-83A1-F6EECF244321}">
+                <p14:modId xmlns:p14="http://schemas.microsoft.com/office/powerpoint/2010/main" val="2551237544"/>
+              </p:ext>
+            </p:extLst>
+          </p:nvPr>
+        </p:nvGraphicFramePr>
+        <p:xfrm>
+          <a:off x="7322370" y="3429000"/>
+          <a:ext cx="3851237" cy="1483360"/>
+        </p:xfrm>
+        <a:graphic>
+          <a:graphicData uri="http://schemas.openxmlformats.org/drawingml/2006/table">
+            <a:tbl>
+              <a:tblPr firstRow="1" bandRow="1">
+                <a:tableStyleId>{2D5ABB26-0587-4C30-8999-92F81FD0307C}</a:tableStyleId>
+              </a:tblPr>
+              <a:tblGrid>
+                <a:gridCol w="1341121">
+                  <a:extLst>
+                    <a:ext uri="{9D8B030D-6E8A-4147-A177-3AD203B41FA5}">
+                      <a16:colId xmlns:a16="http://schemas.microsoft.com/office/drawing/2014/main" val="3676258254"/>
+                    </a:ext>
+                  </a:extLst>
+                </a:gridCol>
+                <a:gridCol w="2510116">
+                  <a:extLst>
+                    <a:ext uri="{9D8B030D-6E8A-4147-A177-3AD203B41FA5}">
+                      <a16:colId xmlns:a16="http://schemas.microsoft.com/office/drawing/2014/main" val="3238272406"/>
+                    </a:ext>
+                  </a:extLst>
+                </a:gridCol>
+              </a:tblGrid>
+              <a:tr h="370840">
+                <a:tc>
+                  <a:txBody>
+                    <a:bodyPr/>
+                    <a:lstStyle/>
+                    <a:p>
+                      <a:pPr algn="ctr"/>
+                      <a:r>
+                        <a:rPr lang="pt-BR" dirty="0"/>
+                        <a:t>COD_DEPTO</a:t>
+                      </a:r>
+                    </a:p>
+                  </a:txBody>
+                  <a:tcPr>
+                    <a:lnL w="12700" cap="flat" cmpd="sng" algn="ctr">
+                      <a:solidFill>
+                        <a:schemeClr val="tx1"/>
+                      </a:solidFill>
+                      <a:prstDash val="solid"/>
+                      <a:round/>
+                      <a:headEnd type="none" w="med" len="med"/>
+                      <a:tailEnd type="none" w="med" len="med"/>
+                    </a:lnL>
+                    <a:lnR w="12700" cap="flat" cmpd="sng" algn="ctr">
+                      <a:solidFill>
+                        <a:schemeClr val="tx1"/>
+                      </a:solidFill>
+                      <a:prstDash val="solid"/>
+                      <a:round/>
+                      <a:headEnd type="none" w="med" len="med"/>
+                      <a:tailEnd type="none" w="med" len="med"/>
+                    </a:lnR>
+                    <a:lnT w="12700" cap="flat" cmpd="sng" algn="ctr">
+                      <a:solidFill>
+                        <a:schemeClr val="tx1"/>
+                      </a:solidFill>
+                      <a:prstDash val="solid"/>
+                      <a:round/>
+                      <a:headEnd type="none" w="med" len="med"/>
+                      <a:tailEnd type="none" w="med" len="med"/>
+                    </a:lnT>
+                    <a:lnB w="12700" cap="flat" cmpd="sng" algn="ctr">
+                      <a:solidFill>
+                        <a:schemeClr val="tx1"/>
+                      </a:solidFill>
+                      <a:prstDash val="solid"/>
+                      <a:round/>
+                      <a:headEnd type="none" w="med" len="med"/>
+                      <a:tailEnd type="none" w="med" len="med"/>
+                    </a:lnB>
+                  </a:tcPr>
+                </a:tc>
+                <a:tc>
+                  <a:txBody>
+                    <a:bodyPr/>
+                    <a:lstStyle/>
+                    <a:p>
+                      <a:r>
+                        <a:rPr lang="pt-BR" dirty="0"/>
+                        <a:t>NOME_DEPARTAMENTO</a:t>
+                      </a:r>
+                    </a:p>
+                  </a:txBody>
+                  <a:tcPr>
+                    <a:lnL w="12700" cap="flat" cmpd="sng" algn="ctr">
+                      <a:solidFill>
+                        <a:schemeClr val="tx1"/>
+                      </a:solidFill>
+                      <a:prstDash val="solid"/>
+                      <a:round/>
+                      <a:headEnd type="none" w="med" len="med"/>
+                      <a:tailEnd type="none" w="med" len="med"/>
+                    </a:lnL>
+                    <a:lnR w="12700" cap="flat" cmpd="sng" algn="ctr">
+                      <a:solidFill>
+                        <a:schemeClr val="tx1"/>
+                      </a:solidFill>
+                      <a:prstDash val="solid"/>
+                      <a:round/>
+                      <a:headEnd type="none" w="med" len="med"/>
+                      <a:tailEnd type="none" w="med" len="med"/>
+                    </a:lnR>
+                    <a:lnT w="12700" cap="flat" cmpd="sng" algn="ctr">
+                      <a:solidFill>
+                        <a:schemeClr val="tx1"/>
+                      </a:solidFill>
+                      <a:prstDash val="solid"/>
+                      <a:round/>
+                      <a:headEnd type="none" w="med" len="med"/>
+                      <a:tailEnd type="none" w="med" len="med"/>
+                    </a:lnT>
+                    <a:lnB w="12700" cap="flat" cmpd="sng" algn="ctr">
+                      <a:solidFill>
+                        <a:schemeClr val="tx1"/>
+                      </a:solidFill>
+                      <a:prstDash val="solid"/>
+                      <a:round/>
+                      <a:headEnd type="none" w="med" len="med"/>
+                      <a:tailEnd type="none" w="med" len="med"/>
+                    </a:lnB>
+                  </a:tcPr>
+                </a:tc>
+                <a:extLst>
+                  <a:ext uri="{0D108BD9-81ED-4DB2-BD59-A6C34878D82A}">
+                    <a16:rowId xmlns:a16="http://schemas.microsoft.com/office/drawing/2014/main" val="3972983408"/>
+                  </a:ext>
+                </a:extLst>
+              </a:tr>
+              <a:tr h="370840">
+                <a:tc>
+                  <a:txBody>
+                    <a:bodyPr/>
+                    <a:lstStyle/>
+                    <a:p>
+                      <a:pPr algn="ctr"/>
+                      <a:r>
+                        <a:rPr lang="pt-BR" dirty="0"/>
+                        <a:t>1</a:t>
+                      </a:r>
+                    </a:p>
+                  </a:txBody>
+                  <a:tcPr>
+                    <a:lnL w="12700" cap="flat" cmpd="sng" algn="ctr">
+                      <a:solidFill>
+                        <a:schemeClr val="tx1"/>
+                      </a:solidFill>
+                      <a:prstDash val="solid"/>
+                      <a:round/>
+                      <a:headEnd type="none" w="med" len="med"/>
+                      <a:tailEnd type="none" w="med" len="med"/>
+                    </a:lnL>
+                    <a:lnR w="12700" cap="flat" cmpd="sng" algn="ctr">
+                      <a:solidFill>
+                        <a:schemeClr val="tx1"/>
+                      </a:solidFill>
+                      <a:prstDash val="solid"/>
+                      <a:round/>
+                      <a:headEnd type="none" w="med" len="med"/>
+                      <a:tailEnd type="none" w="med" len="med"/>
+                    </a:lnR>
+                    <a:lnT w="12700" cap="flat" cmpd="sng" algn="ctr">
+                      <a:solidFill>
+                        <a:schemeClr val="tx1"/>
+                      </a:solidFill>
+                      <a:prstDash val="solid"/>
+                      <a:round/>
+                      <a:headEnd type="none" w="med" len="med"/>
+                      <a:tailEnd type="none" w="med" len="med"/>
+                    </a:lnT>
+                    <a:lnB w="12700" cap="flat" cmpd="sng" algn="ctr">
+                      <a:solidFill>
+                        <a:schemeClr val="tx1"/>
+                      </a:solidFill>
+                      <a:prstDash val="solid"/>
+                      <a:round/>
+                      <a:headEnd type="none" w="med" len="med"/>
+                      <a:tailEnd type="none" w="med" len="med"/>
+                    </a:lnB>
+                  </a:tcPr>
+                </a:tc>
+                <a:tc>
+                  <a:txBody>
+                    <a:bodyPr/>
+                    <a:lstStyle/>
+                    <a:p>
+                      <a:r>
+                        <a:rPr lang="pt-BR" dirty="0"/>
+                        <a:t>BIG DATA</a:t>
+                      </a:r>
+                    </a:p>
+                  </a:txBody>
+                  <a:tcPr>
+                    <a:lnL w="12700" cap="flat" cmpd="sng" algn="ctr">
+                      <a:solidFill>
+                        <a:schemeClr val="tx1"/>
+                      </a:solidFill>
+                      <a:prstDash val="solid"/>
+                      <a:round/>
+                      <a:headEnd type="none" w="med" len="med"/>
+                      <a:tailEnd type="none" w="med" len="med"/>
+                    </a:lnL>
+                    <a:lnR w="12700" cap="flat" cmpd="sng" algn="ctr">
+                      <a:solidFill>
+                        <a:schemeClr val="tx1"/>
+                      </a:solidFill>
+                      <a:prstDash val="solid"/>
+                      <a:round/>
+                      <a:headEnd type="none" w="med" len="med"/>
+                      <a:tailEnd type="none" w="med" len="med"/>
+                    </a:lnR>
+                    <a:lnT w="12700" cap="flat" cmpd="sng" algn="ctr">
+                      <a:solidFill>
+                        <a:schemeClr val="tx1"/>
+                      </a:solidFill>
+                      <a:prstDash val="solid"/>
+                      <a:round/>
+                      <a:headEnd type="none" w="med" len="med"/>
+                      <a:tailEnd type="none" w="med" len="med"/>
+                    </a:lnT>
+                    <a:lnB w="12700" cap="flat" cmpd="sng" algn="ctr">
+                      <a:solidFill>
+                        <a:schemeClr val="tx1"/>
+                      </a:solidFill>
+                      <a:prstDash val="solid"/>
+                      <a:round/>
+                      <a:headEnd type="none" w="med" len="med"/>
+                      <a:tailEnd type="none" w="med" len="med"/>
+                    </a:lnB>
+                  </a:tcPr>
+                </a:tc>
+                <a:extLst>
+                  <a:ext uri="{0D108BD9-81ED-4DB2-BD59-A6C34878D82A}">
+                    <a16:rowId xmlns:a16="http://schemas.microsoft.com/office/drawing/2014/main" val="413956977"/>
+                  </a:ext>
+                </a:extLst>
+              </a:tr>
+              <a:tr h="370840">
+                <a:tc>
+                  <a:txBody>
+                    <a:bodyPr/>
+                    <a:lstStyle/>
+                    <a:p>
+                      <a:pPr algn="ctr"/>
+                      <a:r>
+                        <a:rPr lang="pt-BR" dirty="0"/>
+                        <a:t>2</a:t>
+                      </a:r>
+                    </a:p>
+                  </a:txBody>
+                  <a:tcPr>
+                    <a:lnL w="12700" cap="flat" cmpd="sng" algn="ctr">
+                      <a:solidFill>
+                        <a:schemeClr val="tx1"/>
+                      </a:solidFill>
+                      <a:prstDash val="solid"/>
+                      <a:round/>
+                      <a:headEnd type="none" w="med" len="med"/>
+                      <a:tailEnd type="none" w="med" len="med"/>
+                    </a:lnL>
+                    <a:lnR w="12700" cap="flat" cmpd="sng" algn="ctr">
+                      <a:solidFill>
+                        <a:schemeClr val="tx1"/>
+                      </a:solidFill>
+                      <a:prstDash val="solid"/>
+                      <a:round/>
+                      <a:headEnd type="none" w="med" len="med"/>
+                      <a:tailEnd type="none" w="med" len="med"/>
+                    </a:lnR>
+                    <a:lnT w="12700" cap="flat" cmpd="sng" algn="ctr">
+                      <a:solidFill>
+                        <a:schemeClr val="tx1"/>
+                      </a:solidFill>
+                      <a:prstDash val="solid"/>
+                      <a:round/>
+                      <a:headEnd type="none" w="med" len="med"/>
+                      <a:tailEnd type="none" w="med" len="med"/>
+                    </a:lnT>
+                    <a:lnB w="12700" cap="flat" cmpd="sng" algn="ctr">
+                      <a:solidFill>
+                        <a:schemeClr val="tx1"/>
+                      </a:solidFill>
+                      <a:prstDash val="solid"/>
+                      <a:round/>
+                      <a:headEnd type="none" w="med" len="med"/>
+                      <a:tailEnd type="none" w="med" len="med"/>
+                    </a:lnB>
+                  </a:tcPr>
+                </a:tc>
+                <a:tc>
+                  <a:txBody>
+                    <a:bodyPr/>
+                    <a:lstStyle/>
+                    <a:p>
+                      <a:r>
+                        <a:rPr lang="pt-BR" dirty="0"/>
+                        <a:t>ENGENHARIA</a:t>
+                      </a:r>
+                    </a:p>
+                  </a:txBody>
+                  <a:tcPr>
+                    <a:lnL w="12700" cap="flat" cmpd="sng" algn="ctr">
+                      <a:solidFill>
+                        <a:schemeClr val="tx1"/>
+                      </a:solidFill>
+                      <a:prstDash val="solid"/>
+                      <a:round/>
+                      <a:headEnd type="none" w="med" len="med"/>
+                      <a:tailEnd type="none" w="med" len="med"/>
+                    </a:lnL>
+                    <a:lnR w="12700" cap="flat" cmpd="sng" algn="ctr">
+                      <a:solidFill>
+                        <a:schemeClr val="tx1"/>
+                      </a:solidFill>
+                      <a:prstDash val="solid"/>
+                      <a:round/>
+                      <a:headEnd type="none" w="med" len="med"/>
+                      <a:tailEnd type="none" w="med" len="med"/>
+                    </a:lnR>
+                    <a:lnT w="12700" cap="flat" cmpd="sng" algn="ctr">
+                      <a:solidFill>
+                        <a:schemeClr val="tx1"/>
+                      </a:solidFill>
+                      <a:prstDash val="solid"/>
+                      <a:round/>
+                      <a:headEnd type="none" w="med" len="med"/>
+                      <a:tailEnd type="none" w="med" len="med"/>
+                    </a:lnT>
+                    <a:lnB w="12700" cap="flat" cmpd="sng" algn="ctr">
+                      <a:solidFill>
+                        <a:schemeClr val="tx1"/>
+                      </a:solidFill>
+                      <a:prstDash val="solid"/>
+                      <a:round/>
+                      <a:headEnd type="none" w="med" len="med"/>
+                      <a:tailEnd type="none" w="med" len="med"/>
+                    </a:lnB>
+                  </a:tcPr>
+                </a:tc>
+                <a:extLst>
+                  <a:ext uri="{0D108BD9-81ED-4DB2-BD59-A6C34878D82A}">
+                    <a16:rowId xmlns:a16="http://schemas.microsoft.com/office/drawing/2014/main" val="1908616991"/>
+                  </a:ext>
+                </a:extLst>
+              </a:tr>
+              <a:tr h="370840">
+                <a:tc>
+                  <a:txBody>
+                    <a:bodyPr/>
+                    <a:lstStyle/>
+                    <a:p>
+                      <a:pPr algn="ctr"/>
+                      <a:r>
+                        <a:rPr lang="pt-BR" dirty="0"/>
+                        <a:t>3</a:t>
+                      </a:r>
+                    </a:p>
+                  </a:txBody>
+                  <a:tcPr>
+                    <a:lnL w="12700" cap="flat" cmpd="sng" algn="ctr">
+                      <a:solidFill>
+                        <a:schemeClr val="tx1"/>
+                      </a:solidFill>
+                      <a:prstDash val="solid"/>
+                      <a:round/>
+                      <a:headEnd type="none" w="med" len="med"/>
+                      <a:tailEnd type="none" w="med" len="med"/>
+                    </a:lnL>
+                    <a:lnR w="12700" cap="flat" cmpd="sng" algn="ctr">
+                      <a:solidFill>
+                        <a:schemeClr val="tx1"/>
+                      </a:solidFill>
+                      <a:prstDash val="solid"/>
+                      <a:round/>
+                      <a:headEnd type="none" w="med" len="med"/>
+                      <a:tailEnd type="none" w="med" len="med"/>
+                    </a:lnR>
+                    <a:lnT w="12700" cap="flat" cmpd="sng" algn="ctr">
+                      <a:solidFill>
+                        <a:schemeClr val="tx1"/>
+                      </a:solidFill>
+                      <a:prstDash val="solid"/>
+                      <a:round/>
+                      <a:headEnd type="none" w="med" len="med"/>
+                      <a:tailEnd type="none" w="med" len="med"/>
+                    </a:lnT>
+                    <a:lnB w="12700" cap="flat" cmpd="sng" algn="ctr">
+                      <a:solidFill>
+                        <a:schemeClr val="tx1"/>
+                      </a:solidFill>
+                      <a:prstDash val="solid"/>
+                      <a:round/>
+                      <a:headEnd type="none" w="med" len="med"/>
+                      <a:tailEnd type="none" w="med" len="med"/>
+                    </a:lnB>
+                  </a:tcPr>
+                </a:tc>
+                <a:tc>
+                  <a:txBody>
+                    <a:bodyPr/>
+                    <a:lstStyle/>
+                    <a:p>
+                      <a:r>
+                        <a:rPr lang="pt-BR" dirty="0"/>
+                        <a:t>TI</a:t>
+                      </a:r>
+                    </a:p>
+                  </a:txBody>
+                  <a:tcPr>
+                    <a:lnL w="12700" cap="flat" cmpd="sng" algn="ctr">
+                      <a:solidFill>
+                        <a:schemeClr val="tx1"/>
+                      </a:solidFill>
+                      <a:prstDash val="solid"/>
+                      <a:round/>
+                      <a:headEnd type="none" w="med" len="med"/>
+                      <a:tailEnd type="none" w="med" len="med"/>
+                    </a:lnL>
+                    <a:lnR w="12700" cap="flat" cmpd="sng" algn="ctr">
+                      <a:solidFill>
+                        <a:schemeClr val="tx1"/>
+                      </a:solidFill>
+                      <a:prstDash val="solid"/>
+                      <a:round/>
+                      <a:headEnd type="none" w="med" len="med"/>
+                      <a:tailEnd type="none" w="med" len="med"/>
+                    </a:lnR>
+                    <a:lnT w="12700" cap="flat" cmpd="sng" algn="ctr">
+                      <a:solidFill>
+                        <a:schemeClr val="tx1"/>
+                      </a:solidFill>
+                      <a:prstDash val="solid"/>
+                      <a:round/>
+                      <a:headEnd type="none" w="med" len="med"/>
+                      <a:tailEnd type="none" w="med" len="med"/>
+                    </a:lnT>
+                    <a:lnB w="12700" cap="flat" cmpd="sng" algn="ctr">
+                      <a:solidFill>
+                        <a:schemeClr val="tx1"/>
+                      </a:solidFill>
+                      <a:prstDash val="solid"/>
+                      <a:round/>
+                      <a:headEnd type="none" w="med" len="med"/>
+                      <a:tailEnd type="none" w="med" len="med"/>
+                    </a:lnB>
+                  </a:tcPr>
+                </a:tc>
+                <a:extLst>
+                  <a:ext uri="{0D108BD9-81ED-4DB2-BD59-A6C34878D82A}">
+                    <a16:rowId xmlns:a16="http://schemas.microsoft.com/office/drawing/2014/main" val="1222940136"/>
+                  </a:ext>
+                </a:extLst>
+              </a:tr>
+            </a:tbl>
+          </a:graphicData>
+        </a:graphic>
+      </p:graphicFrame>
+    </p:spTree>
+    <p:extLst>
+      <p:ext uri="{BB962C8B-B14F-4D97-AF65-F5344CB8AC3E}">
+        <p14:creationId xmlns:p14="http://schemas.microsoft.com/office/powerpoint/2010/main" val="2947887270"/>
       </p:ext>
     </p:extLst>
   </p:cSld>
@@ -23156,6 +25064,1868 @@
 </p:sld>
 </file>
 
+<file path=ppt/slides/slide50.xml><?xml version="1.0" encoding="utf-8"?>
+<p:sld xmlns:a="http://schemas.openxmlformats.org/drawingml/2006/main" xmlns:r="http://schemas.openxmlformats.org/officeDocument/2006/relationships" xmlns:p="http://schemas.openxmlformats.org/presentationml/2006/main">
+  <p:cSld>
+    <p:spTree>
+      <p:nvGrpSpPr>
+        <p:cNvPr id="1" name=""/>
+        <p:cNvGrpSpPr/>
+        <p:nvPr/>
+      </p:nvGrpSpPr>
+      <p:grpSpPr>
+        <a:xfrm>
+          <a:off x="0" y="0"/>
+          <a:ext cx="0" cy="0"/>
+          <a:chOff x="0" y="0"/>
+          <a:chExt cx="0" cy="0"/>
+        </a:xfrm>
+      </p:grpSpPr>
+      <p:sp>
+        <p:nvSpPr>
+          <p:cNvPr id="2" name="Título 1">
+            <a:extLst>
+              <a:ext uri="{FF2B5EF4-FFF2-40B4-BE49-F238E27FC236}">
+                <a16:creationId xmlns:a16="http://schemas.microsoft.com/office/drawing/2014/main" id="{CC7C5B47-35D0-CBC5-39AF-B5F44B677392}"/>
+              </a:ext>
+            </a:extLst>
+          </p:cNvPr>
+          <p:cNvSpPr>
+            <a:spLocks noGrp="1"/>
+          </p:cNvSpPr>
+          <p:nvPr>
+            <p:ph type="title"/>
+          </p:nvPr>
+        </p:nvSpPr>
+        <p:spPr/>
+        <p:txBody>
+          <a:bodyPr>
+            <a:normAutofit/>
+          </a:bodyPr>
+          <a:lstStyle/>
+          <a:p>
+            <a:r>
+              <a:rPr lang="pt-BR" sz="4400" b="1" dirty="0"/>
+              <a:t>MODELAGEM DE BANCO DE DADOS RELACIONAL</a:t>
+            </a:r>
+            <a:endParaRPr lang="pt-BR" sz="2700" dirty="0"/>
+          </a:p>
+        </p:txBody>
+      </p:sp>
+      <p:sp>
+        <p:nvSpPr>
+          <p:cNvPr id="3" name="Espaço Reservado para Conteúdo 2">
+            <a:extLst>
+              <a:ext uri="{FF2B5EF4-FFF2-40B4-BE49-F238E27FC236}">
+                <a16:creationId xmlns:a16="http://schemas.microsoft.com/office/drawing/2014/main" id="{59758A1E-514F-AFAC-13D2-56BDC5AADB96}"/>
+              </a:ext>
+            </a:extLst>
+          </p:cNvPr>
+          <p:cNvSpPr>
+            <a:spLocks noGrp="1"/>
+          </p:cNvSpPr>
+          <p:nvPr>
+            <p:ph idx="1"/>
+          </p:nvPr>
+        </p:nvSpPr>
+        <p:spPr>
+          <a:xfrm>
+            <a:off x="1097279" y="1923026"/>
+            <a:ext cx="10058399" cy="4384468"/>
+          </a:xfrm>
+          <a:ln>
+            <a:solidFill>
+              <a:schemeClr val="bg1"/>
+            </a:solidFill>
+          </a:ln>
+        </p:spPr>
+        <p:style>
+          <a:lnRef idx="2">
+            <a:schemeClr val="dk1"/>
+          </a:lnRef>
+          <a:fillRef idx="1">
+            <a:schemeClr val="lt1"/>
+          </a:fillRef>
+          <a:effectRef idx="0">
+            <a:schemeClr val="dk1"/>
+          </a:effectRef>
+          <a:fontRef idx="minor">
+            <a:schemeClr val="dk1"/>
+          </a:fontRef>
+        </p:style>
+        <p:txBody>
+          <a:bodyPr>
+            <a:normAutofit/>
+          </a:bodyPr>
+          <a:lstStyle/>
+          <a:p>
+            <a:pPr marL="0" indent="0">
+              <a:buNone/>
+            </a:pPr>
+            <a:r>
+              <a:rPr lang="pt-BR" sz="2400" dirty="0"/>
+              <a:t>As chaves estrangeiras são chaves primárias pertencestes a outras tabelas.</a:t>
+            </a:r>
+          </a:p>
+          <a:p>
+            <a:pPr marL="0" indent="0">
+              <a:buNone/>
+            </a:pPr>
+            <a:r>
+              <a:rPr lang="pt-BR" sz="2400" dirty="0"/>
+              <a:t>Conforme observamos, as mesmas chaves que estão na tabela TB_DEPARTAMENTO também estão na tabela TB_EMPREGADO.</a:t>
+            </a:r>
+          </a:p>
+          <a:p>
+            <a:pPr marL="0" indent="0">
+              <a:buNone/>
+            </a:pPr>
+            <a:r>
+              <a:rPr lang="pt-BR" sz="2400" dirty="0"/>
+              <a:t>Em alguns casos, mais de uma coluna pode servir como chaves, mas apenas uma será a chave primária; as demais chaves servirão como chaves alternativas. </a:t>
+            </a:r>
+          </a:p>
+        </p:txBody>
+      </p:sp>
+      <p:graphicFrame>
+        <p:nvGraphicFramePr>
+          <p:cNvPr id="4" name="Tabela 3">
+            <a:extLst>
+              <a:ext uri="{FF2B5EF4-FFF2-40B4-BE49-F238E27FC236}">
+                <a16:creationId xmlns:a16="http://schemas.microsoft.com/office/drawing/2014/main" id="{664028F6-E0CC-DC2C-BC41-809C3948573D}"/>
+              </a:ext>
+            </a:extLst>
+          </p:cNvPr>
+          <p:cNvGraphicFramePr>
+            <a:graphicFrameLocks noGrp="1"/>
+          </p:cNvGraphicFramePr>
+          <p:nvPr>
+            <p:extLst>
+              <p:ext uri="{D42A27DB-BD31-4B8C-83A1-F6EECF244321}">
+                <p14:modId xmlns:p14="http://schemas.microsoft.com/office/powerpoint/2010/main" val="1898438178"/>
+              </p:ext>
+            </p:extLst>
+          </p:nvPr>
+        </p:nvGraphicFramePr>
+        <p:xfrm>
+          <a:off x="1097279" y="4421918"/>
+          <a:ext cx="5841404" cy="1854200"/>
+        </p:xfrm>
+        <a:graphic>
+          <a:graphicData uri="http://schemas.openxmlformats.org/drawingml/2006/table">
+            <a:tbl>
+              <a:tblPr firstRow="1" bandRow="1">
+                <a:tableStyleId>{2D5ABB26-0587-4C30-8999-92F81FD0307C}</a:tableStyleId>
+              </a:tblPr>
+              <a:tblGrid>
+                <a:gridCol w="1735568">
+                  <a:extLst>
+                    <a:ext uri="{9D8B030D-6E8A-4147-A177-3AD203B41FA5}">
+                      <a16:colId xmlns:a16="http://schemas.microsoft.com/office/drawing/2014/main" val="639222513"/>
+                    </a:ext>
+                  </a:extLst>
+                </a:gridCol>
+                <a:gridCol w="968188">
+                  <a:extLst>
+                    <a:ext uri="{9D8B030D-6E8A-4147-A177-3AD203B41FA5}">
+                      <a16:colId xmlns:a16="http://schemas.microsoft.com/office/drawing/2014/main" val="885486051"/>
+                    </a:ext>
+                  </a:extLst>
+                </a:gridCol>
+                <a:gridCol w="1380565">
+                  <a:extLst>
+                    <a:ext uri="{9D8B030D-6E8A-4147-A177-3AD203B41FA5}">
+                      <a16:colId xmlns:a16="http://schemas.microsoft.com/office/drawing/2014/main" val="3563096703"/>
+                    </a:ext>
+                  </a:extLst>
+                </a:gridCol>
+                <a:gridCol w="1757083">
+                  <a:extLst>
+                    <a:ext uri="{9D8B030D-6E8A-4147-A177-3AD203B41FA5}">
+                      <a16:colId xmlns:a16="http://schemas.microsoft.com/office/drawing/2014/main" val="500366731"/>
+                    </a:ext>
+                  </a:extLst>
+                </a:gridCol>
+              </a:tblGrid>
+              <a:tr h="370840">
+                <a:tc>
+                  <a:txBody>
+                    <a:bodyPr/>
+                    <a:lstStyle/>
+                    <a:p>
+                      <a:pPr algn="ctr"/>
+                      <a:r>
+                        <a:rPr lang="pt-BR" dirty="0"/>
+                        <a:t>ID_EMPREGADO</a:t>
+                      </a:r>
+                    </a:p>
+                  </a:txBody>
+                  <a:tcPr>
+                    <a:lnL w="12700" cap="flat" cmpd="sng" algn="ctr">
+                      <a:solidFill>
+                        <a:schemeClr val="tx1"/>
+                      </a:solidFill>
+                      <a:prstDash val="solid"/>
+                      <a:round/>
+                      <a:headEnd type="none" w="med" len="med"/>
+                      <a:tailEnd type="none" w="med" len="med"/>
+                    </a:lnL>
+                    <a:lnR w="12700" cap="flat" cmpd="sng" algn="ctr">
+                      <a:solidFill>
+                        <a:schemeClr val="tx1"/>
+                      </a:solidFill>
+                      <a:prstDash val="solid"/>
+                      <a:round/>
+                      <a:headEnd type="none" w="med" len="med"/>
+                      <a:tailEnd type="none" w="med" len="med"/>
+                    </a:lnR>
+                    <a:lnT w="12700" cap="flat" cmpd="sng" algn="ctr">
+                      <a:solidFill>
+                        <a:schemeClr val="tx1"/>
+                      </a:solidFill>
+                      <a:prstDash val="solid"/>
+                      <a:round/>
+                      <a:headEnd type="none" w="med" len="med"/>
+                      <a:tailEnd type="none" w="med" len="med"/>
+                    </a:lnT>
+                    <a:lnB w="12700" cap="flat" cmpd="sng" algn="ctr">
+                      <a:solidFill>
+                        <a:schemeClr val="tx1"/>
+                      </a:solidFill>
+                      <a:prstDash val="solid"/>
+                      <a:round/>
+                      <a:headEnd type="none" w="med" len="med"/>
+                      <a:tailEnd type="none" w="med" len="med"/>
+                    </a:lnB>
+                  </a:tcPr>
+                </a:tc>
+                <a:tc>
+                  <a:txBody>
+                    <a:bodyPr/>
+                    <a:lstStyle/>
+                    <a:p>
+                      <a:r>
+                        <a:rPr lang="pt-BR" dirty="0"/>
+                        <a:t>NOME</a:t>
+                      </a:r>
+                    </a:p>
+                  </a:txBody>
+                  <a:tcPr>
+                    <a:lnL w="12700" cap="flat" cmpd="sng" algn="ctr">
+                      <a:solidFill>
+                        <a:schemeClr val="tx1"/>
+                      </a:solidFill>
+                      <a:prstDash val="solid"/>
+                      <a:round/>
+                      <a:headEnd type="none" w="med" len="med"/>
+                      <a:tailEnd type="none" w="med" len="med"/>
+                    </a:lnL>
+                    <a:lnR w="12700" cap="flat" cmpd="sng" algn="ctr">
+                      <a:solidFill>
+                        <a:schemeClr val="tx1"/>
+                      </a:solidFill>
+                      <a:prstDash val="solid"/>
+                      <a:round/>
+                      <a:headEnd type="none" w="med" len="med"/>
+                      <a:tailEnd type="none" w="med" len="med"/>
+                    </a:lnR>
+                    <a:lnT w="12700" cap="flat" cmpd="sng" algn="ctr">
+                      <a:solidFill>
+                        <a:schemeClr val="tx1"/>
+                      </a:solidFill>
+                      <a:prstDash val="solid"/>
+                      <a:round/>
+                      <a:headEnd type="none" w="med" len="med"/>
+                      <a:tailEnd type="none" w="med" len="med"/>
+                    </a:lnT>
+                    <a:lnB w="12700" cap="flat" cmpd="sng" algn="ctr">
+                      <a:solidFill>
+                        <a:schemeClr val="tx1"/>
+                      </a:solidFill>
+                      <a:prstDash val="solid"/>
+                      <a:round/>
+                      <a:headEnd type="none" w="med" len="med"/>
+                      <a:tailEnd type="none" w="med" len="med"/>
+                    </a:lnB>
+                  </a:tcPr>
+                </a:tc>
+                <a:tc>
+                  <a:txBody>
+                    <a:bodyPr/>
+                    <a:lstStyle/>
+                    <a:p>
+                      <a:pPr algn="ctr"/>
+                      <a:r>
+                        <a:rPr lang="pt-BR" dirty="0"/>
+                        <a:t>COD_DEPTO</a:t>
+                      </a:r>
+                    </a:p>
+                  </a:txBody>
+                  <a:tcPr>
+                    <a:lnL w="12700" cap="flat" cmpd="sng" algn="ctr">
+                      <a:solidFill>
+                        <a:schemeClr val="tx1"/>
+                      </a:solidFill>
+                      <a:prstDash val="solid"/>
+                      <a:round/>
+                      <a:headEnd type="none" w="med" len="med"/>
+                      <a:tailEnd type="none" w="med" len="med"/>
+                    </a:lnL>
+                    <a:lnR w="12700" cap="flat" cmpd="sng" algn="ctr">
+                      <a:solidFill>
+                        <a:schemeClr val="tx1"/>
+                      </a:solidFill>
+                      <a:prstDash val="solid"/>
+                      <a:round/>
+                      <a:headEnd type="none" w="med" len="med"/>
+                      <a:tailEnd type="none" w="med" len="med"/>
+                    </a:lnR>
+                    <a:lnT w="12700" cap="flat" cmpd="sng" algn="ctr">
+                      <a:solidFill>
+                        <a:schemeClr val="tx1"/>
+                      </a:solidFill>
+                      <a:prstDash val="solid"/>
+                      <a:round/>
+                      <a:headEnd type="none" w="med" len="med"/>
+                      <a:tailEnd type="none" w="med" len="med"/>
+                    </a:lnT>
+                    <a:lnB w="12700" cap="flat" cmpd="sng" algn="ctr">
+                      <a:solidFill>
+                        <a:schemeClr val="tx1"/>
+                      </a:solidFill>
+                      <a:prstDash val="solid"/>
+                      <a:round/>
+                      <a:headEnd type="none" w="med" len="med"/>
+                      <a:tailEnd type="none" w="med" len="med"/>
+                    </a:lnB>
+                  </a:tcPr>
+                </a:tc>
+                <a:tc>
+                  <a:txBody>
+                    <a:bodyPr/>
+                    <a:lstStyle/>
+                    <a:p>
+                      <a:r>
+                        <a:rPr lang="pt-BR" dirty="0"/>
+                        <a:t>CPF</a:t>
+                      </a:r>
+                    </a:p>
+                  </a:txBody>
+                  <a:tcPr>
+                    <a:lnL w="12700" cap="flat" cmpd="sng" algn="ctr">
+                      <a:solidFill>
+                        <a:schemeClr val="tx1"/>
+                      </a:solidFill>
+                      <a:prstDash val="solid"/>
+                      <a:round/>
+                      <a:headEnd type="none" w="med" len="med"/>
+                      <a:tailEnd type="none" w="med" len="med"/>
+                    </a:lnL>
+                    <a:lnR w="12700" cap="flat" cmpd="sng" algn="ctr">
+                      <a:solidFill>
+                        <a:schemeClr val="tx1"/>
+                      </a:solidFill>
+                      <a:prstDash val="solid"/>
+                      <a:round/>
+                      <a:headEnd type="none" w="med" len="med"/>
+                      <a:tailEnd type="none" w="med" len="med"/>
+                    </a:lnR>
+                    <a:lnT w="12700" cap="flat" cmpd="sng" algn="ctr">
+                      <a:solidFill>
+                        <a:schemeClr val="tx1"/>
+                      </a:solidFill>
+                      <a:prstDash val="solid"/>
+                      <a:round/>
+                      <a:headEnd type="none" w="med" len="med"/>
+                      <a:tailEnd type="none" w="med" len="med"/>
+                    </a:lnT>
+                    <a:lnB w="12700" cap="flat" cmpd="sng" algn="ctr">
+                      <a:solidFill>
+                        <a:schemeClr val="tx1"/>
+                      </a:solidFill>
+                      <a:prstDash val="solid"/>
+                      <a:round/>
+                      <a:headEnd type="none" w="med" len="med"/>
+                      <a:tailEnd type="none" w="med" len="med"/>
+                    </a:lnB>
+                  </a:tcPr>
+                </a:tc>
+                <a:extLst>
+                  <a:ext uri="{0D108BD9-81ED-4DB2-BD59-A6C34878D82A}">
+                    <a16:rowId xmlns:a16="http://schemas.microsoft.com/office/drawing/2014/main" val="3741624859"/>
+                  </a:ext>
+                </a:extLst>
+              </a:tr>
+              <a:tr h="370840">
+                <a:tc>
+                  <a:txBody>
+                    <a:bodyPr/>
+                    <a:lstStyle/>
+                    <a:p>
+                      <a:pPr algn="ctr"/>
+                      <a:r>
+                        <a:rPr lang="pt-BR" dirty="0"/>
+                        <a:t>1</a:t>
+                      </a:r>
+                    </a:p>
+                  </a:txBody>
+                  <a:tcPr>
+                    <a:lnL w="12700" cap="flat" cmpd="sng" algn="ctr">
+                      <a:solidFill>
+                        <a:schemeClr val="tx1"/>
+                      </a:solidFill>
+                      <a:prstDash val="solid"/>
+                      <a:round/>
+                      <a:headEnd type="none" w="med" len="med"/>
+                      <a:tailEnd type="none" w="med" len="med"/>
+                    </a:lnL>
+                    <a:lnR w="12700" cap="flat" cmpd="sng" algn="ctr">
+                      <a:solidFill>
+                        <a:schemeClr val="tx1"/>
+                      </a:solidFill>
+                      <a:prstDash val="solid"/>
+                      <a:round/>
+                      <a:headEnd type="none" w="med" len="med"/>
+                      <a:tailEnd type="none" w="med" len="med"/>
+                    </a:lnR>
+                    <a:lnT w="12700" cap="flat" cmpd="sng" algn="ctr">
+                      <a:solidFill>
+                        <a:schemeClr val="tx1"/>
+                      </a:solidFill>
+                      <a:prstDash val="solid"/>
+                      <a:round/>
+                      <a:headEnd type="none" w="med" len="med"/>
+                      <a:tailEnd type="none" w="med" len="med"/>
+                    </a:lnT>
+                    <a:lnB w="12700" cap="flat" cmpd="sng" algn="ctr">
+                      <a:solidFill>
+                        <a:schemeClr val="tx1"/>
+                      </a:solidFill>
+                      <a:prstDash val="solid"/>
+                      <a:round/>
+                      <a:headEnd type="none" w="med" len="med"/>
+                      <a:tailEnd type="none" w="med" len="med"/>
+                    </a:lnB>
+                  </a:tcPr>
+                </a:tc>
+                <a:tc>
+                  <a:txBody>
+                    <a:bodyPr/>
+                    <a:lstStyle/>
+                    <a:p>
+                      <a:r>
+                        <a:rPr lang="pt-BR" dirty="0"/>
+                        <a:t>YURI</a:t>
+                      </a:r>
+                    </a:p>
+                  </a:txBody>
+                  <a:tcPr>
+                    <a:lnL w="12700" cap="flat" cmpd="sng" algn="ctr">
+                      <a:solidFill>
+                        <a:schemeClr val="tx1"/>
+                      </a:solidFill>
+                      <a:prstDash val="solid"/>
+                      <a:round/>
+                      <a:headEnd type="none" w="med" len="med"/>
+                      <a:tailEnd type="none" w="med" len="med"/>
+                    </a:lnL>
+                    <a:lnR w="12700" cap="flat" cmpd="sng" algn="ctr">
+                      <a:solidFill>
+                        <a:schemeClr val="tx1"/>
+                      </a:solidFill>
+                      <a:prstDash val="solid"/>
+                      <a:round/>
+                      <a:headEnd type="none" w="med" len="med"/>
+                      <a:tailEnd type="none" w="med" len="med"/>
+                    </a:lnR>
+                    <a:lnT w="12700" cap="flat" cmpd="sng" algn="ctr">
+                      <a:solidFill>
+                        <a:schemeClr val="tx1"/>
+                      </a:solidFill>
+                      <a:prstDash val="solid"/>
+                      <a:round/>
+                      <a:headEnd type="none" w="med" len="med"/>
+                      <a:tailEnd type="none" w="med" len="med"/>
+                    </a:lnT>
+                    <a:lnB w="12700" cap="flat" cmpd="sng" algn="ctr">
+                      <a:solidFill>
+                        <a:schemeClr val="tx1"/>
+                      </a:solidFill>
+                      <a:prstDash val="solid"/>
+                      <a:round/>
+                      <a:headEnd type="none" w="med" len="med"/>
+                      <a:tailEnd type="none" w="med" len="med"/>
+                    </a:lnB>
+                  </a:tcPr>
+                </a:tc>
+                <a:tc>
+                  <a:txBody>
+                    <a:bodyPr/>
+                    <a:lstStyle/>
+                    <a:p>
+                      <a:pPr algn="ctr"/>
+                      <a:r>
+                        <a:rPr lang="pt-BR" dirty="0"/>
+                        <a:t>1</a:t>
+                      </a:r>
+                    </a:p>
+                  </a:txBody>
+                  <a:tcPr>
+                    <a:lnL w="12700" cap="flat" cmpd="sng" algn="ctr">
+                      <a:solidFill>
+                        <a:schemeClr val="tx1"/>
+                      </a:solidFill>
+                      <a:prstDash val="solid"/>
+                      <a:round/>
+                      <a:headEnd type="none" w="med" len="med"/>
+                      <a:tailEnd type="none" w="med" len="med"/>
+                    </a:lnL>
+                    <a:lnR w="12700" cap="flat" cmpd="sng" algn="ctr">
+                      <a:solidFill>
+                        <a:schemeClr val="tx1"/>
+                      </a:solidFill>
+                      <a:prstDash val="solid"/>
+                      <a:round/>
+                      <a:headEnd type="none" w="med" len="med"/>
+                      <a:tailEnd type="none" w="med" len="med"/>
+                    </a:lnR>
+                    <a:lnT w="12700" cap="flat" cmpd="sng" algn="ctr">
+                      <a:solidFill>
+                        <a:schemeClr val="tx1"/>
+                      </a:solidFill>
+                      <a:prstDash val="solid"/>
+                      <a:round/>
+                      <a:headEnd type="none" w="med" len="med"/>
+                      <a:tailEnd type="none" w="med" len="med"/>
+                    </a:lnT>
+                    <a:lnB w="12700" cap="flat" cmpd="sng" algn="ctr">
+                      <a:solidFill>
+                        <a:schemeClr val="tx1"/>
+                      </a:solidFill>
+                      <a:prstDash val="solid"/>
+                      <a:round/>
+                      <a:headEnd type="none" w="med" len="med"/>
+                      <a:tailEnd type="none" w="med" len="med"/>
+                    </a:lnB>
+                  </a:tcPr>
+                </a:tc>
+                <a:tc>
+                  <a:txBody>
+                    <a:bodyPr/>
+                    <a:lstStyle/>
+                    <a:p>
+                      <a:r>
+                        <a:rPr lang="pt-BR" dirty="0"/>
+                        <a:t>XXX.XXX.XXX-X1</a:t>
+                      </a:r>
+                    </a:p>
+                  </a:txBody>
+                  <a:tcPr>
+                    <a:lnL w="12700" cap="flat" cmpd="sng" algn="ctr">
+                      <a:solidFill>
+                        <a:schemeClr val="tx1"/>
+                      </a:solidFill>
+                      <a:prstDash val="solid"/>
+                      <a:round/>
+                      <a:headEnd type="none" w="med" len="med"/>
+                      <a:tailEnd type="none" w="med" len="med"/>
+                    </a:lnL>
+                    <a:lnR w="12700" cap="flat" cmpd="sng" algn="ctr">
+                      <a:solidFill>
+                        <a:schemeClr val="tx1"/>
+                      </a:solidFill>
+                      <a:prstDash val="solid"/>
+                      <a:round/>
+                      <a:headEnd type="none" w="med" len="med"/>
+                      <a:tailEnd type="none" w="med" len="med"/>
+                    </a:lnR>
+                    <a:lnT w="12700" cap="flat" cmpd="sng" algn="ctr">
+                      <a:solidFill>
+                        <a:schemeClr val="tx1"/>
+                      </a:solidFill>
+                      <a:prstDash val="solid"/>
+                      <a:round/>
+                      <a:headEnd type="none" w="med" len="med"/>
+                      <a:tailEnd type="none" w="med" len="med"/>
+                    </a:lnT>
+                    <a:lnB w="12700" cap="flat" cmpd="sng" algn="ctr">
+                      <a:solidFill>
+                        <a:schemeClr val="tx1"/>
+                      </a:solidFill>
+                      <a:prstDash val="solid"/>
+                      <a:round/>
+                      <a:headEnd type="none" w="med" len="med"/>
+                      <a:tailEnd type="none" w="med" len="med"/>
+                    </a:lnB>
+                  </a:tcPr>
+                </a:tc>
+                <a:extLst>
+                  <a:ext uri="{0D108BD9-81ED-4DB2-BD59-A6C34878D82A}">
+                    <a16:rowId xmlns:a16="http://schemas.microsoft.com/office/drawing/2014/main" val="4002527758"/>
+                  </a:ext>
+                </a:extLst>
+              </a:tr>
+              <a:tr h="370840">
+                <a:tc>
+                  <a:txBody>
+                    <a:bodyPr/>
+                    <a:lstStyle/>
+                    <a:p>
+                      <a:pPr algn="ctr"/>
+                      <a:r>
+                        <a:rPr lang="pt-BR" dirty="0"/>
+                        <a:t>2</a:t>
+                      </a:r>
+                    </a:p>
+                  </a:txBody>
+                  <a:tcPr>
+                    <a:lnL w="12700" cap="flat" cmpd="sng" algn="ctr">
+                      <a:solidFill>
+                        <a:schemeClr val="tx1"/>
+                      </a:solidFill>
+                      <a:prstDash val="solid"/>
+                      <a:round/>
+                      <a:headEnd type="none" w="med" len="med"/>
+                      <a:tailEnd type="none" w="med" len="med"/>
+                    </a:lnL>
+                    <a:lnR w="12700" cap="flat" cmpd="sng" algn="ctr">
+                      <a:solidFill>
+                        <a:schemeClr val="tx1"/>
+                      </a:solidFill>
+                      <a:prstDash val="solid"/>
+                      <a:round/>
+                      <a:headEnd type="none" w="med" len="med"/>
+                      <a:tailEnd type="none" w="med" len="med"/>
+                    </a:lnR>
+                    <a:lnT w="12700" cap="flat" cmpd="sng" algn="ctr">
+                      <a:solidFill>
+                        <a:schemeClr val="tx1"/>
+                      </a:solidFill>
+                      <a:prstDash val="solid"/>
+                      <a:round/>
+                      <a:headEnd type="none" w="med" len="med"/>
+                      <a:tailEnd type="none" w="med" len="med"/>
+                    </a:lnT>
+                    <a:lnB w="12700" cap="flat" cmpd="sng" algn="ctr">
+                      <a:solidFill>
+                        <a:schemeClr val="tx1"/>
+                      </a:solidFill>
+                      <a:prstDash val="solid"/>
+                      <a:round/>
+                      <a:headEnd type="none" w="med" len="med"/>
+                      <a:tailEnd type="none" w="med" len="med"/>
+                    </a:lnB>
+                  </a:tcPr>
+                </a:tc>
+                <a:tc>
+                  <a:txBody>
+                    <a:bodyPr/>
+                    <a:lstStyle/>
+                    <a:p>
+                      <a:r>
+                        <a:rPr lang="pt-BR" dirty="0"/>
+                        <a:t>TAUMI</a:t>
+                      </a:r>
+                    </a:p>
+                  </a:txBody>
+                  <a:tcPr>
+                    <a:lnL w="12700" cap="flat" cmpd="sng" algn="ctr">
+                      <a:solidFill>
+                        <a:schemeClr val="tx1"/>
+                      </a:solidFill>
+                      <a:prstDash val="solid"/>
+                      <a:round/>
+                      <a:headEnd type="none" w="med" len="med"/>
+                      <a:tailEnd type="none" w="med" len="med"/>
+                    </a:lnL>
+                    <a:lnR w="12700" cap="flat" cmpd="sng" algn="ctr">
+                      <a:solidFill>
+                        <a:schemeClr val="tx1"/>
+                      </a:solidFill>
+                      <a:prstDash val="solid"/>
+                      <a:round/>
+                      <a:headEnd type="none" w="med" len="med"/>
+                      <a:tailEnd type="none" w="med" len="med"/>
+                    </a:lnR>
+                    <a:lnT w="12700" cap="flat" cmpd="sng" algn="ctr">
+                      <a:solidFill>
+                        <a:schemeClr val="tx1"/>
+                      </a:solidFill>
+                      <a:prstDash val="solid"/>
+                      <a:round/>
+                      <a:headEnd type="none" w="med" len="med"/>
+                      <a:tailEnd type="none" w="med" len="med"/>
+                    </a:lnT>
+                    <a:lnB w="12700" cap="flat" cmpd="sng" algn="ctr">
+                      <a:solidFill>
+                        <a:schemeClr val="tx1"/>
+                      </a:solidFill>
+                      <a:prstDash val="solid"/>
+                      <a:round/>
+                      <a:headEnd type="none" w="med" len="med"/>
+                      <a:tailEnd type="none" w="med" len="med"/>
+                    </a:lnB>
+                  </a:tcPr>
+                </a:tc>
+                <a:tc>
+                  <a:txBody>
+                    <a:bodyPr/>
+                    <a:lstStyle/>
+                    <a:p>
+                      <a:pPr algn="ctr"/>
+                      <a:r>
+                        <a:rPr lang="pt-BR" dirty="0"/>
+                        <a:t>2</a:t>
+                      </a:r>
+                    </a:p>
+                  </a:txBody>
+                  <a:tcPr>
+                    <a:lnL w="12700" cap="flat" cmpd="sng" algn="ctr">
+                      <a:solidFill>
+                        <a:schemeClr val="tx1"/>
+                      </a:solidFill>
+                      <a:prstDash val="solid"/>
+                      <a:round/>
+                      <a:headEnd type="none" w="med" len="med"/>
+                      <a:tailEnd type="none" w="med" len="med"/>
+                    </a:lnL>
+                    <a:lnR w="12700" cap="flat" cmpd="sng" algn="ctr">
+                      <a:solidFill>
+                        <a:schemeClr val="tx1"/>
+                      </a:solidFill>
+                      <a:prstDash val="solid"/>
+                      <a:round/>
+                      <a:headEnd type="none" w="med" len="med"/>
+                      <a:tailEnd type="none" w="med" len="med"/>
+                    </a:lnR>
+                    <a:lnT w="12700" cap="flat" cmpd="sng" algn="ctr">
+                      <a:solidFill>
+                        <a:schemeClr val="tx1"/>
+                      </a:solidFill>
+                      <a:prstDash val="solid"/>
+                      <a:round/>
+                      <a:headEnd type="none" w="med" len="med"/>
+                      <a:tailEnd type="none" w="med" len="med"/>
+                    </a:lnT>
+                    <a:lnB w="12700" cap="flat" cmpd="sng" algn="ctr">
+                      <a:solidFill>
+                        <a:schemeClr val="tx1"/>
+                      </a:solidFill>
+                      <a:prstDash val="solid"/>
+                      <a:round/>
+                      <a:headEnd type="none" w="med" len="med"/>
+                      <a:tailEnd type="none" w="med" len="med"/>
+                    </a:lnB>
+                  </a:tcPr>
+                </a:tc>
+                <a:tc>
+                  <a:txBody>
+                    <a:bodyPr/>
+                    <a:lstStyle/>
+                    <a:p>
+                      <a:r>
+                        <a:rPr lang="pt-BR" dirty="0"/>
+                        <a:t>XXX.XXX.XXX-X2</a:t>
+                      </a:r>
+                    </a:p>
+                  </a:txBody>
+                  <a:tcPr>
+                    <a:lnL w="12700" cap="flat" cmpd="sng" algn="ctr">
+                      <a:solidFill>
+                        <a:schemeClr val="tx1"/>
+                      </a:solidFill>
+                      <a:prstDash val="solid"/>
+                      <a:round/>
+                      <a:headEnd type="none" w="med" len="med"/>
+                      <a:tailEnd type="none" w="med" len="med"/>
+                    </a:lnL>
+                    <a:lnR w="12700" cap="flat" cmpd="sng" algn="ctr">
+                      <a:solidFill>
+                        <a:schemeClr val="tx1"/>
+                      </a:solidFill>
+                      <a:prstDash val="solid"/>
+                      <a:round/>
+                      <a:headEnd type="none" w="med" len="med"/>
+                      <a:tailEnd type="none" w="med" len="med"/>
+                    </a:lnR>
+                    <a:lnT w="12700" cap="flat" cmpd="sng" algn="ctr">
+                      <a:solidFill>
+                        <a:schemeClr val="tx1"/>
+                      </a:solidFill>
+                      <a:prstDash val="solid"/>
+                      <a:round/>
+                      <a:headEnd type="none" w="med" len="med"/>
+                      <a:tailEnd type="none" w="med" len="med"/>
+                    </a:lnT>
+                    <a:lnB w="12700" cap="flat" cmpd="sng" algn="ctr">
+                      <a:solidFill>
+                        <a:schemeClr val="tx1"/>
+                      </a:solidFill>
+                      <a:prstDash val="solid"/>
+                      <a:round/>
+                      <a:headEnd type="none" w="med" len="med"/>
+                      <a:tailEnd type="none" w="med" len="med"/>
+                    </a:lnB>
+                  </a:tcPr>
+                </a:tc>
+                <a:extLst>
+                  <a:ext uri="{0D108BD9-81ED-4DB2-BD59-A6C34878D82A}">
+                    <a16:rowId xmlns:a16="http://schemas.microsoft.com/office/drawing/2014/main" val="2413718252"/>
+                  </a:ext>
+                </a:extLst>
+              </a:tr>
+              <a:tr h="370840">
+                <a:tc>
+                  <a:txBody>
+                    <a:bodyPr/>
+                    <a:lstStyle/>
+                    <a:p>
+                      <a:pPr algn="ctr"/>
+                      <a:r>
+                        <a:rPr lang="pt-BR" dirty="0"/>
+                        <a:t>2</a:t>
+                      </a:r>
+                    </a:p>
+                  </a:txBody>
+                  <a:tcPr>
+                    <a:lnL w="12700" cap="flat" cmpd="sng" algn="ctr">
+                      <a:solidFill>
+                        <a:schemeClr val="tx1"/>
+                      </a:solidFill>
+                      <a:prstDash val="solid"/>
+                      <a:round/>
+                      <a:headEnd type="none" w="med" len="med"/>
+                      <a:tailEnd type="none" w="med" len="med"/>
+                    </a:lnL>
+                    <a:lnR w="12700" cap="flat" cmpd="sng" algn="ctr">
+                      <a:solidFill>
+                        <a:schemeClr val="tx1"/>
+                      </a:solidFill>
+                      <a:prstDash val="solid"/>
+                      <a:round/>
+                      <a:headEnd type="none" w="med" len="med"/>
+                      <a:tailEnd type="none" w="med" len="med"/>
+                    </a:lnR>
+                    <a:lnT w="12700" cap="flat" cmpd="sng" algn="ctr">
+                      <a:solidFill>
+                        <a:schemeClr val="tx1"/>
+                      </a:solidFill>
+                      <a:prstDash val="solid"/>
+                      <a:round/>
+                      <a:headEnd type="none" w="med" len="med"/>
+                      <a:tailEnd type="none" w="med" len="med"/>
+                    </a:lnT>
+                    <a:lnB w="12700" cap="flat" cmpd="sng" algn="ctr">
+                      <a:solidFill>
+                        <a:schemeClr val="tx1"/>
+                      </a:solidFill>
+                      <a:prstDash val="solid"/>
+                      <a:round/>
+                      <a:headEnd type="none" w="med" len="med"/>
+                      <a:tailEnd type="none" w="med" len="med"/>
+                    </a:lnB>
+                  </a:tcPr>
+                </a:tc>
+                <a:tc>
+                  <a:txBody>
+                    <a:bodyPr/>
+                    <a:lstStyle/>
+                    <a:p>
+                      <a:r>
+                        <a:rPr lang="pt-BR" dirty="0"/>
+                        <a:t>DANIEL</a:t>
+                      </a:r>
+                    </a:p>
+                  </a:txBody>
+                  <a:tcPr>
+                    <a:lnL w="12700" cap="flat" cmpd="sng" algn="ctr">
+                      <a:solidFill>
+                        <a:schemeClr val="tx1"/>
+                      </a:solidFill>
+                      <a:prstDash val="solid"/>
+                      <a:round/>
+                      <a:headEnd type="none" w="med" len="med"/>
+                      <a:tailEnd type="none" w="med" len="med"/>
+                    </a:lnL>
+                    <a:lnR w="12700" cap="flat" cmpd="sng" algn="ctr">
+                      <a:solidFill>
+                        <a:schemeClr val="tx1"/>
+                      </a:solidFill>
+                      <a:prstDash val="solid"/>
+                      <a:round/>
+                      <a:headEnd type="none" w="med" len="med"/>
+                      <a:tailEnd type="none" w="med" len="med"/>
+                    </a:lnR>
+                    <a:lnT w="12700" cap="flat" cmpd="sng" algn="ctr">
+                      <a:solidFill>
+                        <a:schemeClr val="tx1"/>
+                      </a:solidFill>
+                      <a:prstDash val="solid"/>
+                      <a:round/>
+                      <a:headEnd type="none" w="med" len="med"/>
+                      <a:tailEnd type="none" w="med" len="med"/>
+                    </a:lnT>
+                    <a:lnB w="12700" cap="flat" cmpd="sng" algn="ctr">
+                      <a:solidFill>
+                        <a:schemeClr val="tx1"/>
+                      </a:solidFill>
+                      <a:prstDash val="solid"/>
+                      <a:round/>
+                      <a:headEnd type="none" w="med" len="med"/>
+                      <a:tailEnd type="none" w="med" len="med"/>
+                    </a:lnB>
+                  </a:tcPr>
+                </a:tc>
+                <a:tc>
+                  <a:txBody>
+                    <a:bodyPr/>
+                    <a:lstStyle/>
+                    <a:p>
+                      <a:pPr algn="ctr"/>
+                      <a:r>
+                        <a:rPr lang="pt-BR" dirty="0"/>
+                        <a:t>2</a:t>
+                      </a:r>
+                    </a:p>
+                  </a:txBody>
+                  <a:tcPr>
+                    <a:lnL w="12700" cap="flat" cmpd="sng" algn="ctr">
+                      <a:solidFill>
+                        <a:schemeClr val="tx1"/>
+                      </a:solidFill>
+                      <a:prstDash val="solid"/>
+                      <a:round/>
+                      <a:headEnd type="none" w="med" len="med"/>
+                      <a:tailEnd type="none" w="med" len="med"/>
+                    </a:lnL>
+                    <a:lnR w="12700" cap="flat" cmpd="sng" algn="ctr">
+                      <a:solidFill>
+                        <a:schemeClr val="tx1"/>
+                      </a:solidFill>
+                      <a:prstDash val="solid"/>
+                      <a:round/>
+                      <a:headEnd type="none" w="med" len="med"/>
+                      <a:tailEnd type="none" w="med" len="med"/>
+                    </a:lnR>
+                    <a:lnT w="12700" cap="flat" cmpd="sng" algn="ctr">
+                      <a:solidFill>
+                        <a:schemeClr val="tx1"/>
+                      </a:solidFill>
+                      <a:prstDash val="solid"/>
+                      <a:round/>
+                      <a:headEnd type="none" w="med" len="med"/>
+                      <a:tailEnd type="none" w="med" len="med"/>
+                    </a:lnT>
+                    <a:lnB w="12700" cap="flat" cmpd="sng" algn="ctr">
+                      <a:solidFill>
+                        <a:schemeClr val="tx1"/>
+                      </a:solidFill>
+                      <a:prstDash val="solid"/>
+                      <a:round/>
+                      <a:headEnd type="none" w="med" len="med"/>
+                      <a:tailEnd type="none" w="med" len="med"/>
+                    </a:lnB>
+                  </a:tcPr>
+                </a:tc>
+                <a:tc>
+                  <a:txBody>
+                    <a:bodyPr/>
+                    <a:lstStyle/>
+                    <a:p>
+                      <a:r>
+                        <a:rPr lang="pt-BR" dirty="0"/>
+                        <a:t>XXX.XXX.XXX-X3</a:t>
+                      </a:r>
+                    </a:p>
+                  </a:txBody>
+                  <a:tcPr>
+                    <a:lnL w="12700" cap="flat" cmpd="sng" algn="ctr">
+                      <a:solidFill>
+                        <a:schemeClr val="tx1"/>
+                      </a:solidFill>
+                      <a:prstDash val="solid"/>
+                      <a:round/>
+                      <a:headEnd type="none" w="med" len="med"/>
+                      <a:tailEnd type="none" w="med" len="med"/>
+                    </a:lnL>
+                    <a:lnR w="12700" cap="flat" cmpd="sng" algn="ctr">
+                      <a:solidFill>
+                        <a:schemeClr val="tx1"/>
+                      </a:solidFill>
+                      <a:prstDash val="solid"/>
+                      <a:round/>
+                      <a:headEnd type="none" w="med" len="med"/>
+                      <a:tailEnd type="none" w="med" len="med"/>
+                    </a:lnR>
+                    <a:lnT w="12700" cap="flat" cmpd="sng" algn="ctr">
+                      <a:solidFill>
+                        <a:schemeClr val="tx1"/>
+                      </a:solidFill>
+                      <a:prstDash val="solid"/>
+                      <a:round/>
+                      <a:headEnd type="none" w="med" len="med"/>
+                      <a:tailEnd type="none" w="med" len="med"/>
+                    </a:lnT>
+                    <a:lnB w="12700" cap="flat" cmpd="sng" algn="ctr">
+                      <a:solidFill>
+                        <a:schemeClr val="tx1"/>
+                      </a:solidFill>
+                      <a:prstDash val="solid"/>
+                      <a:round/>
+                      <a:headEnd type="none" w="med" len="med"/>
+                      <a:tailEnd type="none" w="med" len="med"/>
+                    </a:lnB>
+                  </a:tcPr>
+                </a:tc>
+                <a:extLst>
+                  <a:ext uri="{0D108BD9-81ED-4DB2-BD59-A6C34878D82A}">
+                    <a16:rowId xmlns:a16="http://schemas.microsoft.com/office/drawing/2014/main" val="4060221883"/>
+                  </a:ext>
+                </a:extLst>
+              </a:tr>
+              <a:tr h="370840">
+                <a:tc>
+                  <a:txBody>
+                    <a:bodyPr/>
+                    <a:lstStyle/>
+                    <a:p>
+                      <a:pPr algn="ctr"/>
+                      <a:r>
+                        <a:rPr lang="pt-BR" dirty="0"/>
+                        <a:t>4</a:t>
+                      </a:r>
+                    </a:p>
+                  </a:txBody>
+                  <a:tcPr>
+                    <a:lnL w="12700" cap="flat" cmpd="sng" algn="ctr">
+                      <a:solidFill>
+                        <a:schemeClr val="tx1"/>
+                      </a:solidFill>
+                      <a:prstDash val="solid"/>
+                      <a:round/>
+                      <a:headEnd type="none" w="med" len="med"/>
+                      <a:tailEnd type="none" w="med" len="med"/>
+                    </a:lnL>
+                    <a:lnR w="12700" cap="flat" cmpd="sng" algn="ctr">
+                      <a:solidFill>
+                        <a:schemeClr val="tx1"/>
+                      </a:solidFill>
+                      <a:prstDash val="solid"/>
+                      <a:round/>
+                      <a:headEnd type="none" w="med" len="med"/>
+                      <a:tailEnd type="none" w="med" len="med"/>
+                    </a:lnR>
+                    <a:lnT w="12700" cap="flat" cmpd="sng" algn="ctr">
+                      <a:solidFill>
+                        <a:schemeClr val="tx1"/>
+                      </a:solidFill>
+                      <a:prstDash val="solid"/>
+                      <a:round/>
+                      <a:headEnd type="none" w="med" len="med"/>
+                      <a:tailEnd type="none" w="med" len="med"/>
+                    </a:lnT>
+                    <a:lnB w="12700" cap="flat" cmpd="sng" algn="ctr">
+                      <a:solidFill>
+                        <a:schemeClr val="tx1"/>
+                      </a:solidFill>
+                      <a:prstDash val="solid"/>
+                      <a:round/>
+                      <a:headEnd type="none" w="med" len="med"/>
+                      <a:tailEnd type="none" w="med" len="med"/>
+                    </a:lnB>
+                  </a:tcPr>
+                </a:tc>
+                <a:tc>
+                  <a:txBody>
+                    <a:bodyPr/>
+                    <a:lstStyle/>
+                    <a:p>
+                      <a:r>
+                        <a:rPr lang="pt-BR" dirty="0"/>
+                        <a:t>GOIABA</a:t>
+                      </a:r>
+                    </a:p>
+                  </a:txBody>
+                  <a:tcPr>
+                    <a:lnL w="12700" cap="flat" cmpd="sng" algn="ctr">
+                      <a:solidFill>
+                        <a:schemeClr val="tx1"/>
+                      </a:solidFill>
+                      <a:prstDash val="solid"/>
+                      <a:round/>
+                      <a:headEnd type="none" w="med" len="med"/>
+                      <a:tailEnd type="none" w="med" len="med"/>
+                    </a:lnL>
+                    <a:lnR w="12700" cap="flat" cmpd="sng" algn="ctr">
+                      <a:solidFill>
+                        <a:schemeClr val="tx1"/>
+                      </a:solidFill>
+                      <a:prstDash val="solid"/>
+                      <a:round/>
+                      <a:headEnd type="none" w="med" len="med"/>
+                      <a:tailEnd type="none" w="med" len="med"/>
+                    </a:lnR>
+                    <a:lnT w="12700" cap="flat" cmpd="sng" algn="ctr">
+                      <a:solidFill>
+                        <a:schemeClr val="tx1"/>
+                      </a:solidFill>
+                      <a:prstDash val="solid"/>
+                      <a:round/>
+                      <a:headEnd type="none" w="med" len="med"/>
+                      <a:tailEnd type="none" w="med" len="med"/>
+                    </a:lnT>
+                    <a:lnB w="12700" cap="flat" cmpd="sng" algn="ctr">
+                      <a:solidFill>
+                        <a:schemeClr val="tx1"/>
+                      </a:solidFill>
+                      <a:prstDash val="solid"/>
+                      <a:round/>
+                      <a:headEnd type="none" w="med" len="med"/>
+                      <a:tailEnd type="none" w="med" len="med"/>
+                    </a:lnB>
+                  </a:tcPr>
+                </a:tc>
+                <a:tc>
+                  <a:txBody>
+                    <a:bodyPr/>
+                    <a:lstStyle/>
+                    <a:p>
+                      <a:pPr algn="ctr"/>
+                      <a:r>
+                        <a:rPr lang="pt-BR" dirty="0"/>
+                        <a:t>1</a:t>
+                      </a:r>
+                    </a:p>
+                  </a:txBody>
+                  <a:tcPr>
+                    <a:lnL w="12700" cap="flat" cmpd="sng" algn="ctr">
+                      <a:solidFill>
+                        <a:schemeClr val="tx1"/>
+                      </a:solidFill>
+                      <a:prstDash val="solid"/>
+                      <a:round/>
+                      <a:headEnd type="none" w="med" len="med"/>
+                      <a:tailEnd type="none" w="med" len="med"/>
+                    </a:lnL>
+                    <a:lnR w="12700" cap="flat" cmpd="sng" algn="ctr">
+                      <a:solidFill>
+                        <a:schemeClr val="tx1"/>
+                      </a:solidFill>
+                      <a:prstDash val="solid"/>
+                      <a:round/>
+                      <a:headEnd type="none" w="med" len="med"/>
+                      <a:tailEnd type="none" w="med" len="med"/>
+                    </a:lnR>
+                    <a:lnT w="12700" cap="flat" cmpd="sng" algn="ctr">
+                      <a:solidFill>
+                        <a:schemeClr val="tx1"/>
+                      </a:solidFill>
+                      <a:prstDash val="solid"/>
+                      <a:round/>
+                      <a:headEnd type="none" w="med" len="med"/>
+                      <a:tailEnd type="none" w="med" len="med"/>
+                    </a:lnT>
+                    <a:lnB w="12700" cap="flat" cmpd="sng" algn="ctr">
+                      <a:solidFill>
+                        <a:schemeClr val="tx1"/>
+                      </a:solidFill>
+                      <a:prstDash val="solid"/>
+                      <a:round/>
+                      <a:headEnd type="none" w="med" len="med"/>
+                      <a:tailEnd type="none" w="med" len="med"/>
+                    </a:lnB>
+                  </a:tcPr>
+                </a:tc>
+                <a:tc>
+                  <a:txBody>
+                    <a:bodyPr/>
+                    <a:lstStyle/>
+                    <a:p>
+                      <a:r>
+                        <a:rPr lang="pt-BR" dirty="0"/>
+                        <a:t>XXX.XXX.XXX-X4</a:t>
+                      </a:r>
+                    </a:p>
+                  </a:txBody>
+                  <a:tcPr>
+                    <a:lnL w="12700" cap="flat" cmpd="sng" algn="ctr">
+                      <a:solidFill>
+                        <a:schemeClr val="tx1"/>
+                      </a:solidFill>
+                      <a:prstDash val="solid"/>
+                      <a:round/>
+                      <a:headEnd type="none" w="med" len="med"/>
+                      <a:tailEnd type="none" w="med" len="med"/>
+                    </a:lnL>
+                    <a:lnR w="12700" cap="flat" cmpd="sng" algn="ctr">
+                      <a:solidFill>
+                        <a:schemeClr val="tx1"/>
+                      </a:solidFill>
+                      <a:prstDash val="solid"/>
+                      <a:round/>
+                      <a:headEnd type="none" w="med" len="med"/>
+                      <a:tailEnd type="none" w="med" len="med"/>
+                    </a:lnR>
+                    <a:lnT w="12700" cap="flat" cmpd="sng" algn="ctr">
+                      <a:solidFill>
+                        <a:schemeClr val="tx1"/>
+                      </a:solidFill>
+                      <a:prstDash val="solid"/>
+                      <a:round/>
+                      <a:headEnd type="none" w="med" len="med"/>
+                      <a:tailEnd type="none" w="med" len="med"/>
+                    </a:lnT>
+                    <a:lnB w="12700" cap="flat" cmpd="sng" algn="ctr">
+                      <a:solidFill>
+                        <a:schemeClr val="tx1"/>
+                      </a:solidFill>
+                      <a:prstDash val="solid"/>
+                      <a:round/>
+                      <a:headEnd type="none" w="med" len="med"/>
+                      <a:tailEnd type="none" w="med" len="med"/>
+                    </a:lnB>
+                  </a:tcPr>
+                </a:tc>
+                <a:extLst>
+                  <a:ext uri="{0D108BD9-81ED-4DB2-BD59-A6C34878D82A}">
+                    <a16:rowId xmlns:a16="http://schemas.microsoft.com/office/drawing/2014/main" val="545109077"/>
+                  </a:ext>
+                </a:extLst>
+              </a:tr>
+            </a:tbl>
+          </a:graphicData>
+        </a:graphic>
+      </p:graphicFrame>
+      <p:graphicFrame>
+        <p:nvGraphicFramePr>
+          <p:cNvPr id="5" name="Tabela 4">
+            <a:extLst>
+              <a:ext uri="{FF2B5EF4-FFF2-40B4-BE49-F238E27FC236}">
+                <a16:creationId xmlns:a16="http://schemas.microsoft.com/office/drawing/2014/main" id="{9A10063E-4E31-C12B-6EEB-7207321D3B99}"/>
+              </a:ext>
+            </a:extLst>
+          </p:cNvPr>
+          <p:cNvGraphicFramePr>
+            <a:graphicFrameLocks noGrp="1"/>
+          </p:cNvGraphicFramePr>
+          <p:nvPr>
+            <p:extLst>
+              <p:ext uri="{D42A27DB-BD31-4B8C-83A1-F6EECF244321}">
+                <p14:modId xmlns:p14="http://schemas.microsoft.com/office/powerpoint/2010/main" val="721301676"/>
+              </p:ext>
+            </p:extLst>
+          </p:nvPr>
+        </p:nvGraphicFramePr>
+        <p:xfrm>
+          <a:off x="7304441" y="4421918"/>
+          <a:ext cx="3851237" cy="1483360"/>
+        </p:xfrm>
+        <a:graphic>
+          <a:graphicData uri="http://schemas.openxmlformats.org/drawingml/2006/table">
+            <a:tbl>
+              <a:tblPr firstRow="1" bandRow="1">
+                <a:tableStyleId>{2D5ABB26-0587-4C30-8999-92F81FD0307C}</a:tableStyleId>
+              </a:tblPr>
+              <a:tblGrid>
+                <a:gridCol w="1341121">
+                  <a:extLst>
+                    <a:ext uri="{9D8B030D-6E8A-4147-A177-3AD203B41FA5}">
+                      <a16:colId xmlns:a16="http://schemas.microsoft.com/office/drawing/2014/main" val="3676258254"/>
+                    </a:ext>
+                  </a:extLst>
+                </a:gridCol>
+                <a:gridCol w="2510116">
+                  <a:extLst>
+                    <a:ext uri="{9D8B030D-6E8A-4147-A177-3AD203B41FA5}">
+                      <a16:colId xmlns:a16="http://schemas.microsoft.com/office/drawing/2014/main" val="3238272406"/>
+                    </a:ext>
+                  </a:extLst>
+                </a:gridCol>
+              </a:tblGrid>
+              <a:tr h="370840">
+                <a:tc>
+                  <a:txBody>
+                    <a:bodyPr/>
+                    <a:lstStyle/>
+                    <a:p>
+                      <a:pPr algn="ctr"/>
+                      <a:r>
+                        <a:rPr lang="pt-BR" dirty="0"/>
+                        <a:t>COD_DEPTO</a:t>
+                      </a:r>
+                    </a:p>
+                  </a:txBody>
+                  <a:tcPr>
+                    <a:lnL w="12700" cap="flat" cmpd="sng" algn="ctr">
+                      <a:solidFill>
+                        <a:schemeClr val="tx1"/>
+                      </a:solidFill>
+                      <a:prstDash val="solid"/>
+                      <a:round/>
+                      <a:headEnd type="none" w="med" len="med"/>
+                      <a:tailEnd type="none" w="med" len="med"/>
+                    </a:lnL>
+                    <a:lnR w="12700" cap="flat" cmpd="sng" algn="ctr">
+                      <a:solidFill>
+                        <a:schemeClr val="tx1"/>
+                      </a:solidFill>
+                      <a:prstDash val="solid"/>
+                      <a:round/>
+                      <a:headEnd type="none" w="med" len="med"/>
+                      <a:tailEnd type="none" w="med" len="med"/>
+                    </a:lnR>
+                    <a:lnT w="12700" cap="flat" cmpd="sng" algn="ctr">
+                      <a:solidFill>
+                        <a:schemeClr val="tx1"/>
+                      </a:solidFill>
+                      <a:prstDash val="solid"/>
+                      <a:round/>
+                      <a:headEnd type="none" w="med" len="med"/>
+                      <a:tailEnd type="none" w="med" len="med"/>
+                    </a:lnT>
+                    <a:lnB w="12700" cap="flat" cmpd="sng" algn="ctr">
+                      <a:solidFill>
+                        <a:schemeClr val="tx1"/>
+                      </a:solidFill>
+                      <a:prstDash val="solid"/>
+                      <a:round/>
+                      <a:headEnd type="none" w="med" len="med"/>
+                      <a:tailEnd type="none" w="med" len="med"/>
+                    </a:lnB>
+                  </a:tcPr>
+                </a:tc>
+                <a:tc>
+                  <a:txBody>
+                    <a:bodyPr/>
+                    <a:lstStyle/>
+                    <a:p>
+                      <a:r>
+                        <a:rPr lang="pt-BR" dirty="0"/>
+                        <a:t>NOME_DEPARTAMENTO</a:t>
+                      </a:r>
+                    </a:p>
+                  </a:txBody>
+                  <a:tcPr>
+                    <a:lnL w="12700" cap="flat" cmpd="sng" algn="ctr">
+                      <a:solidFill>
+                        <a:schemeClr val="tx1"/>
+                      </a:solidFill>
+                      <a:prstDash val="solid"/>
+                      <a:round/>
+                      <a:headEnd type="none" w="med" len="med"/>
+                      <a:tailEnd type="none" w="med" len="med"/>
+                    </a:lnL>
+                    <a:lnR w="12700" cap="flat" cmpd="sng" algn="ctr">
+                      <a:solidFill>
+                        <a:schemeClr val="tx1"/>
+                      </a:solidFill>
+                      <a:prstDash val="solid"/>
+                      <a:round/>
+                      <a:headEnd type="none" w="med" len="med"/>
+                      <a:tailEnd type="none" w="med" len="med"/>
+                    </a:lnR>
+                    <a:lnT w="12700" cap="flat" cmpd="sng" algn="ctr">
+                      <a:solidFill>
+                        <a:schemeClr val="tx1"/>
+                      </a:solidFill>
+                      <a:prstDash val="solid"/>
+                      <a:round/>
+                      <a:headEnd type="none" w="med" len="med"/>
+                      <a:tailEnd type="none" w="med" len="med"/>
+                    </a:lnT>
+                    <a:lnB w="12700" cap="flat" cmpd="sng" algn="ctr">
+                      <a:solidFill>
+                        <a:schemeClr val="tx1"/>
+                      </a:solidFill>
+                      <a:prstDash val="solid"/>
+                      <a:round/>
+                      <a:headEnd type="none" w="med" len="med"/>
+                      <a:tailEnd type="none" w="med" len="med"/>
+                    </a:lnB>
+                  </a:tcPr>
+                </a:tc>
+                <a:extLst>
+                  <a:ext uri="{0D108BD9-81ED-4DB2-BD59-A6C34878D82A}">
+                    <a16:rowId xmlns:a16="http://schemas.microsoft.com/office/drawing/2014/main" val="3972983408"/>
+                  </a:ext>
+                </a:extLst>
+              </a:tr>
+              <a:tr h="370840">
+                <a:tc>
+                  <a:txBody>
+                    <a:bodyPr/>
+                    <a:lstStyle/>
+                    <a:p>
+                      <a:pPr algn="ctr"/>
+                      <a:r>
+                        <a:rPr lang="pt-BR" dirty="0"/>
+                        <a:t>1</a:t>
+                      </a:r>
+                    </a:p>
+                  </a:txBody>
+                  <a:tcPr>
+                    <a:lnL w="12700" cap="flat" cmpd="sng" algn="ctr">
+                      <a:solidFill>
+                        <a:schemeClr val="tx1"/>
+                      </a:solidFill>
+                      <a:prstDash val="solid"/>
+                      <a:round/>
+                      <a:headEnd type="none" w="med" len="med"/>
+                      <a:tailEnd type="none" w="med" len="med"/>
+                    </a:lnL>
+                    <a:lnR w="12700" cap="flat" cmpd="sng" algn="ctr">
+                      <a:solidFill>
+                        <a:schemeClr val="tx1"/>
+                      </a:solidFill>
+                      <a:prstDash val="solid"/>
+                      <a:round/>
+                      <a:headEnd type="none" w="med" len="med"/>
+                      <a:tailEnd type="none" w="med" len="med"/>
+                    </a:lnR>
+                    <a:lnT w="12700" cap="flat" cmpd="sng" algn="ctr">
+                      <a:solidFill>
+                        <a:schemeClr val="tx1"/>
+                      </a:solidFill>
+                      <a:prstDash val="solid"/>
+                      <a:round/>
+                      <a:headEnd type="none" w="med" len="med"/>
+                      <a:tailEnd type="none" w="med" len="med"/>
+                    </a:lnT>
+                    <a:lnB w="12700" cap="flat" cmpd="sng" algn="ctr">
+                      <a:solidFill>
+                        <a:schemeClr val="tx1"/>
+                      </a:solidFill>
+                      <a:prstDash val="solid"/>
+                      <a:round/>
+                      <a:headEnd type="none" w="med" len="med"/>
+                      <a:tailEnd type="none" w="med" len="med"/>
+                    </a:lnB>
+                  </a:tcPr>
+                </a:tc>
+                <a:tc>
+                  <a:txBody>
+                    <a:bodyPr/>
+                    <a:lstStyle/>
+                    <a:p>
+                      <a:r>
+                        <a:rPr lang="pt-BR" dirty="0"/>
+                        <a:t>BIG DATA</a:t>
+                      </a:r>
+                    </a:p>
+                  </a:txBody>
+                  <a:tcPr>
+                    <a:lnL w="12700" cap="flat" cmpd="sng" algn="ctr">
+                      <a:solidFill>
+                        <a:schemeClr val="tx1"/>
+                      </a:solidFill>
+                      <a:prstDash val="solid"/>
+                      <a:round/>
+                      <a:headEnd type="none" w="med" len="med"/>
+                      <a:tailEnd type="none" w="med" len="med"/>
+                    </a:lnL>
+                    <a:lnR w="12700" cap="flat" cmpd="sng" algn="ctr">
+                      <a:solidFill>
+                        <a:schemeClr val="tx1"/>
+                      </a:solidFill>
+                      <a:prstDash val="solid"/>
+                      <a:round/>
+                      <a:headEnd type="none" w="med" len="med"/>
+                      <a:tailEnd type="none" w="med" len="med"/>
+                    </a:lnR>
+                    <a:lnT w="12700" cap="flat" cmpd="sng" algn="ctr">
+                      <a:solidFill>
+                        <a:schemeClr val="tx1"/>
+                      </a:solidFill>
+                      <a:prstDash val="solid"/>
+                      <a:round/>
+                      <a:headEnd type="none" w="med" len="med"/>
+                      <a:tailEnd type="none" w="med" len="med"/>
+                    </a:lnT>
+                    <a:lnB w="12700" cap="flat" cmpd="sng" algn="ctr">
+                      <a:solidFill>
+                        <a:schemeClr val="tx1"/>
+                      </a:solidFill>
+                      <a:prstDash val="solid"/>
+                      <a:round/>
+                      <a:headEnd type="none" w="med" len="med"/>
+                      <a:tailEnd type="none" w="med" len="med"/>
+                    </a:lnB>
+                  </a:tcPr>
+                </a:tc>
+                <a:extLst>
+                  <a:ext uri="{0D108BD9-81ED-4DB2-BD59-A6C34878D82A}">
+                    <a16:rowId xmlns:a16="http://schemas.microsoft.com/office/drawing/2014/main" val="413956977"/>
+                  </a:ext>
+                </a:extLst>
+              </a:tr>
+              <a:tr h="370840">
+                <a:tc>
+                  <a:txBody>
+                    <a:bodyPr/>
+                    <a:lstStyle/>
+                    <a:p>
+                      <a:pPr algn="ctr"/>
+                      <a:r>
+                        <a:rPr lang="pt-BR" dirty="0"/>
+                        <a:t>2</a:t>
+                      </a:r>
+                    </a:p>
+                  </a:txBody>
+                  <a:tcPr>
+                    <a:lnL w="12700" cap="flat" cmpd="sng" algn="ctr">
+                      <a:solidFill>
+                        <a:schemeClr val="tx1"/>
+                      </a:solidFill>
+                      <a:prstDash val="solid"/>
+                      <a:round/>
+                      <a:headEnd type="none" w="med" len="med"/>
+                      <a:tailEnd type="none" w="med" len="med"/>
+                    </a:lnL>
+                    <a:lnR w="12700" cap="flat" cmpd="sng" algn="ctr">
+                      <a:solidFill>
+                        <a:schemeClr val="tx1"/>
+                      </a:solidFill>
+                      <a:prstDash val="solid"/>
+                      <a:round/>
+                      <a:headEnd type="none" w="med" len="med"/>
+                      <a:tailEnd type="none" w="med" len="med"/>
+                    </a:lnR>
+                    <a:lnT w="12700" cap="flat" cmpd="sng" algn="ctr">
+                      <a:solidFill>
+                        <a:schemeClr val="tx1"/>
+                      </a:solidFill>
+                      <a:prstDash val="solid"/>
+                      <a:round/>
+                      <a:headEnd type="none" w="med" len="med"/>
+                      <a:tailEnd type="none" w="med" len="med"/>
+                    </a:lnT>
+                    <a:lnB w="12700" cap="flat" cmpd="sng" algn="ctr">
+                      <a:solidFill>
+                        <a:schemeClr val="tx1"/>
+                      </a:solidFill>
+                      <a:prstDash val="solid"/>
+                      <a:round/>
+                      <a:headEnd type="none" w="med" len="med"/>
+                      <a:tailEnd type="none" w="med" len="med"/>
+                    </a:lnB>
+                  </a:tcPr>
+                </a:tc>
+                <a:tc>
+                  <a:txBody>
+                    <a:bodyPr/>
+                    <a:lstStyle/>
+                    <a:p>
+                      <a:r>
+                        <a:rPr lang="pt-BR" dirty="0"/>
+                        <a:t>ENGENHARIA</a:t>
+                      </a:r>
+                    </a:p>
+                  </a:txBody>
+                  <a:tcPr>
+                    <a:lnL w="12700" cap="flat" cmpd="sng" algn="ctr">
+                      <a:solidFill>
+                        <a:schemeClr val="tx1"/>
+                      </a:solidFill>
+                      <a:prstDash val="solid"/>
+                      <a:round/>
+                      <a:headEnd type="none" w="med" len="med"/>
+                      <a:tailEnd type="none" w="med" len="med"/>
+                    </a:lnL>
+                    <a:lnR w="12700" cap="flat" cmpd="sng" algn="ctr">
+                      <a:solidFill>
+                        <a:schemeClr val="tx1"/>
+                      </a:solidFill>
+                      <a:prstDash val="solid"/>
+                      <a:round/>
+                      <a:headEnd type="none" w="med" len="med"/>
+                      <a:tailEnd type="none" w="med" len="med"/>
+                    </a:lnR>
+                    <a:lnT w="12700" cap="flat" cmpd="sng" algn="ctr">
+                      <a:solidFill>
+                        <a:schemeClr val="tx1"/>
+                      </a:solidFill>
+                      <a:prstDash val="solid"/>
+                      <a:round/>
+                      <a:headEnd type="none" w="med" len="med"/>
+                      <a:tailEnd type="none" w="med" len="med"/>
+                    </a:lnT>
+                    <a:lnB w="12700" cap="flat" cmpd="sng" algn="ctr">
+                      <a:solidFill>
+                        <a:schemeClr val="tx1"/>
+                      </a:solidFill>
+                      <a:prstDash val="solid"/>
+                      <a:round/>
+                      <a:headEnd type="none" w="med" len="med"/>
+                      <a:tailEnd type="none" w="med" len="med"/>
+                    </a:lnB>
+                  </a:tcPr>
+                </a:tc>
+                <a:extLst>
+                  <a:ext uri="{0D108BD9-81ED-4DB2-BD59-A6C34878D82A}">
+                    <a16:rowId xmlns:a16="http://schemas.microsoft.com/office/drawing/2014/main" val="1908616991"/>
+                  </a:ext>
+                </a:extLst>
+              </a:tr>
+              <a:tr h="370840">
+                <a:tc>
+                  <a:txBody>
+                    <a:bodyPr/>
+                    <a:lstStyle/>
+                    <a:p>
+                      <a:pPr algn="ctr"/>
+                      <a:r>
+                        <a:rPr lang="pt-BR" dirty="0"/>
+                        <a:t>3</a:t>
+                      </a:r>
+                    </a:p>
+                  </a:txBody>
+                  <a:tcPr>
+                    <a:lnL w="12700" cap="flat" cmpd="sng" algn="ctr">
+                      <a:solidFill>
+                        <a:schemeClr val="tx1"/>
+                      </a:solidFill>
+                      <a:prstDash val="solid"/>
+                      <a:round/>
+                      <a:headEnd type="none" w="med" len="med"/>
+                      <a:tailEnd type="none" w="med" len="med"/>
+                    </a:lnL>
+                    <a:lnR w="12700" cap="flat" cmpd="sng" algn="ctr">
+                      <a:solidFill>
+                        <a:schemeClr val="tx1"/>
+                      </a:solidFill>
+                      <a:prstDash val="solid"/>
+                      <a:round/>
+                      <a:headEnd type="none" w="med" len="med"/>
+                      <a:tailEnd type="none" w="med" len="med"/>
+                    </a:lnR>
+                    <a:lnT w="12700" cap="flat" cmpd="sng" algn="ctr">
+                      <a:solidFill>
+                        <a:schemeClr val="tx1"/>
+                      </a:solidFill>
+                      <a:prstDash val="solid"/>
+                      <a:round/>
+                      <a:headEnd type="none" w="med" len="med"/>
+                      <a:tailEnd type="none" w="med" len="med"/>
+                    </a:lnT>
+                    <a:lnB w="12700" cap="flat" cmpd="sng" algn="ctr">
+                      <a:solidFill>
+                        <a:schemeClr val="tx1"/>
+                      </a:solidFill>
+                      <a:prstDash val="solid"/>
+                      <a:round/>
+                      <a:headEnd type="none" w="med" len="med"/>
+                      <a:tailEnd type="none" w="med" len="med"/>
+                    </a:lnB>
+                  </a:tcPr>
+                </a:tc>
+                <a:tc>
+                  <a:txBody>
+                    <a:bodyPr/>
+                    <a:lstStyle/>
+                    <a:p>
+                      <a:r>
+                        <a:rPr lang="pt-BR" dirty="0"/>
+                        <a:t>TI</a:t>
+                      </a:r>
+                    </a:p>
+                  </a:txBody>
+                  <a:tcPr>
+                    <a:lnL w="12700" cap="flat" cmpd="sng" algn="ctr">
+                      <a:solidFill>
+                        <a:schemeClr val="tx1"/>
+                      </a:solidFill>
+                      <a:prstDash val="solid"/>
+                      <a:round/>
+                      <a:headEnd type="none" w="med" len="med"/>
+                      <a:tailEnd type="none" w="med" len="med"/>
+                    </a:lnL>
+                    <a:lnR w="12700" cap="flat" cmpd="sng" algn="ctr">
+                      <a:solidFill>
+                        <a:schemeClr val="tx1"/>
+                      </a:solidFill>
+                      <a:prstDash val="solid"/>
+                      <a:round/>
+                      <a:headEnd type="none" w="med" len="med"/>
+                      <a:tailEnd type="none" w="med" len="med"/>
+                    </a:lnR>
+                    <a:lnT w="12700" cap="flat" cmpd="sng" algn="ctr">
+                      <a:solidFill>
+                        <a:schemeClr val="tx1"/>
+                      </a:solidFill>
+                      <a:prstDash val="solid"/>
+                      <a:round/>
+                      <a:headEnd type="none" w="med" len="med"/>
+                      <a:tailEnd type="none" w="med" len="med"/>
+                    </a:lnT>
+                    <a:lnB w="12700" cap="flat" cmpd="sng" algn="ctr">
+                      <a:solidFill>
+                        <a:schemeClr val="tx1"/>
+                      </a:solidFill>
+                      <a:prstDash val="solid"/>
+                      <a:round/>
+                      <a:headEnd type="none" w="med" len="med"/>
+                      <a:tailEnd type="none" w="med" len="med"/>
+                    </a:lnB>
+                  </a:tcPr>
+                </a:tc>
+                <a:extLst>
+                  <a:ext uri="{0D108BD9-81ED-4DB2-BD59-A6C34878D82A}">
+                    <a16:rowId xmlns:a16="http://schemas.microsoft.com/office/drawing/2014/main" val="1222940136"/>
+                  </a:ext>
+                </a:extLst>
+              </a:tr>
+            </a:tbl>
+          </a:graphicData>
+        </a:graphic>
+      </p:graphicFrame>
+    </p:spTree>
+    <p:extLst>
+      <p:ext uri="{BB962C8B-B14F-4D97-AF65-F5344CB8AC3E}">
+        <p14:creationId xmlns:p14="http://schemas.microsoft.com/office/powerpoint/2010/main" val="2799265277"/>
+      </p:ext>
+    </p:extLst>
+  </p:cSld>
+  <p:clrMapOvr>
+    <a:masterClrMapping/>
+  </p:clrMapOvr>
+</p:sld>
+</file>
+
+<file path=ppt/slides/slide51.xml><?xml version="1.0" encoding="utf-8"?>
+<p:sld xmlns:a="http://schemas.openxmlformats.org/drawingml/2006/main" xmlns:r="http://schemas.openxmlformats.org/officeDocument/2006/relationships" xmlns:p="http://schemas.openxmlformats.org/presentationml/2006/main">
+  <p:cSld>
+    <p:spTree>
+      <p:nvGrpSpPr>
+        <p:cNvPr id="1" name=""/>
+        <p:cNvGrpSpPr/>
+        <p:nvPr/>
+      </p:nvGrpSpPr>
+      <p:grpSpPr>
+        <a:xfrm>
+          <a:off x="0" y="0"/>
+          <a:ext cx="0" cy="0"/>
+          <a:chOff x="0" y="0"/>
+          <a:chExt cx="0" cy="0"/>
+        </a:xfrm>
+      </p:grpSpPr>
+      <p:sp>
+        <p:nvSpPr>
+          <p:cNvPr id="2" name="Título 1">
+            <a:extLst>
+              <a:ext uri="{FF2B5EF4-FFF2-40B4-BE49-F238E27FC236}">
+                <a16:creationId xmlns:a16="http://schemas.microsoft.com/office/drawing/2014/main" id="{CC7C5B47-35D0-CBC5-39AF-B5F44B677392}"/>
+              </a:ext>
+            </a:extLst>
+          </p:cNvPr>
+          <p:cNvSpPr>
+            <a:spLocks noGrp="1"/>
+          </p:cNvSpPr>
+          <p:nvPr>
+            <p:ph type="title"/>
+          </p:nvPr>
+        </p:nvSpPr>
+        <p:spPr/>
+        <p:txBody>
+          <a:bodyPr>
+            <a:normAutofit/>
+          </a:bodyPr>
+          <a:lstStyle/>
+          <a:p>
+            <a:r>
+              <a:rPr lang="pt-BR" sz="4400" b="1" dirty="0"/>
+              <a:t>MODELAGEM DE BANCO DE DADOS RELACIONAL</a:t>
+            </a:r>
+            <a:endParaRPr lang="pt-BR" sz="2700" dirty="0"/>
+          </a:p>
+        </p:txBody>
+      </p:sp>
+      <p:sp>
+        <p:nvSpPr>
+          <p:cNvPr id="3" name="Espaço Reservado para Conteúdo 2">
+            <a:extLst>
+              <a:ext uri="{FF2B5EF4-FFF2-40B4-BE49-F238E27FC236}">
+                <a16:creationId xmlns:a16="http://schemas.microsoft.com/office/drawing/2014/main" id="{59758A1E-514F-AFAC-13D2-56BDC5AADB96}"/>
+              </a:ext>
+            </a:extLst>
+          </p:cNvPr>
+          <p:cNvSpPr>
+            <a:spLocks noGrp="1"/>
+          </p:cNvSpPr>
+          <p:nvPr>
+            <p:ph idx="1"/>
+          </p:nvPr>
+        </p:nvSpPr>
+        <p:spPr>
+          <a:xfrm>
+            <a:off x="1097279" y="1923026"/>
+            <a:ext cx="10058399" cy="4384468"/>
+          </a:xfrm>
+          <a:ln>
+            <a:solidFill>
+              <a:schemeClr val="bg1"/>
+            </a:solidFill>
+          </a:ln>
+        </p:spPr>
+        <p:style>
+          <a:lnRef idx="2">
+            <a:schemeClr val="dk1"/>
+          </a:lnRef>
+          <a:fillRef idx="1">
+            <a:schemeClr val="lt1"/>
+          </a:fillRef>
+          <a:effectRef idx="0">
+            <a:schemeClr val="dk1"/>
+          </a:effectRef>
+          <a:fontRef idx="minor">
+            <a:schemeClr val="dk1"/>
+          </a:fontRef>
+        </p:style>
+        <p:txBody>
+          <a:bodyPr>
+            <a:normAutofit/>
+          </a:bodyPr>
+          <a:lstStyle/>
+          <a:p>
+            <a:pPr marL="0" indent="0">
+              <a:buNone/>
+            </a:pPr>
+            <a:r>
+              <a:rPr lang="pt-BR" sz="2400" dirty="0"/>
+              <a:t>Os domínios e valores vazios são usado para especificar um conjunto de valores que os campos da respectiva coluna podem assumir. </a:t>
+            </a:r>
+          </a:p>
+          <a:p>
+            <a:pPr marL="0" indent="0">
+              <a:buNone/>
+            </a:pPr>
+            <a:r>
+              <a:rPr lang="pt-BR" sz="2400" dirty="0"/>
+              <a:t>Os conjunto de valores são conhecidos como </a:t>
+            </a:r>
+            <a:r>
+              <a:rPr lang="pt-BR" sz="2400" b="1" dirty="0"/>
+              <a:t> domínio do campo</a:t>
+            </a:r>
+            <a:r>
+              <a:rPr lang="pt-BR" sz="2400" dirty="0"/>
+              <a:t>.</a:t>
+            </a:r>
+          </a:p>
+        </p:txBody>
+      </p:sp>
+    </p:spTree>
+    <p:extLst>
+      <p:ext uri="{BB962C8B-B14F-4D97-AF65-F5344CB8AC3E}">
+        <p14:creationId xmlns:p14="http://schemas.microsoft.com/office/powerpoint/2010/main" val="3321087206"/>
+      </p:ext>
+    </p:extLst>
+  </p:cSld>
+  <p:clrMapOvr>
+    <a:masterClrMapping/>
+  </p:clrMapOvr>
+</p:sld>
+</file>
+
 <file path=ppt/slides/slide6.xml><?xml version="1.0" encoding="utf-8"?>
 <p:sld xmlns:a="http://schemas.openxmlformats.org/drawingml/2006/main" xmlns:r="http://schemas.openxmlformats.org/officeDocument/2006/relationships" xmlns:p="http://schemas.openxmlformats.org/presentationml/2006/main">
   <p:cSld>

</xml_diff>

<commit_message>
Terminando a aula 5 de banco de dados e adicionando aula de dispositivos móveis
</commit_message>
<xml_diff>
--- a/Euripedes Simões de Paula/Banco de Dados/Aula 5/Projeto de banco de dados.pptx
+++ b/Euripedes Simões de Paula/Banco de Dados/Aula 5/Projeto de banco de dados.pptx
@@ -56,6 +56,11 @@
     <p:sldId id="307" r:id="rId50"/>
     <p:sldId id="308" r:id="rId51"/>
     <p:sldId id="309" r:id="rId52"/>
+    <p:sldId id="310" r:id="rId53"/>
+    <p:sldId id="312" r:id="rId54"/>
+    <p:sldId id="313" r:id="rId55"/>
+    <p:sldId id="314" r:id="rId56"/>
+    <p:sldId id="315" r:id="rId57"/>
   </p:sldIdLst>
   <p:sldSz cx="12192000" cy="6858000"/>
   <p:notesSz cx="6858000" cy="9144000"/>
@@ -388,7 +393,7 @@
           <a:p>
             <a:fld id="{B8B9BE19-35B1-49B2-9769-AE2A591CF592}" type="datetimeFigureOut">
               <a:rPr lang="pt-BR" smtClean="0"/>
-              <a:t>31/03/2024</a:t>
+              <a:t>03/04/2024</a:t>
             </a:fld>
             <a:endParaRPr lang="pt-BR"/>
           </a:p>
@@ -596,7 +601,7 @@
           <a:p>
             <a:fld id="{B8B9BE19-35B1-49B2-9769-AE2A591CF592}" type="datetimeFigureOut">
               <a:rPr lang="pt-BR" smtClean="0"/>
-              <a:t>31/03/2024</a:t>
+              <a:t>03/04/2024</a:t>
             </a:fld>
             <a:endParaRPr lang="pt-BR"/>
           </a:p>
@@ -852,7 +857,7 @@
           <a:p>
             <a:fld id="{B8B9BE19-35B1-49B2-9769-AE2A591CF592}" type="datetimeFigureOut">
               <a:rPr lang="pt-BR" smtClean="0"/>
-              <a:t>31/03/2024</a:t>
+              <a:t>03/04/2024</a:t>
             </a:fld>
             <a:endParaRPr lang="pt-BR"/>
           </a:p>
@@ -1026,7 +1031,7 @@
           <a:p>
             <a:fld id="{B8B9BE19-35B1-49B2-9769-AE2A591CF592}" type="datetimeFigureOut">
               <a:rPr lang="pt-BR" smtClean="0"/>
-              <a:t>31/03/2024</a:t>
+              <a:t>03/04/2024</a:t>
             </a:fld>
             <a:endParaRPr lang="pt-BR"/>
           </a:p>
@@ -1369,7 +1374,7 @@
           <a:p>
             <a:fld id="{B8B9BE19-35B1-49B2-9769-AE2A591CF592}" type="datetimeFigureOut">
               <a:rPr lang="pt-BR" smtClean="0"/>
-              <a:t>31/03/2024</a:t>
+              <a:t>03/04/2024</a:t>
             </a:fld>
             <a:endParaRPr lang="pt-BR"/>
           </a:p>
@@ -1644,7 +1649,7 @@
           <a:p>
             <a:fld id="{B8B9BE19-35B1-49B2-9769-AE2A591CF592}" type="datetimeFigureOut">
               <a:rPr lang="pt-BR" smtClean="0"/>
-              <a:t>31/03/2024</a:t>
+              <a:t>03/04/2024</a:t>
             </a:fld>
             <a:endParaRPr lang="pt-BR"/>
           </a:p>
@@ -2023,7 +2028,7 @@
           <a:p>
             <a:fld id="{B8B9BE19-35B1-49B2-9769-AE2A591CF592}" type="datetimeFigureOut">
               <a:rPr lang="pt-BR" smtClean="0"/>
-              <a:t>31/03/2024</a:t>
+              <a:t>03/04/2024</a:t>
             </a:fld>
             <a:endParaRPr lang="pt-BR"/>
           </a:p>
@@ -2141,7 +2146,7 @@
           <a:p>
             <a:fld id="{B8B9BE19-35B1-49B2-9769-AE2A591CF592}" type="datetimeFigureOut">
               <a:rPr lang="pt-BR" smtClean="0"/>
-              <a:t>31/03/2024</a:t>
+              <a:t>03/04/2024</a:t>
             </a:fld>
             <a:endParaRPr lang="pt-BR"/>
           </a:p>
@@ -2312,7 +2317,7 @@
           <a:p>
             <a:fld id="{B8B9BE19-35B1-49B2-9769-AE2A591CF592}" type="datetimeFigureOut">
               <a:rPr lang="pt-BR" smtClean="0"/>
-              <a:t>31/03/2024</a:t>
+              <a:t>03/04/2024</a:t>
             </a:fld>
             <a:endParaRPr lang="pt-BR"/>
           </a:p>
@@ -2666,7 +2671,7 @@
           <a:p>
             <a:fld id="{B8B9BE19-35B1-49B2-9769-AE2A591CF592}" type="datetimeFigureOut">
               <a:rPr lang="pt-BR" smtClean="0"/>
-              <a:t>31/03/2024</a:t>
+              <a:t>03/04/2024</a:t>
             </a:fld>
             <a:endParaRPr lang="pt-BR"/>
           </a:p>
@@ -3048,7 +3053,7 @@
           <a:p>
             <a:fld id="{B8B9BE19-35B1-49B2-9769-AE2A591CF592}" type="datetimeFigureOut">
               <a:rPr lang="pt-BR" smtClean="0"/>
-              <a:t>31/03/2024</a:t>
+              <a:t>03/04/2024</a:t>
             </a:fld>
             <a:endParaRPr lang="pt-BR"/>
           </a:p>
@@ -3335,7 +3340,7 @@
           <a:p>
             <a:fld id="{B8B9BE19-35B1-49B2-9769-AE2A591CF592}" type="datetimeFigureOut">
               <a:rPr lang="pt-BR" smtClean="0"/>
-              <a:t>31/03/2024</a:t>
+              <a:t>03/04/2024</a:t>
             </a:fld>
             <a:endParaRPr lang="pt-BR"/>
           </a:p>
@@ -6821,7 +6826,7 @@
           <a:p>
             <a:r>
               <a:rPr lang="pt-BR" sz="2400" dirty="0"/>
-              <a:t>Conhecer o modelo entidade-relacionamento possibilita a criação de pequenos e grandes projetos de anco de dados, e proporciona a modelagem de alta qualidade.</a:t>
+              <a:t>Conhecer o modelo entidade-relacionamento possibilita a criação de pequenos e grandes projetos de Banco de dados, e proporciona a modelagem de alta qualidade.</a:t>
             </a:r>
           </a:p>
           <a:p>
@@ -26911,12 +26916,4447 @@
               <a:t>.</a:t>
             </a:r>
           </a:p>
+          <a:p>
+            <a:pPr marL="0" indent="0">
+              <a:buNone/>
+            </a:pPr>
+            <a:r>
+              <a:rPr lang="pt-BR" sz="2400" dirty="0"/>
+              <a:t>Algo que podemos fazer também é definir se o campo pode ou não ser nulo. Isso significa que o campo não terá valores.</a:t>
+            </a:r>
+          </a:p>
         </p:txBody>
       </p:sp>
     </p:spTree>
     <p:extLst>
       <p:ext uri="{BB962C8B-B14F-4D97-AF65-F5344CB8AC3E}">
         <p14:creationId xmlns:p14="http://schemas.microsoft.com/office/powerpoint/2010/main" val="3321087206"/>
+      </p:ext>
+    </p:extLst>
+  </p:cSld>
+  <p:clrMapOvr>
+    <a:masterClrMapping/>
+  </p:clrMapOvr>
+</p:sld>
+</file>
+
+<file path=ppt/slides/slide52.xml><?xml version="1.0" encoding="utf-8"?>
+<p:sld xmlns:a="http://schemas.openxmlformats.org/drawingml/2006/main" xmlns:r="http://schemas.openxmlformats.org/officeDocument/2006/relationships" xmlns:p="http://schemas.openxmlformats.org/presentationml/2006/main">
+  <p:cSld>
+    <p:spTree>
+      <p:nvGrpSpPr>
+        <p:cNvPr id="1" name=""/>
+        <p:cNvGrpSpPr/>
+        <p:nvPr/>
+      </p:nvGrpSpPr>
+      <p:grpSpPr>
+        <a:xfrm>
+          <a:off x="0" y="0"/>
+          <a:ext cx="0" cy="0"/>
+          <a:chOff x="0" y="0"/>
+          <a:chExt cx="0" cy="0"/>
+        </a:xfrm>
+      </p:grpSpPr>
+      <p:sp>
+        <p:nvSpPr>
+          <p:cNvPr id="2" name="Título 1">
+            <a:extLst>
+              <a:ext uri="{FF2B5EF4-FFF2-40B4-BE49-F238E27FC236}">
+                <a16:creationId xmlns:a16="http://schemas.microsoft.com/office/drawing/2014/main" id="{CC7C5B47-35D0-CBC5-39AF-B5F44B677392}"/>
+              </a:ext>
+            </a:extLst>
+          </p:cNvPr>
+          <p:cNvSpPr>
+            <a:spLocks noGrp="1"/>
+          </p:cNvSpPr>
+          <p:nvPr>
+            <p:ph type="title"/>
+          </p:nvPr>
+        </p:nvSpPr>
+        <p:spPr/>
+        <p:txBody>
+          <a:bodyPr>
+            <a:normAutofit/>
+          </a:bodyPr>
+          <a:lstStyle/>
+          <a:p>
+            <a:r>
+              <a:rPr lang="pt-BR" sz="4400" b="1" dirty="0"/>
+              <a:t>MODELAGEM DE BANCO DE DADOS RELACIONAL</a:t>
+            </a:r>
+            <a:endParaRPr lang="pt-BR" sz="2700" dirty="0"/>
+          </a:p>
+        </p:txBody>
+      </p:sp>
+      <p:sp>
+        <p:nvSpPr>
+          <p:cNvPr id="3" name="Espaço Reservado para Conteúdo 2">
+            <a:extLst>
+              <a:ext uri="{FF2B5EF4-FFF2-40B4-BE49-F238E27FC236}">
+                <a16:creationId xmlns:a16="http://schemas.microsoft.com/office/drawing/2014/main" id="{59758A1E-514F-AFAC-13D2-56BDC5AADB96}"/>
+              </a:ext>
+            </a:extLst>
+          </p:cNvPr>
+          <p:cNvSpPr>
+            <a:spLocks noGrp="1"/>
+          </p:cNvSpPr>
+          <p:nvPr>
+            <p:ph idx="1"/>
+          </p:nvPr>
+        </p:nvSpPr>
+        <p:spPr>
+          <a:xfrm>
+            <a:off x="1097279" y="1923026"/>
+            <a:ext cx="10058399" cy="4384468"/>
+          </a:xfrm>
+          <a:ln>
+            <a:solidFill>
+              <a:schemeClr val="bg1"/>
+            </a:solidFill>
+          </a:ln>
+        </p:spPr>
+        <p:style>
+          <a:lnRef idx="2">
+            <a:schemeClr val="dk1"/>
+          </a:lnRef>
+          <a:fillRef idx="1">
+            <a:schemeClr val="lt1"/>
+          </a:fillRef>
+          <a:effectRef idx="0">
+            <a:schemeClr val="dk1"/>
+          </a:effectRef>
+          <a:fontRef idx="minor">
+            <a:schemeClr val="dk1"/>
+          </a:fontRef>
+        </p:style>
+        <p:txBody>
+          <a:bodyPr>
+            <a:normAutofit/>
+          </a:bodyPr>
+          <a:lstStyle/>
+          <a:p>
+            <a:pPr marL="0" indent="0">
+              <a:buNone/>
+            </a:pPr>
+            <a:r>
+              <a:rPr lang="pt-BR" sz="2400" dirty="0"/>
+              <a:t>A </a:t>
+            </a:r>
+            <a:r>
+              <a:rPr lang="pt-BR" sz="2400" b="1" dirty="0"/>
+              <a:t>integridade</a:t>
+            </a:r>
+            <a:r>
+              <a:rPr lang="pt-BR" sz="2400" dirty="0"/>
+              <a:t> de um banco de dados significa que os dados devem ser consistentes.</a:t>
+            </a:r>
+          </a:p>
+          <a:p>
+            <a:pPr marL="0" indent="0">
+              <a:buNone/>
+            </a:pPr>
+            <a:r>
+              <a:rPr lang="pt-BR" sz="2400" dirty="0"/>
+              <a:t>Dentre as diferentes representação de um modelo de banco de dados relacionais, encontramos:</a:t>
+            </a:r>
+          </a:p>
+          <a:p>
+            <a:pPr>
+              <a:buFont typeface="Wingdings" panose="05000000000000000000" pitchFamily="2" charset="2"/>
+              <a:buChar char="Ø"/>
+            </a:pPr>
+            <a:r>
+              <a:rPr lang="pt-BR" sz="2400" dirty="0"/>
+              <a:t> O </a:t>
+            </a:r>
+            <a:r>
+              <a:rPr lang="pt-BR" sz="2400" b="1" dirty="0"/>
+              <a:t>esquema textual</a:t>
+            </a:r>
+            <a:r>
+              <a:rPr lang="pt-BR" sz="2400" dirty="0"/>
+              <a:t> de banco de dados relacional;</a:t>
+            </a:r>
+          </a:p>
+          <a:p>
+            <a:pPr>
+              <a:buFont typeface="Wingdings" panose="05000000000000000000" pitchFamily="2" charset="2"/>
+              <a:buChar char="Ø"/>
+            </a:pPr>
+            <a:r>
+              <a:rPr lang="pt-BR" sz="2400" dirty="0"/>
+              <a:t> O esquema diagramático de banco de dados relacional.</a:t>
+            </a:r>
+          </a:p>
+          <a:p>
+            <a:pPr marL="0" indent="0">
+              <a:buNone/>
+            </a:pPr>
+            <a:r>
+              <a:rPr lang="pt-BR" sz="2400" dirty="0"/>
+              <a:t>O esquema textual é útil para exemplos.</a:t>
+            </a:r>
+          </a:p>
+          <a:p>
+            <a:pPr marL="0" indent="0">
+              <a:buNone/>
+            </a:pPr>
+            <a:r>
+              <a:rPr lang="pt-BR" sz="2400" dirty="0"/>
+              <a:t>A </a:t>
+            </a:r>
+            <a:r>
+              <a:rPr lang="pt-BR" sz="2400" b="1" dirty="0"/>
+              <a:t>representação diagramática  </a:t>
+            </a:r>
+            <a:r>
+              <a:rPr lang="pt-BR" sz="2400" dirty="0"/>
+              <a:t>é composta por retângulos que simbolizam as tabelas e apresentam os atributos ou colunas que representam as tabelas.</a:t>
+            </a:r>
+          </a:p>
+        </p:txBody>
+      </p:sp>
+    </p:spTree>
+    <p:extLst>
+      <p:ext uri="{BB962C8B-B14F-4D97-AF65-F5344CB8AC3E}">
+        <p14:creationId xmlns:p14="http://schemas.microsoft.com/office/powerpoint/2010/main" val="3348335875"/>
+      </p:ext>
+    </p:extLst>
+  </p:cSld>
+  <p:clrMapOvr>
+    <a:masterClrMapping/>
+  </p:clrMapOvr>
+</p:sld>
+</file>
+
+<file path=ppt/slides/slide53.xml><?xml version="1.0" encoding="utf-8"?>
+<p:sld xmlns:a="http://schemas.openxmlformats.org/drawingml/2006/main" xmlns:r="http://schemas.openxmlformats.org/officeDocument/2006/relationships" xmlns:p="http://schemas.openxmlformats.org/presentationml/2006/main">
+  <p:cSld>
+    <p:spTree>
+      <p:nvGrpSpPr>
+        <p:cNvPr id="1" name=""/>
+        <p:cNvGrpSpPr/>
+        <p:nvPr/>
+      </p:nvGrpSpPr>
+      <p:grpSpPr>
+        <a:xfrm>
+          <a:off x="0" y="0"/>
+          <a:ext cx="0" cy="0"/>
+          <a:chOff x="0" y="0"/>
+          <a:chExt cx="0" cy="0"/>
+        </a:xfrm>
+      </p:grpSpPr>
+      <p:sp>
+        <p:nvSpPr>
+          <p:cNvPr id="2" name="Título 1">
+            <a:extLst>
+              <a:ext uri="{FF2B5EF4-FFF2-40B4-BE49-F238E27FC236}">
+                <a16:creationId xmlns:a16="http://schemas.microsoft.com/office/drawing/2014/main" id="{CC7C5B47-35D0-CBC5-39AF-B5F44B677392}"/>
+              </a:ext>
+            </a:extLst>
+          </p:cNvPr>
+          <p:cNvSpPr>
+            <a:spLocks noGrp="1"/>
+          </p:cNvSpPr>
+          <p:nvPr>
+            <p:ph type="title"/>
+          </p:nvPr>
+        </p:nvSpPr>
+        <p:spPr/>
+        <p:txBody>
+          <a:bodyPr>
+            <a:normAutofit/>
+          </a:bodyPr>
+          <a:lstStyle/>
+          <a:p>
+            <a:r>
+              <a:rPr lang="pt-BR" sz="4400" b="1" dirty="0"/>
+              <a:t>MODELAGEM DE BANCO DE DADOS RELACIONAL</a:t>
+            </a:r>
+            <a:endParaRPr lang="pt-BR" sz="2700" dirty="0"/>
+          </a:p>
+        </p:txBody>
+      </p:sp>
+      <p:sp>
+        <p:nvSpPr>
+          <p:cNvPr id="3" name="Espaço Reservado para Conteúdo 2">
+            <a:extLst>
+              <a:ext uri="{FF2B5EF4-FFF2-40B4-BE49-F238E27FC236}">
+                <a16:creationId xmlns:a16="http://schemas.microsoft.com/office/drawing/2014/main" id="{59758A1E-514F-AFAC-13D2-56BDC5AADB96}"/>
+              </a:ext>
+            </a:extLst>
+          </p:cNvPr>
+          <p:cNvSpPr>
+            <a:spLocks noGrp="1"/>
+          </p:cNvSpPr>
+          <p:nvPr>
+            <p:ph idx="1"/>
+          </p:nvPr>
+        </p:nvSpPr>
+        <p:spPr>
+          <a:xfrm>
+            <a:off x="1097279" y="1923026"/>
+            <a:ext cx="10058399" cy="4384468"/>
+          </a:xfrm>
+          <a:ln>
+            <a:solidFill>
+              <a:schemeClr val="bg1"/>
+            </a:solidFill>
+          </a:ln>
+        </p:spPr>
+        <p:style>
+          <a:lnRef idx="2">
+            <a:schemeClr val="dk1"/>
+          </a:lnRef>
+          <a:fillRef idx="1">
+            <a:schemeClr val="lt1"/>
+          </a:fillRef>
+          <a:effectRef idx="0">
+            <a:schemeClr val="dk1"/>
+          </a:effectRef>
+          <a:fontRef idx="minor">
+            <a:schemeClr val="dk1"/>
+          </a:fontRef>
+        </p:style>
+        <p:txBody>
+          <a:bodyPr>
+            <a:normAutofit/>
+          </a:bodyPr>
+          <a:lstStyle/>
+          <a:p>
+            <a:pPr marL="0" indent="0">
+              <a:buNone/>
+            </a:pPr>
+            <a:r>
+              <a:rPr lang="pt-BR" sz="2400" dirty="0"/>
+              <a:t>Com base nesse esquema, é possível transformar um </a:t>
+            </a:r>
+            <a:r>
+              <a:rPr lang="pt-BR" sz="2400" b="1" dirty="0"/>
+              <a:t>modelo relacional </a:t>
+            </a:r>
+            <a:r>
+              <a:rPr lang="pt-BR" sz="2400" dirty="0"/>
+              <a:t>em </a:t>
+            </a:r>
+            <a:r>
+              <a:rPr lang="pt-BR" sz="2400" b="1" dirty="0"/>
+              <a:t>modelo lógico</a:t>
+            </a:r>
+            <a:r>
+              <a:rPr lang="pt-BR" sz="2400" dirty="0"/>
+              <a:t>. </a:t>
+            </a:r>
+          </a:p>
+          <a:p>
+            <a:pPr marL="0" indent="0">
+              <a:buNone/>
+            </a:pPr>
+            <a:r>
+              <a:rPr lang="pt-BR" sz="2400" dirty="0"/>
+              <a:t>Por exemplo, ao criar uma tabela, a representação textual deve ser TB_EMPREGADO(</a:t>
+            </a:r>
+            <a:r>
+              <a:rPr lang="pt-BR" sz="2400" dirty="0" err="1"/>
+              <a:t>id_empregado</a:t>
+            </a:r>
+            <a:r>
+              <a:rPr lang="pt-BR" sz="2400" dirty="0"/>
+              <a:t>, nome, </a:t>
+            </a:r>
+            <a:r>
+              <a:rPr lang="pt-BR" sz="2400" dirty="0" err="1"/>
+              <a:t>cod_depto</a:t>
+            </a:r>
+            <a:r>
+              <a:rPr lang="pt-BR" sz="2400" dirty="0"/>
+              <a:t>, </a:t>
+            </a:r>
+            <a:r>
+              <a:rPr lang="pt-BR" sz="2400" dirty="0" err="1"/>
+              <a:t>cpf</a:t>
+            </a:r>
+            <a:r>
+              <a:rPr lang="pt-BR" sz="2400" dirty="0"/>
+              <a:t>).</a:t>
+            </a:r>
+          </a:p>
+          <a:p>
+            <a:pPr marL="0" indent="0">
+              <a:buNone/>
+            </a:pPr>
+            <a:r>
+              <a:rPr lang="pt-BR" sz="2400" dirty="0"/>
+              <a:t>Para essa tabela, podemos definir o campo CPF como chave primária; é um atributo que não repetirá.</a:t>
+            </a:r>
+          </a:p>
+        </p:txBody>
+      </p:sp>
+      <p:graphicFrame>
+        <p:nvGraphicFramePr>
+          <p:cNvPr id="4" name="Tabela 3">
+            <a:extLst>
+              <a:ext uri="{FF2B5EF4-FFF2-40B4-BE49-F238E27FC236}">
+                <a16:creationId xmlns:a16="http://schemas.microsoft.com/office/drawing/2014/main" id="{664028F6-E0CC-DC2C-BC41-809C3948573D}"/>
+              </a:ext>
+            </a:extLst>
+          </p:cNvPr>
+          <p:cNvGraphicFramePr>
+            <a:graphicFrameLocks noGrp="1"/>
+          </p:cNvGraphicFramePr>
+          <p:nvPr>
+            <p:extLst>
+              <p:ext uri="{D42A27DB-BD31-4B8C-83A1-F6EECF244321}">
+                <p14:modId xmlns:p14="http://schemas.microsoft.com/office/powerpoint/2010/main" val="3927291561"/>
+              </p:ext>
+            </p:extLst>
+          </p:nvPr>
+        </p:nvGraphicFramePr>
+        <p:xfrm>
+          <a:off x="1097279" y="4453294"/>
+          <a:ext cx="5841404" cy="1854200"/>
+        </p:xfrm>
+        <a:graphic>
+          <a:graphicData uri="http://schemas.openxmlformats.org/drawingml/2006/table">
+            <a:tbl>
+              <a:tblPr firstRow="1" bandRow="1">
+                <a:tableStyleId>{2D5ABB26-0587-4C30-8999-92F81FD0307C}</a:tableStyleId>
+              </a:tblPr>
+              <a:tblGrid>
+                <a:gridCol w="1735568">
+                  <a:extLst>
+                    <a:ext uri="{9D8B030D-6E8A-4147-A177-3AD203B41FA5}">
+                      <a16:colId xmlns:a16="http://schemas.microsoft.com/office/drawing/2014/main" val="639222513"/>
+                    </a:ext>
+                  </a:extLst>
+                </a:gridCol>
+                <a:gridCol w="968188">
+                  <a:extLst>
+                    <a:ext uri="{9D8B030D-6E8A-4147-A177-3AD203B41FA5}">
+                      <a16:colId xmlns:a16="http://schemas.microsoft.com/office/drawing/2014/main" val="885486051"/>
+                    </a:ext>
+                  </a:extLst>
+                </a:gridCol>
+                <a:gridCol w="1380565">
+                  <a:extLst>
+                    <a:ext uri="{9D8B030D-6E8A-4147-A177-3AD203B41FA5}">
+                      <a16:colId xmlns:a16="http://schemas.microsoft.com/office/drawing/2014/main" val="3563096703"/>
+                    </a:ext>
+                  </a:extLst>
+                </a:gridCol>
+                <a:gridCol w="1757083">
+                  <a:extLst>
+                    <a:ext uri="{9D8B030D-6E8A-4147-A177-3AD203B41FA5}">
+                      <a16:colId xmlns:a16="http://schemas.microsoft.com/office/drawing/2014/main" val="500366731"/>
+                    </a:ext>
+                  </a:extLst>
+                </a:gridCol>
+              </a:tblGrid>
+              <a:tr h="370840">
+                <a:tc>
+                  <a:txBody>
+                    <a:bodyPr/>
+                    <a:lstStyle/>
+                    <a:p>
+                      <a:pPr algn="ctr"/>
+                      <a:r>
+                        <a:rPr lang="pt-BR" dirty="0"/>
+                        <a:t>ID_EMPREGADO</a:t>
+                      </a:r>
+                    </a:p>
+                  </a:txBody>
+                  <a:tcPr>
+                    <a:lnL w="12700" cap="flat" cmpd="sng" algn="ctr">
+                      <a:solidFill>
+                        <a:schemeClr val="tx1"/>
+                      </a:solidFill>
+                      <a:prstDash val="solid"/>
+                      <a:round/>
+                      <a:headEnd type="none" w="med" len="med"/>
+                      <a:tailEnd type="none" w="med" len="med"/>
+                    </a:lnL>
+                    <a:lnR w="12700" cap="flat" cmpd="sng" algn="ctr">
+                      <a:solidFill>
+                        <a:schemeClr val="tx1"/>
+                      </a:solidFill>
+                      <a:prstDash val="solid"/>
+                      <a:round/>
+                      <a:headEnd type="none" w="med" len="med"/>
+                      <a:tailEnd type="none" w="med" len="med"/>
+                    </a:lnR>
+                    <a:lnT w="12700" cap="flat" cmpd="sng" algn="ctr">
+                      <a:solidFill>
+                        <a:schemeClr val="tx1"/>
+                      </a:solidFill>
+                      <a:prstDash val="solid"/>
+                      <a:round/>
+                      <a:headEnd type="none" w="med" len="med"/>
+                      <a:tailEnd type="none" w="med" len="med"/>
+                    </a:lnT>
+                    <a:lnB w="12700" cap="flat" cmpd="sng" algn="ctr">
+                      <a:solidFill>
+                        <a:schemeClr val="tx1"/>
+                      </a:solidFill>
+                      <a:prstDash val="solid"/>
+                      <a:round/>
+                      <a:headEnd type="none" w="med" len="med"/>
+                      <a:tailEnd type="none" w="med" len="med"/>
+                    </a:lnB>
+                  </a:tcPr>
+                </a:tc>
+                <a:tc>
+                  <a:txBody>
+                    <a:bodyPr/>
+                    <a:lstStyle/>
+                    <a:p>
+                      <a:r>
+                        <a:rPr lang="pt-BR" dirty="0"/>
+                        <a:t>NOME</a:t>
+                      </a:r>
+                    </a:p>
+                  </a:txBody>
+                  <a:tcPr>
+                    <a:lnL w="12700" cap="flat" cmpd="sng" algn="ctr">
+                      <a:solidFill>
+                        <a:schemeClr val="tx1"/>
+                      </a:solidFill>
+                      <a:prstDash val="solid"/>
+                      <a:round/>
+                      <a:headEnd type="none" w="med" len="med"/>
+                      <a:tailEnd type="none" w="med" len="med"/>
+                    </a:lnL>
+                    <a:lnR w="12700" cap="flat" cmpd="sng" algn="ctr">
+                      <a:solidFill>
+                        <a:schemeClr val="tx1"/>
+                      </a:solidFill>
+                      <a:prstDash val="solid"/>
+                      <a:round/>
+                      <a:headEnd type="none" w="med" len="med"/>
+                      <a:tailEnd type="none" w="med" len="med"/>
+                    </a:lnR>
+                    <a:lnT w="12700" cap="flat" cmpd="sng" algn="ctr">
+                      <a:solidFill>
+                        <a:schemeClr val="tx1"/>
+                      </a:solidFill>
+                      <a:prstDash val="solid"/>
+                      <a:round/>
+                      <a:headEnd type="none" w="med" len="med"/>
+                      <a:tailEnd type="none" w="med" len="med"/>
+                    </a:lnT>
+                    <a:lnB w="12700" cap="flat" cmpd="sng" algn="ctr">
+                      <a:solidFill>
+                        <a:schemeClr val="tx1"/>
+                      </a:solidFill>
+                      <a:prstDash val="solid"/>
+                      <a:round/>
+                      <a:headEnd type="none" w="med" len="med"/>
+                      <a:tailEnd type="none" w="med" len="med"/>
+                    </a:lnB>
+                  </a:tcPr>
+                </a:tc>
+                <a:tc>
+                  <a:txBody>
+                    <a:bodyPr/>
+                    <a:lstStyle/>
+                    <a:p>
+                      <a:pPr algn="ctr"/>
+                      <a:r>
+                        <a:rPr lang="pt-BR" dirty="0"/>
+                        <a:t>COD_DEPTO</a:t>
+                      </a:r>
+                    </a:p>
+                  </a:txBody>
+                  <a:tcPr>
+                    <a:lnL w="12700" cap="flat" cmpd="sng" algn="ctr">
+                      <a:solidFill>
+                        <a:schemeClr val="tx1"/>
+                      </a:solidFill>
+                      <a:prstDash val="solid"/>
+                      <a:round/>
+                      <a:headEnd type="none" w="med" len="med"/>
+                      <a:tailEnd type="none" w="med" len="med"/>
+                    </a:lnL>
+                    <a:lnR w="12700" cap="flat" cmpd="sng" algn="ctr">
+                      <a:solidFill>
+                        <a:schemeClr val="tx1"/>
+                      </a:solidFill>
+                      <a:prstDash val="solid"/>
+                      <a:round/>
+                      <a:headEnd type="none" w="med" len="med"/>
+                      <a:tailEnd type="none" w="med" len="med"/>
+                    </a:lnR>
+                    <a:lnT w="12700" cap="flat" cmpd="sng" algn="ctr">
+                      <a:solidFill>
+                        <a:schemeClr val="tx1"/>
+                      </a:solidFill>
+                      <a:prstDash val="solid"/>
+                      <a:round/>
+                      <a:headEnd type="none" w="med" len="med"/>
+                      <a:tailEnd type="none" w="med" len="med"/>
+                    </a:lnT>
+                    <a:lnB w="12700" cap="flat" cmpd="sng" algn="ctr">
+                      <a:solidFill>
+                        <a:schemeClr val="tx1"/>
+                      </a:solidFill>
+                      <a:prstDash val="solid"/>
+                      <a:round/>
+                      <a:headEnd type="none" w="med" len="med"/>
+                      <a:tailEnd type="none" w="med" len="med"/>
+                    </a:lnB>
+                  </a:tcPr>
+                </a:tc>
+                <a:tc>
+                  <a:txBody>
+                    <a:bodyPr/>
+                    <a:lstStyle/>
+                    <a:p>
+                      <a:r>
+                        <a:rPr lang="pt-BR" dirty="0"/>
+                        <a:t>CPF</a:t>
+                      </a:r>
+                    </a:p>
+                  </a:txBody>
+                  <a:tcPr>
+                    <a:lnL w="12700" cap="flat" cmpd="sng" algn="ctr">
+                      <a:solidFill>
+                        <a:schemeClr val="tx1"/>
+                      </a:solidFill>
+                      <a:prstDash val="solid"/>
+                      <a:round/>
+                      <a:headEnd type="none" w="med" len="med"/>
+                      <a:tailEnd type="none" w="med" len="med"/>
+                    </a:lnL>
+                    <a:lnR w="12700" cap="flat" cmpd="sng" algn="ctr">
+                      <a:solidFill>
+                        <a:schemeClr val="tx1"/>
+                      </a:solidFill>
+                      <a:prstDash val="solid"/>
+                      <a:round/>
+                      <a:headEnd type="none" w="med" len="med"/>
+                      <a:tailEnd type="none" w="med" len="med"/>
+                    </a:lnR>
+                    <a:lnT w="12700" cap="flat" cmpd="sng" algn="ctr">
+                      <a:solidFill>
+                        <a:schemeClr val="tx1"/>
+                      </a:solidFill>
+                      <a:prstDash val="solid"/>
+                      <a:round/>
+                      <a:headEnd type="none" w="med" len="med"/>
+                      <a:tailEnd type="none" w="med" len="med"/>
+                    </a:lnT>
+                    <a:lnB w="12700" cap="flat" cmpd="sng" algn="ctr">
+                      <a:solidFill>
+                        <a:schemeClr val="tx1"/>
+                      </a:solidFill>
+                      <a:prstDash val="solid"/>
+                      <a:round/>
+                      <a:headEnd type="none" w="med" len="med"/>
+                      <a:tailEnd type="none" w="med" len="med"/>
+                    </a:lnB>
+                  </a:tcPr>
+                </a:tc>
+                <a:extLst>
+                  <a:ext uri="{0D108BD9-81ED-4DB2-BD59-A6C34878D82A}">
+                    <a16:rowId xmlns:a16="http://schemas.microsoft.com/office/drawing/2014/main" val="3741624859"/>
+                  </a:ext>
+                </a:extLst>
+              </a:tr>
+              <a:tr h="370840">
+                <a:tc>
+                  <a:txBody>
+                    <a:bodyPr/>
+                    <a:lstStyle/>
+                    <a:p>
+                      <a:pPr algn="ctr"/>
+                      <a:r>
+                        <a:rPr lang="pt-BR" dirty="0"/>
+                        <a:t>1</a:t>
+                      </a:r>
+                    </a:p>
+                  </a:txBody>
+                  <a:tcPr>
+                    <a:lnL w="12700" cap="flat" cmpd="sng" algn="ctr">
+                      <a:solidFill>
+                        <a:schemeClr val="tx1"/>
+                      </a:solidFill>
+                      <a:prstDash val="solid"/>
+                      <a:round/>
+                      <a:headEnd type="none" w="med" len="med"/>
+                      <a:tailEnd type="none" w="med" len="med"/>
+                    </a:lnL>
+                    <a:lnR w="12700" cap="flat" cmpd="sng" algn="ctr">
+                      <a:solidFill>
+                        <a:schemeClr val="tx1"/>
+                      </a:solidFill>
+                      <a:prstDash val="solid"/>
+                      <a:round/>
+                      <a:headEnd type="none" w="med" len="med"/>
+                      <a:tailEnd type="none" w="med" len="med"/>
+                    </a:lnR>
+                    <a:lnT w="12700" cap="flat" cmpd="sng" algn="ctr">
+                      <a:solidFill>
+                        <a:schemeClr val="tx1"/>
+                      </a:solidFill>
+                      <a:prstDash val="solid"/>
+                      <a:round/>
+                      <a:headEnd type="none" w="med" len="med"/>
+                      <a:tailEnd type="none" w="med" len="med"/>
+                    </a:lnT>
+                    <a:lnB w="12700" cap="flat" cmpd="sng" algn="ctr">
+                      <a:solidFill>
+                        <a:schemeClr val="tx1"/>
+                      </a:solidFill>
+                      <a:prstDash val="solid"/>
+                      <a:round/>
+                      <a:headEnd type="none" w="med" len="med"/>
+                      <a:tailEnd type="none" w="med" len="med"/>
+                    </a:lnB>
+                  </a:tcPr>
+                </a:tc>
+                <a:tc>
+                  <a:txBody>
+                    <a:bodyPr/>
+                    <a:lstStyle/>
+                    <a:p>
+                      <a:r>
+                        <a:rPr lang="pt-BR" dirty="0"/>
+                        <a:t>YURI</a:t>
+                      </a:r>
+                    </a:p>
+                  </a:txBody>
+                  <a:tcPr>
+                    <a:lnL w="12700" cap="flat" cmpd="sng" algn="ctr">
+                      <a:solidFill>
+                        <a:schemeClr val="tx1"/>
+                      </a:solidFill>
+                      <a:prstDash val="solid"/>
+                      <a:round/>
+                      <a:headEnd type="none" w="med" len="med"/>
+                      <a:tailEnd type="none" w="med" len="med"/>
+                    </a:lnL>
+                    <a:lnR w="12700" cap="flat" cmpd="sng" algn="ctr">
+                      <a:solidFill>
+                        <a:schemeClr val="tx1"/>
+                      </a:solidFill>
+                      <a:prstDash val="solid"/>
+                      <a:round/>
+                      <a:headEnd type="none" w="med" len="med"/>
+                      <a:tailEnd type="none" w="med" len="med"/>
+                    </a:lnR>
+                    <a:lnT w="12700" cap="flat" cmpd="sng" algn="ctr">
+                      <a:solidFill>
+                        <a:schemeClr val="tx1"/>
+                      </a:solidFill>
+                      <a:prstDash val="solid"/>
+                      <a:round/>
+                      <a:headEnd type="none" w="med" len="med"/>
+                      <a:tailEnd type="none" w="med" len="med"/>
+                    </a:lnT>
+                    <a:lnB w="12700" cap="flat" cmpd="sng" algn="ctr">
+                      <a:solidFill>
+                        <a:schemeClr val="tx1"/>
+                      </a:solidFill>
+                      <a:prstDash val="solid"/>
+                      <a:round/>
+                      <a:headEnd type="none" w="med" len="med"/>
+                      <a:tailEnd type="none" w="med" len="med"/>
+                    </a:lnB>
+                  </a:tcPr>
+                </a:tc>
+                <a:tc>
+                  <a:txBody>
+                    <a:bodyPr/>
+                    <a:lstStyle/>
+                    <a:p>
+                      <a:pPr algn="ctr"/>
+                      <a:r>
+                        <a:rPr lang="pt-BR" dirty="0"/>
+                        <a:t>1</a:t>
+                      </a:r>
+                    </a:p>
+                  </a:txBody>
+                  <a:tcPr>
+                    <a:lnL w="12700" cap="flat" cmpd="sng" algn="ctr">
+                      <a:solidFill>
+                        <a:schemeClr val="tx1"/>
+                      </a:solidFill>
+                      <a:prstDash val="solid"/>
+                      <a:round/>
+                      <a:headEnd type="none" w="med" len="med"/>
+                      <a:tailEnd type="none" w="med" len="med"/>
+                    </a:lnL>
+                    <a:lnR w="12700" cap="flat" cmpd="sng" algn="ctr">
+                      <a:solidFill>
+                        <a:schemeClr val="tx1"/>
+                      </a:solidFill>
+                      <a:prstDash val="solid"/>
+                      <a:round/>
+                      <a:headEnd type="none" w="med" len="med"/>
+                      <a:tailEnd type="none" w="med" len="med"/>
+                    </a:lnR>
+                    <a:lnT w="12700" cap="flat" cmpd="sng" algn="ctr">
+                      <a:solidFill>
+                        <a:schemeClr val="tx1"/>
+                      </a:solidFill>
+                      <a:prstDash val="solid"/>
+                      <a:round/>
+                      <a:headEnd type="none" w="med" len="med"/>
+                      <a:tailEnd type="none" w="med" len="med"/>
+                    </a:lnT>
+                    <a:lnB w="12700" cap="flat" cmpd="sng" algn="ctr">
+                      <a:solidFill>
+                        <a:schemeClr val="tx1"/>
+                      </a:solidFill>
+                      <a:prstDash val="solid"/>
+                      <a:round/>
+                      <a:headEnd type="none" w="med" len="med"/>
+                      <a:tailEnd type="none" w="med" len="med"/>
+                    </a:lnB>
+                  </a:tcPr>
+                </a:tc>
+                <a:tc>
+                  <a:txBody>
+                    <a:bodyPr/>
+                    <a:lstStyle/>
+                    <a:p>
+                      <a:r>
+                        <a:rPr lang="pt-BR" dirty="0"/>
+                        <a:t>XXX.XXX.XXX-X1</a:t>
+                      </a:r>
+                    </a:p>
+                  </a:txBody>
+                  <a:tcPr>
+                    <a:lnL w="12700" cap="flat" cmpd="sng" algn="ctr">
+                      <a:solidFill>
+                        <a:schemeClr val="tx1"/>
+                      </a:solidFill>
+                      <a:prstDash val="solid"/>
+                      <a:round/>
+                      <a:headEnd type="none" w="med" len="med"/>
+                      <a:tailEnd type="none" w="med" len="med"/>
+                    </a:lnL>
+                    <a:lnR w="12700" cap="flat" cmpd="sng" algn="ctr">
+                      <a:solidFill>
+                        <a:schemeClr val="tx1"/>
+                      </a:solidFill>
+                      <a:prstDash val="solid"/>
+                      <a:round/>
+                      <a:headEnd type="none" w="med" len="med"/>
+                      <a:tailEnd type="none" w="med" len="med"/>
+                    </a:lnR>
+                    <a:lnT w="12700" cap="flat" cmpd="sng" algn="ctr">
+                      <a:solidFill>
+                        <a:schemeClr val="tx1"/>
+                      </a:solidFill>
+                      <a:prstDash val="solid"/>
+                      <a:round/>
+                      <a:headEnd type="none" w="med" len="med"/>
+                      <a:tailEnd type="none" w="med" len="med"/>
+                    </a:lnT>
+                    <a:lnB w="12700" cap="flat" cmpd="sng" algn="ctr">
+                      <a:solidFill>
+                        <a:schemeClr val="tx1"/>
+                      </a:solidFill>
+                      <a:prstDash val="solid"/>
+                      <a:round/>
+                      <a:headEnd type="none" w="med" len="med"/>
+                      <a:tailEnd type="none" w="med" len="med"/>
+                    </a:lnB>
+                  </a:tcPr>
+                </a:tc>
+                <a:extLst>
+                  <a:ext uri="{0D108BD9-81ED-4DB2-BD59-A6C34878D82A}">
+                    <a16:rowId xmlns:a16="http://schemas.microsoft.com/office/drawing/2014/main" val="4002527758"/>
+                  </a:ext>
+                </a:extLst>
+              </a:tr>
+              <a:tr h="370840">
+                <a:tc>
+                  <a:txBody>
+                    <a:bodyPr/>
+                    <a:lstStyle/>
+                    <a:p>
+                      <a:pPr algn="ctr"/>
+                      <a:r>
+                        <a:rPr lang="pt-BR" dirty="0"/>
+                        <a:t>2</a:t>
+                      </a:r>
+                    </a:p>
+                  </a:txBody>
+                  <a:tcPr>
+                    <a:lnL w="12700" cap="flat" cmpd="sng" algn="ctr">
+                      <a:solidFill>
+                        <a:schemeClr val="tx1"/>
+                      </a:solidFill>
+                      <a:prstDash val="solid"/>
+                      <a:round/>
+                      <a:headEnd type="none" w="med" len="med"/>
+                      <a:tailEnd type="none" w="med" len="med"/>
+                    </a:lnL>
+                    <a:lnR w="12700" cap="flat" cmpd="sng" algn="ctr">
+                      <a:solidFill>
+                        <a:schemeClr val="tx1"/>
+                      </a:solidFill>
+                      <a:prstDash val="solid"/>
+                      <a:round/>
+                      <a:headEnd type="none" w="med" len="med"/>
+                      <a:tailEnd type="none" w="med" len="med"/>
+                    </a:lnR>
+                    <a:lnT w="12700" cap="flat" cmpd="sng" algn="ctr">
+                      <a:solidFill>
+                        <a:schemeClr val="tx1"/>
+                      </a:solidFill>
+                      <a:prstDash val="solid"/>
+                      <a:round/>
+                      <a:headEnd type="none" w="med" len="med"/>
+                      <a:tailEnd type="none" w="med" len="med"/>
+                    </a:lnT>
+                    <a:lnB w="12700" cap="flat" cmpd="sng" algn="ctr">
+                      <a:solidFill>
+                        <a:schemeClr val="tx1"/>
+                      </a:solidFill>
+                      <a:prstDash val="solid"/>
+                      <a:round/>
+                      <a:headEnd type="none" w="med" len="med"/>
+                      <a:tailEnd type="none" w="med" len="med"/>
+                    </a:lnB>
+                  </a:tcPr>
+                </a:tc>
+                <a:tc>
+                  <a:txBody>
+                    <a:bodyPr/>
+                    <a:lstStyle/>
+                    <a:p>
+                      <a:r>
+                        <a:rPr lang="pt-BR" dirty="0"/>
+                        <a:t>TAUMI</a:t>
+                      </a:r>
+                    </a:p>
+                  </a:txBody>
+                  <a:tcPr>
+                    <a:lnL w="12700" cap="flat" cmpd="sng" algn="ctr">
+                      <a:solidFill>
+                        <a:schemeClr val="tx1"/>
+                      </a:solidFill>
+                      <a:prstDash val="solid"/>
+                      <a:round/>
+                      <a:headEnd type="none" w="med" len="med"/>
+                      <a:tailEnd type="none" w="med" len="med"/>
+                    </a:lnL>
+                    <a:lnR w="12700" cap="flat" cmpd="sng" algn="ctr">
+                      <a:solidFill>
+                        <a:schemeClr val="tx1"/>
+                      </a:solidFill>
+                      <a:prstDash val="solid"/>
+                      <a:round/>
+                      <a:headEnd type="none" w="med" len="med"/>
+                      <a:tailEnd type="none" w="med" len="med"/>
+                    </a:lnR>
+                    <a:lnT w="12700" cap="flat" cmpd="sng" algn="ctr">
+                      <a:solidFill>
+                        <a:schemeClr val="tx1"/>
+                      </a:solidFill>
+                      <a:prstDash val="solid"/>
+                      <a:round/>
+                      <a:headEnd type="none" w="med" len="med"/>
+                      <a:tailEnd type="none" w="med" len="med"/>
+                    </a:lnT>
+                    <a:lnB w="12700" cap="flat" cmpd="sng" algn="ctr">
+                      <a:solidFill>
+                        <a:schemeClr val="tx1"/>
+                      </a:solidFill>
+                      <a:prstDash val="solid"/>
+                      <a:round/>
+                      <a:headEnd type="none" w="med" len="med"/>
+                      <a:tailEnd type="none" w="med" len="med"/>
+                    </a:lnB>
+                  </a:tcPr>
+                </a:tc>
+                <a:tc>
+                  <a:txBody>
+                    <a:bodyPr/>
+                    <a:lstStyle/>
+                    <a:p>
+                      <a:pPr algn="ctr"/>
+                      <a:r>
+                        <a:rPr lang="pt-BR" dirty="0"/>
+                        <a:t>2</a:t>
+                      </a:r>
+                    </a:p>
+                  </a:txBody>
+                  <a:tcPr>
+                    <a:lnL w="12700" cap="flat" cmpd="sng" algn="ctr">
+                      <a:solidFill>
+                        <a:schemeClr val="tx1"/>
+                      </a:solidFill>
+                      <a:prstDash val="solid"/>
+                      <a:round/>
+                      <a:headEnd type="none" w="med" len="med"/>
+                      <a:tailEnd type="none" w="med" len="med"/>
+                    </a:lnL>
+                    <a:lnR w="12700" cap="flat" cmpd="sng" algn="ctr">
+                      <a:solidFill>
+                        <a:schemeClr val="tx1"/>
+                      </a:solidFill>
+                      <a:prstDash val="solid"/>
+                      <a:round/>
+                      <a:headEnd type="none" w="med" len="med"/>
+                      <a:tailEnd type="none" w="med" len="med"/>
+                    </a:lnR>
+                    <a:lnT w="12700" cap="flat" cmpd="sng" algn="ctr">
+                      <a:solidFill>
+                        <a:schemeClr val="tx1"/>
+                      </a:solidFill>
+                      <a:prstDash val="solid"/>
+                      <a:round/>
+                      <a:headEnd type="none" w="med" len="med"/>
+                      <a:tailEnd type="none" w="med" len="med"/>
+                    </a:lnT>
+                    <a:lnB w="12700" cap="flat" cmpd="sng" algn="ctr">
+                      <a:solidFill>
+                        <a:schemeClr val="tx1"/>
+                      </a:solidFill>
+                      <a:prstDash val="solid"/>
+                      <a:round/>
+                      <a:headEnd type="none" w="med" len="med"/>
+                      <a:tailEnd type="none" w="med" len="med"/>
+                    </a:lnB>
+                  </a:tcPr>
+                </a:tc>
+                <a:tc>
+                  <a:txBody>
+                    <a:bodyPr/>
+                    <a:lstStyle/>
+                    <a:p>
+                      <a:r>
+                        <a:rPr lang="pt-BR" dirty="0"/>
+                        <a:t>XXX.XXX.XXX-X2</a:t>
+                      </a:r>
+                    </a:p>
+                  </a:txBody>
+                  <a:tcPr>
+                    <a:lnL w="12700" cap="flat" cmpd="sng" algn="ctr">
+                      <a:solidFill>
+                        <a:schemeClr val="tx1"/>
+                      </a:solidFill>
+                      <a:prstDash val="solid"/>
+                      <a:round/>
+                      <a:headEnd type="none" w="med" len="med"/>
+                      <a:tailEnd type="none" w="med" len="med"/>
+                    </a:lnL>
+                    <a:lnR w="12700" cap="flat" cmpd="sng" algn="ctr">
+                      <a:solidFill>
+                        <a:schemeClr val="tx1"/>
+                      </a:solidFill>
+                      <a:prstDash val="solid"/>
+                      <a:round/>
+                      <a:headEnd type="none" w="med" len="med"/>
+                      <a:tailEnd type="none" w="med" len="med"/>
+                    </a:lnR>
+                    <a:lnT w="12700" cap="flat" cmpd="sng" algn="ctr">
+                      <a:solidFill>
+                        <a:schemeClr val="tx1"/>
+                      </a:solidFill>
+                      <a:prstDash val="solid"/>
+                      <a:round/>
+                      <a:headEnd type="none" w="med" len="med"/>
+                      <a:tailEnd type="none" w="med" len="med"/>
+                    </a:lnT>
+                    <a:lnB w="12700" cap="flat" cmpd="sng" algn="ctr">
+                      <a:solidFill>
+                        <a:schemeClr val="tx1"/>
+                      </a:solidFill>
+                      <a:prstDash val="solid"/>
+                      <a:round/>
+                      <a:headEnd type="none" w="med" len="med"/>
+                      <a:tailEnd type="none" w="med" len="med"/>
+                    </a:lnB>
+                  </a:tcPr>
+                </a:tc>
+                <a:extLst>
+                  <a:ext uri="{0D108BD9-81ED-4DB2-BD59-A6C34878D82A}">
+                    <a16:rowId xmlns:a16="http://schemas.microsoft.com/office/drawing/2014/main" val="2413718252"/>
+                  </a:ext>
+                </a:extLst>
+              </a:tr>
+              <a:tr h="370840">
+                <a:tc>
+                  <a:txBody>
+                    <a:bodyPr/>
+                    <a:lstStyle/>
+                    <a:p>
+                      <a:pPr algn="ctr"/>
+                      <a:r>
+                        <a:rPr lang="pt-BR" dirty="0"/>
+                        <a:t>2</a:t>
+                      </a:r>
+                    </a:p>
+                  </a:txBody>
+                  <a:tcPr>
+                    <a:lnL w="12700" cap="flat" cmpd="sng" algn="ctr">
+                      <a:solidFill>
+                        <a:schemeClr val="tx1"/>
+                      </a:solidFill>
+                      <a:prstDash val="solid"/>
+                      <a:round/>
+                      <a:headEnd type="none" w="med" len="med"/>
+                      <a:tailEnd type="none" w="med" len="med"/>
+                    </a:lnL>
+                    <a:lnR w="12700" cap="flat" cmpd="sng" algn="ctr">
+                      <a:solidFill>
+                        <a:schemeClr val="tx1"/>
+                      </a:solidFill>
+                      <a:prstDash val="solid"/>
+                      <a:round/>
+                      <a:headEnd type="none" w="med" len="med"/>
+                      <a:tailEnd type="none" w="med" len="med"/>
+                    </a:lnR>
+                    <a:lnT w="12700" cap="flat" cmpd="sng" algn="ctr">
+                      <a:solidFill>
+                        <a:schemeClr val="tx1"/>
+                      </a:solidFill>
+                      <a:prstDash val="solid"/>
+                      <a:round/>
+                      <a:headEnd type="none" w="med" len="med"/>
+                      <a:tailEnd type="none" w="med" len="med"/>
+                    </a:lnT>
+                    <a:lnB w="12700" cap="flat" cmpd="sng" algn="ctr">
+                      <a:solidFill>
+                        <a:schemeClr val="tx1"/>
+                      </a:solidFill>
+                      <a:prstDash val="solid"/>
+                      <a:round/>
+                      <a:headEnd type="none" w="med" len="med"/>
+                      <a:tailEnd type="none" w="med" len="med"/>
+                    </a:lnB>
+                  </a:tcPr>
+                </a:tc>
+                <a:tc>
+                  <a:txBody>
+                    <a:bodyPr/>
+                    <a:lstStyle/>
+                    <a:p>
+                      <a:r>
+                        <a:rPr lang="pt-BR" dirty="0"/>
+                        <a:t>DANIEL</a:t>
+                      </a:r>
+                    </a:p>
+                  </a:txBody>
+                  <a:tcPr>
+                    <a:lnL w="12700" cap="flat" cmpd="sng" algn="ctr">
+                      <a:solidFill>
+                        <a:schemeClr val="tx1"/>
+                      </a:solidFill>
+                      <a:prstDash val="solid"/>
+                      <a:round/>
+                      <a:headEnd type="none" w="med" len="med"/>
+                      <a:tailEnd type="none" w="med" len="med"/>
+                    </a:lnL>
+                    <a:lnR w="12700" cap="flat" cmpd="sng" algn="ctr">
+                      <a:solidFill>
+                        <a:schemeClr val="tx1"/>
+                      </a:solidFill>
+                      <a:prstDash val="solid"/>
+                      <a:round/>
+                      <a:headEnd type="none" w="med" len="med"/>
+                      <a:tailEnd type="none" w="med" len="med"/>
+                    </a:lnR>
+                    <a:lnT w="12700" cap="flat" cmpd="sng" algn="ctr">
+                      <a:solidFill>
+                        <a:schemeClr val="tx1"/>
+                      </a:solidFill>
+                      <a:prstDash val="solid"/>
+                      <a:round/>
+                      <a:headEnd type="none" w="med" len="med"/>
+                      <a:tailEnd type="none" w="med" len="med"/>
+                    </a:lnT>
+                    <a:lnB w="12700" cap="flat" cmpd="sng" algn="ctr">
+                      <a:solidFill>
+                        <a:schemeClr val="tx1"/>
+                      </a:solidFill>
+                      <a:prstDash val="solid"/>
+                      <a:round/>
+                      <a:headEnd type="none" w="med" len="med"/>
+                      <a:tailEnd type="none" w="med" len="med"/>
+                    </a:lnB>
+                  </a:tcPr>
+                </a:tc>
+                <a:tc>
+                  <a:txBody>
+                    <a:bodyPr/>
+                    <a:lstStyle/>
+                    <a:p>
+                      <a:pPr algn="ctr"/>
+                      <a:r>
+                        <a:rPr lang="pt-BR" dirty="0"/>
+                        <a:t>2</a:t>
+                      </a:r>
+                    </a:p>
+                  </a:txBody>
+                  <a:tcPr>
+                    <a:lnL w="12700" cap="flat" cmpd="sng" algn="ctr">
+                      <a:solidFill>
+                        <a:schemeClr val="tx1"/>
+                      </a:solidFill>
+                      <a:prstDash val="solid"/>
+                      <a:round/>
+                      <a:headEnd type="none" w="med" len="med"/>
+                      <a:tailEnd type="none" w="med" len="med"/>
+                    </a:lnL>
+                    <a:lnR w="12700" cap="flat" cmpd="sng" algn="ctr">
+                      <a:solidFill>
+                        <a:schemeClr val="tx1"/>
+                      </a:solidFill>
+                      <a:prstDash val="solid"/>
+                      <a:round/>
+                      <a:headEnd type="none" w="med" len="med"/>
+                      <a:tailEnd type="none" w="med" len="med"/>
+                    </a:lnR>
+                    <a:lnT w="12700" cap="flat" cmpd="sng" algn="ctr">
+                      <a:solidFill>
+                        <a:schemeClr val="tx1"/>
+                      </a:solidFill>
+                      <a:prstDash val="solid"/>
+                      <a:round/>
+                      <a:headEnd type="none" w="med" len="med"/>
+                      <a:tailEnd type="none" w="med" len="med"/>
+                    </a:lnT>
+                    <a:lnB w="12700" cap="flat" cmpd="sng" algn="ctr">
+                      <a:solidFill>
+                        <a:schemeClr val="tx1"/>
+                      </a:solidFill>
+                      <a:prstDash val="solid"/>
+                      <a:round/>
+                      <a:headEnd type="none" w="med" len="med"/>
+                      <a:tailEnd type="none" w="med" len="med"/>
+                    </a:lnB>
+                  </a:tcPr>
+                </a:tc>
+                <a:tc>
+                  <a:txBody>
+                    <a:bodyPr/>
+                    <a:lstStyle/>
+                    <a:p>
+                      <a:r>
+                        <a:rPr lang="pt-BR" dirty="0"/>
+                        <a:t>XXX.XXX.XXX-X3</a:t>
+                      </a:r>
+                    </a:p>
+                  </a:txBody>
+                  <a:tcPr>
+                    <a:lnL w="12700" cap="flat" cmpd="sng" algn="ctr">
+                      <a:solidFill>
+                        <a:schemeClr val="tx1"/>
+                      </a:solidFill>
+                      <a:prstDash val="solid"/>
+                      <a:round/>
+                      <a:headEnd type="none" w="med" len="med"/>
+                      <a:tailEnd type="none" w="med" len="med"/>
+                    </a:lnL>
+                    <a:lnR w="12700" cap="flat" cmpd="sng" algn="ctr">
+                      <a:solidFill>
+                        <a:schemeClr val="tx1"/>
+                      </a:solidFill>
+                      <a:prstDash val="solid"/>
+                      <a:round/>
+                      <a:headEnd type="none" w="med" len="med"/>
+                      <a:tailEnd type="none" w="med" len="med"/>
+                    </a:lnR>
+                    <a:lnT w="12700" cap="flat" cmpd="sng" algn="ctr">
+                      <a:solidFill>
+                        <a:schemeClr val="tx1"/>
+                      </a:solidFill>
+                      <a:prstDash val="solid"/>
+                      <a:round/>
+                      <a:headEnd type="none" w="med" len="med"/>
+                      <a:tailEnd type="none" w="med" len="med"/>
+                    </a:lnT>
+                    <a:lnB w="12700" cap="flat" cmpd="sng" algn="ctr">
+                      <a:solidFill>
+                        <a:schemeClr val="tx1"/>
+                      </a:solidFill>
+                      <a:prstDash val="solid"/>
+                      <a:round/>
+                      <a:headEnd type="none" w="med" len="med"/>
+                      <a:tailEnd type="none" w="med" len="med"/>
+                    </a:lnB>
+                  </a:tcPr>
+                </a:tc>
+                <a:extLst>
+                  <a:ext uri="{0D108BD9-81ED-4DB2-BD59-A6C34878D82A}">
+                    <a16:rowId xmlns:a16="http://schemas.microsoft.com/office/drawing/2014/main" val="4060221883"/>
+                  </a:ext>
+                </a:extLst>
+              </a:tr>
+              <a:tr h="370840">
+                <a:tc>
+                  <a:txBody>
+                    <a:bodyPr/>
+                    <a:lstStyle/>
+                    <a:p>
+                      <a:pPr algn="ctr"/>
+                      <a:r>
+                        <a:rPr lang="pt-BR" dirty="0"/>
+                        <a:t>4</a:t>
+                      </a:r>
+                    </a:p>
+                  </a:txBody>
+                  <a:tcPr>
+                    <a:lnL w="12700" cap="flat" cmpd="sng" algn="ctr">
+                      <a:solidFill>
+                        <a:schemeClr val="tx1"/>
+                      </a:solidFill>
+                      <a:prstDash val="solid"/>
+                      <a:round/>
+                      <a:headEnd type="none" w="med" len="med"/>
+                      <a:tailEnd type="none" w="med" len="med"/>
+                    </a:lnL>
+                    <a:lnR w="12700" cap="flat" cmpd="sng" algn="ctr">
+                      <a:solidFill>
+                        <a:schemeClr val="tx1"/>
+                      </a:solidFill>
+                      <a:prstDash val="solid"/>
+                      <a:round/>
+                      <a:headEnd type="none" w="med" len="med"/>
+                      <a:tailEnd type="none" w="med" len="med"/>
+                    </a:lnR>
+                    <a:lnT w="12700" cap="flat" cmpd="sng" algn="ctr">
+                      <a:solidFill>
+                        <a:schemeClr val="tx1"/>
+                      </a:solidFill>
+                      <a:prstDash val="solid"/>
+                      <a:round/>
+                      <a:headEnd type="none" w="med" len="med"/>
+                      <a:tailEnd type="none" w="med" len="med"/>
+                    </a:lnT>
+                    <a:lnB w="12700" cap="flat" cmpd="sng" algn="ctr">
+                      <a:solidFill>
+                        <a:schemeClr val="tx1"/>
+                      </a:solidFill>
+                      <a:prstDash val="solid"/>
+                      <a:round/>
+                      <a:headEnd type="none" w="med" len="med"/>
+                      <a:tailEnd type="none" w="med" len="med"/>
+                    </a:lnB>
+                  </a:tcPr>
+                </a:tc>
+                <a:tc>
+                  <a:txBody>
+                    <a:bodyPr/>
+                    <a:lstStyle/>
+                    <a:p>
+                      <a:r>
+                        <a:rPr lang="pt-BR" dirty="0"/>
+                        <a:t>GOIABA</a:t>
+                      </a:r>
+                    </a:p>
+                  </a:txBody>
+                  <a:tcPr>
+                    <a:lnL w="12700" cap="flat" cmpd="sng" algn="ctr">
+                      <a:solidFill>
+                        <a:schemeClr val="tx1"/>
+                      </a:solidFill>
+                      <a:prstDash val="solid"/>
+                      <a:round/>
+                      <a:headEnd type="none" w="med" len="med"/>
+                      <a:tailEnd type="none" w="med" len="med"/>
+                    </a:lnL>
+                    <a:lnR w="12700" cap="flat" cmpd="sng" algn="ctr">
+                      <a:solidFill>
+                        <a:schemeClr val="tx1"/>
+                      </a:solidFill>
+                      <a:prstDash val="solid"/>
+                      <a:round/>
+                      <a:headEnd type="none" w="med" len="med"/>
+                      <a:tailEnd type="none" w="med" len="med"/>
+                    </a:lnR>
+                    <a:lnT w="12700" cap="flat" cmpd="sng" algn="ctr">
+                      <a:solidFill>
+                        <a:schemeClr val="tx1"/>
+                      </a:solidFill>
+                      <a:prstDash val="solid"/>
+                      <a:round/>
+                      <a:headEnd type="none" w="med" len="med"/>
+                      <a:tailEnd type="none" w="med" len="med"/>
+                    </a:lnT>
+                    <a:lnB w="12700" cap="flat" cmpd="sng" algn="ctr">
+                      <a:solidFill>
+                        <a:schemeClr val="tx1"/>
+                      </a:solidFill>
+                      <a:prstDash val="solid"/>
+                      <a:round/>
+                      <a:headEnd type="none" w="med" len="med"/>
+                      <a:tailEnd type="none" w="med" len="med"/>
+                    </a:lnB>
+                  </a:tcPr>
+                </a:tc>
+                <a:tc>
+                  <a:txBody>
+                    <a:bodyPr/>
+                    <a:lstStyle/>
+                    <a:p>
+                      <a:pPr algn="ctr"/>
+                      <a:r>
+                        <a:rPr lang="pt-BR" dirty="0"/>
+                        <a:t>1</a:t>
+                      </a:r>
+                    </a:p>
+                  </a:txBody>
+                  <a:tcPr>
+                    <a:lnL w="12700" cap="flat" cmpd="sng" algn="ctr">
+                      <a:solidFill>
+                        <a:schemeClr val="tx1"/>
+                      </a:solidFill>
+                      <a:prstDash val="solid"/>
+                      <a:round/>
+                      <a:headEnd type="none" w="med" len="med"/>
+                      <a:tailEnd type="none" w="med" len="med"/>
+                    </a:lnL>
+                    <a:lnR w="12700" cap="flat" cmpd="sng" algn="ctr">
+                      <a:solidFill>
+                        <a:schemeClr val="tx1"/>
+                      </a:solidFill>
+                      <a:prstDash val="solid"/>
+                      <a:round/>
+                      <a:headEnd type="none" w="med" len="med"/>
+                      <a:tailEnd type="none" w="med" len="med"/>
+                    </a:lnR>
+                    <a:lnT w="12700" cap="flat" cmpd="sng" algn="ctr">
+                      <a:solidFill>
+                        <a:schemeClr val="tx1"/>
+                      </a:solidFill>
+                      <a:prstDash val="solid"/>
+                      <a:round/>
+                      <a:headEnd type="none" w="med" len="med"/>
+                      <a:tailEnd type="none" w="med" len="med"/>
+                    </a:lnT>
+                    <a:lnB w="12700" cap="flat" cmpd="sng" algn="ctr">
+                      <a:solidFill>
+                        <a:schemeClr val="tx1"/>
+                      </a:solidFill>
+                      <a:prstDash val="solid"/>
+                      <a:round/>
+                      <a:headEnd type="none" w="med" len="med"/>
+                      <a:tailEnd type="none" w="med" len="med"/>
+                    </a:lnB>
+                  </a:tcPr>
+                </a:tc>
+                <a:tc>
+                  <a:txBody>
+                    <a:bodyPr/>
+                    <a:lstStyle/>
+                    <a:p>
+                      <a:r>
+                        <a:rPr lang="pt-BR" dirty="0"/>
+                        <a:t>XXX.XXX.XXX-X4</a:t>
+                      </a:r>
+                    </a:p>
+                  </a:txBody>
+                  <a:tcPr>
+                    <a:lnL w="12700" cap="flat" cmpd="sng" algn="ctr">
+                      <a:solidFill>
+                        <a:schemeClr val="tx1"/>
+                      </a:solidFill>
+                      <a:prstDash val="solid"/>
+                      <a:round/>
+                      <a:headEnd type="none" w="med" len="med"/>
+                      <a:tailEnd type="none" w="med" len="med"/>
+                    </a:lnL>
+                    <a:lnR w="12700" cap="flat" cmpd="sng" algn="ctr">
+                      <a:solidFill>
+                        <a:schemeClr val="tx1"/>
+                      </a:solidFill>
+                      <a:prstDash val="solid"/>
+                      <a:round/>
+                      <a:headEnd type="none" w="med" len="med"/>
+                      <a:tailEnd type="none" w="med" len="med"/>
+                    </a:lnR>
+                    <a:lnT w="12700" cap="flat" cmpd="sng" algn="ctr">
+                      <a:solidFill>
+                        <a:schemeClr val="tx1"/>
+                      </a:solidFill>
+                      <a:prstDash val="solid"/>
+                      <a:round/>
+                      <a:headEnd type="none" w="med" len="med"/>
+                      <a:tailEnd type="none" w="med" len="med"/>
+                    </a:lnT>
+                    <a:lnB w="12700" cap="flat" cmpd="sng" algn="ctr">
+                      <a:solidFill>
+                        <a:schemeClr val="tx1"/>
+                      </a:solidFill>
+                      <a:prstDash val="solid"/>
+                      <a:round/>
+                      <a:headEnd type="none" w="med" len="med"/>
+                      <a:tailEnd type="none" w="med" len="med"/>
+                    </a:lnB>
+                  </a:tcPr>
+                </a:tc>
+                <a:extLst>
+                  <a:ext uri="{0D108BD9-81ED-4DB2-BD59-A6C34878D82A}">
+                    <a16:rowId xmlns:a16="http://schemas.microsoft.com/office/drawing/2014/main" val="545109077"/>
+                  </a:ext>
+                </a:extLst>
+              </a:tr>
+            </a:tbl>
+          </a:graphicData>
+        </a:graphic>
+      </p:graphicFrame>
+      <p:graphicFrame>
+        <p:nvGraphicFramePr>
+          <p:cNvPr id="5" name="Tabela 4">
+            <a:extLst>
+              <a:ext uri="{FF2B5EF4-FFF2-40B4-BE49-F238E27FC236}">
+                <a16:creationId xmlns:a16="http://schemas.microsoft.com/office/drawing/2014/main" id="{9A10063E-4E31-C12B-6EEB-7207321D3B99}"/>
+              </a:ext>
+            </a:extLst>
+          </p:cNvPr>
+          <p:cNvGraphicFramePr>
+            <a:graphicFrameLocks noGrp="1"/>
+          </p:cNvGraphicFramePr>
+          <p:nvPr>
+            <p:extLst>
+              <p:ext uri="{D42A27DB-BD31-4B8C-83A1-F6EECF244321}">
+                <p14:modId xmlns:p14="http://schemas.microsoft.com/office/powerpoint/2010/main" val="1460810582"/>
+              </p:ext>
+            </p:extLst>
+          </p:nvPr>
+        </p:nvGraphicFramePr>
+        <p:xfrm>
+          <a:off x="7304441" y="4453294"/>
+          <a:ext cx="3851237" cy="1483360"/>
+        </p:xfrm>
+        <a:graphic>
+          <a:graphicData uri="http://schemas.openxmlformats.org/drawingml/2006/table">
+            <a:tbl>
+              <a:tblPr firstRow="1" bandRow="1">
+                <a:tableStyleId>{2D5ABB26-0587-4C30-8999-92F81FD0307C}</a:tableStyleId>
+              </a:tblPr>
+              <a:tblGrid>
+                <a:gridCol w="1341121">
+                  <a:extLst>
+                    <a:ext uri="{9D8B030D-6E8A-4147-A177-3AD203B41FA5}">
+                      <a16:colId xmlns:a16="http://schemas.microsoft.com/office/drawing/2014/main" val="3676258254"/>
+                    </a:ext>
+                  </a:extLst>
+                </a:gridCol>
+                <a:gridCol w="2510116">
+                  <a:extLst>
+                    <a:ext uri="{9D8B030D-6E8A-4147-A177-3AD203B41FA5}">
+                      <a16:colId xmlns:a16="http://schemas.microsoft.com/office/drawing/2014/main" val="3238272406"/>
+                    </a:ext>
+                  </a:extLst>
+                </a:gridCol>
+              </a:tblGrid>
+              <a:tr h="370840">
+                <a:tc>
+                  <a:txBody>
+                    <a:bodyPr/>
+                    <a:lstStyle/>
+                    <a:p>
+                      <a:pPr algn="ctr"/>
+                      <a:r>
+                        <a:rPr lang="pt-BR" dirty="0"/>
+                        <a:t>COD_DEPTO</a:t>
+                      </a:r>
+                    </a:p>
+                  </a:txBody>
+                  <a:tcPr>
+                    <a:lnL w="12700" cap="flat" cmpd="sng" algn="ctr">
+                      <a:solidFill>
+                        <a:schemeClr val="tx1"/>
+                      </a:solidFill>
+                      <a:prstDash val="solid"/>
+                      <a:round/>
+                      <a:headEnd type="none" w="med" len="med"/>
+                      <a:tailEnd type="none" w="med" len="med"/>
+                    </a:lnL>
+                    <a:lnR w="12700" cap="flat" cmpd="sng" algn="ctr">
+                      <a:solidFill>
+                        <a:schemeClr val="tx1"/>
+                      </a:solidFill>
+                      <a:prstDash val="solid"/>
+                      <a:round/>
+                      <a:headEnd type="none" w="med" len="med"/>
+                      <a:tailEnd type="none" w="med" len="med"/>
+                    </a:lnR>
+                    <a:lnT w="12700" cap="flat" cmpd="sng" algn="ctr">
+                      <a:solidFill>
+                        <a:schemeClr val="tx1"/>
+                      </a:solidFill>
+                      <a:prstDash val="solid"/>
+                      <a:round/>
+                      <a:headEnd type="none" w="med" len="med"/>
+                      <a:tailEnd type="none" w="med" len="med"/>
+                    </a:lnT>
+                    <a:lnB w="12700" cap="flat" cmpd="sng" algn="ctr">
+                      <a:solidFill>
+                        <a:schemeClr val="tx1"/>
+                      </a:solidFill>
+                      <a:prstDash val="solid"/>
+                      <a:round/>
+                      <a:headEnd type="none" w="med" len="med"/>
+                      <a:tailEnd type="none" w="med" len="med"/>
+                    </a:lnB>
+                  </a:tcPr>
+                </a:tc>
+                <a:tc>
+                  <a:txBody>
+                    <a:bodyPr/>
+                    <a:lstStyle/>
+                    <a:p>
+                      <a:r>
+                        <a:rPr lang="pt-BR" dirty="0"/>
+                        <a:t>NOME_DEPARTAMENTO</a:t>
+                      </a:r>
+                    </a:p>
+                  </a:txBody>
+                  <a:tcPr>
+                    <a:lnL w="12700" cap="flat" cmpd="sng" algn="ctr">
+                      <a:solidFill>
+                        <a:schemeClr val="tx1"/>
+                      </a:solidFill>
+                      <a:prstDash val="solid"/>
+                      <a:round/>
+                      <a:headEnd type="none" w="med" len="med"/>
+                      <a:tailEnd type="none" w="med" len="med"/>
+                    </a:lnL>
+                    <a:lnR w="12700" cap="flat" cmpd="sng" algn="ctr">
+                      <a:solidFill>
+                        <a:schemeClr val="tx1"/>
+                      </a:solidFill>
+                      <a:prstDash val="solid"/>
+                      <a:round/>
+                      <a:headEnd type="none" w="med" len="med"/>
+                      <a:tailEnd type="none" w="med" len="med"/>
+                    </a:lnR>
+                    <a:lnT w="12700" cap="flat" cmpd="sng" algn="ctr">
+                      <a:solidFill>
+                        <a:schemeClr val="tx1"/>
+                      </a:solidFill>
+                      <a:prstDash val="solid"/>
+                      <a:round/>
+                      <a:headEnd type="none" w="med" len="med"/>
+                      <a:tailEnd type="none" w="med" len="med"/>
+                    </a:lnT>
+                    <a:lnB w="12700" cap="flat" cmpd="sng" algn="ctr">
+                      <a:solidFill>
+                        <a:schemeClr val="tx1"/>
+                      </a:solidFill>
+                      <a:prstDash val="solid"/>
+                      <a:round/>
+                      <a:headEnd type="none" w="med" len="med"/>
+                      <a:tailEnd type="none" w="med" len="med"/>
+                    </a:lnB>
+                  </a:tcPr>
+                </a:tc>
+                <a:extLst>
+                  <a:ext uri="{0D108BD9-81ED-4DB2-BD59-A6C34878D82A}">
+                    <a16:rowId xmlns:a16="http://schemas.microsoft.com/office/drawing/2014/main" val="3972983408"/>
+                  </a:ext>
+                </a:extLst>
+              </a:tr>
+              <a:tr h="370840">
+                <a:tc>
+                  <a:txBody>
+                    <a:bodyPr/>
+                    <a:lstStyle/>
+                    <a:p>
+                      <a:pPr algn="ctr"/>
+                      <a:r>
+                        <a:rPr lang="pt-BR" dirty="0"/>
+                        <a:t>1</a:t>
+                      </a:r>
+                    </a:p>
+                  </a:txBody>
+                  <a:tcPr>
+                    <a:lnL w="12700" cap="flat" cmpd="sng" algn="ctr">
+                      <a:solidFill>
+                        <a:schemeClr val="tx1"/>
+                      </a:solidFill>
+                      <a:prstDash val="solid"/>
+                      <a:round/>
+                      <a:headEnd type="none" w="med" len="med"/>
+                      <a:tailEnd type="none" w="med" len="med"/>
+                    </a:lnL>
+                    <a:lnR w="12700" cap="flat" cmpd="sng" algn="ctr">
+                      <a:solidFill>
+                        <a:schemeClr val="tx1"/>
+                      </a:solidFill>
+                      <a:prstDash val="solid"/>
+                      <a:round/>
+                      <a:headEnd type="none" w="med" len="med"/>
+                      <a:tailEnd type="none" w="med" len="med"/>
+                    </a:lnR>
+                    <a:lnT w="12700" cap="flat" cmpd="sng" algn="ctr">
+                      <a:solidFill>
+                        <a:schemeClr val="tx1"/>
+                      </a:solidFill>
+                      <a:prstDash val="solid"/>
+                      <a:round/>
+                      <a:headEnd type="none" w="med" len="med"/>
+                      <a:tailEnd type="none" w="med" len="med"/>
+                    </a:lnT>
+                    <a:lnB w="12700" cap="flat" cmpd="sng" algn="ctr">
+                      <a:solidFill>
+                        <a:schemeClr val="tx1"/>
+                      </a:solidFill>
+                      <a:prstDash val="solid"/>
+                      <a:round/>
+                      <a:headEnd type="none" w="med" len="med"/>
+                      <a:tailEnd type="none" w="med" len="med"/>
+                    </a:lnB>
+                  </a:tcPr>
+                </a:tc>
+                <a:tc>
+                  <a:txBody>
+                    <a:bodyPr/>
+                    <a:lstStyle/>
+                    <a:p>
+                      <a:r>
+                        <a:rPr lang="pt-BR" dirty="0"/>
+                        <a:t>BIG DATA</a:t>
+                      </a:r>
+                    </a:p>
+                  </a:txBody>
+                  <a:tcPr>
+                    <a:lnL w="12700" cap="flat" cmpd="sng" algn="ctr">
+                      <a:solidFill>
+                        <a:schemeClr val="tx1"/>
+                      </a:solidFill>
+                      <a:prstDash val="solid"/>
+                      <a:round/>
+                      <a:headEnd type="none" w="med" len="med"/>
+                      <a:tailEnd type="none" w="med" len="med"/>
+                    </a:lnL>
+                    <a:lnR w="12700" cap="flat" cmpd="sng" algn="ctr">
+                      <a:solidFill>
+                        <a:schemeClr val="tx1"/>
+                      </a:solidFill>
+                      <a:prstDash val="solid"/>
+                      <a:round/>
+                      <a:headEnd type="none" w="med" len="med"/>
+                      <a:tailEnd type="none" w="med" len="med"/>
+                    </a:lnR>
+                    <a:lnT w="12700" cap="flat" cmpd="sng" algn="ctr">
+                      <a:solidFill>
+                        <a:schemeClr val="tx1"/>
+                      </a:solidFill>
+                      <a:prstDash val="solid"/>
+                      <a:round/>
+                      <a:headEnd type="none" w="med" len="med"/>
+                      <a:tailEnd type="none" w="med" len="med"/>
+                    </a:lnT>
+                    <a:lnB w="12700" cap="flat" cmpd="sng" algn="ctr">
+                      <a:solidFill>
+                        <a:schemeClr val="tx1"/>
+                      </a:solidFill>
+                      <a:prstDash val="solid"/>
+                      <a:round/>
+                      <a:headEnd type="none" w="med" len="med"/>
+                      <a:tailEnd type="none" w="med" len="med"/>
+                    </a:lnB>
+                  </a:tcPr>
+                </a:tc>
+                <a:extLst>
+                  <a:ext uri="{0D108BD9-81ED-4DB2-BD59-A6C34878D82A}">
+                    <a16:rowId xmlns:a16="http://schemas.microsoft.com/office/drawing/2014/main" val="413956977"/>
+                  </a:ext>
+                </a:extLst>
+              </a:tr>
+              <a:tr h="370840">
+                <a:tc>
+                  <a:txBody>
+                    <a:bodyPr/>
+                    <a:lstStyle/>
+                    <a:p>
+                      <a:pPr algn="ctr"/>
+                      <a:r>
+                        <a:rPr lang="pt-BR" dirty="0"/>
+                        <a:t>2</a:t>
+                      </a:r>
+                    </a:p>
+                  </a:txBody>
+                  <a:tcPr>
+                    <a:lnL w="12700" cap="flat" cmpd="sng" algn="ctr">
+                      <a:solidFill>
+                        <a:schemeClr val="tx1"/>
+                      </a:solidFill>
+                      <a:prstDash val="solid"/>
+                      <a:round/>
+                      <a:headEnd type="none" w="med" len="med"/>
+                      <a:tailEnd type="none" w="med" len="med"/>
+                    </a:lnL>
+                    <a:lnR w="12700" cap="flat" cmpd="sng" algn="ctr">
+                      <a:solidFill>
+                        <a:schemeClr val="tx1"/>
+                      </a:solidFill>
+                      <a:prstDash val="solid"/>
+                      <a:round/>
+                      <a:headEnd type="none" w="med" len="med"/>
+                      <a:tailEnd type="none" w="med" len="med"/>
+                    </a:lnR>
+                    <a:lnT w="12700" cap="flat" cmpd="sng" algn="ctr">
+                      <a:solidFill>
+                        <a:schemeClr val="tx1"/>
+                      </a:solidFill>
+                      <a:prstDash val="solid"/>
+                      <a:round/>
+                      <a:headEnd type="none" w="med" len="med"/>
+                      <a:tailEnd type="none" w="med" len="med"/>
+                    </a:lnT>
+                    <a:lnB w="12700" cap="flat" cmpd="sng" algn="ctr">
+                      <a:solidFill>
+                        <a:schemeClr val="tx1"/>
+                      </a:solidFill>
+                      <a:prstDash val="solid"/>
+                      <a:round/>
+                      <a:headEnd type="none" w="med" len="med"/>
+                      <a:tailEnd type="none" w="med" len="med"/>
+                    </a:lnB>
+                  </a:tcPr>
+                </a:tc>
+                <a:tc>
+                  <a:txBody>
+                    <a:bodyPr/>
+                    <a:lstStyle/>
+                    <a:p>
+                      <a:r>
+                        <a:rPr lang="pt-BR" dirty="0"/>
+                        <a:t>ENGENHARIA</a:t>
+                      </a:r>
+                    </a:p>
+                  </a:txBody>
+                  <a:tcPr>
+                    <a:lnL w="12700" cap="flat" cmpd="sng" algn="ctr">
+                      <a:solidFill>
+                        <a:schemeClr val="tx1"/>
+                      </a:solidFill>
+                      <a:prstDash val="solid"/>
+                      <a:round/>
+                      <a:headEnd type="none" w="med" len="med"/>
+                      <a:tailEnd type="none" w="med" len="med"/>
+                    </a:lnL>
+                    <a:lnR w="12700" cap="flat" cmpd="sng" algn="ctr">
+                      <a:solidFill>
+                        <a:schemeClr val="tx1"/>
+                      </a:solidFill>
+                      <a:prstDash val="solid"/>
+                      <a:round/>
+                      <a:headEnd type="none" w="med" len="med"/>
+                      <a:tailEnd type="none" w="med" len="med"/>
+                    </a:lnR>
+                    <a:lnT w="12700" cap="flat" cmpd="sng" algn="ctr">
+                      <a:solidFill>
+                        <a:schemeClr val="tx1"/>
+                      </a:solidFill>
+                      <a:prstDash val="solid"/>
+                      <a:round/>
+                      <a:headEnd type="none" w="med" len="med"/>
+                      <a:tailEnd type="none" w="med" len="med"/>
+                    </a:lnT>
+                    <a:lnB w="12700" cap="flat" cmpd="sng" algn="ctr">
+                      <a:solidFill>
+                        <a:schemeClr val="tx1"/>
+                      </a:solidFill>
+                      <a:prstDash val="solid"/>
+                      <a:round/>
+                      <a:headEnd type="none" w="med" len="med"/>
+                      <a:tailEnd type="none" w="med" len="med"/>
+                    </a:lnB>
+                  </a:tcPr>
+                </a:tc>
+                <a:extLst>
+                  <a:ext uri="{0D108BD9-81ED-4DB2-BD59-A6C34878D82A}">
+                    <a16:rowId xmlns:a16="http://schemas.microsoft.com/office/drawing/2014/main" val="1908616991"/>
+                  </a:ext>
+                </a:extLst>
+              </a:tr>
+              <a:tr h="370840">
+                <a:tc>
+                  <a:txBody>
+                    <a:bodyPr/>
+                    <a:lstStyle/>
+                    <a:p>
+                      <a:pPr algn="ctr"/>
+                      <a:r>
+                        <a:rPr lang="pt-BR" dirty="0"/>
+                        <a:t>3</a:t>
+                      </a:r>
+                    </a:p>
+                  </a:txBody>
+                  <a:tcPr>
+                    <a:lnL w="12700" cap="flat" cmpd="sng" algn="ctr">
+                      <a:solidFill>
+                        <a:schemeClr val="tx1"/>
+                      </a:solidFill>
+                      <a:prstDash val="solid"/>
+                      <a:round/>
+                      <a:headEnd type="none" w="med" len="med"/>
+                      <a:tailEnd type="none" w="med" len="med"/>
+                    </a:lnL>
+                    <a:lnR w="12700" cap="flat" cmpd="sng" algn="ctr">
+                      <a:solidFill>
+                        <a:schemeClr val="tx1"/>
+                      </a:solidFill>
+                      <a:prstDash val="solid"/>
+                      <a:round/>
+                      <a:headEnd type="none" w="med" len="med"/>
+                      <a:tailEnd type="none" w="med" len="med"/>
+                    </a:lnR>
+                    <a:lnT w="12700" cap="flat" cmpd="sng" algn="ctr">
+                      <a:solidFill>
+                        <a:schemeClr val="tx1"/>
+                      </a:solidFill>
+                      <a:prstDash val="solid"/>
+                      <a:round/>
+                      <a:headEnd type="none" w="med" len="med"/>
+                      <a:tailEnd type="none" w="med" len="med"/>
+                    </a:lnT>
+                    <a:lnB w="12700" cap="flat" cmpd="sng" algn="ctr">
+                      <a:solidFill>
+                        <a:schemeClr val="tx1"/>
+                      </a:solidFill>
+                      <a:prstDash val="solid"/>
+                      <a:round/>
+                      <a:headEnd type="none" w="med" len="med"/>
+                      <a:tailEnd type="none" w="med" len="med"/>
+                    </a:lnB>
+                  </a:tcPr>
+                </a:tc>
+                <a:tc>
+                  <a:txBody>
+                    <a:bodyPr/>
+                    <a:lstStyle/>
+                    <a:p>
+                      <a:r>
+                        <a:rPr lang="pt-BR" dirty="0"/>
+                        <a:t>TI</a:t>
+                      </a:r>
+                    </a:p>
+                  </a:txBody>
+                  <a:tcPr>
+                    <a:lnL w="12700" cap="flat" cmpd="sng" algn="ctr">
+                      <a:solidFill>
+                        <a:schemeClr val="tx1"/>
+                      </a:solidFill>
+                      <a:prstDash val="solid"/>
+                      <a:round/>
+                      <a:headEnd type="none" w="med" len="med"/>
+                      <a:tailEnd type="none" w="med" len="med"/>
+                    </a:lnL>
+                    <a:lnR w="12700" cap="flat" cmpd="sng" algn="ctr">
+                      <a:solidFill>
+                        <a:schemeClr val="tx1"/>
+                      </a:solidFill>
+                      <a:prstDash val="solid"/>
+                      <a:round/>
+                      <a:headEnd type="none" w="med" len="med"/>
+                      <a:tailEnd type="none" w="med" len="med"/>
+                    </a:lnR>
+                    <a:lnT w="12700" cap="flat" cmpd="sng" algn="ctr">
+                      <a:solidFill>
+                        <a:schemeClr val="tx1"/>
+                      </a:solidFill>
+                      <a:prstDash val="solid"/>
+                      <a:round/>
+                      <a:headEnd type="none" w="med" len="med"/>
+                      <a:tailEnd type="none" w="med" len="med"/>
+                    </a:lnT>
+                    <a:lnB w="12700" cap="flat" cmpd="sng" algn="ctr">
+                      <a:solidFill>
+                        <a:schemeClr val="tx1"/>
+                      </a:solidFill>
+                      <a:prstDash val="solid"/>
+                      <a:round/>
+                      <a:headEnd type="none" w="med" len="med"/>
+                      <a:tailEnd type="none" w="med" len="med"/>
+                    </a:lnB>
+                  </a:tcPr>
+                </a:tc>
+                <a:extLst>
+                  <a:ext uri="{0D108BD9-81ED-4DB2-BD59-A6C34878D82A}">
+                    <a16:rowId xmlns:a16="http://schemas.microsoft.com/office/drawing/2014/main" val="1222940136"/>
+                  </a:ext>
+                </a:extLst>
+              </a:tr>
+            </a:tbl>
+          </a:graphicData>
+        </a:graphic>
+      </p:graphicFrame>
+    </p:spTree>
+    <p:extLst>
+      <p:ext uri="{BB962C8B-B14F-4D97-AF65-F5344CB8AC3E}">
+        <p14:creationId xmlns:p14="http://schemas.microsoft.com/office/powerpoint/2010/main" val="2212768256"/>
+      </p:ext>
+    </p:extLst>
+  </p:cSld>
+  <p:clrMapOvr>
+    <a:masterClrMapping/>
+  </p:clrMapOvr>
+</p:sld>
+</file>
+
+<file path=ppt/slides/slide54.xml><?xml version="1.0" encoding="utf-8"?>
+<p:sld xmlns:a="http://schemas.openxmlformats.org/drawingml/2006/main" xmlns:r="http://schemas.openxmlformats.org/officeDocument/2006/relationships" xmlns:p="http://schemas.openxmlformats.org/presentationml/2006/main">
+  <p:cSld>
+    <p:spTree>
+      <p:nvGrpSpPr>
+        <p:cNvPr id="1" name=""/>
+        <p:cNvGrpSpPr/>
+        <p:nvPr/>
+      </p:nvGrpSpPr>
+      <p:grpSpPr>
+        <a:xfrm>
+          <a:off x="0" y="0"/>
+          <a:ext cx="0" cy="0"/>
+          <a:chOff x="0" y="0"/>
+          <a:chExt cx="0" cy="0"/>
+        </a:xfrm>
+      </p:grpSpPr>
+      <p:sp>
+        <p:nvSpPr>
+          <p:cNvPr id="2" name="Título 1">
+            <a:extLst>
+              <a:ext uri="{FF2B5EF4-FFF2-40B4-BE49-F238E27FC236}">
+                <a16:creationId xmlns:a16="http://schemas.microsoft.com/office/drawing/2014/main" id="{CC7C5B47-35D0-CBC5-39AF-B5F44B677392}"/>
+              </a:ext>
+            </a:extLst>
+          </p:cNvPr>
+          <p:cNvSpPr>
+            <a:spLocks noGrp="1"/>
+          </p:cNvSpPr>
+          <p:nvPr>
+            <p:ph type="title"/>
+          </p:nvPr>
+        </p:nvSpPr>
+        <p:spPr/>
+        <p:txBody>
+          <a:bodyPr>
+            <a:normAutofit/>
+          </a:bodyPr>
+          <a:lstStyle/>
+          <a:p>
+            <a:r>
+              <a:rPr lang="pt-BR" sz="4400" b="1" dirty="0"/>
+              <a:t>MODELAGEM DE BANCO DE DADOS RELACIONAL</a:t>
+            </a:r>
+            <a:endParaRPr lang="pt-BR" sz="2700" dirty="0"/>
+          </a:p>
+        </p:txBody>
+      </p:sp>
+      <p:sp>
+        <p:nvSpPr>
+          <p:cNvPr id="3" name="Espaço Reservado para Conteúdo 2">
+            <a:extLst>
+              <a:ext uri="{FF2B5EF4-FFF2-40B4-BE49-F238E27FC236}">
+                <a16:creationId xmlns:a16="http://schemas.microsoft.com/office/drawing/2014/main" id="{59758A1E-514F-AFAC-13D2-56BDC5AADB96}"/>
+              </a:ext>
+            </a:extLst>
+          </p:cNvPr>
+          <p:cNvSpPr>
+            <a:spLocks noGrp="1"/>
+          </p:cNvSpPr>
+          <p:nvPr>
+            <p:ph idx="1"/>
+          </p:nvPr>
+        </p:nvSpPr>
+        <p:spPr>
+          <a:xfrm>
+            <a:off x="1097279" y="1923026"/>
+            <a:ext cx="5696695" cy="4384468"/>
+          </a:xfrm>
+          <a:ln>
+            <a:solidFill>
+              <a:schemeClr val="bg1"/>
+            </a:solidFill>
+          </a:ln>
+        </p:spPr>
+        <p:style>
+          <a:lnRef idx="2">
+            <a:schemeClr val="dk1"/>
+          </a:lnRef>
+          <a:fillRef idx="1">
+            <a:schemeClr val="lt1"/>
+          </a:fillRef>
+          <a:effectRef idx="0">
+            <a:schemeClr val="dk1"/>
+          </a:effectRef>
+          <a:fontRef idx="minor">
+            <a:schemeClr val="dk1"/>
+          </a:fontRef>
+        </p:style>
+        <p:txBody>
+          <a:bodyPr>
+            <a:normAutofit/>
+          </a:bodyPr>
+          <a:lstStyle/>
+          <a:p>
+            <a:pPr marL="0" indent="0">
+              <a:buNone/>
+            </a:pPr>
+            <a:r>
+              <a:rPr lang="pt-BR" sz="2400" dirty="0"/>
+              <a:t>Nesta figura está a representação da criação de uma tabela no modelo relacional utilizando SQL.</a:t>
+            </a:r>
+          </a:p>
+          <a:p>
+            <a:pPr marL="0" indent="0">
+              <a:buNone/>
+            </a:pPr>
+            <a:r>
+              <a:rPr lang="pt-BR" sz="2400" dirty="0"/>
+              <a:t>O comando CREATE TABLE serve para a criação de uma nova tabela no banco de dados.</a:t>
+            </a:r>
+          </a:p>
+          <a:p>
+            <a:pPr marL="0" indent="0">
+              <a:buNone/>
+            </a:pPr>
+            <a:r>
+              <a:rPr lang="pt-BR" sz="2400" dirty="0"/>
+              <a:t>O primeiro parâmetro a ser definido é o nome da tabela, seguindo dos atributos, de seus tipos e das eventuais estrições (em nosso exemplo, not </a:t>
+            </a:r>
+            <a:r>
+              <a:rPr lang="pt-BR" sz="2400" dirty="0" err="1"/>
+              <a:t>null</a:t>
+            </a:r>
+            <a:r>
+              <a:rPr lang="pt-BR" sz="2400" dirty="0"/>
+              <a:t>).</a:t>
+            </a:r>
+          </a:p>
+        </p:txBody>
+      </p:sp>
+      <p:grpSp>
+        <p:nvGrpSpPr>
+          <p:cNvPr id="6" name="Group 19310">
+            <a:extLst>
+              <a:ext uri="{FF2B5EF4-FFF2-40B4-BE49-F238E27FC236}">
+                <a16:creationId xmlns:a16="http://schemas.microsoft.com/office/drawing/2014/main" id="{5BE00E53-DB49-DBBE-80F4-59452CA7F7AE}"/>
+              </a:ext>
+            </a:extLst>
+          </p:cNvPr>
+          <p:cNvGrpSpPr/>
+          <p:nvPr/>
+        </p:nvGrpSpPr>
+        <p:grpSpPr>
+          <a:xfrm>
+            <a:off x="6907528" y="1817370"/>
+            <a:ext cx="4998721" cy="4384468"/>
+            <a:chOff x="0" y="0"/>
+            <a:chExt cx="2521441" cy="2241144"/>
+          </a:xfrm>
+        </p:grpSpPr>
+        <p:sp>
+          <p:nvSpPr>
+            <p:cNvPr id="7" name="Shape 1421">
+              <a:extLst>
+                <a:ext uri="{FF2B5EF4-FFF2-40B4-BE49-F238E27FC236}">
+                  <a16:creationId xmlns:a16="http://schemas.microsoft.com/office/drawing/2014/main" id="{747422AA-88D3-DDC5-14DC-2E393E1347FB}"/>
+                </a:ext>
+              </a:extLst>
+            </p:cNvPr>
+            <p:cNvSpPr/>
+            <p:nvPr/>
+          </p:nvSpPr>
+          <p:spPr>
+            <a:xfrm>
+              <a:off x="0" y="0"/>
+              <a:ext cx="2147900" cy="2241144"/>
+            </a:xfrm>
+            <a:custGeom>
+              <a:avLst/>
+              <a:gdLst/>
+              <a:ahLst/>
+              <a:cxnLst/>
+              <a:rect l="0" t="0" r="0" b="0"/>
+              <a:pathLst>
+                <a:path w="2147900" h="2241144">
+                  <a:moveTo>
+                    <a:pt x="108001" y="0"/>
+                  </a:moveTo>
+                  <a:cubicBezTo>
+                    <a:pt x="108001" y="0"/>
+                    <a:pt x="0" y="0"/>
+                    <a:pt x="0" y="108001"/>
+                  </a:cubicBezTo>
+                  <a:lnTo>
+                    <a:pt x="0" y="2133143"/>
+                  </a:lnTo>
+                  <a:cubicBezTo>
+                    <a:pt x="0" y="2133143"/>
+                    <a:pt x="0" y="2241144"/>
+                    <a:pt x="108001" y="2241144"/>
+                  </a:cubicBezTo>
+                  <a:lnTo>
+                    <a:pt x="2039900" y="2241144"/>
+                  </a:lnTo>
+                  <a:cubicBezTo>
+                    <a:pt x="2039900" y="2241144"/>
+                    <a:pt x="2147900" y="2241144"/>
+                    <a:pt x="2147900" y="2133143"/>
+                  </a:cubicBezTo>
+                  <a:lnTo>
+                    <a:pt x="2147900" y="108001"/>
+                  </a:lnTo>
+                  <a:cubicBezTo>
+                    <a:pt x="2147900" y="108001"/>
+                    <a:pt x="2147900" y="0"/>
+                    <a:pt x="2039900" y="0"/>
+                  </a:cubicBezTo>
+                  <a:lnTo>
+                    <a:pt x="108001" y="0"/>
+                  </a:lnTo>
+                  <a:close/>
+                </a:path>
+              </a:pathLst>
+            </a:custGeom>
+            <a:ln w="12700" cap="flat">
+              <a:miter lim="100000"/>
+            </a:ln>
+          </p:spPr>
+          <p:style>
+            <a:lnRef idx="1">
+              <a:srgbClr val="6B6764"/>
+            </a:lnRef>
+            <a:fillRef idx="0">
+              <a:srgbClr val="000000">
+                <a:alpha val="0"/>
+              </a:srgbClr>
+            </a:fillRef>
+            <a:effectRef idx="0">
+              <a:scrgbClr r="0" g="0" b="0"/>
+            </a:effectRef>
+            <a:fontRef idx="none"/>
+          </p:style>
+          <p:txBody>
+            <a:bodyPr/>
+            <a:lstStyle/>
+            <a:p>
+              <a:endParaRPr lang="pt-BR"/>
+            </a:p>
+          </p:txBody>
+        </p:sp>
+        <p:sp>
+          <p:nvSpPr>
+            <p:cNvPr id="8" name="Rectangle 1422">
+              <a:extLst>
+                <a:ext uri="{FF2B5EF4-FFF2-40B4-BE49-F238E27FC236}">
+                  <a16:creationId xmlns:a16="http://schemas.microsoft.com/office/drawing/2014/main" id="{E86805D9-166C-C0B9-843F-5C2D6A6F10E3}"/>
+                </a:ext>
+              </a:extLst>
+            </p:cNvPr>
+            <p:cNvSpPr/>
+            <p:nvPr/>
+          </p:nvSpPr>
+          <p:spPr>
+            <a:xfrm>
+              <a:off x="132164" y="1887165"/>
+              <a:ext cx="590237" cy="165126"/>
+            </a:xfrm>
+            <a:prstGeom prst="rect">
+              <a:avLst/>
+            </a:prstGeom>
+            <a:ln>
+              <a:noFill/>
+            </a:ln>
+          </p:spPr>
+          <p:txBody>
+            <a:bodyPr vert="horz" lIns="0" tIns="0" rIns="0" bIns="0" rtlCol="0">
+              <a:noAutofit/>
+            </a:bodyPr>
+            <a:lstStyle/>
+            <a:p>
+              <a:pPr marR="127000" indent="163830" algn="l">
+                <a:lnSpc>
+                  <a:spcPct val="107000"/>
+                </a:lnSpc>
+                <a:spcAft>
+                  <a:spcPts val="800"/>
+                </a:spcAft>
+              </a:pPr>
+              <a:r>
+                <a:rPr lang="pt-BR" sz="800" b="1" kern="100">
+                  <a:solidFill>
+                    <a:srgbClr val="2F2115"/>
+                  </a:solidFill>
+                  <a:effectLst/>
+                  <a:latin typeface="Calibri" panose="020F0502020204030204" pitchFamily="34" charset="0"/>
+                  <a:ea typeface="Calibri" panose="020F0502020204030204" pitchFamily="34" charset="0"/>
+                </a:rPr>
+                <a:t>Figura</a:t>
+              </a:r>
+              <a:r>
+                <a:rPr lang="pt-BR" sz="800" b="1" kern="100" spc="-55">
+                  <a:solidFill>
+                    <a:srgbClr val="2F2115"/>
+                  </a:solidFill>
+                  <a:effectLst/>
+                  <a:latin typeface="Calibri" panose="020F0502020204030204" pitchFamily="34" charset="0"/>
+                  <a:ea typeface="Calibri" panose="020F0502020204030204" pitchFamily="34" charset="0"/>
+                </a:rPr>
+                <a:t> </a:t>
+              </a:r>
+              <a:r>
+                <a:rPr lang="pt-BR" sz="800" b="1" kern="100">
+                  <a:solidFill>
+                    <a:srgbClr val="2F2115"/>
+                  </a:solidFill>
+                  <a:effectLst/>
+                  <a:latin typeface="Calibri" panose="020F0502020204030204" pitchFamily="34" charset="0"/>
+                  <a:ea typeface="Calibri" panose="020F0502020204030204" pitchFamily="34" charset="0"/>
+                </a:rPr>
+                <a:t>14.</a:t>
+              </a:r>
+              <a:r>
+                <a:rPr lang="pt-BR" sz="800" b="1" kern="100" spc="-20">
+                  <a:solidFill>
+                    <a:srgbClr val="2F2115"/>
+                  </a:solidFill>
+                  <a:effectLst/>
+                  <a:latin typeface="Calibri" panose="020F0502020204030204" pitchFamily="34" charset="0"/>
+                  <a:ea typeface="Calibri" panose="020F0502020204030204" pitchFamily="34" charset="0"/>
+                </a:rPr>
+                <a:t> </a:t>
+              </a:r>
+              <a:endParaRPr lang="pt-BR" sz="1000" kern="100">
+                <a:solidFill>
+                  <a:srgbClr val="2F2115"/>
+                </a:solidFill>
+                <a:effectLst/>
+                <a:latin typeface="Times New Roman" panose="02020603050405020304" pitchFamily="18" charset="0"/>
+                <a:ea typeface="Times New Roman" panose="02020603050405020304" pitchFamily="18" charset="0"/>
+              </a:endParaRPr>
+            </a:p>
+          </p:txBody>
+        </p:sp>
+        <p:sp>
+          <p:nvSpPr>
+            <p:cNvPr id="9" name="Rectangle 1423">
+              <a:extLst>
+                <a:ext uri="{FF2B5EF4-FFF2-40B4-BE49-F238E27FC236}">
+                  <a16:creationId xmlns:a16="http://schemas.microsoft.com/office/drawing/2014/main" id="{18DEEE8F-4308-1B9C-2685-009C8BD7F70F}"/>
+                </a:ext>
+              </a:extLst>
+            </p:cNvPr>
+            <p:cNvSpPr/>
+            <p:nvPr/>
+          </p:nvSpPr>
+          <p:spPr>
+            <a:xfrm>
+              <a:off x="571551" y="1890924"/>
+              <a:ext cx="1949890" cy="160127"/>
+            </a:xfrm>
+            <a:prstGeom prst="rect">
+              <a:avLst/>
+            </a:prstGeom>
+            <a:ln>
+              <a:noFill/>
+            </a:ln>
+          </p:spPr>
+          <p:txBody>
+            <a:bodyPr vert="horz" lIns="0" tIns="0" rIns="0" bIns="0" rtlCol="0">
+              <a:noAutofit/>
+            </a:bodyPr>
+            <a:lstStyle/>
+            <a:p>
+              <a:pPr marR="127000" indent="163830" algn="l">
+                <a:lnSpc>
+                  <a:spcPct val="107000"/>
+                </a:lnSpc>
+                <a:spcAft>
+                  <a:spcPts val="800"/>
+                </a:spcAft>
+              </a:pPr>
+              <a:r>
+                <a:rPr lang="pt-BR" sz="800" kern="100">
+                  <a:solidFill>
+                    <a:srgbClr val="2F2115"/>
+                  </a:solidFill>
+                  <a:effectLst/>
+                  <a:latin typeface="Calibri" panose="020F0502020204030204" pitchFamily="34" charset="0"/>
+                  <a:ea typeface="Calibri" panose="020F0502020204030204" pitchFamily="34" charset="0"/>
+                </a:rPr>
+                <a:t>Instrução</a:t>
+              </a:r>
+              <a:r>
+                <a:rPr lang="pt-BR" sz="800" kern="100" spc="-45">
+                  <a:solidFill>
+                    <a:srgbClr val="2F2115"/>
+                  </a:solidFill>
+                  <a:effectLst/>
+                  <a:latin typeface="Calibri" panose="020F0502020204030204" pitchFamily="34" charset="0"/>
+                  <a:ea typeface="Calibri" panose="020F0502020204030204" pitchFamily="34" charset="0"/>
+                </a:rPr>
+                <a:t> </a:t>
+              </a:r>
+              <a:r>
+                <a:rPr lang="pt-BR" sz="800" kern="100">
+                  <a:solidFill>
+                    <a:srgbClr val="2F2115"/>
+                  </a:solidFill>
+                  <a:effectLst/>
+                  <a:latin typeface="Calibri" panose="020F0502020204030204" pitchFamily="34" charset="0"/>
+                  <a:ea typeface="Calibri" panose="020F0502020204030204" pitchFamily="34" charset="0"/>
+                </a:rPr>
+                <a:t>em</a:t>
+              </a:r>
+              <a:r>
+                <a:rPr lang="pt-BR" sz="800" kern="100" spc="-45">
+                  <a:solidFill>
+                    <a:srgbClr val="2F2115"/>
+                  </a:solidFill>
+                  <a:effectLst/>
+                  <a:latin typeface="Calibri" panose="020F0502020204030204" pitchFamily="34" charset="0"/>
+                  <a:ea typeface="Calibri" panose="020F0502020204030204" pitchFamily="34" charset="0"/>
+                </a:rPr>
+                <a:t> </a:t>
+              </a:r>
+              <a:r>
+                <a:rPr lang="pt-BR" sz="800" kern="100">
+                  <a:solidFill>
+                    <a:srgbClr val="2F2115"/>
+                  </a:solidFill>
+                  <a:effectLst/>
+                  <a:latin typeface="Calibri" panose="020F0502020204030204" pitchFamily="34" charset="0"/>
+                  <a:ea typeface="Calibri" panose="020F0502020204030204" pitchFamily="34" charset="0"/>
+                </a:rPr>
+                <a:t>SQL</a:t>
+              </a:r>
+              <a:r>
+                <a:rPr lang="pt-BR" sz="800" kern="100" spc="-45">
+                  <a:solidFill>
+                    <a:srgbClr val="2F2115"/>
+                  </a:solidFill>
+                  <a:effectLst/>
+                  <a:latin typeface="Calibri" panose="020F0502020204030204" pitchFamily="34" charset="0"/>
+                  <a:ea typeface="Calibri" panose="020F0502020204030204" pitchFamily="34" charset="0"/>
+                </a:rPr>
+                <a:t> </a:t>
+              </a:r>
+              <a:r>
+                <a:rPr lang="pt-BR" sz="800" kern="100">
+                  <a:solidFill>
+                    <a:srgbClr val="2F2115"/>
+                  </a:solidFill>
+                  <a:effectLst/>
+                  <a:latin typeface="Calibri" panose="020F0502020204030204" pitchFamily="34" charset="0"/>
+                  <a:ea typeface="Calibri" panose="020F0502020204030204" pitchFamily="34" charset="0"/>
+                </a:rPr>
+                <a:t>referente</a:t>
+              </a:r>
+              <a:r>
+                <a:rPr lang="pt-BR" sz="800" kern="100" spc="-45">
+                  <a:solidFill>
+                    <a:srgbClr val="2F2115"/>
+                  </a:solidFill>
+                  <a:effectLst/>
+                  <a:latin typeface="Calibri" panose="020F0502020204030204" pitchFamily="34" charset="0"/>
+                  <a:ea typeface="Calibri" panose="020F0502020204030204" pitchFamily="34" charset="0"/>
+                </a:rPr>
+                <a:t> </a:t>
+              </a:r>
+              <a:r>
+                <a:rPr lang="pt-BR" sz="800" kern="100">
+                  <a:solidFill>
+                    <a:srgbClr val="2F2115"/>
+                  </a:solidFill>
+                  <a:effectLst/>
+                  <a:latin typeface="Calibri" panose="020F0502020204030204" pitchFamily="34" charset="0"/>
+                  <a:ea typeface="Calibri" panose="020F0502020204030204" pitchFamily="34" charset="0"/>
+                </a:rPr>
+                <a:t>à</a:t>
+              </a:r>
+              <a:r>
+                <a:rPr lang="pt-BR" sz="800" kern="100" spc="-45">
+                  <a:solidFill>
+                    <a:srgbClr val="2F2115"/>
+                  </a:solidFill>
+                  <a:effectLst/>
+                  <a:latin typeface="Calibri" panose="020F0502020204030204" pitchFamily="34" charset="0"/>
+                  <a:ea typeface="Calibri" panose="020F0502020204030204" pitchFamily="34" charset="0"/>
+                </a:rPr>
+                <a:t> </a:t>
+              </a:r>
+              <a:r>
+                <a:rPr lang="pt-BR" sz="800" kern="100">
+                  <a:solidFill>
+                    <a:srgbClr val="2F2115"/>
+                  </a:solidFill>
+                  <a:effectLst/>
+                  <a:latin typeface="Calibri" panose="020F0502020204030204" pitchFamily="34" charset="0"/>
+                  <a:ea typeface="Calibri" panose="020F0502020204030204" pitchFamily="34" charset="0"/>
+                </a:rPr>
+                <a:t>criação</a:t>
+              </a:r>
+              <a:r>
+                <a:rPr lang="pt-BR" sz="800" kern="100" spc="-10">
+                  <a:solidFill>
+                    <a:srgbClr val="2F2115"/>
+                  </a:solidFill>
+                  <a:effectLst/>
+                  <a:latin typeface="Calibri" panose="020F0502020204030204" pitchFamily="34" charset="0"/>
+                  <a:ea typeface="Calibri" panose="020F0502020204030204" pitchFamily="34" charset="0"/>
+                </a:rPr>
+                <a:t> </a:t>
+              </a:r>
+              <a:endParaRPr lang="pt-BR" sz="1000" kern="100">
+                <a:solidFill>
+                  <a:srgbClr val="2F2115"/>
+                </a:solidFill>
+                <a:effectLst/>
+                <a:latin typeface="Times New Roman" panose="02020603050405020304" pitchFamily="18" charset="0"/>
+                <a:ea typeface="Times New Roman" panose="02020603050405020304" pitchFamily="18" charset="0"/>
+              </a:endParaRPr>
+            </a:p>
+          </p:txBody>
+        </p:sp>
+        <p:sp>
+          <p:nvSpPr>
+            <p:cNvPr id="10" name="Rectangle 1424">
+              <a:extLst>
+                <a:ext uri="{FF2B5EF4-FFF2-40B4-BE49-F238E27FC236}">
+                  <a16:creationId xmlns:a16="http://schemas.microsoft.com/office/drawing/2014/main" id="{B47FE852-EEE1-4146-FD80-299435506E0F}"/>
+                </a:ext>
+              </a:extLst>
+            </p:cNvPr>
+            <p:cNvSpPr/>
+            <p:nvPr/>
+          </p:nvSpPr>
+          <p:spPr>
+            <a:xfrm>
+              <a:off x="132164" y="2030624"/>
+              <a:ext cx="532958" cy="160127"/>
+            </a:xfrm>
+            <a:prstGeom prst="rect">
+              <a:avLst/>
+            </a:prstGeom>
+            <a:ln>
+              <a:noFill/>
+            </a:ln>
+          </p:spPr>
+          <p:txBody>
+            <a:bodyPr vert="horz" lIns="0" tIns="0" rIns="0" bIns="0" rtlCol="0">
+              <a:noAutofit/>
+            </a:bodyPr>
+            <a:lstStyle/>
+            <a:p>
+              <a:pPr marR="127000" indent="163830" algn="l">
+                <a:lnSpc>
+                  <a:spcPct val="107000"/>
+                </a:lnSpc>
+                <a:spcAft>
+                  <a:spcPts val="800"/>
+                </a:spcAft>
+              </a:pPr>
+              <a:r>
+                <a:rPr lang="pt-BR" sz="800" kern="100">
+                  <a:solidFill>
+                    <a:srgbClr val="2F2115"/>
+                  </a:solidFill>
+                  <a:effectLst/>
+                  <a:latin typeface="Calibri" panose="020F0502020204030204" pitchFamily="34" charset="0"/>
+                  <a:ea typeface="Calibri" panose="020F0502020204030204" pitchFamily="34" charset="0"/>
+                </a:rPr>
+                <a:t>da</a:t>
+              </a:r>
+              <a:r>
+                <a:rPr lang="pt-BR" sz="800" kern="100" spc="-5">
+                  <a:solidFill>
+                    <a:srgbClr val="2F2115"/>
+                  </a:solidFill>
+                  <a:effectLst/>
+                  <a:latin typeface="Calibri" panose="020F0502020204030204" pitchFamily="34" charset="0"/>
+                  <a:ea typeface="Calibri" panose="020F0502020204030204" pitchFamily="34" charset="0"/>
+                </a:rPr>
+                <a:t> </a:t>
+              </a:r>
+              <a:r>
+                <a:rPr lang="pt-BR" sz="800" kern="100">
+                  <a:solidFill>
+                    <a:srgbClr val="2F2115"/>
+                  </a:solidFill>
+                  <a:effectLst/>
+                  <a:latin typeface="Calibri" panose="020F0502020204030204" pitchFamily="34" charset="0"/>
+                  <a:ea typeface="Calibri" panose="020F0502020204030204" pitchFamily="34" charset="0"/>
+                </a:rPr>
+                <a:t>tabela</a:t>
+              </a:r>
+              <a:r>
+                <a:rPr lang="pt-BR" sz="800" kern="100" spc="-5">
+                  <a:solidFill>
+                    <a:srgbClr val="2F2115"/>
+                  </a:solidFill>
+                  <a:effectLst/>
+                  <a:latin typeface="Calibri" panose="020F0502020204030204" pitchFamily="34" charset="0"/>
+                  <a:ea typeface="Calibri" panose="020F0502020204030204" pitchFamily="34" charset="0"/>
+                </a:rPr>
+                <a:t> </a:t>
+              </a:r>
+              <a:endParaRPr lang="pt-BR" sz="1000" kern="100">
+                <a:solidFill>
+                  <a:srgbClr val="2F2115"/>
+                </a:solidFill>
+                <a:effectLst/>
+                <a:latin typeface="Times New Roman" panose="02020603050405020304" pitchFamily="18" charset="0"/>
+                <a:ea typeface="Times New Roman" panose="02020603050405020304" pitchFamily="18" charset="0"/>
+              </a:endParaRPr>
+            </a:p>
+          </p:txBody>
+        </p:sp>
+        <p:sp>
+          <p:nvSpPr>
+            <p:cNvPr id="11" name="Rectangle 1425">
+              <a:extLst>
+                <a:ext uri="{FF2B5EF4-FFF2-40B4-BE49-F238E27FC236}">
+                  <a16:creationId xmlns:a16="http://schemas.microsoft.com/office/drawing/2014/main" id="{89BABA5B-1140-616D-C435-0E55978A02E7}"/>
+                </a:ext>
+              </a:extLst>
+            </p:cNvPr>
+            <p:cNvSpPr/>
+            <p:nvPr/>
+          </p:nvSpPr>
+          <p:spPr>
+            <a:xfrm>
+              <a:off x="532886" y="2063361"/>
+              <a:ext cx="567538" cy="123383"/>
+            </a:xfrm>
+            <a:prstGeom prst="rect">
+              <a:avLst/>
+            </a:prstGeom>
+            <a:ln>
+              <a:noFill/>
+            </a:ln>
+          </p:spPr>
+          <p:txBody>
+            <a:bodyPr vert="horz" lIns="0" tIns="0" rIns="0" bIns="0" rtlCol="0">
+              <a:noAutofit/>
+            </a:bodyPr>
+            <a:lstStyle/>
+            <a:p>
+              <a:pPr marR="127000" indent="163830" algn="l">
+                <a:lnSpc>
+                  <a:spcPct val="107000"/>
+                </a:lnSpc>
+                <a:spcAft>
+                  <a:spcPts val="800"/>
+                </a:spcAft>
+              </a:pPr>
+              <a:r>
+                <a:rPr lang="pt-BR" sz="800" kern="100">
+                  <a:solidFill>
+                    <a:srgbClr val="2F2115"/>
+                  </a:solidFill>
+                  <a:effectLst/>
+                  <a:latin typeface="Courier New" panose="02070309020205020404" pitchFamily="49" charset="0"/>
+                  <a:ea typeface="Courier New" panose="02070309020205020404" pitchFamily="49" charset="0"/>
+                </a:rPr>
+                <a:t>CLIENTE</a:t>
+              </a:r>
+              <a:endParaRPr lang="pt-BR" sz="1000" kern="100">
+                <a:solidFill>
+                  <a:srgbClr val="2F2115"/>
+                </a:solidFill>
+                <a:effectLst/>
+                <a:latin typeface="Times New Roman" panose="02020603050405020304" pitchFamily="18" charset="0"/>
+                <a:ea typeface="Times New Roman" panose="02020603050405020304" pitchFamily="18" charset="0"/>
+              </a:endParaRPr>
+            </a:p>
+          </p:txBody>
+        </p:sp>
+        <p:sp>
+          <p:nvSpPr>
+            <p:cNvPr id="12" name="Rectangle 1426">
+              <a:extLst>
+                <a:ext uri="{FF2B5EF4-FFF2-40B4-BE49-F238E27FC236}">
+                  <a16:creationId xmlns:a16="http://schemas.microsoft.com/office/drawing/2014/main" id="{46DB3742-1BBE-92C2-D3B9-9FF1DE24A7FA}"/>
+                </a:ext>
+              </a:extLst>
+            </p:cNvPr>
+            <p:cNvSpPr/>
+            <p:nvPr/>
+          </p:nvSpPr>
+          <p:spPr>
+            <a:xfrm>
+              <a:off x="959676" y="2030624"/>
+              <a:ext cx="23512" cy="160127"/>
+            </a:xfrm>
+            <a:prstGeom prst="rect">
+              <a:avLst/>
+            </a:prstGeom>
+            <a:ln>
+              <a:noFill/>
+            </a:ln>
+          </p:spPr>
+          <p:txBody>
+            <a:bodyPr vert="horz" lIns="0" tIns="0" rIns="0" bIns="0" rtlCol="0">
+              <a:noAutofit/>
+            </a:bodyPr>
+            <a:lstStyle/>
+            <a:p>
+              <a:pPr marR="127000" indent="163830" algn="l">
+                <a:lnSpc>
+                  <a:spcPct val="107000"/>
+                </a:lnSpc>
+                <a:spcAft>
+                  <a:spcPts val="800"/>
+                </a:spcAft>
+              </a:pPr>
+              <a:r>
+                <a:rPr lang="pt-BR" sz="800" kern="100">
+                  <a:solidFill>
+                    <a:srgbClr val="2F2115"/>
+                  </a:solidFill>
+                  <a:effectLst/>
+                  <a:latin typeface="Calibri" panose="020F0502020204030204" pitchFamily="34" charset="0"/>
+                  <a:ea typeface="Calibri" panose="020F0502020204030204" pitchFamily="34" charset="0"/>
+                </a:rPr>
+                <a:t>.</a:t>
+              </a:r>
+              <a:endParaRPr lang="pt-BR" sz="1000" kern="100">
+                <a:solidFill>
+                  <a:srgbClr val="2F2115"/>
+                </a:solidFill>
+                <a:effectLst/>
+                <a:latin typeface="Times New Roman" panose="02020603050405020304" pitchFamily="18" charset="0"/>
+                <a:ea typeface="Times New Roman" panose="02020603050405020304" pitchFamily="18" charset="0"/>
+              </a:endParaRPr>
+            </a:p>
+          </p:txBody>
+        </p:sp>
+        <p:pic>
+          <p:nvPicPr>
+            <p:cNvPr id="13" name="Picture 1428">
+              <a:extLst>
+                <a:ext uri="{FF2B5EF4-FFF2-40B4-BE49-F238E27FC236}">
+                  <a16:creationId xmlns:a16="http://schemas.microsoft.com/office/drawing/2014/main" id="{87B10415-2FCD-FDCE-058D-9733D66C7FB7}"/>
+                </a:ext>
+              </a:extLst>
+            </p:cNvPr>
+            <p:cNvPicPr/>
+            <p:nvPr/>
+          </p:nvPicPr>
+          <p:blipFill>
+            <a:blip r:embed="rId2"/>
+            <a:stretch>
+              <a:fillRect/>
+            </a:stretch>
+          </p:blipFill>
+          <p:spPr>
+            <a:xfrm>
+              <a:off x="132119" y="147611"/>
+              <a:ext cx="1883664" cy="1632404"/>
+            </a:xfrm>
+            <a:prstGeom prst="rect">
+              <a:avLst/>
+            </a:prstGeom>
+          </p:spPr>
+        </p:pic>
+      </p:grpSp>
+    </p:spTree>
+    <p:extLst>
+      <p:ext uri="{BB962C8B-B14F-4D97-AF65-F5344CB8AC3E}">
+        <p14:creationId xmlns:p14="http://schemas.microsoft.com/office/powerpoint/2010/main" val="2103010523"/>
+      </p:ext>
+    </p:extLst>
+  </p:cSld>
+  <p:clrMapOvr>
+    <a:masterClrMapping/>
+  </p:clrMapOvr>
+</p:sld>
+</file>
+
+<file path=ppt/slides/slide55.xml><?xml version="1.0" encoding="utf-8"?>
+<p:sld xmlns:a="http://schemas.openxmlformats.org/drawingml/2006/main" xmlns:r="http://schemas.openxmlformats.org/officeDocument/2006/relationships" xmlns:p="http://schemas.openxmlformats.org/presentationml/2006/main">
+  <p:cSld>
+    <p:spTree>
+      <p:nvGrpSpPr>
+        <p:cNvPr id="1" name=""/>
+        <p:cNvGrpSpPr/>
+        <p:nvPr/>
+      </p:nvGrpSpPr>
+      <p:grpSpPr>
+        <a:xfrm>
+          <a:off x="0" y="0"/>
+          <a:ext cx="0" cy="0"/>
+          <a:chOff x="0" y="0"/>
+          <a:chExt cx="0" cy="0"/>
+        </a:xfrm>
+      </p:grpSpPr>
+      <p:sp>
+        <p:nvSpPr>
+          <p:cNvPr id="2" name="Título 1">
+            <a:extLst>
+              <a:ext uri="{FF2B5EF4-FFF2-40B4-BE49-F238E27FC236}">
+                <a16:creationId xmlns:a16="http://schemas.microsoft.com/office/drawing/2014/main" id="{CC7C5B47-35D0-CBC5-39AF-B5F44B677392}"/>
+              </a:ext>
+            </a:extLst>
+          </p:cNvPr>
+          <p:cNvSpPr>
+            <a:spLocks noGrp="1"/>
+          </p:cNvSpPr>
+          <p:nvPr>
+            <p:ph type="title"/>
+          </p:nvPr>
+        </p:nvSpPr>
+        <p:spPr/>
+        <p:txBody>
+          <a:bodyPr>
+            <a:normAutofit/>
+          </a:bodyPr>
+          <a:lstStyle/>
+          <a:p>
+            <a:r>
+              <a:rPr lang="pt-BR" sz="4400" b="1" dirty="0"/>
+              <a:t>MODELAGEM DE BANCO DE DADOS RELACIONAL</a:t>
+            </a:r>
+            <a:endParaRPr lang="pt-BR" sz="2700" dirty="0"/>
+          </a:p>
+        </p:txBody>
+      </p:sp>
+      <p:sp>
+        <p:nvSpPr>
+          <p:cNvPr id="3" name="Espaço Reservado para Conteúdo 2">
+            <a:extLst>
+              <a:ext uri="{FF2B5EF4-FFF2-40B4-BE49-F238E27FC236}">
+                <a16:creationId xmlns:a16="http://schemas.microsoft.com/office/drawing/2014/main" id="{59758A1E-514F-AFAC-13D2-56BDC5AADB96}"/>
+              </a:ext>
+            </a:extLst>
+          </p:cNvPr>
+          <p:cNvSpPr>
+            <a:spLocks noGrp="1"/>
+          </p:cNvSpPr>
+          <p:nvPr>
+            <p:ph idx="1"/>
+          </p:nvPr>
+        </p:nvSpPr>
+        <p:spPr>
+          <a:xfrm>
+            <a:off x="1097279" y="1923026"/>
+            <a:ext cx="5696695" cy="4384468"/>
+          </a:xfrm>
+          <a:ln>
+            <a:solidFill>
+              <a:schemeClr val="bg1"/>
+            </a:solidFill>
+          </a:ln>
+        </p:spPr>
+        <p:style>
+          <a:lnRef idx="2">
+            <a:schemeClr val="dk1"/>
+          </a:lnRef>
+          <a:fillRef idx="1">
+            <a:schemeClr val="lt1"/>
+          </a:fillRef>
+          <a:effectRef idx="0">
+            <a:schemeClr val="dk1"/>
+          </a:effectRef>
+          <a:fontRef idx="minor">
+            <a:schemeClr val="dk1"/>
+          </a:fontRef>
+        </p:style>
+        <p:txBody>
+          <a:bodyPr>
+            <a:normAutofit/>
+          </a:bodyPr>
+          <a:lstStyle/>
+          <a:p>
+            <a:pPr marL="0" indent="0">
+              <a:buNone/>
+            </a:pPr>
+            <a:r>
+              <a:rPr lang="pt-BR" sz="2400" dirty="0"/>
+              <a:t>Na figura ao lado, observamos que os campos CPF e NOME são atributos obrigatórios, por se tratar de chave primária e um campo definido com NOT NULL.</a:t>
+            </a:r>
+          </a:p>
+        </p:txBody>
+      </p:sp>
+      <p:grpSp>
+        <p:nvGrpSpPr>
+          <p:cNvPr id="6" name="Group 19310">
+            <a:extLst>
+              <a:ext uri="{FF2B5EF4-FFF2-40B4-BE49-F238E27FC236}">
+                <a16:creationId xmlns:a16="http://schemas.microsoft.com/office/drawing/2014/main" id="{5BE00E53-DB49-DBBE-80F4-59452CA7F7AE}"/>
+              </a:ext>
+            </a:extLst>
+          </p:cNvPr>
+          <p:cNvGrpSpPr/>
+          <p:nvPr/>
+        </p:nvGrpSpPr>
+        <p:grpSpPr>
+          <a:xfrm>
+            <a:off x="6907528" y="1817370"/>
+            <a:ext cx="4998721" cy="4384468"/>
+            <a:chOff x="0" y="0"/>
+            <a:chExt cx="2521441" cy="2241144"/>
+          </a:xfrm>
+        </p:grpSpPr>
+        <p:sp>
+          <p:nvSpPr>
+            <p:cNvPr id="7" name="Shape 1421">
+              <a:extLst>
+                <a:ext uri="{FF2B5EF4-FFF2-40B4-BE49-F238E27FC236}">
+                  <a16:creationId xmlns:a16="http://schemas.microsoft.com/office/drawing/2014/main" id="{747422AA-88D3-DDC5-14DC-2E393E1347FB}"/>
+                </a:ext>
+              </a:extLst>
+            </p:cNvPr>
+            <p:cNvSpPr/>
+            <p:nvPr/>
+          </p:nvSpPr>
+          <p:spPr>
+            <a:xfrm>
+              <a:off x="0" y="0"/>
+              <a:ext cx="2147900" cy="2241144"/>
+            </a:xfrm>
+            <a:custGeom>
+              <a:avLst/>
+              <a:gdLst/>
+              <a:ahLst/>
+              <a:cxnLst/>
+              <a:rect l="0" t="0" r="0" b="0"/>
+              <a:pathLst>
+                <a:path w="2147900" h="2241144">
+                  <a:moveTo>
+                    <a:pt x="108001" y="0"/>
+                  </a:moveTo>
+                  <a:cubicBezTo>
+                    <a:pt x="108001" y="0"/>
+                    <a:pt x="0" y="0"/>
+                    <a:pt x="0" y="108001"/>
+                  </a:cubicBezTo>
+                  <a:lnTo>
+                    <a:pt x="0" y="2133143"/>
+                  </a:lnTo>
+                  <a:cubicBezTo>
+                    <a:pt x="0" y="2133143"/>
+                    <a:pt x="0" y="2241144"/>
+                    <a:pt x="108001" y="2241144"/>
+                  </a:cubicBezTo>
+                  <a:lnTo>
+                    <a:pt x="2039900" y="2241144"/>
+                  </a:lnTo>
+                  <a:cubicBezTo>
+                    <a:pt x="2039900" y="2241144"/>
+                    <a:pt x="2147900" y="2241144"/>
+                    <a:pt x="2147900" y="2133143"/>
+                  </a:cubicBezTo>
+                  <a:lnTo>
+                    <a:pt x="2147900" y="108001"/>
+                  </a:lnTo>
+                  <a:cubicBezTo>
+                    <a:pt x="2147900" y="108001"/>
+                    <a:pt x="2147900" y="0"/>
+                    <a:pt x="2039900" y="0"/>
+                  </a:cubicBezTo>
+                  <a:lnTo>
+                    <a:pt x="108001" y="0"/>
+                  </a:lnTo>
+                  <a:close/>
+                </a:path>
+              </a:pathLst>
+            </a:custGeom>
+            <a:ln w="12700" cap="flat">
+              <a:miter lim="100000"/>
+            </a:ln>
+          </p:spPr>
+          <p:style>
+            <a:lnRef idx="1">
+              <a:srgbClr val="6B6764"/>
+            </a:lnRef>
+            <a:fillRef idx="0">
+              <a:srgbClr val="000000">
+                <a:alpha val="0"/>
+              </a:srgbClr>
+            </a:fillRef>
+            <a:effectRef idx="0">
+              <a:scrgbClr r="0" g="0" b="0"/>
+            </a:effectRef>
+            <a:fontRef idx="none"/>
+          </p:style>
+          <p:txBody>
+            <a:bodyPr/>
+            <a:lstStyle/>
+            <a:p>
+              <a:endParaRPr lang="pt-BR"/>
+            </a:p>
+          </p:txBody>
+        </p:sp>
+        <p:sp>
+          <p:nvSpPr>
+            <p:cNvPr id="8" name="Rectangle 1422">
+              <a:extLst>
+                <a:ext uri="{FF2B5EF4-FFF2-40B4-BE49-F238E27FC236}">
+                  <a16:creationId xmlns:a16="http://schemas.microsoft.com/office/drawing/2014/main" id="{E86805D9-166C-C0B9-843F-5C2D6A6F10E3}"/>
+                </a:ext>
+              </a:extLst>
+            </p:cNvPr>
+            <p:cNvSpPr/>
+            <p:nvPr/>
+          </p:nvSpPr>
+          <p:spPr>
+            <a:xfrm>
+              <a:off x="132164" y="1887165"/>
+              <a:ext cx="590237" cy="165126"/>
+            </a:xfrm>
+            <a:prstGeom prst="rect">
+              <a:avLst/>
+            </a:prstGeom>
+            <a:ln>
+              <a:noFill/>
+            </a:ln>
+          </p:spPr>
+          <p:txBody>
+            <a:bodyPr vert="horz" lIns="0" tIns="0" rIns="0" bIns="0" rtlCol="0">
+              <a:noAutofit/>
+            </a:bodyPr>
+            <a:lstStyle/>
+            <a:p>
+              <a:pPr marR="127000" indent="163830" algn="l">
+                <a:lnSpc>
+                  <a:spcPct val="107000"/>
+                </a:lnSpc>
+                <a:spcAft>
+                  <a:spcPts val="800"/>
+                </a:spcAft>
+              </a:pPr>
+              <a:r>
+                <a:rPr lang="pt-BR" sz="800" b="1" kern="100">
+                  <a:solidFill>
+                    <a:srgbClr val="2F2115"/>
+                  </a:solidFill>
+                  <a:effectLst/>
+                  <a:latin typeface="Calibri" panose="020F0502020204030204" pitchFamily="34" charset="0"/>
+                  <a:ea typeface="Calibri" panose="020F0502020204030204" pitchFamily="34" charset="0"/>
+                </a:rPr>
+                <a:t>Figura</a:t>
+              </a:r>
+              <a:r>
+                <a:rPr lang="pt-BR" sz="800" b="1" kern="100" spc="-55">
+                  <a:solidFill>
+                    <a:srgbClr val="2F2115"/>
+                  </a:solidFill>
+                  <a:effectLst/>
+                  <a:latin typeface="Calibri" panose="020F0502020204030204" pitchFamily="34" charset="0"/>
+                  <a:ea typeface="Calibri" panose="020F0502020204030204" pitchFamily="34" charset="0"/>
+                </a:rPr>
+                <a:t> </a:t>
+              </a:r>
+              <a:r>
+                <a:rPr lang="pt-BR" sz="800" b="1" kern="100">
+                  <a:solidFill>
+                    <a:srgbClr val="2F2115"/>
+                  </a:solidFill>
+                  <a:effectLst/>
+                  <a:latin typeface="Calibri" panose="020F0502020204030204" pitchFamily="34" charset="0"/>
+                  <a:ea typeface="Calibri" panose="020F0502020204030204" pitchFamily="34" charset="0"/>
+                </a:rPr>
+                <a:t>14.</a:t>
+              </a:r>
+              <a:r>
+                <a:rPr lang="pt-BR" sz="800" b="1" kern="100" spc="-20">
+                  <a:solidFill>
+                    <a:srgbClr val="2F2115"/>
+                  </a:solidFill>
+                  <a:effectLst/>
+                  <a:latin typeface="Calibri" panose="020F0502020204030204" pitchFamily="34" charset="0"/>
+                  <a:ea typeface="Calibri" panose="020F0502020204030204" pitchFamily="34" charset="0"/>
+                </a:rPr>
+                <a:t> </a:t>
+              </a:r>
+              <a:endParaRPr lang="pt-BR" sz="1000" kern="100">
+                <a:solidFill>
+                  <a:srgbClr val="2F2115"/>
+                </a:solidFill>
+                <a:effectLst/>
+                <a:latin typeface="Times New Roman" panose="02020603050405020304" pitchFamily="18" charset="0"/>
+                <a:ea typeface="Times New Roman" panose="02020603050405020304" pitchFamily="18" charset="0"/>
+              </a:endParaRPr>
+            </a:p>
+          </p:txBody>
+        </p:sp>
+        <p:sp>
+          <p:nvSpPr>
+            <p:cNvPr id="9" name="Rectangle 1423">
+              <a:extLst>
+                <a:ext uri="{FF2B5EF4-FFF2-40B4-BE49-F238E27FC236}">
+                  <a16:creationId xmlns:a16="http://schemas.microsoft.com/office/drawing/2014/main" id="{18DEEE8F-4308-1B9C-2685-009C8BD7F70F}"/>
+                </a:ext>
+              </a:extLst>
+            </p:cNvPr>
+            <p:cNvSpPr/>
+            <p:nvPr/>
+          </p:nvSpPr>
+          <p:spPr>
+            <a:xfrm>
+              <a:off x="571551" y="1890924"/>
+              <a:ext cx="1949890" cy="160127"/>
+            </a:xfrm>
+            <a:prstGeom prst="rect">
+              <a:avLst/>
+            </a:prstGeom>
+            <a:ln>
+              <a:noFill/>
+            </a:ln>
+          </p:spPr>
+          <p:txBody>
+            <a:bodyPr vert="horz" lIns="0" tIns="0" rIns="0" bIns="0" rtlCol="0">
+              <a:noAutofit/>
+            </a:bodyPr>
+            <a:lstStyle/>
+            <a:p>
+              <a:pPr marR="127000" indent="163830" algn="l">
+                <a:lnSpc>
+                  <a:spcPct val="107000"/>
+                </a:lnSpc>
+                <a:spcAft>
+                  <a:spcPts val="800"/>
+                </a:spcAft>
+              </a:pPr>
+              <a:r>
+                <a:rPr lang="pt-BR" sz="800" kern="100">
+                  <a:solidFill>
+                    <a:srgbClr val="2F2115"/>
+                  </a:solidFill>
+                  <a:effectLst/>
+                  <a:latin typeface="Calibri" panose="020F0502020204030204" pitchFamily="34" charset="0"/>
+                  <a:ea typeface="Calibri" panose="020F0502020204030204" pitchFamily="34" charset="0"/>
+                </a:rPr>
+                <a:t>Instrução</a:t>
+              </a:r>
+              <a:r>
+                <a:rPr lang="pt-BR" sz="800" kern="100" spc="-45">
+                  <a:solidFill>
+                    <a:srgbClr val="2F2115"/>
+                  </a:solidFill>
+                  <a:effectLst/>
+                  <a:latin typeface="Calibri" panose="020F0502020204030204" pitchFamily="34" charset="0"/>
+                  <a:ea typeface="Calibri" panose="020F0502020204030204" pitchFamily="34" charset="0"/>
+                </a:rPr>
+                <a:t> </a:t>
+              </a:r>
+              <a:r>
+                <a:rPr lang="pt-BR" sz="800" kern="100">
+                  <a:solidFill>
+                    <a:srgbClr val="2F2115"/>
+                  </a:solidFill>
+                  <a:effectLst/>
+                  <a:latin typeface="Calibri" panose="020F0502020204030204" pitchFamily="34" charset="0"/>
+                  <a:ea typeface="Calibri" panose="020F0502020204030204" pitchFamily="34" charset="0"/>
+                </a:rPr>
+                <a:t>em</a:t>
+              </a:r>
+              <a:r>
+                <a:rPr lang="pt-BR" sz="800" kern="100" spc="-45">
+                  <a:solidFill>
+                    <a:srgbClr val="2F2115"/>
+                  </a:solidFill>
+                  <a:effectLst/>
+                  <a:latin typeface="Calibri" panose="020F0502020204030204" pitchFamily="34" charset="0"/>
+                  <a:ea typeface="Calibri" panose="020F0502020204030204" pitchFamily="34" charset="0"/>
+                </a:rPr>
+                <a:t> </a:t>
+              </a:r>
+              <a:r>
+                <a:rPr lang="pt-BR" sz="800" kern="100">
+                  <a:solidFill>
+                    <a:srgbClr val="2F2115"/>
+                  </a:solidFill>
+                  <a:effectLst/>
+                  <a:latin typeface="Calibri" panose="020F0502020204030204" pitchFamily="34" charset="0"/>
+                  <a:ea typeface="Calibri" panose="020F0502020204030204" pitchFamily="34" charset="0"/>
+                </a:rPr>
+                <a:t>SQL</a:t>
+              </a:r>
+              <a:r>
+                <a:rPr lang="pt-BR" sz="800" kern="100" spc="-45">
+                  <a:solidFill>
+                    <a:srgbClr val="2F2115"/>
+                  </a:solidFill>
+                  <a:effectLst/>
+                  <a:latin typeface="Calibri" panose="020F0502020204030204" pitchFamily="34" charset="0"/>
+                  <a:ea typeface="Calibri" panose="020F0502020204030204" pitchFamily="34" charset="0"/>
+                </a:rPr>
+                <a:t> </a:t>
+              </a:r>
+              <a:r>
+                <a:rPr lang="pt-BR" sz="800" kern="100">
+                  <a:solidFill>
+                    <a:srgbClr val="2F2115"/>
+                  </a:solidFill>
+                  <a:effectLst/>
+                  <a:latin typeface="Calibri" panose="020F0502020204030204" pitchFamily="34" charset="0"/>
+                  <a:ea typeface="Calibri" panose="020F0502020204030204" pitchFamily="34" charset="0"/>
+                </a:rPr>
+                <a:t>referente</a:t>
+              </a:r>
+              <a:r>
+                <a:rPr lang="pt-BR" sz="800" kern="100" spc="-45">
+                  <a:solidFill>
+                    <a:srgbClr val="2F2115"/>
+                  </a:solidFill>
+                  <a:effectLst/>
+                  <a:latin typeface="Calibri" panose="020F0502020204030204" pitchFamily="34" charset="0"/>
+                  <a:ea typeface="Calibri" panose="020F0502020204030204" pitchFamily="34" charset="0"/>
+                </a:rPr>
+                <a:t> </a:t>
+              </a:r>
+              <a:r>
+                <a:rPr lang="pt-BR" sz="800" kern="100">
+                  <a:solidFill>
+                    <a:srgbClr val="2F2115"/>
+                  </a:solidFill>
+                  <a:effectLst/>
+                  <a:latin typeface="Calibri" panose="020F0502020204030204" pitchFamily="34" charset="0"/>
+                  <a:ea typeface="Calibri" panose="020F0502020204030204" pitchFamily="34" charset="0"/>
+                </a:rPr>
+                <a:t>à</a:t>
+              </a:r>
+              <a:r>
+                <a:rPr lang="pt-BR" sz="800" kern="100" spc="-45">
+                  <a:solidFill>
+                    <a:srgbClr val="2F2115"/>
+                  </a:solidFill>
+                  <a:effectLst/>
+                  <a:latin typeface="Calibri" panose="020F0502020204030204" pitchFamily="34" charset="0"/>
+                  <a:ea typeface="Calibri" panose="020F0502020204030204" pitchFamily="34" charset="0"/>
+                </a:rPr>
+                <a:t> </a:t>
+              </a:r>
+              <a:r>
+                <a:rPr lang="pt-BR" sz="800" kern="100">
+                  <a:solidFill>
+                    <a:srgbClr val="2F2115"/>
+                  </a:solidFill>
+                  <a:effectLst/>
+                  <a:latin typeface="Calibri" panose="020F0502020204030204" pitchFamily="34" charset="0"/>
+                  <a:ea typeface="Calibri" panose="020F0502020204030204" pitchFamily="34" charset="0"/>
+                </a:rPr>
+                <a:t>criação</a:t>
+              </a:r>
+              <a:r>
+                <a:rPr lang="pt-BR" sz="800" kern="100" spc="-10">
+                  <a:solidFill>
+                    <a:srgbClr val="2F2115"/>
+                  </a:solidFill>
+                  <a:effectLst/>
+                  <a:latin typeface="Calibri" panose="020F0502020204030204" pitchFamily="34" charset="0"/>
+                  <a:ea typeface="Calibri" panose="020F0502020204030204" pitchFamily="34" charset="0"/>
+                </a:rPr>
+                <a:t> </a:t>
+              </a:r>
+              <a:endParaRPr lang="pt-BR" sz="1000" kern="100">
+                <a:solidFill>
+                  <a:srgbClr val="2F2115"/>
+                </a:solidFill>
+                <a:effectLst/>
+                <a:latin typeface="Times New Roman" panose="02020603050405020304" pitchFamily="18" charset="0"/>
+                <a:ea typeface="Times New Roman" panose="02020603050405020304" pitchFamily="18" charset="0"/>
+              </a:endParaRPr>
+            </a:p>
+          </p:txBody>
+        </p:sp>
+        <p:sp>
+          <p:nvSpPr>
+            <p:cNvPr id="10" name="Rectangle 1424">
+              <a:extLst>
+                <a:ext uri="{FF2B5EF4-FFF2-40B4-BE49-F238E27FC236}">
+                  <a16:creationId xmlns:a16="http://schemas.microsoft.com/office/drawing/2014/main" id="{B47FE852-EEE1-4146-FD80-299435506E0F}"/>
+                </a:ext>
+              </a:extLst>
+            </p:cNvPr>
+            <p:cNvSpPr/>
+            <p:nvPr/>
+          </p:nvSpPr>
+          <p:spPr>
+            <a:xfrm>
+              <a:off x="132164" y="2030624"/>
+              <a:ext cx="532958" cy="160127"/>
+            </a:xfrm>
+            <a:prstGeom prst="rect">
+              <a:avLst/>
+            </a:prstGeom>
+            <a:ln>
+              <a:noFill/>
+            </a:ln>
+          </p:spPr>
+          <p:txBody>
+            <a:bodyPr vert="horz" lIns="0" tIns="0" rIns="0" bIns="0" rtlCol="0">
+              <a:noAutofit/>
+            </a:bodyPr>
+            <a:lstStyle/>
+            <a:p>
+              <a:pPr marR="127000" indent="163830" algn="l">
+                <a:lnSpc>
+                  <a:spcPct val="107000"/>
+                </a:lnSpc>
+                <a:spcAft>
+                  <a:spcPts val="800"/>
+                </a:spcAft>
+              </a:pPr>
+              <a:r>
+                <a:rPr lang="pt-BR" sz="800" kern="100">
+                  <a:solidFill>
+                    <a:srgbClr val="2F2115"/>
+                  </a:solidFill>
+                  <a:effectLst/>
+                  <a:latin typeface="Calibri" panose="020F0502020204030204" pitchFamily="34" charset="0"/>
+                  <a:ea typeface="Calibri" panose="020F0502020204030204" pitchFamily="34" charset="0"/>
+                </a:rPr>
+                <a:t>da</a:t>
+              </a:r>
+              <a:r>
+                <a:rPr lang="pt-BR" sz="800" kern="100" spc="-5">
+                  <a:solidFill>
+                    <a:srgbClr val="2F2115"/>
+                  </a:solidFill>
+                  <a:effectLst/>
+                  <a:latin typeface="Calibri" panose="020F0502020204030204" pitchFamily="34" charset="0"/>
+                  <a:ea typeface="Calibri" panose="020F0502020204030204" pitchFamily="34" charset="0"/>
+                </a:rPr>
+                <a:t> </a:t>
+              </a:r>
+              <a:r>
+                <a:rPr lang="pt-BR" sz="800" kern="100">
+                  <a:solidFill>
+                    <a:srgbClr val="2F2115"/>
+                  </a:solidFill>
+                  <a:effectLst/>
+                  <a:latin typeface="Calibri" panose="020F0502020204030204" pitchFamily="34" charset="0"/>
+                  <a:ea typeface="Calibri" panose="020F0502020204030204" pitchFamily="34" charset="0"/>
+                </a:rPr>
+                <a:t>tabela</a:t>
+              </a:r>
+              <a:r>
+                <a:rPr lang="pt-BR" sz="800" kern="100" spc="-5">
+                  <a:solidFill>
+                    <a:srgbClr val="2F2115"/>
+                  </a:solidFill>
+                  <a:effectLst/>
+                  <a:latin typeface="Calibri" panose="020F0502020204030204" pitchFamily="34" charset="0"/>
+                  <a:ea typeface="Calibri" panose="020F0502020204030204" pitchFamily="34" charset="0"/>
+                </a:rPr>
+                <a:t> </a:t>
+              </a:r>
+              <a:endParaRPr lang="pt-BR" sz="1000" kern="100">
+                <a:solidFill>
+                  <a:srgbClr val="2F2115"/>
+                </a:solidFill>
+                <a:effectLst/>
+                <a:latin typeface="Times New Roman" panose="02020603050405020304" pitchFamily="18" charset="0"/>
+                <a:ea typeface="Times New Roman" panose="02020603050405020304" pitchFamily="18" charset="0"/>
+              </a:endParaRPr>
+            </a:p>
+          </p:txBody>
+        </p:sp>
+        <p:sp>
+          <p:nvSpPr>
+            <p:cNvPr id="11" name="Rectangle 1425">
+              <a:extLst>
+                <a:ext uri="{FF2B5EF4-FFF2-40B4-BE49-F238E27FC236}">
+                  <a16:creationId xmlns:a16="http://schemas.microsoft.com/office/drawing/2014/main" id="{89BABA5B-1140-616D-C435-0E55978A02E7}"/>
+                </a:ext>
+              </a:extLst>
+            </p:cNvPr>
+            <p:cNvSpPr/>
+            <p:nvPr/>
+          </p:nvSpPr>
+          <p:spPr>
+            <a:xfrm>
+              <a:off x="532886" y="2063361"/>
+              <a:ext cx="567538" cy="123383"/>
+            </a:xfrm>
+            <a:prstGeom prst="rect">
+              <a:avLst/>
+            </a:prstGeom>
+            <a:ln>
+              <a:noFill/>
+            </a:ln>
+          </p:spPr>
+          <p:txBody>
+            <a:bodyPr vert="horz" lIns="0" tIns="0" rIns="0" bIns="0" rtlCol="0">
+              <a:noAutofit/>
+            </a:bodyPr>
+            <a:lstStyle/>
+            <a:p>
+              <a:pPr marR="127000" indent="163830" algn="l">
+                <a:lnSpc>
+                  <a:spcPct val="107000"/>
+                </a:lnSpc>
+                <a:spcAft>
+                  <a:spcPts val="800"/>
+                </a:spcAft>
+              </a:pPr>
+              <a:r>
+                <a:rPr lang="pt-BR" sz="800" kern="100">
+                  <a:solidFill>
+                    <a:srgbClr val="2F2115"/>
+                  </a:solidFill>
+                  <a:effectLst/>
+                  <a:latin typeface="Courier New" panose="02070309020205020404" pitchFamily="49" charset="0"/>
+                  <a:ea typeface="Courier New" panose="02070309020205020404" pitchFamily="49" charset="0"/>
+                </a:rPr>
+                <a:t>CLIENTE</a:t>
+              </a:r>
+              <a:endParaRPr lang="pt-BR" sz="1000" kern="100">
+                <a:solidFill>
+                  <a:srgbClr val="2F2115"/>
+                </a:solidFill>
+                <a:effectLst/>
+                <a:latin typeface="Times New Roman" panose="02020603050405020304" pitchFamily="18" charset="0"/>
+                <a:ea typeface="Times New Roman" panose="02020603050405020304" pitchFamily="18" charset="0"/>
+              </a:endParaRPr>
+            </a:p>
+          </p:txBody>
+        </p:sp>
+        <p:sp>
+          <p:nvSpPr>
+            <p:cNvPr id="12" name="Rectangle 1426">
+              <a:extLst>
+                <a:ext uri="{FF2B5EF4-FFF2-40B4-BE49-F238E27FC236}">
+                  <a16:creationId xmlns:a16="http://schemas.microsoft.com/office/drawing/2014/main" id="{46DB3742-1BBE-92C2-D3B9-9FF1DE24A7FA}"/>
+                </a:ext>
+              </a:extLst>
+            </p:cNvPr>
+            <p:cNvSpPr/>
+            <p:nvPr/>
+          </p:nvSpPr>
+          <p:spPr>
+            <a:xfrm>
+              <a:off x="959676" y="2030624"/>
+              <a:ext cx="23512" cy="160127"/>
+            </a:xfrm>
+            <a:prstGeom prst="rect">
+              <a:avLst/>
+            </a:prstGeom>
+            <a:ln>
+              <a:noFill/>
+            </a:ln>
+          </p:spPr>
+          <p:txBody>
+            <a:bodyPr vert="horz" lIns="0" tIns="0" rIns="0" bIns="0" rtlCol="0">
+              <a:noAutofit/>
+            </a:bodyPr>
+            <a:lstStyle/>
+            <a:p>
+              <a:pPr marR="127000" indent="163830" algn="l">
+                <a:lnSpc>
+                  <a:spcPct val="107000"/>
+                </a:lnSpc>
+                <a:spcAft>
+                  <a:spcPts val="800"/>
+                </a:spcAft>
+              </a:pPr>
+              <a:r>
+                <a:rPr lang="pt-BR" sz="800" kern="100">
+                  <a:solidFill>
+                    <a:srgbClr val="2F2115"/>
+                  </a:solidFill>
+                  <a:effectLst/>
+                  <a:latin typeface="Calibri" panose="020F0502020204030204" pitchFamily="34" charset="0"/>
+                  <a:ea typeface="Calibri" panose="020F0502020204030204" pitchFamily="34" charset="0"/>
+                </a:rPr>
+                <a:t>.</a:t>
+              </a:r>
+              <a:endParaRPr lang="pt-BR" sz="1000" kern="100">
+                <a:solidFill>
+                  <a:srgbClr val="2F2115"/>
+                </a:solidFill>
+                <a:effectLst/>
+                <a:latin typeface="Times New Roman" panose="02020603050405020304" pitchFamily="18" charset="0"/>
+                <a:ea typeface="Times New Roman" panose="02020603050405020304" pitchFamily="18" charset="0"/>
+              </a:endParaRPr>
+            </a:p>
+          </p:txBody>
+        </p:sp>
+        <p:pic>
+          <p:nvPicPr>
+            <p:cNvPr id="13" name="Picture 1428">
+              <a:extLst>
+                <a:ext uri="{FF2B5EF4-FFF2-40B4-BE49-F238E27FC236}">
+                  <a16:creationId xmlns:a16="http://schemas.microsoft.com/office/drawing/2014/main" id="{87B10415-2FCD-FDCE-058D-9733D66C7FB7}"/>
+                </a:ext>
+              </a:extLst>
+            </p:cNvPr>
+            <p:cNvPicPr/>
+            <p:nvPr/>
+          </p:nvPicPr>
+          <p:blipFill>
+            <a:blip r:embed="rId2"/>
+            <a:stretch>
+              <a:fillRect/>
+            </a:stretch>
+          </p:blipFill>
+          <p:spPr>
+            <a:xfrm>
+              <a:off x="132119" y="147611"/>
+              <a:ext cx="1883664" cy="1632404"/>
+            </a:xfrm>
+            <a:prstGeom prst="rect">
+              <a:avLst/>
+            </a:prstGeom>
+          </p:spPr>
+        </p:pic>
+      </p:grpSp>
+    </p:spTree>
+    <p:extLst>
+      <p:ext uri="{BB962C8B-B14F-4D97-AF65-F5344CB8AC3E}">
+        <p14:creationId xmlns:p14="http://schemas.microsoft.com/office/powerpoint/2010/main" val="4119425102"/>
+      </p:ext>
+    </p:extLst>
+  </p:cSld>
+  <p:clrMapOvr>
+    <a:masterClrMapping/>
+  </p:clrMapOvr>
+</p:sld>
+</file>
+
+<file path=ppt/slides/slide56.xml><?xml version="1.0" encoding="utf-8"?>
+<p:sld xmlns:a="http://schemas.openxmlformats.org/drawingml/2006/main" xmlns:r="http://schemas.openxmlformats.org/officeDocument/2006/relationships" xmlns:p="http://schemas.openxmlformats.org/presentationml/2006/main">
+  <p:cSld>
+    <p:spTree>
+      <p:nvGrpSpPr>
+        <p:cNvPr id="1" name=""/>
+        <p:cNvGrpSpPr/>
+        <p:nvPr/>
+      </p:nvGrpSpPr>
+      <p:grpSpPr>
+        <a:xfrm>
+          <a:off x="0" y="0"/>
+          <a:ext cx="0" cy="0"/>
+          <a:chOff x="0" y="0"/>
+          <a:chExt cx="0" cy="0"/>
+        </a:xfrm>
+      </p:grpSpPr>
+      <p:sp>
+        <p:nvSpPr>
+          <p:cNvPr id="2" name="Título 1">
+            <a:extLst>
+              <a:ext uri="{FF2B5EF4-FFF2-40B4-BE49-F238E27FC236}">
+                <a16:creationId xmlns:a16="http://schemas.microsoft.com/office/drawing/2014/main" id="{CC7C5B47-35D0-CBC5-39AF-B5F44B677392}"/>
+              </a:ext>
+            </a:extLst>
+          </p:cNvPr>
+          <p:cNvSpPr>
+            <a:spLocks noGrp="1"/>
+          </p:cNvSpPr>
+          <p:nvPr>
+            <p:ph type="title"/>
+          </p:nvPr>
+        </p:nvSpPr>
+        <p:spPr>
+          <a:xfrm>
+            <a:off x="927120" y="310873"/>
+            <a:ext cx="10058400" cy="1450757"/>
+          </a:xfrm>
+        </p:spPr>
+        <p:txBody>
+          <a:bodyPr>
+            <a:normAutofit/>
+          </a:bodyPr>
+          <a:lstStyle/>
+          <a:p>
+            <a:r>
+              <a:rPr lang="pt-BR" sz="4400" b="1" dirty="0"/>
+              <a:t>MODELAGEM DE BANCO DE DADOS RELACIONAL</a:t>
+            </a:r>
+            <a:endParaRPr lang="pt-BR" sz="2700" dirty="0"/>
+          </a:p>
+        </p:txBody>
+      </p:sp>
+      <p:sp>
+        <p:nvSpPr>
+          <p:cNvPr id="3" name="Espaço Reservado para Conteúdo 2">
+            <a:extLst>
+              <a:ext uri="{FF2B5EF4-FFF2-40B4-BE49-F238E27FC236}">
+                <a16:creationId xmlns:a16="http://schemas.microsoft.com/office/drawing/2014/main" id="{59758A1E-514F-AFAC-13D2-56BDC5AADB96}"/>
+              </a:ext>
+            </a:extLst>
+          </p:cNvPr>
+          <p:cNvSpPr>
+            <a:spLocks noGrp="1"/>
+          </p:cNvSpPr>
+          <p:nvPr>
+            <p:ph idx="1"/>
+          </p:nvPr>
+        </p:nvSpPr>
+        <p:spPr>
+          <a:xfrm>
+            <a:off x="1097279" y="1923026"/>
+            <a:ext cx="5883007" cy="4384468"/>
+          </a:xfrm>
+          <a:ln>
+            <a:solidFill>
+              <a:schemeClr val="bg1"/>
+            </a:solidFill>
+          </a:ln>
+        </p:spPr>
+        <p:style>
+          <a:lnRef idx="2">
+            <a:schemeClr val="dk1"/>
+          </a:lnRef>
+          <a:fillRef idx="1">
+            <a:schemeClr val="lt1"/>
+          </a:fillRef>
+          <a:effectRef idx="0">
+            <a:schemeClr val="dk1"/>
+          </a:effectRef>
+          <a:fontRef idx="minor">
+            <a:schemeClr val="dk1"/>
+          </a:fontRef>
+        </p:style>
+        <p:txBody>
+          <a:bodyPr>
+            <a:normAutofit/>
+          </a:bodyPr>
+          <a:lstStyle/>
+          <a:p>
+            <a:pPr marL="0" indent="0">
+              <a:buNone/>
+            </a:pPr>
+            <a:r>
+              <a:rPr lang="pt-BR" sz="2400" dirty="0"/>
+              <a:t>No caso das restrições com chaves primárias e integridade referenciais, são adotados os comandos PRIMARY KEY e UNIQUE.</a:t>
+            </a:r>
+          </a:p>
+          <a:p>
+            <a:pPr marL="0" indent="0">
+              <a:buNone/>
+            </a:pPr>
+            <a:r>
+              <a:rPr lang="pt-BR" sz="2400" dirty="0"/>
+              <a:t>A cláusula PRIMARY KEY representa o atributo como a chave primária.</a:t>
+            </a:r>
+          </a:p>
+          <a:p>
+            <a:pPr marL="0" indent="0">
+              <a:buNone/>
+            </a:pPr>
+            <a:r>
+              <a:rPr lang="pt-BR" sz="2400" dirty="0"/>
+              <a:t>A cláusula UNIQUE é utilizada para especificar chaves únicas, que não são primárias em uma tabela.</a:t>
+            </a:r>
+          </a:p>
+          <a:p>
+            <a:pPr marL="0" indent="0">
+              <a:buNone/>
+            </a:pPr>
+            <a:r>
+              <a:rPr lang="pt-BR" sz="2400" dirty="0"/>
+              <a:t>A cláusula FOREIGN KEY está relacionada as restrições de integridade utilizando os campos EMAIL e TELEFONE.</a:t>
+            </a:r>
+          </a:p>
+        </p:txBody>
+      </p:sp>
+      <p:grpSp>
+        <p:nvGrpSpPr>
+          <p:cNvPr id="5" name="Group 20251">
+            <a:extLst>
+              <a:ext uri="{FF2B5EF4-FFF2-40B4-BE49-F238E27FC236}">
+                <a16:creationId xmlns:a16="http://schemas.microsoft.com/office/drawing/2014/main" id="{F3F569DD-AF1F-FA8D-C6FF-90B2F55A9F4C}"/>
+              </a:ext>
+            </a:extLst>
+          </p:cNvPr>
+          <p:cNvGrpSpPr/>
+          <p:nvPr/>
+        </p:nvGrpSpPr>
+        <p:grpSpPr>
+          <a:xfrm>
+            <a:off x="6980286" y="1923026"/>
+            <a:ext cx="5105400" cy="4211074"/>
+            <a:chOff x="0" y="0"/>
+            <a:chExt cx="3541126" cy="2546147"/>
+          </a:xfrm>
+        </p:grpSpPr>
+        <p:sp>
+          <p:nvSpPr>
+            <p:cNvPr id="14" name="Shape 1509">
+              <a:extLst>
+                <a:ext uri="{FF2B5EF4-FFF2-40B4-BE49-F238E27FC236}">
+                  <a16:creationId xmlns:a16="http://schemas.microsoft.com/office/drawing/2014/main" id="{9DCE75EB-360F-CD85-9929-1BFCD6DBEF44}"/>
+                </a:ext>
+              </a:extLst>
+            </p:cNvPr>
+            <p:cNvSpPr/>
+            <p:nvPr/>
+          </p:nvSpPr>
+          <p:spPr>
+            <a:xfrm>
+              <a:off x="0" y="0"/>
+              <a:ext cx="3370250" cy="2546147"/>
+            </a:xfrm>
+            <a:custGeom>
+              <a:avLst/>
+              <a:gdLst/>
+              <a:ahLst/>
+              <a:cxnLst/>
+              <a:rect l="0" t="0" r="0" b="0"/>
+              <a:pathLst>
+                <a:path w="3370250" h="2546147">
+                  <a:moveTo>
+                    <a:pt x="108001" y="0"/>
+                  </a:moveTo>
+                  <a:cubicBezTo>
+                    <a:pt x="108001" y="0"/>
+                    <a:pt x="0" y="0"/>
+                    <a:pt x="0" y="108001"/>
+                  </a:cubicBezTo>
+                  <a:lnTo>
+                    <a:pt x="0" y="2438146"/>
+                  </a:lnTo>
+                  <a:cubicBezTo>
+                    <a:pt x="0" y="2438146"/>
+                    <a:pt x="0" y="2546147"/>
+                    <a:pt x="108001" y="2546147"/>
+                  </a:cubicBezTo>
+                  <a:lnTo>
+                    <a:pt x="3262249" y="2546147"/>
+                  </a:lnTo>
+                  <a:cubicBezTo>
+                    <a:pt x="3262249" y="2546147"/>
+                    <a:pt x="3370250" y="2546147"/>
+                    <a:pt x="3370250" y="2438146"/>
+                  </a:cubicBezTo>
+                  <a:lnTo>
+                    <a:pt x="3370250" y="108001"/>
+                  </a:lnTo>
+                  <a:cubicBezTo>
+                    <a:pt x="3370250" y="108001"/>
+                    <a:pt x="3370250" y="0"/>
+                    <a:pt x="3262249" y="0"/>
+                  </a:cubicBezTo>
+                  <a:lnTo>
+                    <a:pt x="108001" y="0"/>
+                  </a:lnTo>
+                  <a:close/>
+                </a:path>
+              </a:pathLst>
+            </a:custGeom>
+            <a:ln w="12700" cap="flat">
+              <a:miter lim="100000"/>
+            </a:ln>
+          </p:spPr>
+          <p:style>
+            <a:lnRef idx="1">
+              <a:srgbClr val="6B6764"/>
+            </a:lnRef>
+            <a:fillRef idx="0">
+              <a:srgbClr val="000000">
+                <a:alpha val="0"/>
+              </a:srgbClr>
+            </a:fillRef>
+            <a:effectRef idx="0">
+              <a:scrgbClr r="0" g="0" b="0"/>
+            </a:effectRef>
+            <a:fontRef idx="none"/>
+          </p:style>
+          <p:txBody>
+            <a:bodyPr/>
+            <a:lstStyle/>
+            <a:p>
+              <a:endParaRPr lang="pt-BR"/>
+            </a:p>
+          </p:txBody>
+        </p:sp>
+        <p:sp>
+          <p:nvSpPr>
+            <p:cNvPr id="15" name="Rectangle 1510">
+              <a:extLst>
+                <a:ext uri="{FF2B5EF4-FFF2-40B4-BE49-F238E27FC236}">
+                  <a16:creationId xmlns:a16="http://schemas.microsoft.com/office/drawing/2014/main" id="{63D5F74B-2BFB-D8A0-1296-C54140F62FD5}"/>
+                </a:ext>
+              </a:extLst>
+            </p:cNvPr>
+            <p:cNvSpPr/>
+            <p:nvPr/>
+          </p:nvSpPr>
+          <p:spPr>
+            <a:xfrm>
+              <a:off x="129376" y="2192163"/>
+              <a:ext cx="652151" cy="165126"/>
+            </a:xfrm>
+            <a:prstGeom prst="rect">
+              <a:avLst/>
+            </a:prstGeom>
+            <a:ln>
+              <a:noFill/>
+            </a:ln>
+          </p:spPr>
+          <p:txBody>
+            <a:bodyPr vert="horz" lIns="0" tIns="0" rIns="0" bIns="0" rtlCol="0">
+              <a:noAutofit/>
+            </a:bodyPr>
+            <a:lstStyle/>
+            <a:p>
+              <a:pPr marR="127000" indent="163830" algn="l">
+                <a:lnSpc>
+                  <a:spcPct val="107000"/>
+                </a:lnSpc>
+                <a:spcAft>
+                  <a:spcPts val="800"/>
+                </a:spcAft>
+              </a:pPr>
+              <a:r>
+                <a:rPr lang="pt-BR" sz="800" b="1" kern="100" dirty="0">
+                  <a:solidFill>
+                    <a:srgbClr val="2F2115"/>
+                  </a:solidFill>
+                  <a:effectLst/>
+                  <a:latin typeface="Calibri" panose="020F0502020204030204" pitchFamily="34" charset="0"/>
+                  <a:ea typeface="Calibri" panose="020F0502020204030204" pitchFamily="34" charset="0"/>
+                </a:rPr>
+                <a:t>Figura</a:t>
+              </a:r>
+              <a:r>
+                <a:rPr lang="pt-BR" sz="800" b="1" kern="100" spc="90" dirty="0">
+                  <a:solidFill>
+                    <a:srgbClr val="2F2115"/>
+                  </a:solidFill>
+                  <a:effectLst/>
+                  <a:latin typeface="Calibri" panose="020F0502020204030204" pitchFamily="34" charset="0"/>
+                  <a:ea typeface="Calibri" panose="020F0502020204030204" pitchFamily="34" charset="0"/>
+                </a:rPr>
+                <a:t> </a:t>
+              </a:r>
+              <a:r>
+                <a:rPr lang="pt-BR" sz="800" b="1" kern="100" dirty="0">
+                  <a:solidFill>
+                    <a:srgbClr val="2F2115"/>
+                  </a:solidFill>
+                  <a:effectLst/>
+                  <a:latin typeface="Calibri" panose="020F0502020204030204" pitchFamily="34" charset="0"/>
+                  <a:ea typeface="Calibri" panose="020F0502020204030204" pitchFamily="34" charset="0"/>
+                </a:rPr>
+                <a:t>15. </a:t>
+              </a:r>
+              <a:endParaRPr lang="pt-BR" sz="1000" kern="100" dirty="0">
+                <a:solidFill>
+                  <a:srgbClr val="2F2115"/>
+                </a:solidFill>
+                <a:effectLst/>
+                <a:latin typeface="Times New Roman" panose="02020603050405020304" pitchFamily="18" charset="0"/>
+                <a:ea typeface="Times New Roman" panose="02020603050405020304" pitchFamily="18" charset="0"/>
+              </a:endParaRPr>
+            </a:p>
+          </p:txBody>
+        </p:sp>
+        <p:sp>
+          <p:nvSpPr>
+            <p:cNvPr id="16" name="Rectangle 1511">
+              <a:extLst>
+                <a:ext uri="{FF2B5EF4-FFF2-40B4-BE49-F238E27FC236}">
+                  <a16:creationId xmlns:a16="http://schemas.microsoft.com/office/drawing/2014/main" id="{A34C4E5A-6576-A2F3-4D30-21AC16B9E5F9}"/>
+                </a:ext>
+              </a:extLst>
+            </p:cNvPr>
+            <p:cNvSpPr/>
+            <p:nvPr/>
+          </p:nvSpPr>
+          <p:spPr>
+            <a:xfrm>
+              <a:off x="631501" y="2195922"/>
+              <a:ext cx="2909625" cy="160127"/>
+            </a:xfrm>
+            <a:prstGeom prst="rect">
+              <a:avLst/>
+            </a:prstGeom>
+            <a:ln>
+              <a:noFill/>
+            </a:ln>
+          </p:spPr>
+          <p:txBody>
+            <a:bodyPr vert="horz" lIns="0" tIns="0" rIns="0" bIns="0" rtlCol="0">
+              <a:noAutofit/>
+            </a:bodyPr>
+            <a:lstStyle/>
+            <a:p>
+              <a:pPr marR="127000" indent="163830" algn="l">
+                <a:lnSpc>
+                  <a:spcPct val="107000"/>
+                </a:lnSpc>
+                <a:spcAft>
+                  <a:spcPts val="800"/>
+                </a:spcAft>
+              </a:pPr>
+              <a:r>
+                <a:rPr lang="pt-BR" sz="800" kern="100" dirty="0">
+                  <a:solidFill>
+                    <a:srgbClr val="2F2115"/>
+                  </a:solidFill>
+                  <a:effectLst/>
+                  <a:latin typeface="Calibri" panose="020F0502020204030204" pitchFamily="34" charset="0"/>
+                  <a:ea typeface="Calibri" panose="020F0502020204030204" pitchFamily="34" charset="0"/>
+                </a:rPr>
+                <a:t>Instrução</a:t>
+              </a:r>
+              <a:r>
+                <a:rPr lang="pt-BR" sz="800" kern="100" spc="105" dirty="0">
+                  <a:solidFill>
+                    <a:srgbClr val="2F2115"/>
+                  </a:solidFill>
+                  <a:effectLst/>
+                  <a:latin typeface="Calibri" panose="020F0502020204030204" pitchFamily="34" charset="0"/>
+                  <a:ea typeface="Calibri" panose="020F0502020204030204" pitchFamily="34" charset="0"/>
+                </a:rPr>
+                <a:t> </a:t>
+              </a:r>
+              <a:r>
+                <a:rPr lang="pt-BR" sz="800" kern="100" dirty="0">
+                  <a:solidFill>
+                    <a:srgbClr val="2F2115"/>
+                  </a:solidFill>
+                  <a:effectLst/>
+                  <a:latin typeface="Calibri" panose="020F0502020204030204" pitchFamily="34" charset="0"/>
+                  <a:ea typeface="Calibri" panose="020F0502020204030204" pitchFamily="34" charset="0"/>
+                </a:rPr>
+                <a:t>em</a:t>
+              </a:r>
+              <a:r>
+                <a:rPr lang="pt-BR" sz="800" kern="100" spc="105" dirty="0">
+                  <a:solidFill>
+                    <a:srgbClr val="2F2115"/>
+                  </a:solidFill>
+                  <a:effectLst/>
+                  <a:latin typeface="Calibri" panose="020F0502020204030204" pitchFamily="34" charset="0"/>
+                  <a:ea typeface="Calibri" panose="020F0502020204030204" pitchFamily="34" charset="0"/>
+                </a:rPr>
+                <a:t> </a:t>
+              </a:r>
+              <a:r>
+                <a:rPr lang="pt-BR" sz="800" kern="100" dirty="0">
+                  <a:solidFill>
+                    <a:srgbClr val="2F2115"/>
+                  </a:solidFill>
+                  <a:effectLst/>
+                  <a:latin typeface="Calibri" panose="020F0502020204030204" pitchFamily="34" charset="0"/>
+                  <a:ea typeface="Calibri" panose="020F0502020204030204" pitchFamily="34" charset="0"/>
+                </a:rPr>
+                <a:t>SQL</a:t>
+              </a:r>
+              <a:r>
+                <a:rPr lang="pt-BR" sz="800" kern="100" spc="105" dirty="0">
+                  <a:solidFill>
+                    <a:srgbClr val="2F2115"/>
+                  </a:solidFill>
+                  <a:effectLst/>
+                  <a:latin typeface="Calibri" panose="020F0502020204030204" pitchFamily="34" charset="0"/>
+                  <a:ea typeface="Calibri" panose="020F0502020204030204" pitchFamily="34" charset="0"/>
+                </a:rPr>
+                <a:t> </a:t>
+              </a:r>
+              <a:r>
+                <a:rPr lang="pt-BR" sz="800" kern="100" dirty="0">
+                  <a:solidFill>
+                    <a:srgbClr val="2F2115"/>
+                  </a:solidFill>
+                  <a:effectLst/>
+                  <a:latin typeface="Calibri" panose="020F0502020204030204" pitchFamily="34" charset="0"/>
+                  <a:ea typeface="Calibri" panose="020F0502020204030204" pitchFamily="34" charset="0"/>
+                </a:rPr>
+                <a:t>referente</a:t>
+              </a:r>
+              <a:r>
+                <a:rPr lang="pt-BR" sz="800" kern="100" spc="105" dirty="0">
+                  <a:solidFill>
+                    <a:srgbClr val="2F2115"/>
+                  </a:solidFill>
+                  <a:effectLst/>
+                  <a:latin typeface="Calibri" panose="020F0502020204030204" pitchFamily="34" charset="0"/>
+                  <a:ea typeface="Calibri" panose="020F0502020204030204" pitchFamily="34" charset="0"/>
+                </a:rPr>
+                <a:t> </a:t>
+              </a:r>
+              <a:r>
+                <a:rPr lang="pt-BR" sz="800" kern="100" dirty="0">
+                  <a:solidFill>
+                    <a:srgbClr val="2F2115"/>
+                  </a:solidFill>
+                  <a:effectLst/>
+                  <a:latin typeface="Calibri" panose="020F0502020204030204" pitchFamily="34" charset="0"/>
+                  <a:ea typeface="Calibri" panose="020F0502020204030204" pitchFamily="34" charset="0"/>
+                </a:rPr>
+                <a:t>à</a:t>
+              </a:r>
+              <a:r>
+                <a:rPr lang="pt-BR" sz="800" kern="100" spc="105" dirty="0">
+                  <a:solidFill>
+                    <a:srgbClr val="2F2115"/>
+                  </a:solidFill>
+                  <a:effectLst/>
+                  <a:latin typeface="Calibri" panose="020F0502020204030204" pitchFamily="34" charset="0"/>
+                  <a:ea typeface="Calibri" panose="020F0502020204030204" pitchFamily="34" charset="0"/>
+                </a:rPr>
+                <a:t> </a:t>
+              </a:r>
+              <a:r>
+                <a:rPr lang="pt-BR" sz="800" kern="100" dirty="0">
+                  <a:solidFill>
+                    <a:srgbClr val="2F2115"/>
+                  </a:solidFill>
+                  <a:effectLst/>
+                  <a:latin typeface="Calibri" panose="020F0502020204030204" pitchFamily="34" charset="0"/>
+                  <a:ea typeface="Calibri" panose="020F0502020204030204" pitchFamily="34" charset="0"/>
+                </a:rPr>
+                <a:t>criação</a:t>
+              </a:r>
+              <a:r>
+                <a:rPr lang="pt-BR" sz="800" kern="100" spc="105" dirty="0">
+                  <a:solidFill>
+                    <a:srgbClr val="2F2115"/>
+                  </a:solidFill>
+                  <a:effectLst/>
+                  <a:latin typeface="Calibri" panose="020F0502020204030204" pitchFamily="34" charset="0"/>
+                  <a:ea typeface="Calibri" panose="020F0502020204030204" pitchFamily="34" charset="0"/>
+                </a:rPr>
+                <a:t> </a:t>
+              </a:r>
+              <a:r>
+                <a:rPr lang="pt-BR" sz="800" kern="100" dirty="0">
+                  <a:solidFill>
+                    <a:srgbClr val="2F2115"/>
+                  </a:solidFill>
+                  <a:effectLst/>
+                  <a:latin typeface="Calibri" panose="020F0502020204030204" pitchFamily="34" charset="0"/>
+                  <a:ea typeface="Calibri" panose="020F0502020204030204" pitchFamily="34" charset="0"/>
+                </a:rPr>
+                <a:t>das</a:t>
+              </a:r>
+              <a:r>
+                <a:rPr lang="pt-BR" sz="800" kern="100" spc="105" dirty="0">
+                  <a:solidFill>
+                    <a:srgbClr val="2F2115"/>
+                  </a:solidFill>
+                  <a:effectLst/>
+                  <a:latin typeface="Calibri" panose="020F0502020204030204" pitchFamily="34" charset="0"/>
+                  <a:ea typeface="Calibri" panose="020F0502020204030204" pitchFamily="34" charset="0"/>
+                </a:rPr>
+                <a:t> </a:t>
+              </a:r>
+              <a:r>
+                <a:rPr lang="pt-BR" sz="800" kern="100" dirty="0">
+                  <a:solidFill>
+                    <a:srgbClr val="2F2115"/>
+                  </a:solidFill>
+                  <a:effectLst/>
+                  <a:latin typeface="Calibri" panose="020F0502020204030204" pitchFamily="34" charset="0"/>
+                  <a:ea typeface="Calibri" panose="020F0502020204030204" pitchFamily="34" charset="0"/>
+                </a:rPr>
+                <a:t>tabelas</a:t>
+              </a:r>
+              <a:r>
+                <a:rPr lang="pt-BR" sz="800" kern="100" spc="10" dirty="0">
+                  <a:solidFill>
+                    <a:srgbClr val="2F2115"/>
+                  </a:solidFill>
+                  <a:effectLst/>
+                  <a:latin typeface="Calibri" panose="020F0502020204030204" pitchFamily="34" charset="0"/>
+                  <a:ea typeface="Calibri" panose="020F0502020204030204" pitchFamily="34" charset="0"/>
+                </a:rPr>
+                <a:t> </a:t>
+              </a:r>
+              <a:endParaRPr lang="pt-BR" sz="1000" kern="100" dirty="0">
+                <a:solidFill>
+                  <a:srgbClr val="2F2115"/>
+                </a:solidFill>
+                <a:effectLst/>
+                <a:latin typeface="Times New Roman" panose="02020603050405020304" pitchFamily="18" charset="0"/>
+                <a:ea typeface="Times New Roman" panose="02020603050405020304" pitchFamily="18" charset="0"/>
+              </a:endParaRPr>
+            </a:p>
+          </p:txBody>
+        </p:sp>
+        <p:sp>
+          <p:nvSpPr>
+            <p:cNvPr id="17" name="Rectangle 1512">
+              <a:extLst>
+                <a:ext uri="{FF2B5EF4-FFF2-40B4-BE49-F238E27FC236}">
+                  <a16:creationId xmlns:a16="http://schemas.microsoft.com/office/drawing/2014/main" id="{74AC0E44-B559-13E9-D406-8EB12D825471}"/>
+                </a:ext>
+              </a:extLst>
+            </p:cNvPr>
+            <p:cNvSpPr/>
+            <p:nvPr/>
+          </p:nvSpPr>
+          <p:spPr>
+            <a:xfrm>
+              <a:off x="2831533" y="2228658"/>
+              <a:ext cx="434247" cy="123383"/>
+            </a:xfrm>
+            <a:prstGeom prst="rect">
+              <a:avLst/>
+            </a:prstGeom>
+            <a:ln>
+              <a:noFill/>
+            </a:ln>
+          </p:spPr>
+          <p:txBody>
+            <a:bodyPr vert="horz" lIns="0" tIns="0" rIns="0" bIns="0" rtlCol="0">
+              <a:noAutofit/>
+            </a:bodyPr>
+            <a:lstStyle/>
+            <a:p>
+              <a:pPr marR="127000" indent="163830" algn="l">
+                <a:lnSpc>
+                  <a:spcPct val="107000"/>
+                </a:lnSpc>
+                <a:spcAft>
+                  <a:spcPts val="800"/>
+                </a:spcAft>
+              </a:pPr>
+              <a:r>
+                <a:rPr lang="pt-BR" sz="800" kern="100">
+                  <a:solidFill>
+                    <a:srgbClr val="2F2115"/>
+                  </a:solidFill>
+                  <a:effectLst/>
+                  <a:latin typeface="Courier New" panose="02070309020205020404" pitchFamily="49" charset="0"/>
+                  <a:ea typeface="Courier New" panose="02070309020205020404" pitchFamily="49" charset="0"/>
+                </a:rPr>
+                <a:t>EMAIL</a:t>
+              </a:r>
+              <a:endParaRPr lang="pt-BR" sz="1000" kern="100">
+                <a:solidFill>
+                  <a:srgbClr val="2F2115"/>
+                </a:solidFill>
+                <a:effectLst/>
+                <a:latin typeface="Times New Roman" panose="02020603050405020304" pitchFamily="18" charset="0"/>
+                <a:ea typeface="Times New Roman" panose="02020603050405020304" pitchFamily="18" charset="0"/>
+              </a:endParaRPr>
+            </a:p>
+          </p:txBody>
+        </p:sp>
+        <p:sp>
+          <p:nvSpPr>
+            <p:cNvPr id="18" name="Rectangle 1513">
+              <a:extLst>
+                <a:ext uri="{FF2B5EF4-FFF2-40B4-BE49-F238E27FC236}">
+                  <a16:creationId xmlns:a16="http://schemas.microsoft.com/office/drawing/2014/main" id="{644BA579-320A-B62E-1BFF-D64188C774E0}"/>
+                </a:ext>
+              </a:extLst>
+            </p:cNvPr>
+            <p:cNvSpPr/>
+            <p:nvPr/>
+          </p:nvSpPr>
+          <p:spPr>
+            <a:xfrm>
+              <a:off x="3161048" y="2196125"/>
+              <a:ext cx="25053" cy="159856"/>
+            </a:xfrm>
+            <a:prstGeom prst="rect">
+              <a:avLst/>
+            </a:prstGeom>
+            <a:ln>
+              <a:noFill/>
+            </a:ln>
+          </p:spPr>
+          <p:txBody>
+            <a:bodyPr vert="horz" lIns="0" tIns="0" rIns="0" bIns="0" rtlCol="0">
+              <a:noAutofit/>
+            </a:bodyPr>
+            <a:lstStyle/>
+            <a:p>
+              <a:pPr marR="127000" indent="163830" algn="l">
+                <a:lnSpc>
+                  <a:spcPct val="107000"/>
+                </a:lnSpc>
+                <a:spcAft>
+                  <a:spcPts val="800"/>
+                </a:spcAft>
+              </a:pPr>
+              <a:r>
+                <a:rPr lang="pt-BR" sz="800" i="1" kern="100">
+                  <a:solidFill>
+                    <a:srgbClr val="2F2115"/>
+                  </a:solidFill>
+                  <a:effectLst/>
+                  <a:latin typeface="Calibri" panose="020F0502020204030204" pitchFamily="34" charset="0"/>
+                  <a:ea typeface="Calibri" panose="020F0502020204030204" pitchFamily="34" charset="0"/>
+                </a:rPr>
+                <a:t> </a:t>
+              </a:r>
+              <a:endParaRPr lang="pt-BR" sz="1000" kern="100">
+                <a:solidFill>
+                  <a:srgbClr val="2F2115"/>
+                </a:solidFill>
+                <a:effectLst/>
+                <a:latin typeface="Times New Roman" panose="02020603050405020304" pitchFamily="18" charset="0"/>
+                <a:ea typeface="Times New Roman" panose="02020603050405020304" pitchFamily="18" charset="0"/>
+              </a:endParaRPr>
+            </a:p>
+          </p:txBody>
+        </p:sp>
+        <p:sp>
+          <p:nvSpPr>
+            <p:cNvPr id="19" name="Rectangle 1514">
+              <a:extLst>
+                <a:ext uri="{FF2B5EF4-FFF2-40B4-BE49-F238E27FC236}">
+                  <a16:creationId xmlns:a16="http://schemas.microsoft.com/office/drawing/2014/main" id="{6B43A3FF-6D34-A3F5-F074-02E64CE39E66}"/>
+                </a:ext>
+              </a:extLst>
+            </p:cNvPr>
+            <p:cNvSpPr/>
+            <p:nvPr/>
+          </p:nvSpPr>
+          <p:spPr>
+            <a:xfrm>
+              <a:off x="3190124" y="2195922"/>
+              <a:ext cx="67503" cy="160127"/>
+            </a:xfrm>
+            <a:prstGeom prst="rect">
+              <a:avLst/>
+            </a:prstGeom>
+            <a:ln>
+              <a:noFill/>
+            </a:ln>
+          </p:spPr>
+          <p:txBody>
+            <a:bodyPr vert="horz" lIns="0" tIns="0" rIns="0" bIns="0" rtlCol="0">
+              <a:noAutofit/>
+            </a:bodyPr>
+            <a:lstStyle/>
+            <a:p>
+              <a:pPr marR="127000" indent="163830" algn="l">
+                <a:lnSpc>
+                  <a:spcPct val="107000"/>
+                </a:lnSpc>
+                <a:spcAft>
+                  <a:spcPts val="800"/>
+                </a:spcAft>
+              </a:pPr>
+              <a:r>
+                <a:rPr lang="pt-BR" sz="800" kern="100">
+                  <a:solidFill>
+                    <a:srgbClr val="2F2115"/>
+                  </a:solidFill>
+                  <a:effectLst/>
+                  <a:latin typeface="Calibri" panose="020F0502020204030204" pitchFamily="34" charset="0"/>
+                  <a:ea typeface="Calibri" panose="020F0502020204030204" pitchFamily="34" charset="0"/>
+                </a:rPr>
+                <a:t>e</a:t>
+              </a:r>
+              <a:endParaRPr lang="pt-BR" sz="1000" kern="100">
+                <a:solidFill>
+                  <a:srgbClr val="2F2115"/>
+                </a:solidFill>
+                <a:effectLst/>
+                <a:latin typeface="Times New Roman" panose="02020603050405020304" pitchFamily="18" charset="0"/>
+                <a:ea typeface="Times New Roman" panose="02020603050405020304" pitchFamily="18" charset="0"/>
+              </a:endParaRPr>
+            </a:p>
+          </p:txBody>
+        </p:sp>
+        <p:sp>
+          <p:nvSpPr>
+            <p:cNvPr id="20" name="Rectangle 1515">
+              <a:extLst>
+                <a:ext uri="{FF2B5EF4-FFF2-40B4-BE49-F238E27FC236}">
+                  <a16:creationId xmlns:a16="http://schemas.microsoft.com/office/drawing/2014/main" id="{1820349C-8445-DAA5-0751-883A138CFA1C}"/>
+                </a:ext>
+              </a:extLst>
+            </p:cNvPr>
+            <p:cNvSpPr/>
+            <p:nvPr/>
+          </p:nvSpPr>
+          <p:spPr>
+            <a:xfrm>
+              <a:off x="3240876" y="2196125"/>
+              <a:ext cx="25053" cy="159856"/>
+            </a:xfrm>
+            <a:prstGeom prst="rect">
+              <a:avLst/>
+            </a:prstGeom>
+            <a:ln>
+              <a:noFill/>
+            </a:ln>
+          </p:spPr>
+          <p:txBody>
+            <a:bodyPr vert="horz" lIns="0" tIns="0" rIns="0" bIns="0" rtlCol="0">
+              <a:noAutofit/>
+            </a:bodyPr>
+            <a:lstStyle/>
+            <a:p>
+              <a:pPr marR="127000" indent="163830" algn="l">
+                <a:lnSpc>
+                  <a:spcPct val="107000"/>
+                </a:lnSpc>
+                <a:spcAft>
+                  <a:spcPts val="800"/>
+                </a:spcAft>
+              </a:pPr>
+              <a:r>
+                <a:rPr lang="pt-BR" sz="800" i="1" kern="100">
+                  <a:solidFill>
+                    <a:srgbClr val="2F2115"/>
+                  </a:solidFill>
+                  <a:effectLst/>
+                  <a:latin typeface="Calibri" panose="020F0502020204030204" pitchFamily="34" charset="0"/>
+                  <a:ea typeface="Calibri" panose="020F0502020204030204" pitchFamily="34" charset="0"/>
+                </a:rPr>
+                <a:t> </a:t>
+              </a:r>
+              <a:endParaRPr lang="pt-BR" sz="1000" kern="100">
+                <a:solidFill>
+                  <a:srgbClr val="2F2115"/>
+                </a:solidFill>
+                <a:effectLst/>
+                <a:latin typeface="Times New Roman" panose="02020603050405020304" pitchFamily="18" charset="0"/>
+                <a:ea typeface="Times New Roman" panose="02020603050405020304" pitchFamily="18" charset="0"/>
+              </a:endParaRPr>
+            </a:p>
+          </p:txBody>
+        </p:sp>
+        <p:sp>
+          <p:nvSpPr>
+            <p:cNvPr id="21" name="Rectangle 1516">
+              <a:extLst>
+                <a:ext uri="{FF2B5EF4-FFF2-40B4-BE49-F238E27FC236}">
+                  <a16:creationId xmlns:a16="http://schemas.microsoft.com/office/drawing/2014/main" id="{05C22564-7D0C-B598-184B-04359483B181}"/>
+                </a:ext>
+              </a:extLst>
+            </p:cNvPr>
+            <p:cNvSpPr/>
+            <p:nvPr/>
+          </p:nvSpPr>
+          <p:spPr>
+            <a:xfrm>
+              <a:off x="129376" y="2368358"/>
+              <a:ext cx="648614" cy="123383"/>
+            </a:xfrm>
+            <a:prstGeom prst="rect">
+              <a:avLst/>
+            </a:prstGeom>
+            <a:ln>
+              <a:noFill/>
+            </a:ln>
+          </p:spPr>
+          <p:txBody>
+            <a:bodyPr vert="horz" lIns="0" tIns="0" rIns="0" bIns="0" rtlCol="0">
+              <a:noAutofit/>
+            </a:bodyPr>
+            <a:lstStyle/>
+            <a:p>
+              <a:pPr marR="127000" indent="163830" algn="l">
+                <a:lnSpc>
+                  <a:spcPct val="107000"/>
+                </a:lnSpc>
+                <a:spcAft>
+                  <a:spcPts val="800"/>
+                </a:spcAft>
+              </a:pPr>
+              <a:r>
+                <a:rPr lang="pt-BR" sz="800" kern="100">
+                  <a:solidFill>
+                    <a:srgbClr val="2F2115"/>
+                  </a:solidFill>
+                  <a:effectLst/>
+                  <a:latin typeface="Courier New" panose="02070309020205020404" pitchFamily="49" charset="0"/>
+                  <a:ea typeface="Courier New" panose="02070309020205020404" pitchFamily="49" charset="0"/>
+                </a:rPr>
+                <a:t>TELEFONE</a:t>
+              </a:r>
+              <a:endParaRPr lang="pt-BR" sz="1000" kern="100">
+                <a:solidFill>
+                  <a:srgbClr val="2F2115"/>
+                </a:solidFill>
+                <a:effectLst/>
+                <a:latin typeface="Times New Roman" panose="02020603050405020304" pitchFamily="18" charset="0"/>
+                <a:ea typeface="Times New Roman" panose="02020603050405020304" pitchFamily="18" charset="0"/>
+              </a:endParaRPr>
+            </a:p>
+          </p:txBody>
+        </p:sp>
+        <p:sp>
+          <p:nvSpPr>
+            <p:cNvPr id="22" name="Rectangle 1517">
+              <a:extLst>
+                <a:ext uri="{FF2B5EF4-FFF2-40B4-BE49-F238E27FC236}">
+                  <a16:creationId xmlns:a16="http://schemas.microsoft.com/office/drawing/2014/main" id="{0DBCFEE8-C653-FD9A-DF69-B2D7832EC166}"/>
+                </a:ext>
+              </a:extLst>
+            </p:cNvPr>
+            <p:cNvSpPr/>
+            <p:nvPr/>
+          </p:nvSpPr>
+          <p:spPr>
+            <a:xfrm>
+              <a:off x="617136" y="2335622"/>
+              <a:ext cx="23512" cy="160127"/>
+            </a:xfrm>
+            <a:prstGeom prst="rect">
+              <a:avLst/>
+            </a:prstGeom>
+            <a:ln>
+              <a:noFill/>
+            </a:ln>
+          </p:spPr>
+          <p:txBody>
+            <a:bodyPr vert="horz" lIns="0" tIns="0" rIns="0" bIns="0" rtlCol="0">
+              <a:noAutofit/>
+            </a:bodyPr>
+            <a:lstStyle/>
+            <a:p>
+              <a:pPr marR="127000" indent="163830" algn="l">
+                <a:lnSpc>
+                  <a:spcPct val="107000"/>
+                </a:lnSpc>
+                <a:spcAft>
+                  <a:spcPts val="800"/>
+                </a:spcAft>
+              </a:pPr>
+              <a:r>
+                <a:rPr lang="pt-BR" sz="800" kern="100">
+                  <a:solidFill>
+                    <a:srgbClr val="2F2115"/>
+                  </a:solidFill>
+                  <a:effectLst/>
+                  <a:latin typeface="Calibri" panose="020F0502020204030204" pitchFamily="34" charset="0"/>
+                  <a:ea typeface="Calibri" panose="020F0502020204030204" pitchFamily="34" charset="0"/>
+                </a:rPr>
+                <a:t>.</a:t>
+              </a:r>
+              <a:endParaRPr lang="pt-BR" sz="1000" kern="100">
+                <a:solidFill>
+                  <a:srgbClr val="2F2115"/>
+                </a:solidFill>
+                <a:effectLst/>
+                <a:latin typeface="Times New Roman" panose="02020603050405020304" pitchFamily="18" charset="0"/>
+                <a:ea typeface="Times New Roman" panose="02020603050405020304" pitchFamily="18" charset="0"/>
+              </a:endParaRPr>
+            </a:p>
+          </p:txBody>
+        </p:sp>
+        <p:pic>
+          <p:nvPicPr>
+            <p:cNvPr id="23" name="Picture 1519">
+              <a:extLst>
+                <a:ext uri="{FF2B5EF4-FFF2-40B4-BE49-F238E27FC236}">
+                  <a16:creationId xmlns:a16="http://schemas.microsoft.com/office/drawing/2014/main" id="{FD8CF18B-F882-BE80-CE15-BAA4BEA7D4DD}"/>
+                </a:ext>
+              </a:extLst>
+            </p:cNvPr>
+            <p:cNvPicPr/>
+            <p:nvPr/>
+          </p:nvPicPr>
+          <p:blipFill>
+            <a:blip r:embed="rId2"/>
+            <a:stretch>
+              <a:fillRect/>
+            </a:stretch>
+          </p:blipFill>
+          <p:spPr>
+            <a:xfrm>
+              <a:off x="129376" y="147610"/>
+              <a:ext cx="3111500" cy="1957739"/>
+            </a:xfrm>
+            <a:prstGeom prst="rect">
+              <a:avLst/>
+            </a:prstGeom>
+          </p:spPr>
+        </p:pic>
+      </p:grpSp>
+    </p:spTree>
+    <p:extLst>
+      <p:ext uri="{BB962C8B-B14F-4D97-AF65-F5344CB8AC3E}">
+        <p14:creationId xmlns:p14="http://schemas.microsoft.com/office/powerpoint/2010/main" val="3328104388"/>
       </p:ext>
     </p:extLst>
   </p:cSld>

</xml_diff>